<commit_message>
login có remember me
</commit_message>
<xml_diff>
--- a/lesson10.pptx
+++ b/lesson10.pptx
@@ -12,6 +12,12 @@
     <p:sldId id="260" r:id="rId6"/>
     <p:sldId id="261" r:id="rId7"/>
     <p:sldId id="262" r:id="rId8"/>
+    <p:sldId id="263" r:id="rId9"/>
+    <p:sldId id="264" r:id="rId10"/>
+    <p:sldId id="265" r:id="rId11"/>
+    <p:sldId id="266" r:id="rId12"/>
+    <p:sldId id="267" r:id="rId13"/>
+    <p:sldId id="268" r:id="rId14"/>
   </p:sldIdLst>
   <p:sldSz cx="12192000" cy="6858000"/>
   <p:notesSz cx="6858000" cy="9144000"/>
@@ -110,6 +116,11 @@
       </a:defRPr>
     </a:lvl9pPr>
   </p:defaultTextStyle>
+  <p:extLst>
+    <p:ext uri="{EFAFB233-063F-42B5-8137-9DF3F51BA10A}">
+      <p15:sldGuideLst xmlns:p15="http://schemas.microsoft.com/office/powerpoint/2012/main"/>
+    </p:ext>
+  </p:extLst>
 </p:presentation>
 </file>
 
@@ -390,182 +401,182 @@
   <inkml:trace contextRef="#ctx0" brushRef="#br0" timeOffset="162125">26950 13928 10321,'0'-8'1169,"0"25"-1079,17 4 0,-13 24-90,30-2-887,-29 9 887,13-23 0,1 0 90,-14 36-90,14-32 0,0 1-468,-16 0 0,-1 0 468,13-1 0,2 1 0,-9 10 0,-3 1 0,11 18 0,-6-25 0,-2-1 0,-6 1-341,9-5 251,-10-9-449,5-7-91,-6-6 1294,3-24-664,-3-17 0,0-15 799,0-8-709,0 6 90,9 13 0,0 1 180,-4-16-91,11 12 1,0 2 0,-12 3 835,24-1-1105,-13 23 0,7 4-90,-2 31 180,-6-6-90,-3 12 0,0 2-270,6 9-135,-2-2 1,-1 1-496,4 8-135,-4-10 1,0-2 91,4 4 943,17 10 0,-13-33 0,11-1 0</inkml:trace>
   <inkml:trace contextRef="#ctx0" brushRef="#br0" timeOffset="162808">27823 14389 11041,'-16'-5'359,"12"-5"271,-31 9-450,11-4-90,-9 5-90,11 17 0,-14 9 90,22 10-135,-5-8 0,0 0 45,9 9-180,-5 12-90,14-17 180,-2-1 0,3-3-180,23 4 91,-18-12-181,35-3 180,-18-12 180,16-25 90,-1-8 0,-16-10 270,3-3-1,-21 11 451,7-11-540,-10 13-180,0-5-180,0 15 90,0 31 0,0 21-90,0 12-180,7-11 0,1-2 0,-4-1 0,27 7-539,-6-19 359,6-3-359,9-7 539,-15-4 180,14-24 90,-15-10-727,5-10 996,-12-4 1,-1 9 270,-6 0 136,-1-11-316,-6 14-90,-1-11-180,-2 22-180,0 23 180,0 12 700,0 31-790,16-13 340,-12 1-520,27-9 0,-12-12 0,8 7 91,10-19 89,-13 5 0,14-24 0,-16-10 0,9-24 89,-15 6 451,2-17-180,-11 26-90,-2-8-90,-3 12-270,-2 12-90,0 18-989,0 33-1,18 7-2068,-1 26 3238,5-31 0,7 9 0,-9-16 0</inkml:trace>
   <inkml:trace contextRef="#ctx0" brushRef="#br0" timeOffset="162954">28985 14412 14189,'11'0'-990,"-2"0"541,-3 12-91,-3-9 540,0 10 0,-2-13 0,-1 0 0</inkml:trace>
-  <inkml:trace contextRef="#ctx0" brushRef="#br0" timeOffset="463029">8313 2542 7803,'-21'0'1799,"2"0"-810,11 6-1169,-11-4-180,15-7 0,-22 2 181,24-17 89,-19 10 90,19-10 0,-7 6 0,9-2 90,0 8 0,0-1 179,0 1 1,0 2 180,17 2-90,4 3-270,11 16-90,-13 5 0,0 11 0,-17 1 0,6 12 0,-8-8-45,-11-3 0,-1 1-45,6 7-437,-15-15 1,-1 0 256,17 9-90,-36-2-180,35-3-449,-46 6 539,44-14 180,-44 3 270,39-18 0,-14-2 270,19-25 1233,5 3-1143,21-6 0,-13-2 179,28 22-89,-11-9-360,19 12 0,6 17-90,-8-13-630,12 30-629,-19-19 1259,21 5 0,-21 0 0,10-9 0</inkml:trace>
-  <inkml:trace contextRef="#ctx0" brushRef="#br0" timeOffset="463660">9262 2275 9961,'0'-11'1889,"0"1"-1799,2 2 180,0 5 180,4 0-270,0 3-180,6 18 0,0-13 0,3 35 0,-3-19 0,2 23-180,0-3-765,-5-9 1,1 2-136,5 20-134,-5-8 0,0 0 884,2 5 1,3 11-1,-3-23 1</inkml:trace>
-  <inkml:trace contextRef="#ctx0" brushRef="#br0" timeOffset="463861">9683 2401 9871,'-45'0'2519,"20"22"-2339,-17-16-180,27 24 0,0 3 0,-24-5-45,19 12 0,2 2-45,-9 3-450,19-8 1,2-1-91,-7 3-1259,13 20 810,21-32 89,-15 4 990,46-19 0,-25-5 0,27-5 0</inkml:trace>
-  <inkml:trace contextRef="#ctx0" brushRef="#br0" timeOffset="464044">9990 2529 9961,'-18'-10'1889,"14"19"-1889,-14 15-270,18 10-359,0 1-91,0-6 1,18-1-91,-14 0 0,27-1 1,-27-3-180,24-2 989,-24-4 0,24-3 0,-12-3 0</inkml:trace>
-  <inkml:trace contextRef="#ctx0" brushRef="#br0" timeOffset="464194">10115 2384 9062,'-24'-10'0,"5"0"-90,4 3 90,11 1 0,-11 4 0,15-1 0</inkml:trace>
-  <inkml:trace contextRef="#ctx0" brushRef="#br0" timeOffset="464813">10377 2760 9242,'-14'-17'-450,"23"-11"450,-4-9 0,30-6-573,-31 10 663,26-2-90,-27 3 0,11 1 338,-14-4-158,0 10 270,0-3 529,-17 12-619,-9 9-180,-8 18-180,11 17 0,2 10 0,19 5 0,-8-7 0,10 20-90,19-14-295,-14 13-65,35-11 181,-9-15-91,-3-9 0,2-4 0,20-5 135,-16-4 0,-1-5 135,7-18 90,9 11 180,-8-45 90,-14 29 1259,2-38-809,-20 24-360,-4-3-180,-24 12-270,14 28 180,0 13 0,23 15-90,19-9 0,-1-11 0,-4-10 0,-1 0 0,-20-22 0,10 16 629,-19-35-449,7 17 0,-9-9-270,0-2 0,0 16 0,0 25-629,0 15-361,22 19-719,3 12 630,2-21 1169,0-5 0,-1-2 0,-5-8 0,28 4 0</inkml:trace>
-  <inkml:trace contextRef="#ctx0" brushRef="#br0" timeOffset="465043">10435 2265 9062,'-27'-9'719,"-2"-3"-539,14 3-90,2-5-90,30 0 0,-13 2-90,34 0-1169,-11 5 719,20 3-899,1 1 1439,-14 3 0,-3 17 0,-13 5 0</inkml:trace>
-  <inkml:trace contextRef="#ctx0" brushRef="#br0" timeOffset="465213">10658 2069 9512,'36'-3'269,"-7"-1"-269,-3 4-449,-5 15-181,0-12-449,1 31 1079,8 1 0,-8 10 0,5 8 0</inkml:trace>
-  <inkml:trace contextRef="#ctx0" brushRef="#br0" timeOffset="465749">12255 2536 10231,'-34'-3'270,"0"1"270,-10 2-450,10 0-270,-19 15 180,25 0 0,-10 19 0,23-18-450,1 16 270,11-15 90,3 9-270,24-6-89,3-6 269,27-7-90,-15-2 180,2-25 180,-12 15-180,-2-42 90,0 24 45,-11-9 0,-2-4 45,0-11 269,0 3 1,-3 0 90,-9-9 90,2 9 0,0 0-447,-4-3 266,-16-10 1,13 18-360,-26 14 0,25-3 90,-19 21-90,21 21 0,-8 36 0,10 1-180,9-5 0,0 1-629,-4 3-91,10-6 1,4-2-1,7 6-76,-10-18 1,3-2-15,22 6 990,-8-5 0,3-7 0,1-4 0</inkml:trace>
-  <inkml:trace contextRef="#ctx0" brushRef="#br0" timeOffset="466079">12883 2432 11311,'-40'-9'719,"0"2"-719,0 7 0,17 19 0,-11 6 0,21-1 0,-4 25-270,8-33-449,27 31 359,8-26 180,22-3 180,-8-10-90,9-23 90,-22 12 180,10-43 90,-25 26 449,6-36-539,-17 27-270,4-4 270,-5 12-180,0 35-90,0 9-495,10 7 1,0 4-226,-5 15-135,22-15 1,3-5-585,-5-7 1529,3-1 0,2-4 0,8-13 0,3 9 0</inkml:trace>
-  <inkml:trace contextRef="#ctx0" brushRef="#br0" timeOffset="466283">13580 2089 10771,'-29'-21'809,"-9"1"-179,34 11-540,-12 18-90,16 21 90,0 11-90,0 8-1066,0-7 976,0-1-1305,18 22 585,-13-18 180,11-9 1,2-2 89,-4 2-89,5 6 629,-2-12 0,-15-12 0,6 3 0</inkml:trace>
-  <inkml:trace contextRef="#ctx0" brushRef="#br0" timeOffset="466410">13363 2418 9062,'-14'-17'90,"-4"13"90,16-25-630,-4 20 0,6-11-449,28 12 359,4 1-449,18 7 989,-5 0 0,-8 0 0,0 0 0</inkml:trace>
-  <inkml:trace contextRef="#ctx0" brushRef="#br0" timeOffset="466747">13973 2325 9602,'-18'-11'2338,"-9"1"-2068,-13 10-270,-3 16 0,9 9 0,15 9 0,-1 4-90,18 7-270,-5-11 180,7 11-449,24-9 89,-18-11 0,38 1 360,-15-18 180,20-4 0,-8-23 90,-8-10 180,-8-9 90,-13-3 540,-1-5-541,-11 13-89,0-16-360,0 26 180,0-4-630,-14 19-269,11 20-450,9-7-91,-1 33 1350,30-8 0,-8 8 0,18 2 0</inkml:trace>
-  <inkml:trace contextRef="#ctx0" brushRef="#br0" timeOffset="467143">15132 2048 12030,'-16'-15'1619,"0"1"-1349,1 5-270,3 1-90,1 2 180,5 2-90,2 17-540,2 35 91,2 1-893,8-2 1,1 2 802,-5 10 44,4-20 0,1-1-404,11 15-1126,-16-3 1305,27-4-1891,-28 10 2611,17-18 0,-17 4 0,6-20 0</inkml:trace>
-  <inkml:trace contextRef="#ctx0" brushRef="#br0" timeOffset="467294">15007 2455 9871,'-21'-30'90,"-4"0"-90,23 1 0,-7 4 0,9 0 0,0 4-90,23 3-359,11 2-1,13 7 45,-12 5 0,-1 1-44,12 1-271,5 9 0,0 6 203,2 8 228,-10-10 1,-2 2 0,-1 18 0,-1-11 0</inkml:trace>
-  <inkml:trace contextRef="#ctx0" brushRef="#br0" timeOffset="467671">15660 2429 8072,'3'4'810,"2"5"-720,-2-7-90,5 7 0,-2-2 0,3 1-90,1 2-90,1-3-90,1 0-449,11 3 269,-3-2-180,17 2 180,-13-5 91,15-2 449,-18-3 449,5-14 181,-14 11-180,-1-24-181,-5 23 631,-2-24 179,-2 11-449,-2-12-91,-20 7-359,4 10-270,-6 21 90,11 17-180,11 27 90,0-2 45,10-12 0,1 0-135,-6 12-447,5-16 1,1-2 446,5 16 180,-12-1-90,23 1-1459,-20-7 1,-3 0 1458,8 12-45,-7-16 0,-2 1-1738,-3 19 974,0-24-361,0 11-89,0-31 1439,-15-6 1,11-3 0,-12-4 0</inkml:trace>
-  <inkml:trace contextRef="#ctx0" brushRef="#br0" timeOffset="468128">16225 2482 8972,'-18'19'1709,"18"5"-1619,4 12-90,10 0 0,-2-5 90,-9 0-180,9 3 90,-3 14 90,-7-13-90,7 9 90,-9-20-90,0-5 0,0-2-360,0-5 90,0-20 180,0-14 0,0-14 90,-14-10-1043,11 3 1043,-10-6 90,13-5-90,0 14 0,0-2-90,0-22 135,-2 13 0,4 2 135,14-4-84,-16 16 1,4 4 83,31 3 89,-17 2-89,16 19 0,-9 24-90,-10 13 0,-2 27-90,-12-8 0,2-12 0,-1-1-1025,-2 5 306,-18 14-1620,13-6 900,-32-16 1439,33 8 0,-15-22 0,19-1 0</inkml:trace>
-  <inkml:trace contextRef="#ctx0" brushRef="#br0" timeOffset="468429">16532 2366 9242,'11'18'629,"2"-4"-449,-4 0 0,12-11-90,-5 11-90,9-14 0,-5 0 90,4 0 0,1 0 0,13 0 0,-10-15 0,17-2 180,-24-1 359,5-22-539,-18 25 180,-2-21-90,-6 19-90,0-1 90,-22 10-90,0-1-90,-18 25 0,20 7-360,-5 24-90,22-7-1349,11 18 810,-4-25 989,26-5 0,6-2 0,0 1 0,3-10 0,0 1 0</inkml:trace>
-  <inkml:trace contextRef="#ctx0" brushRef="#br0" timeOffset="468815">17807 2370 10681,'-6'-9'630,"2"0"-630,4 2-90,0-1 90,21 0-450,-15 2-675,25 2 1,6 3 315,-13-1 809,11 8 0,1 0 0,-8-2 0,5 10 0</inkml:trace>
-  <inkml:trace contextRef="#ctx0" brushRef="#br0" timeOffset="468943">18008 2657 10681,'0'12'1529,"0"-2"-1529,19-4-450,10-3-2428,34-20 899,-5-6 1589,-23 12 0,-1-1 0,-5-8 0,-1-1 0,31-7 0</inkml:trace>
-  <inkml:trace contextRef="#ctx0" brushRef="#br0" timeOffset="469677">19053 2137 10771,'0'-11'180,"0"4"269,0 2-359,18 19 0,1 21-180,3 3 135,-6-6 0,-4 1-45,-9 4 0,20 22 0,-21-25 0,7 3-180,-6-17 91,-2-4-1441,6-3 1081,-6-20 449,2-15 0,-3-14 0,0-8 90,14 5 179,-10-18 91,28 15 180,-16-20-270,4 33 180,2 0-450,-9 20 89,5 5 91,3 25-90,-8-15-90,3 57 0,-5-37 0,-5 11 0,-1 1 0,1-2 0,1 8 0,-4-20 0,1-5-90,-1-8-629,-1 3 359,0-12 360,1 6 0,0-25-90,2 12 180,3-35-180,1 20 180,4-23-90,-1 7-90,4-2 180,-1 0 360,5-8-270,-4 15 269,5-3-359,-7 23 0,0 4-90,-4 7 0,-1 0 90,2 18-90,-1-13-90,0 39 180,0-22-629,5 40-451,-2-20 90,-1-8 1,1-1-482,7 5-148,10 8 1529,-1-21 0,4-6 0,3-3 0</inkml:trace>
-  <inkml:trace contextRef="#ctx0" brushRef="#br0" timeOffset="470031">20385 2174 9871,'-59'-4'1799,"1"0"-1619,14 4-90,2 0-90,1 16 0,11 7 0,-12 22 90,28-7-360,-8 13 90,21-21 90,-6 6-89,25-13 89,-14-7-90,37-2 180,-21-7-90,20-3 90,-7-4 0,13-15 0,-11 12 180,16-30 0,-26 9 359,2-21-269,-20 9-90,-1 3-90,-6 14-90,0-1-90,0 24-899,0 10 269,0 27-1079,0 4 810,0-9 989,18 1 0,3-24 0,17 2 0</inkml:trace>
-  <inkml:trace contextRef="#ctx0" brushRef="#br0" timeOffset="470365">20643 2216 10951,'-21'-3'629,"4"22"-629,17 2 0,0 23 0,0-11 0,0-3-90,0-11-89,14-8 89,-10 7 90,10-9-180,-5 3 270,1-21-180,6-14 180,-1-24-90,-5 8 180,7-19-180,-9 25 89,10-20 1,-11 35-90,5-9 0,-7 26 0,1 14-539,-2 15-990,3 25 809,1-6-269,3 4 989,11-5 0,-2-13 0,10 8 0</inkml:trace>
-  <inkml:trace contextRef="#ctx0" brushRef="#br0" timeOffset="470781">21240 2192 10411,'-40'-6'450,"3"1"-360,15 20 90,-6-12-180,25 26-90,-9-8-180,12 17 180,26 0-90,10-6 270,12-14-818,0-8 638,-16-10 180,1 0-90,5 0 0,-18-17 90,10 13 450,-27-32-180,8 9 180,-11-21-271,0 10-89,-21-4-180,-2 18 638,-13 5-548,16 30-90,9 21 90,11 13-1076,21 4 986,-15-7 0,37 1 0,-37 1 0,21-13 0,3 1 0,-10 13 0,8-9 0,-1-1 90,-11 1-691,12 11 242,-26-29-2970,9 1 2070,-39-14 1259,-17-17 0,15 1 0,-1-4 0,-3-6 0,0 0 0</inkml:trace>
-  <inkml:trace contextRef="#ctx0" brushRef="#br0" timeOffset="471015">20232 1610 9512,'0'-24'809,"24"1"-449,-18-1-90,39 2 179,-19-3-359,-1 8-269,12 0-1800,-33 27 539,12 18-358,-47 12 1488,4 12 0,-1-29 0,-2 0 0,7 2 0,0 0 0</inkml:trace>
-  <inkml:trace contextRef="#ctx0" brushRef="#br0" timeOffset="472026">8778 2752 7982,'-15'16'2789,"21"-12"-2699,-2 29-90,26-17 0,-27 16 90,20-6-90,-21 1 0,10 1-90,-12 1-180,0 2-270,0 3-89,-20 3-316,-3-5 1,-5 1 336,-2-5 1,-4-1-1,-10 11 1,-1 0-1,6-9 1,1 0 0</inkml:trace>
-  <inkml:trace contextRef="#ctx0" brushRef="#br0" timeOffset="500179">7985 4067 9062,'-1'-11'1349,"-1"-3"-1169,1 9-90,-2-9-90,3 6 270,0-2 0,0 1-270,0 2 90,16-7-180,-12 4 90,31-3 0,-31 3 0,33 1 90,-33 0-180,29 3 90,-29 2 0,26 3 90,-14 0-180,6 1 269,3 14-268,-13-11 178,3 26-89,-8-25 0,-2 28 0,-3-19-89,-1 21-181,-1-13-360,-16 10 360,12-15-449,-13 1 89,17-7 630,17-6-90,5-1 180,11-3 0,1 0 0,6 0 90,-9 0 180,20 0-91,-23 13 181,11 1-180,-23 1-90,3 6-180,-12-19 0,-3 20 90,-3-12 0,-19 18 0,14-9-90,-32 15 0,8-16 0,-8 7-90,-4-12 180,11-2-360,0-2-270,-1-2-449,0-3-1,1-1 990,-8-3 0,9 0 0,-6 0 0</inkml:trace>
-  <inkml:trace contextRef="#ctx0" brushRef="#br0" timeOffset="500533">8700 4304 8162,'-16'-12'2159,"4"21"-2069,27-17 0,-11 31 90,26-20-90,-27 21 0,25-13 0,-25 13 90,21-5-90,-21 2-90,14 1 0,-15 3-180,4 2-810,-28 18 91,0-7-406,-12-3 1,-6 0 1127,11-11 1,-2-2 0,-12 8-1,-3-1 1,10-8 0,0-1-1</inkml:trace>
-  <inkml:trace contextRef="#ctx0" brushRef="#br0" timeOffset="502308">9560 3694 9602,'0'-9'1439,"0"2"-1169,0 1-270,0 1 629,0 3-719,0 17 180,0 14-90,0 12 0,0 10 0,15-5 0,-14-9 0,2 2-169,12-10 0,3 2 34,-8 22 0,-1 0-315,13 7-450,-4-11 1,-2 0 90,-5 4 314,2-20 0,1-1-1124,1 18 1619,-7-15 0,1 2 0,-8-16 0</inkml:trace>
-  <inkml:trace contextRef="#ctx0" brushRef="#br0" timeOffset="502445">9393 4312 7623,'0'-18'0,"19"-1"0,-15-2-135,24 4 0,4 0-225,-5-10 360,14 1 0,3 2 0,4-5 0,-15 9 0,0 0 0</inkml:trace>
-  <inkml:trace contextRef="#ctx0" brushRef="#br0" timeOffset="502865">9962 3718 7533,'-13'17'1709,"2"5"-1709,11 12 90,23 2-90,-18-5 0,32 5 0,-33 4 0,10-10 0,3 1 0,2 17 0,-2-6 0,-1-1 0,2 7-90,-2-10 0,-3 0-906,-5 1 996,11 7 240,-12-23-510,-3-5-180,0-7 180,-3-5 270,1-23-90,-2-25 90,0-4 510,0-11-420,0 22 0,0 2 0,0 2 630,16-1-541,-12 10-89,23 5-90,-10 11 90,-2 21-90,12-12 157,-17 30-157,13-29-270,-5 35-720,10-9 541,-4 10-811,18 9 1260,-13-22 0,7 3 0,-9-11 0</inkml:trace>
-  <inkml:trace contextRef="#ctx0" brushRef="#br0" timeOffset="503143">10800 4044 8702,'-38'-7'1259,"0"1"-1349,6 23 180,4 7-180,13 9 90,6 2 0,9-7-269,0 12 89,22-10-270,8 16 270,-1-24 180,23-2-90,-17-6 180,14-12-90,2 6 0,-25-23-90,2-5 90,-19-19-90,-3 7 180,-28-1-180,17 11-540,-57 1 1,38-2 629,-11 14 0,-2 1 0,5-5 0,-10 7 0</inkml:trace>
-  <inkml:trace contextRef="#ctx0" brushRef="#br0" timeOffset="503359">11410 4109 8972,'0'30'-360,"0"-6"-270,0 4-179,0-7-181,0 3 990,15-1 0,-11 1 0,10 1 0</inkml:trace>
-  <inkml:trace contextRef="#ctx0" brushRef="#br0" timeOffset="503525">11622 3989 8972,'0'-9'-3058,"-17"2"3058,13 23 0,-12-13 0,16 15 0</inkml:trace>
-  <inkml:trace contextRef="#ctx0" brushRef="#br0" timeOffset="503761">10782 3887 8522,'-12'-17'270,"2"3"-270,3 2 180,4 3-90,1 1 0,2 2 0,0 2 0,19 2 0,-15 17-360,35-11 90,-34 29-810,26-5 361,-28 9 629,8 16 0,-11-20 0,0 9 0</inkml:trace>
-  <inkml:trace contextRef="#ctx0" brushRef="#br0" timeOffset="503913">10712 3673 8252,'26'-14'180,"9"3"-270,-31 5-90,31 3-269,-17 1-541,21 2 990,-4 0 0,6 20 0,6 4 0</inkml:trace>
-  <inkml:trace contextRef="#ctx0" brushRef="#br0" timeOffset="504409">12462 3820 9422,'-55'0'-90,"3"0"90,1 0-45,17 7 0,0 4 45,-13 15-45,13-3 0,3 2-45,3 16-360,3 11 180,18-24-359,50 15 359,-15-29 225,14-4 0,3-4 45,0-6 45,-6-6 0,0-5-45,3-13-1541,9 1 1811,-24-18 359,-7 25 630,-3-26-1079,-10 13-180,-1-1 0,-23 14 282,1 24-192,-4 20-90,8 27 90,12-5-45,9-11 0,1-1-418,-5 11 373,15-16 0,-1 0 0,-14 11 90,15-2-90,-6-4 0,-11-1 0,10-6 0,-13-1-134,0 1-856,0-9 990,-16 2 0,12-16 0,-12-1 0</inkml:trace>
-  <inkml:trace contextRef="#ctx0" brushRef="#br0" timeOffset="504609">12858 3764 8612,'14'15'1619,"-2"-13"-1619,-7 29 0,0-27 0,-3 32 0,4-19-180,2 32-359,1-18-361,2 9 180,-2-14 1,-1-1-271,3-3 990,-3-3 0,3-3 0,-3-2 0</inkml:trace>
-  <inkml:trace contextRef="#ctx0" brushRef="#br0" timeOffset="504745">12842 3767 9332,'-14'-24'90,"11"1"-270,-19 6-360,20 2 360,-13 5-1619,14 1 1799,13 6 0,-8 15 0,13 5 0</inkml:trace>
-  <inkml:trace contextRef="#ctx0" brushRef="#br0" timeOffset="505109">13450 3849 9332,'-46'0'1439,"-3"0"-1529,14 0 90,-1 0 0,13 0-90,2 17 90,-1-1-180,11 17-360,1-2 271,34 5 269,-18-12 0,37 1 0,-19-20 89,15 0-89,-6-5 810,-15-15-270,-9-4-450,-9-10-270,0 2-90,0 34-989,0 5 539,14 32 90,-11-13-89,22 0 719,-9-2 0,0-16 0,-3 3 0</inkml:trace>
-  <inkml:trace contextRef="#ctx0" brushRef="#br0" timeOffset="505425">13667 3933 9062,'14'38'270,"-11"1"-270,22-20 0,-22 11-180,19-18 180,-19 9-270,15-10 270,-13-6-90,7-5 90,-5-18 0,-1 13 0,-1-33 90,1 22 360,3-33-360,-3 20 179,2-16-89,-5 30 180,0-12-360,1 24 180,0-7-270,7 30-180,-2-16-1799,10 60 630,-4-34 1350,-4 3 0,-1 3 0,9 8 0,1 2 0</inkml:trace>
-  <inkml:trace contextRef="#ctx0" brushRef="#br0" timeOffset="505799">14548 3610 11580,'-12'-21'270,"2"2"-360,0 5 90,4 2 0,2 5 0,2 2 0,2 19 0,-1 16 90,18 9-270,-13 9-741,25-7 381,-25 5-89,22 1-136,-17-14 1,-2 0 44,9 15-180,-5-10 1,-1-1 899,0 0 0,2 8 0,-5-19 0</inkml:trace>
-  <inkml:trace contextRef="#ctx0" brushRef="#br0" timeOffset="505958">14448 3911 9152,'-12'-26'-90,"10"-1"-90,-10 1-180,12 0-359,21-7 359,-15 9 45,32 5 0,9 4 135,-12 2 0,20 5 0,2 2-179,-4 5-21,-16 1 1,-1 0 0,15 0 0,-1 0 0</inkml:trace>
-  <inkml:trace contextRef="#ctx0" brushRef="#br0" timeOffset="506175">15155 3739 8162,'0'17'1440,"-20"-5"-1440,15 2 0,-30-4 0,31 4 0,-27 2-90,15 15 180,-3-6-90,7 30 0,12-26-180,0 15 0,27-24 90,-20-4-180,47-2 180,-30-3-90,24-4 90,8-3-90,-17-2-180,23-21 91,-34 15 89,-2-31-180,-14 32-719,-11-33 1079,-14 13 0,8-10 0,-12 4 0</inkml:trace>
-  <inkml:trace contextRef="#ctx0" brushRef="#br0" timeOffset="506434">15688 3887 7803,'4'19'269,"-2"13"-179,2-28-90,-2 27 90,4-12-90,-3 7-270,9 6 91,-6-19-541,10 3 270,-8-12 450,11-3 0,-7-1 0,6 0 0</inkml:trace>
-  <inkml:trace contextRef="#ctx0" brushRef="#br0" timeOffset="506575">15902 3788 8792,'7'-11'989,"-1"2"-719,-3 9-90,0 0-180,-1 0 0,2 15 0,0-11 0,1 27 0,4-7-629,-2-3-1440,6 17 719,-4-18 1350,2 2 0,0 4 0,-2-12 0</inkml:trace>
-  <inkml:trace contextRef="#ctx0" brushRef="#br0" timeOffset="506925">15142 3653 9781,'-8'-13'720,"3"-1"-630,2 2-90,2-7-90,1 7 180,19-5-360,-15 10-989,29 1-90,-18 4-270,13 16 1619,-2-10 0,-6 26 0,-2-9 0</inkml:trace>
-  <inkml:trace contextRef="#ctx0" brushRef="#br0" timeOffset="507075">15273 3528 9512,'0'-26'989,"24"6"-989,-18 3 0,41 6-450,-26-1-2068,38-2 775,-16 5 1743,13-1 0,-13 7 0,2 2 0</inkml:trace>
-  <inkml:trace contextRef="#ctx0" brushRef="#br0" timeOffset="507611">15700 3957 9152,'-5'-17'899,"21"-2"-899,-11-11 0,31 13 0,-21 1-1079,15 14 179,-8-5 900,-2 21 0,-11 9 0,-2 16 0</inkml:trace>
-  <inkml:trace contextRef="#ctx0" brushRef="#br0" timeOffset="508061">16527 3437 11131,'0'-9'629,"0"2"-449,0 2-90,0 24-360,0 27-719,18 4-136,-8-6 1,0 1 135,12 6 989,-6-6 0,-2 2 0,2 5 0,-1-17 0,0-1 0</inkml:trace>
-  <inkml:trace contextRef="#ctx0" brushRef="#br0" timeOffset="508197">16487 3817 8882,'0'-23'-1169,"20"1"1169,25-17 0,2 17 0,-17 4 0,1 1 0</inkml:trace>
-  <inkml:trace contextRef="#ctx0" brushRef="#br0" timeOffset="508708">17225 3761 8792,'-24'24'1169,"17"1"-1169,-41-5 0,27 3 90,-33 12-180,23-8 90,-13 19 0,29-19 0,-10 4-270,23-11-89,-7-4 269,9-1-180,0-2 0,20-3 90,-15-5-360,54-1 450,-34-3-45,10 1 1,2-3 134,1-18 0,10 14 0,-20-31 0,-4 32 180,-12-34 719,3 11-539,-13-10 90,5 2-360,-7 14 179,0 3-269,-19 4 0,15 1 90,-29 6-90,30 17 0,-11 9-180,14 15 90,23-17-89,-17 8-91,40-22 90,-27 7-90,33-10 270,-18 0 0,21 0-90,-24-17 180,5 13 90,-15-30 90,-6 30 90,-1-30 89,-6 29 541,-4-29-720,-2 18-360,-2-10-270,0 30-989,0 11-450,18 27 1799,4-5 0,20-1 0,1-5 0</inkml:trace>
-  <inkml:trace contextRef="#ctx0" brushRef="#br0" timeOffset="508891">17443 3298 9781,'-12'-3'-1349,"2"1"-270,5 17 1619,25 5 0,-15 12 0,17 0 0</inkml:trace>
-  <inkml:trace contextRef="#ctx0" brushRef="#br0" timeOffset="509029">17590 4456 8522,'0'5'-270,"0"-1"0,0-3 1</inkml:trace>
-  <inkml:trace contextRef="#ctx0" brushRef="#br0" timeOffset="509910">18347 3591 10231,'0'-18'720,"-17"1"-720,13 7 0,-12-1 0,3 7-180,9 24-720,-9 28 451,13 4 179,12-11 0,2-1-981,-8 0 1116,18-14 1,6-2-747,9 9 701,15-17 45,-19-7 0,0-2 225,5-7-90,23-19 90,-33 14 0,6-37 180,-20 24 180,-3-21 1079,-8-10-1169,0 19-270,-5-14-180,-17 24 1189,13 6-1099,-12 23 582,16 27-672,22 6 90,-9-9 0,1-1-270,13 1-374,18 8 284,-25-18 91,22-4-1,-9-3 0,14-4 270,-11-5-46,17-3 46,-24-19 269,6-4 91,-22 0 270,0-14 89,-11 11-449,1-14 13,-3 8-1542,-15 13-313,11 25-227,-11 9 1799,37 18 0,-17-19 0,17-4 0</inkml:trace>
-  <inkml:trace contextRef="#ctx0" brushRef="#br0" timeOffset="510247">19597 3603 9152,'-47'-8'1889,"2"2"-1619,7 24-360,1-14 180,23 30-90,-10-30 0,22 31 0,-6-20 89,8 24-89,0-15-449,17 13 269,6-18 90,24 3 90,-8-15 0,2-2 0,1-5 0,-11-20 90,12-4 0,-21-1 629,-1-28-449,-14 36-90,-4-28-270,-3 21 90,0 7-719,-13 18-900,10 30 809,-11 6 810,19 2 0,7-1 0,4-2 0,16 20 0</inkml:trace>
-  <inkml:trace contextRef="#ctx0" brushRef="#br0" timeOffset="510474">18913 3194 8522,'0'-18'90,"28"2"-180,-21 4 135,29 2 0,7 4 45,-12-1-90,14 1 0,1 3 0,-6 2-1349,11 17 0,-35 12 1349,-2 10 0,-14 11 0,0-8 0</inkml:trace>
-  <inkml:trace contextRef="#ctx0" brushRef="#br0" timeOffset="510908">20408 3465 10501,'-27'-9'-90,"-11"2"90,14-2-180,-15 6 180,0-1 0,18 23 0,-4-14 0,23 33 90,-8-11-270,10 8 180,22 3 0,7-1-90,12-8 135,-13-6 0,-2-1-45,7 4 0,7 3 0,-12-3 0,-14-10 0,0 9-180,-14-12-899,-20 5 539,14-8-179,-40 0 89,26-3 0,-22-2 630,11-3 0,4 0 0,-1-2 0</inkml:trace>
-  <inkml:trace contextRef="#ctx0" brushRef="#br0" timeOffset="511158">20517 3702 7623,'43'-4'90,"16"0"-180,-19-1 180,21-3 0,-34 5-180,5-4 180,-19 3 89,-3 0-89,-6-1 180,-2-3-90,-2 1 360,-20-7-180,-3 5 359,-23-2-719,24 4 360,-15 3-360,21 2 0,-13 2 0,15 15 0,5 7-90,9 10-450,0 1-1439,19 20 990,-14-21 989,38 17 0,-22-28 0,22-2 0</inkml:trace>
-  <inkml:trace contextRef="#ctx0" brushRef="#br0" timeOffset="511442">21075 3477 9062,'-29'0'0,"3"0"0,-4 0 0,16 15 90,-9-11 0,21 29-90,-6-11 90,31 21-180,-17-10 90,36 10 0,-14-18 0,-3 8 270,15-6-91,-24-9-179,4 9 0,-8-16-359,-12 7-181,-18-11-719,-5 3 629,1-6 630,-17 1 0,16-4 0,-19 1 0</inkml:trace>
-  <inkml:trace contextRef="#ctx0" brushRef="#br0" timeOffset="511745">21492 3609 9602,'-52'0'269,"9"12"-179,-1-9-180,25 20 180,-16-20-449,31 16 179,-11-7 0,15 4 180,0 1 0,21-4 90,11 6-90,11-2-852,5 3 941,-12-5-89,-2-2-316,-1 0 496,-6 0 180,-2-3-180,-13 1-270,7 0 180,-16-3 279,7 1-728,-34-4 258,18-1-439,-44-1 1,29-2-181,-22 0 720,0-1 0,23 0 0,-4 0 0</inkml:trace>
-  <inkml:trace contextRef="#ctx0" brushRef="#br0" timeOffset="511926">21847 3621 9602,'11'14'539,"-3"-11"-539,-1 11 0,-2 1 0,-2-11 0,2 21 0,-3-22 90,-1 23-180,0-15-270,-1 13-1079,0-2 630,0-6 809,0 10 0,0-13 0,0 2 0</inkml:trace>
-  <inkml:trace contextRef="#ctx0" brushRef="#br0" timeOffset="512075">21902 3338 9152,'-18'-14'-810,"-7"4"810,22 4 0,-8 3 0,11 2 0</inkml:trace>
-  <inkml:trace contextRef="#ctx0" brushRef="#br0" timeOffset="512375">22352 3623 9781,'0'5'720,"0"-1"-180,-23 3-360,17-1-90,-33 12-90,18-4 0,-14 13 0,13-8 0,8 3 0,14-7 0,0-3 0,0 0 0,0 1 0,24-6 0,7 1 0,13-6 0,5-2 89,-30-15-178,15 12 89,-30-25-270,9 8 0,-13-14-810,-23 5 361,-9-1-361,-13 20 1080,-12-7 0,25 16 0,-9-5 0</inkml:trace>
-  <inkml:trace contextRef="#ctx0" brushRef="#br0" timeOffset="512723">22565 3621 9332,'5'12'809,"1"-9"-629,-6 20-90,2-13 0,-1 11-90,0-2 0,1-1-90,1-1 90,0-1 90,1-4-180,1 3 90,-1-7-90,2 0 90,-4-6-180,8-1 180,-4-17 0,6 12-90,-1-30 90,3 18 180,1-18 450,8-7-360,-5 13 179,8-9-359,-11 14-90,3 12 90,-6 0-180,-1 11-180,1 23-809,-1 11-2159,3 31 3238,-2-10 0,-2 2 0,-1-17 0</inkml:trace>
-  <inkml:trace contextRef="#ctx0" brushRef="#br0" timeOffset="518594">23773 3233 6273,'-19'-6'-113,"3"2"1,16 2 0,0 1 0</inkml:trace>
-  <inkml:trace contextRef="#ctx0" brushRef="#br0" timeOffset="520273">11023 5317 9062,'0'-8'1799,"0"-1"-1529,0 1 359,0-5-359,0 3 90,-16-7-180,12 7 0,-12-6-180,5 9 0,8-3 0,-8 7-270,2 2 90,7-1 0,-13 1 0,8 0-270,-4 15 181,2-10-91,2 25 180,1-25-90,2 28 180,3-17 90,0 14 0,1-8-90,0-3 90,21 5 0,2-8 0,23 9 90,-23-13-90,11 3 90,-30-7 0,10 0-90,-14-2 0,0-2 90,0 0-180,0-1-540,0 2 91,-24 0-1080,1 0 449,-6-2 1170,-3 0 0,28-1 0,-11-1 0</inkml:trace>
-  <inkml:trace contextRef="#ctx0" brushRef="#br0" timeOffset="520508">11333 5175 10681,'0'36'0,"0"-5"0,0 3-90,0-4-90,0 20-90,0-11-360,7-6 1,0 0-91,-3 3-269,20 17 359,-21-28 1,7 3 629,-10-14 0,0-3 0,0-3 0</inkml:trace>
-  <inkml:trace contextRef="#ctx0" brushRef="#br0" timeOffset="520658">11120 5502 7443,'0'-13'360,"0"-1"-360,17 0 0,-13-1 0,35 0-90,-34-2 0,45 3-540,-11-5 0,13 6 562,-1-2 0,-17 8 1,-2 1-1</inkml:trace>
-  <inkml:trace contextRef="#ctx0" brushRef="#br0" timeOffset="521746">10752 5100 9512,'17'22'269,"-13"14"-179,30-18-90,-30 18 0,28-3 0,-12 19 0,1-11 45,-6-5 0,-1 1-45,-1 3-45,-2-6 0,0-1 45,-1 1 0,1 9 0,-8-20 0,1-2-90,-1-5 0,-3-2 1,1-6-181,0-1-270,1-5 450,1 0 0,-1-17 90,1 12 0,0-28-90,1 15 90,1-16 0,2 2 90,2-2-90,1-1 0,3 0-90,9-11 180,-5 11 180,17-12-270,-14 24 90,8 1-90,-11 12 90,3 4-90,-5 2 180,8 2 0,-9 22 449,6 3-269,-11 1 0,-2 25-450,-5-32 180,-2 25-90,-21-13 0,16-8-90,-35 12-90,14-15-1259,-20 6 539,20-13 900,-22 0 0,41-9 0,-21-2 0</inkml:trace>
-  <inkml:trace contextRef="#ctx0" brushRef="#br0" timeOffset="522110">11458 5495 7803,'6'0'179,"-1"0"-89,1 0-90,-1 0-90,2 0 0,1 0 1,5 0 89,-2 0-450,6-15 450,-7 1 0,2-3-90,-9-6 90,-1 8 0,-2-6 0,0 3 90,0 7 0,-17-3 0,13 7 269,-30-3 1,16 8-90,-16 1-270,17 15 0,-7-10 0,21 24 90,-7-9-90,10 15 0,0-6 0,20 4 0,8-21-180,-3 11-629,41-17 179,-41 5 630,10-8 0,2-1 0,-6-1 0,7 0 0</inkml:trace>
-  <inkml:trace contextRef="#ctx0" brushRef="#br0" timeOffset="522724">11838 5320 8882,'-29'20'0,"12"3"-90,5 12 90,5-5 0,5-8-180,-6 3 180,26-13-180,-13 8 90,29-19 0,-9 5 90,18-20 0,0-4 180,-4-17 0,-12 4 90,-12 0 0,-9 9-90,-6 5-180,0 26 90,-12 14-180,10 14 90,-10 27 0,12-22-1094,0 18 1094,0-20 90,0-1-90,17-4 0,-13 7 90,13-16-90,-17 9-90,0-25-2698,0 2 2788,-14-30 0,10 14 0,-10-15 0</inkml:trace>
-  <inkml:trace contextRef="#ctx0" brushRef="#br0" timeOffset="522864">12258 5432 7083,'8'21'0,"-1"11"0,-1-28 0,-1 27 0,-2-17 0,-1 12 0,-1-6 0</inkml:trace>
-  <inkml:trace contextRef="#ctx0" brushRef="#br0" timeOffset="523024">12145 5191 6633,'0'-3'0,"0"1"0</inkml:trace>
-  <inkml:trace contextRef="#ctx0" brushRef="#br0" timeOffset="523324">12653 5393 7533,'0'16'180,"0"-1"-180,0-1 0,0-1 0,0 6 0,0-6 0,0 6 90,0-10-90,0-2-90,0-4 90,0-21 0,0-2 90,11-22 539,-8 11-359,16-3-270,-10 15 0,17 5 0,-7 24 0,6-6-630,-9 33-449,0-19 1079,0 19 0,2-7 0,1 0 0</inkml:trace>
-  <inkml:trace contextRef="#ctx0" brushRef="#br0" timeOffset="523507">13150 5271 8072,'-8'15'-158,"6"12"1,-6-9 0,8 14 0</inkml:trace>
-  <inkml:trace contextRef="#ctx0" brushRef="#br0" timeOffset="523632">13297 5559 10501,'0'6'-473,"0"-1"1,-14-3 0,-2-1 0</inkml:trace>
-  <inkml:trace contextRef="#ctx0" brushRef="#br0" timeOffset="524507">13982 4969 9062,'0'-9'90,"9"3"-90,-7 21 90,7 19-4342,-9 11 4162,0 10 0,0-7 460,0 1-820,0 1-180,0-3-809,14 10 1439,-10-19 0,25 5 0,-11-21 0</inkml:trace>
-  <inkml:trace contextRef="#ctx0" brushRef="#br0" timeOffset="524708">14297 5029 8612,'-23'-4'2069,"-1"23"-1979,-26 11 0,12 14-2123,2-2 2033,11-9 0,13-1 237,-10-1-507,19-3 308,-9-2-487,12-3-181,0-3-1349,23-1 900,9-8 1079,15-3 0,1-8 0,-8 0 0</inkml:trace>
-  <inkml:trace contextRef="#ctx0" brushRef="#br0" timeOffset="525214">14492 4951 8522,'-11'21'270,"9"16"-270,-9-20 0,11 35 0,0-15 0,10 3 0,0 1 0,-5 2 0,14-4 0,2-2-270,-5-7 90,18 10 0,-21-23-449,6-3 539,-8-11-90,4-3 180,5-18 0,-9-7 90,10-20-90,-12 9 90,9-7 180,-12 28-91,4-14 181,-4 26-360,-2-8 90,4 11 0,-2 0-90,5 21 90,-2 2-90,2 2 0,0 13 0,-1-23 0,2 17 90,3-7-90,1-14-90,8 9 0,-8-19 0,13 6 90,-10-25-90,6 13 90,-7-35 0,0 23 90,-1-20 180,0-1-90,-4 10 0,-4-6 0,-3 14-180,-5 25 0,0 22-270,-1 10-1709,16 23 1979,-2-31 0,4 7 0,-7-14 0</inkml:trace>
-  <inkml:trace contextRef="#ctx0" brushRef="#br0" timeOffset="525360">15005 4878 7533,'-12'15'0,"2"4"0</inkml:trace>
-  <inkml:trace contextRef="#ctx0" brushRef="#br0" timeOffset="525946">15745 4768 10501,'4'-4'450,"2"2"-450,-3 1 0,3 16 90,-1-12-180,5 49 90,-3-25-1483,4 34 584,-3-17-91,-1 1 181,2 3 809,-3-15 0,-1 0 0,5 15 0,1 14 0</inkml:trace>
-  <inkml:trace contextRef="#ctx0" brushRef="#br0" timeOffset="526090">15777 5126 9062,'0'-22'-90,"0"0"-180,0-4-90,0 6-359,20-7-181,6 13 900,13 2 0,0 8 0,-8 2 0</inkml:trace>
-  <inkml:trace contextRef="#ctx0" brushRef="#br0" timeOffset="526425">16265 5077 8612,'0'8'450,"-16"2"-360,13 6-90,-26-3-90,26 6 90,-9-4 180,12 0-270,0 1-270,0 3-90,0-5-179,17 3 89,9-10 360,23-1 180,-10-5 0,2-1 90,-5-18 0,-11-1 809,4-17-269,-20 1 180,-2 3-541,-7 4-89,-16 12 0,13 1-90,-24 14-360,24 13-1079,-8 7-450,32 18 1799,4-7 0,14-12 0,-2-5 0</inkml:trace>
-  <inkml:trace contextRef="#ctx0" brushRef="#br0" timeOffset="526690">16812 5015 9242,'-39'18'1259,"17"2"-1259,6 18 0,16-1-270,21-3 90,8-5 0,12-14 180,1-7 0,-9-8 0,-1 0 0,-2 0 0,-4-20 0,-4 15 0,-10-32 0,2 32 0,-13-30-90,6 12 0,-32-7-449,19 3-181,-43 17 1,29-5-271,-22 13 990,11-6 0,0 8 0,0 0 0</inkml:trace>
-  <inkml:trace contextRef="#ctx0" brushRef="#br0" timeOffset="526830">16500 5539 9602,'0'0'0</inkml:trace>
-  <inkml:trace contextRef="#ctx0" brushRef="#br0" timeOffset="527240">17320 4982 11221,'-10'-7'-270,"8"0"270,-12 3 90,13 0 0,-4 18-90,25 5 0,-15 22 90,32 4-180,-21-8 90,13 7 0,-14-21 269,2 8 1,-10-20-180,4 4-450,-6-28-539,-2-19 269,-3-7-179,0-14 89,0 16 91,0-1-181,0-1 810,0 3 0,19 2 0,4 2 0</inkml:trace>
-  <inkml:trace contextRef="#ctx0" brushRef="#br0" timeOffset="527620">18018 4991 8702,'-21'-14'1349,"-12"10"-989,11-21-360,-16 22 0,1-7 0,5 10 0,16 17 0,0 4 0,15 19 0,-4-8-450,28 6 270,-1-15 1,23-4 179,-6-10 0,-1-9 89,-9-32 1,-5 24 810,-14-41-360,-4 29-630,-6-13 180,0 7-450,0 28-319,19 61 1,5-15-1,-2-3 1,0-1 0</inkml:trace>
-  <inkml:trace contextRef="#ctx0" brushRef="#br0" timeOffset="529630">18878 4905 10141,'-3'13'720,"0"8"-720,3 10 0,17 4 0,-13-2 0,13 4 0,-6 2 0,-8-1 0,8 1 0,-11-2 0,7-4 90,-5-2-180,6-7 270,-8-4-180,0-4-90,0-3-1439,0-3 1349,0-22 0,-17-11 270,13-31-90,-12 7-45,15 8 0,2-1-280,-1-10 325,0 16 0,0 0 90,0-13-90,0 4 180,0 4-90,0 6 62,0 4 208,0 8-90,16 1-360,-12 11 180,26 2-90,-17 6 410,12 20-410,-8 2 212,-5 18-662,-5-3-89,-6-7-271,-1-4 810,-19 1 0,15-15 0,-15 5 0</inkml:trace>
-  <inkml:trace contextRef="#ctx0" brushRef="#br0" timeOffset="529856">19412 4318 8972,'13'-11'1079,"0"4"-899,-2 5 270,1 2-360,-2 21-90,-2-16 90,-1 43-90,-4-26 0,1 26 0,-1 11-90,-2-11-405,0-7 0,1 0-494,0 6 134,1-9 1,0-1-225,2 3 1079,1 8 0,-3-20 0,0-2 0</inkml:trace>
-  <inkml:trace contextRef="#ctx0" brushRef="#br0" timeOffset="530006">19295 4797 8162,'-8'-27'90,"1"6"-90,7 3 0,24 5-90,-17 0-180,45 3-179,-29 2-91,27 4-449,-12 1 791,2 3 1,-1 0 0,0 0 0</inkml:trace>
-  <inkml:trace contextRef="#ctx0" brushRef="#br0" timeOffset="530294">19800 4916 7803,'0'20'0,"0"0"0,0-2 89,0-4-89,0-3 0,0-4 90,0 0-449,0-2-271,21-3 0,21-17 450,2 10 225,-10-9 0,-2-4 135,-1-2 360,5 1 0,-23-14-91,6 29-89,-16-25 630,11 16-631,-13-8-898,2 26-721,-3 4-538,0 21 1798,0-7 0,19-10 0,4-3 0</inkml:trace>
-  <inkml:trace contextRef="#ctx0" brushRef="#br0" timeOffset="530527">19885 4566 8162,'0'-5'360,"24"1"-360,-18 0 90,42 1-90,-28 0 0,23 1 0,-11 0 0,0 2-90,9 0 90,-12 0-899,5 17-181,-16 0 1080,-9 15 0,-2-6 0,-7-1 0</inkml:trace>
-  <inkml:trace contextRef="#ctx0" brushRef="#br0" timeOffset="530695">20270 4141 8342,'13'-3'450,"-3"1"-360,5 18-90,-4-12-270,-10 51-539,2-27 809,-2 14 0,-2 4 0,1 8 0,0-17 0,0 1 0</inkml:trace>
-  <inkml:trace contextRef="#ctx0" brushRef="#br0" timeOffset="530974">21020 4807 9961,'-41'-6'-90,"3"-4"90,10 9 0,0-4 0,1 5 0,1 0 0,-4 18 0,12 7-539,-3 19-91,16 1 90,21-19-89,-11 5-181,41-27 810,-22 8 0,26-12 0,-9 0 0</inkml:trace>
-  <inkml:trace contextRef="#ctx0" brushRef="#br0" timeOffset="531374">21147 4477 8792,'-14'-13'899,"2"1"-359,-3 6 180,6 1-630,9 27-90,0 9 90,14 33-90,-11-8-45,12-16 0,-1-1 135,-10 10-90,10-9 0,0-1-90,-11 2-450,10-6 0,0-3 1,-11-5-721,14 8 721,-12-28-361,5-2 360,0-5 181,1-22 339,2 17 20,0-38 110,1 38 429,2-40-89,-1 29-90,2-20 449,2 11-539,-2 12 270,8 0-450,-12 13 180,5 0-180,-8 16 0,1-11-90,-3 32 90,2-3-180,-3 9-720,7 16 360,-4-26-809,9 16 270,-3-26 989,5-2 0,-1-11 0,1-6 0</inkml:trace>
-  <inkml:trace contextRef="#ctx0" brushRef="#br0" timeOffset="531623">21798 4768 8432,'-19'-6'450,"-1"2"-450,-3 24 90,-6 4-180,25 13 90,-9 5-90,13-16-90,0 6-270,22-12 180,5 0 1,26-11 179,-12 0 0,11-9 90,-23-18 0,8-5 0,-25-19 0,0 9 0,-12 0-360,-24 10-899,-11-9 1259,-12 9 0,-4-4 0,11 11 0</inkml:trace>
-  <inkml:trace contextRef="#ctx0" brushRef="#br0" timeOffset="532340">22882 4406 9062,'0'-16'899,"0"1"-719,-20 2-180,16 1 270,-31 3-270,13 3 0,-19 3-90,8 24 90,-1-16 0,7 51 0,12-31-180,4 9 0,3 2 90,7 4 45,12-7 0,2 0 45,-6 8 0,18-15 0,6 0-90,8 21 180,14-11-90,-20-11 0,-1 1 0,6 0 90,12 8-90,-32-17 0,8 2 0,-24-11 0,7 0 0,-32-1 0,18-3-719,-61 3-1,39-3-604,-12-2 0,-2 0 1108,-1 0 1,-9-2 0,17 0-1</inkml:trace>
-  <inkml:trace contextRef="#ctx0" brushRef="#br0" timeOffset="532826">22772 4200 9152,'-5'-7'1709,"2"3"-1529,0 15-90,17 11-90,-10 11 0,30 22 45,-26-15 0,0 1-843,10-6 1,0 0 842,-10 7 0,-1 1-90,5-7 0,0-3 45,-1 21-315,0-10 1,0 0-676,0 8-719,-3-2 0,-1-1 1709,-3 1 0,1-14 0,0-2 0,1-2 0</inkml:trace>
-  <inkml:trace contextRef="#ctx0" brushRef="#br0" timeOffset="533193">23305 4998 9781,'-4'9'450,"0"1"-540,21-9-809,20-15-91,7 10 990,-4-13 0,0 0 0,9 12 0,-15-3 0,0-1 0</inkml:trace>
-  <inkml:trace contextRef="#ctx0" brushRef="#br0" timeOffset="533640">24265 4284 10051,'-30'-13'90,"2"0"-90,3 6 0,0 0 0,-5 5 0,0 0 0,-3 1 0,1 1 0,2 0 0,-7 16-90,13 1 180,-2 20-90,18-8 0,4 4-90,23-8 90,-15 3 0,44 1-311,-22 2 311,26 1 0,-8 0 0,-11-8 0,0 1 0,15 11 0,-10-3 0,-2 0 90,1 4 90,2 12 270,-19-3-360,-10-11 0,-3 18-90,-27-24-70,-9 10-200,-11-21-1618,-15 3 628,19-14-359,-9-2 1619,16-5 0,2 0 0,4 0 0</inkml:trace>
-  <inkml:trace contextRef="#ctx0" brushRef="#br0" timeOffset="533959">24572 4298 10501,'-10'-2'1169,"3"15"-1169,7 10 0,0 11 0,0 7 0,0 17 0,0-11 0,7-6 0,0 0-1637,-3 8 738,20 10-990,-13-7 900,1-18 989,7 13 0,-14-26 0,9 1 0</inkml:trace>
-  <inkml:trace contextRef="#ctx0" brushRef="#br0" timeOffset="535207">24660 4382 9062,'0'18'1889,"0"0"-1799,0-4 0,0-1 0,0 2 0,0 2-90,0 4 0,0 1 0,12 5 89,-9 14-89,9-4 0,-11-4 0,-2 1-89,1 7-631,0 3 0,0-1 1,0-2-1,0-3 1,0-1-91,0-8 810,0 5 0,0-15 0,0-2 0</inkml:trace>
-  <inkml:trace contextRef="#ctx0" brushRef="#br0" timeOffset="535509">24543 4221 9691,'-1'-12'810,"0"1"-720,0-1 0,1 2 0,0-4 0,25 0-90,-19-2 0,28 2 0,6 2 0,-7-9-397,4 7 0,3 2-52,11-4-271,3 2 90,1 1 90,-18 7 1,0 2 89,19-2 450,-15 3 0,0 2 0,-2 1 0,8 0 0</inkml:trace>
-  <inkml:trace contextRef="#ctx0" brushRef="#br0" timeOffset="535724">24787 4568 7803,'46'0'-1709,"1"0"1709,-10 0 0,-1-13 0,-9-2 0</inkml:trace>
-  <inkml:trace contextRef="#ctx0" brushRef="#br0" timeOffset="535927">24753 5064 10141,'47'2'-360,"-8"0"-449,0-17-1,-5 11 1,2-26 809,21 12 0,-12 0 0,15 3 0</inkml:trace>
-  <inkml:trace contextRef="#ctx0" brushRef="#br0" timeOffset="536479">25820 4141 8882,'0'-11'540,"0"-1"-1,0-6-449,0 3 360,-18-11-180,14 12 0,-31-4-270,31 11 90,-29 1-90,17 4 90,-13 0-90,3 2-90,0 0 180,-15 21-180,11 7 135,5-1 0,1 2-135,-1 18-990,-4 4 1170,15-12-90,7 0-180,3 2-539,2 18 269,27-14 270,-8-7 0,4-2-26,3-14 1,4-2 205,13 14 0,-1 0-642,13 5 642,-18-15 0,1 0 0,-4-1 0,-2-1 180,15 10 90,-15-7 0,-2 0-1,-1 0 956,-3 12-1225,-17-20 270,-27 11-180,13-18-90,-24 1 0,-6-4-270,7-2-270,-12-3 1,-2 0-361,-2-1-503,-12-1 414,22 0 989,3-18 0,7 13 0,2-13 0</inkml:trace>
-  <inkml:trace contextRef="#ctx0" brushRef="#br0" timeOffset="537006">26447 4189 9332,'0'-12'719,"0"0"-449,0 6-180,0-2 90,-16 4 180,12-2-180,-24 3-90,13 1 0,-13 2-180,-2 15 90,6 2 0,0 1-90,2 13 180,5-9-360,-3 20 180,12-10-180,1 9 90,6-19 180,39 21 0,-28-23 0,26 0 0,5-1 0,-16-1 0,10-2 0,1 0 0,-1 4 90,20 15 0,-27-14 0,5 9 90,-14-8-180,-2 0 0,-4 1 360,4 9-270,-7-7-1,0 13-89,-7-16 90,-2 2-180,-1-9 180,0-3-90,-24-1-90,17-3 90,-38 0-269,40-3-901,-54-3 361,35 0-91,-9-2 1,-1 0-630,1 0 1529,-6-18 0,14 13 0,1-13 0</inkml:trace>
-  <inkml:trace contextRef="#ctx0" brushRef="#br0" timeOffset="537356">27073 3937 8072,'36'-9'0,"-1"1"0,6-6-269,-8 6-451,24-6 0,-26 8 720,9 1 0,-18 3 0,-2 1 0</inkml:trace>
-  <inkml:trace contextRef="#ctx0" brushRef="#br0" timeOffset="537575">27252 4109 9781,'0'9'1080,"0"2"-900,12-1 0,-10 9-180,10-2 90,-2 20-90,-8-11 0,8 13-630,-10 5-90,4-7-989,-3 27 810,2-27 899,-3 27 0,0-30 0,0 10 0</inkml:trace>
-  <inkml:trace contextRef="#ctx0" brushRef="#br0" timeOffset="537757">27182 4994 10231,'-3'5'720,"24"-19"-810,7-5-180,15-2-1079,13-12 359,-17 10-1625,13-8 2615,-14 3 0,-2 17 0,-1 3 0</inkml:trace>
-  <inkml:trace contextRef="#ctx0" brushRef="#br0" timeOffset="538273">28295 4018 9871,'-38'-11'540,"-11"-6"-270,14 6 360,-21-4-271,26 11-269,-23-1 0,21 5 0,-8 18-90,0 7 0,12 13 0,5-8 0,1 2-608,0 13 608,8-12 0,2 1 0,0 16 0,4 5-90,4-1 180,4 1-90,0-5 0,24-2 0,11 8-90,16-18 90,-13-13 0,2-3-180,17-5-619,-18-8 0,1-3 799,21-3 0,1-3-83,1-16 128,-21 5 0,-1-3-90,-11-1 0,0-3 45,15-7 0,-4-2 0,-2-8 0,-14-8 0,-5-2 0,-7-3-43,-4 8 0,-8 2-407,-30-3 1771,4 4-1726,-12 13 0,-6 3-225,-11-7-977,2 10 0,-1 2 1607,-12 5 0,24 6 0,1 1 0,-14 2 0</inkml:trace>
-  <inkml:trace contextRef="#ctx0" brushRef="#br0" timeOffset="538839">28767 4067 10141,'0'37'990,"0"-5"-721,14 6 1,-10-1-180,11 4-45,-7-8 0,0 1-45,7 18 0,-1-8 0,1 1 90,-2 6-90,-3-11 0,-2-1 0,0 1-90,1 15-90,-4-30-90,-5-2-1259,0-12 1439,0-22 90,0-10 0,0-12 0,0-6 0,0-19 0,0 9 135,0 1 0,0-2-105,0-13 419,0 8 1,0 1-1633,0-8 1273,6 24 0,0 1 90,-3-5-397,9 9 217,-12 7 450,9 6-90,-7 8 355,12 6-625,-7 4 1429,4 2-1429,-1 20-90,3-15-90,0 34 90,4-21 0,0 18 485,1-4-485,7 20 0,-4-11-360,-3-5 1,-1 0-443,4 6 172,7 11-90,-10-19-539,3-3 180,-2-2-1176,8 5 2255,-8-10 0,6 1 0,-10-10 0</inkml:trace>
-  <inkml:trace contextRef="#ctx0" brushRef="#br0" timeOffset="539073">29395 4007 11940,'-10'-12'900,"2"1"-271,-4 5-449,3 2-180,6 24 0,-3-15 0,1 45 0,0-24 0,-1 29-90,1-3-360,0-9 1,1 0-51,2-9 0,0 1-985,-2 26 1,2-1-8,1-24 1,1-1 1491,-1 11 0,1-1 0,0 15 0,0-2 0</inkml:trace>
-  <inkml:trace contextRef="#ctx0" brushRef="#br0" timeOffset="542122">11122 6782 6723,'16'-41'-180,"12"-2"180,-25-1-1999,25-1 2089,-25 1 90,21 4 141,-21 4-141,15 6 443,-16 4-623,4 8 809,-6 6-629,-15 26-90,11 18 90,-29 14-90,31-9 0,0 0 0,-29 14-136,28-17 1,2 0 45,-13 13 0,14-2 455,0-4-725,0 13-269,0-16-1260,0 16 1799,18-26 0,-13 3 0,12-12 0</inkml:trace>
-  <inkml:trace contextRef="#ctx0" brushRef="#br0" timeOffset="542289">11080 7105 8702,'0'-40'180,"18"17"-90,-14-16-180,24 23 0,3 1-270,-2-29-1276,1 21 0,3 2 917,7-11-271,0-1 907,1 0 0,-3 2 0,0 1 1</inkml:trace>
-  <inkml:trace contextRef="#ctx0" brushRef="#br0" timeOffset="542424">11533 6622 8072,'-17'39'720,"12"-7"-720,-13 1 90,4-1-180,11-7 90,-20 6-270,21-11-360,-7-1-89,9-2 719,0-3 0,0-3 0,0-1 0</inkml:trace>
-  <inkml:trace contextRef="#ctx0" brushRef="#br0" timeOffset="542606">11353 6381 8072,'-9'-23'450,"6"4"-450,-12 6 0,13 4 0,-7 1 0,8 22 0,-3 5 0</inkml:trace>
-  <inkml:trace contextRef="#ctx0" brushRef="#br0" timeOffset="543982">10767 6982 8342,'55'0'1260,"-8"-18"-1081,-3 13-754,-7-31 665,1 20-90,3-16 0,3 5-1474,1-2 1564,1-1-90,-2-2 0,-2 0-26,-16 11 0,0 0 26,9-10 0,7-15 0,-26 23 0,-4-13 0,-9 17 0,-3-4 0,0 7 275,-22 2-185,-2-6 0,-23 10 0,-1-3 0,9 11 360,-12 23-450,22-16 658,-6 39-658,16-25 180,4 22-270,8-8 180,3 32-90,20-23 0,-4-4 0,3-3 0,21-6-270,5 5-270,-7-17 1,0-4-856,1-8 1,2-1 1394,9 0 0,-9-2 0,-1-1 0,3-1 0</inkml:trace>
-  <inkml:trace contextRef="#ctx0" brushRef="#br0" timeOffset="544342">11635 6559 8162,'-19'16'2519,"3"3"-2519,16 20 180,0-8-180,0 3-90,0-10 90,0 13 90,0-11-180,16 18-180,-13-22-90,13 10 270,-7-18-180,-7 0-629,7-8 899,-9-23 0,0-7 0,0-13 90,0-12-180,0 18 180,0-9 450,0 7-181,0 8-179,16 5-90,4 31-180,13 16 90,-13 12-1439,5 16 450,-11-19 989,14 23 0,-7-26 0,0 6 0</inkml:trace>
-  <inkml:trace contextRef="#ctx0" brushRef="#br0" timeOffset="544723">11988 6691 7803,'-39'0'899,"16"18"-449,-5 7-450,12 10 0,-9 16 0,11-18-90,6 22 180,8-26-90,0 5-90,0-15 90,20-5-90,2-7 90,22-2 0,-3-20 0,-17-13 0,11-25 90,-22 4-1244,5-5 1244,-10 12-90,-8 1 180,0-3-181,0-14 271,-20 14-1,15-20-358,-33 35-8,34-8 277,-14 24 449,8 2-629,7 26 1060,9 15-1060,-2 10 0,14-5 0,0 1-450,-14 15-454,14-16 0,-2 0-445,-12 17-91,24 0 1367,-25-1 0,23-1 0,-8-2 0</inkml:trace>
-  <inkml:trace contextRef="#ctx0" brushRef="#br0" timeOffset="545048">12650 6823 10591,'-24'-7'-90,"11"1"0,3 6 0</inkml:trace>
-  <inkml:trace contextRef="#ctx0" brushRef="#br0" timeOffset="545189">12725 7052 11221,'-20'-14'-1650,"3"12"1,17-14 0</inkml:trace>
-  <inkml:trace contextRef="#ctx0" brushRef="#br0" timeOffset="547233">13378 6728 11490,'42'-35'270,"-5"5"-180,11-1-2935,-4 3 2845,8-4 0,4-3-180,-25 15 0,1 0-180,-1 1 1,1 0-46,2-1 0,-1 0 45,0 1 0,0 0 0,-1 0 1,0 1-91,0 1 0,-1 1-809,25-13 1259,-4 7 0,-8 6 0,-2 2 0</inkml:trace>
-  <inkml:trace contextRef="#ctx0" brushRef="#br0" timeOffset="547622">14657 6016 9602,'0'-10'1529,"0"23"-1529,0 9 0,11 17-90,-8 26-90,8-20-405,-6-5 0,-2 0 46,-1 7-631,10-5 1,1-3 163,-5-6 1006,14 12 0,-15-34 0,-1-2 0</inkml:trace>
-  <inkml:trace contextRef="#ctx0" brushRef="#br0" timeOffset="547806">14607 6240 8432,'-21'-13'900,"2"5"-810,12-1 90,-1 5 89,7-3-269,-2 3-359,22 2-91,8 1-450,29 1 91,-8 0 10,-11 7 1,-1 1 528,9-5 1,13 21 0,-19-11 0</inkml:trace>
-  <inkml:trace contextRef="#ctx0" brushRef="#br0" timeOffset="548330">15158 6220 9242,'-19'-13'1349,"-13"5"-1259,18 3-90,-5 20-90,8 5 90,11 20 0,0-8-450,0 1 90,19-5 91,2-4 359,20-6-180,0-7 90,-1-11 0,-15-21 0,4 16 90,-26-35 89,17 14-89,-18-9 180,6 1-180,-8 12 90,0 2-180,0 1-180,0 1 360,0 5-180,0 18 0,18 9-180,-13 20-270,45-2 271,-29-13-1,41 3 90,-29-20 180,30 7-90,-34-25 0,19-5 180,-34 1 179,0-31-179,-10 32 180,-4-38-180,0 32 0,-16-5-90,12 13-180,-12 2 180,2 4 0,11 19-180,-10 13-180,13 12-1079,15 20 629,-11-19-989,25 23 1709,-15-27 0,2 4 0,-6-14 0</inkml:trace>
-  <inkml:trace contextRef="#ctx0" brushRef="#br0" timeOffset="548477">15565 6240 8342,'-26'-15'630,"5"2"-1530,12 3-179,24 4 1079,-10 3 0,37 2 0,-16 0 0</inkml:trace>
-  <inkml:trace contextRef="#ctx0" brushRef="#br0" timeOffset="548710">14967 5897 8702,'-15'14'180,"4"0"-270,34 2-270,-17 6-269,46-19-91,-28 16-624,26-18 1159,-9 7 1,2-8 0,2 0 0</inkml:trace>
-  <inkml:trace contextRef="#ctx0" brushRef="#br0" timeOffset="548856">15433 5813 8522,'-14'20'-383,"2"5"1,12 12 0,0-1 0</inkml:trace>
-  <inkml:trace contextRef="#ctx0" brushRef="#br0" timeOffset="549476">16142 5995 8972,'0'-8'989,"0"3"-899,0 22-90,15 7 0,-11 13 0,12-2 0,-2 4 0,-11-11 0,22 7 90,-22-14-90,8-3-90,-4-9-449,-5 5-91,8-12 630,-9-13 0,3-12 0,-4-26 0,0 12 0,0-14 270,15 24 180,-11-5-271,12 14-89,-5 9-90,1 20 90,8 10-90,-3 18 0,-6-18 0,-5 11-90,0-28 180,-5 23-180,2-24-179,-2 17-91,1-19 360,1 7-90,5-22 90,-2 11 90,4-26-180,-2 26 90,3-30 0,0 28 90,6-28 0,-5 21-90,9-5 0,-10 8 0,3 9 0,-3 0 0,-1 19 0,2-15-180,1 39-540,-1-24-89,2 24 809,8 3 0,-2-11 0,7 9 0</inkml:trace>
-  <inkml:trace contextRef="#ctx0" brushRef="#br0" timeOffset="549839">16910 6030 8702,'-37'-4'900,"3"0"-900,17 21 89,-2 4-178,17 20 89,-6-9 0,8-2-90,0-10-450,20-2 360,0 2 180,18-4-90,-5-5 180,-5-5-90,-12-25 0,-6-4 90,-10-20 90,0 11 629,0-7-629,0 15-180,-15 5 90,11 3-180,-12 31-899,36 2 179,1 25-1438,24 0 2248,-11-7 0,1-13 0,-10-14 0</inkml:trace>
-  <inkml:trace contextRef="#ctx0" brushRef="#br0" timeOffset="550457">17347 6103 9602,'-14'19'539,"3"7"-539,11 13 0,16 1 0,-12-8-90,12 2 0,-4-2-90,-9-1-269,19-3 89,-20-3 0,17 0 270,-6-10-90,11 0 90,-4-12 0,0-1 180,-5-22-90,-1 15-90,-2-36 180,0 24 90,-3-21 0,-1 10 720,-5-12-271,-1 11 1,-2-12-630,0 20 0,-12 4 0,9 31 0,-10 14 0,13 12 90,0 0-90,0-9 0,0 1-90,17-3 90,-13 0 90,13 3-90,-6-8-90,-8 4 0,8-17-900,-11 1-539,-22-9 630,-4 0-270,-16-3 1169,2-18 0,5 13 0,-1-13 0</inkml:trace>
-  <inkml:trace contextRef="#ctx0" brushRef="#br0" timeOffset="550626">17015 5805 9602,'10'11'-3508,"-7"5"3508,13 13 0,-14 2 0,4-5 0</inkml:trace>
-  <inkml:trace contextRef="#ctx0" brushRef="#br0" timeOffset="550890">18215 5739 10051,'-57'0'0,"26"18"180,-17-14-90,43 28 0,-43 9-90,42-1-315,-7-2 0,1 0-494,12 4-1,10-4 1,1 0-361,-6 6 956,14-16 0,-1 0 0,-14 5 0,12-1 0</inkml:trace>
-  <inkml:trace contextRef="#ctx0" brushRef="#br0" timeOffset="551056">17997 6114 9422,'-10'-23'-90,"3"1"0,7-11 0,23 10-90,-17-8-630,51 8 361,-36 8-811,41 1 1260,-33 10 0,9 2 0,-14 2 0</inkml:trace>
-  <inkml:trace contextRef="#ctx0" brushRef="#br0" timeOffset="551205">18338 6008 8522,'0'13'1439,"0"-3"-1259,0 0-270,0-3 180,0 8-90,0-2-539,0 14-91,0-10-719,0 15 269,19-12 1080,-15 5 0,29-8 0,-15-1 0</inkml:trace>
-  <inkml:trace contextRef="#ctx0" brushRef="#br0" timeOffset="551376">18272 5969 10411,'-18'-19'810,"8"4"-810,-7 3-360,11 1-2968,-5 5 3328,25 0 0,8 22 0,17 5 0</inkml:trace>
-  <inkml:trace contextRef="#ctx0" brushRef="#br0" timeOffset="551710">18552 6096 9152,'3'11'539,"-1"-3"-449,2 9-180,-1-7 90,5 10-179,-4-7-361,5 2-180,-1-1 450,-1-5-359,6 3 539,-7-9 180,4-1-180,-3-2 90,1-22 270,4-4 179,-2-14-89,2 6 270,0-2-450,-5 12 719,6-7-539,-10 21-270,4 1-90,-4 9 90,2 0-90,1 0 90,2 20-180,1-15 90,1 35-720,8-10 91,-3 8-721,13 12 901,-11-24-91,6 4-90,-8-19 630,2 0 0,-3-9 0,0 3 0</inkml:trace>
-  <inkml:trace contextRef="#ctx0" brushRef="#br0" timeOffset="551858">19015 6108 9152,'2'-22'1349,"0"-10"-1349,1 29 720,-2-16-630,1 18-90,-1-4 89,4 5-89,-2 16-89,5-12 89,0 27-360,3-28-1619,6 31 989,-2-10 990,11 15 0,-9-16 0,4-8 0</inkml:trace>
-  <inkml:trace contextRef="#ctx0" brushRef="#br0" timeOffset="552264">18993 5697 8612,'-4'-10'90,"3"2"180,-7 2-180,8 2-90,-3 19-90,22-12 90,-1 47 0,5-29-726,2 29 726,-22-17 0,21 0 0,-21 2 90,29 10-90,-22-12 0,23 14 0,-18-24-270,9 7 90,-12-18 90,3 2-90,-8-11 0,-1 0 90,-1-2 726,2-1-636,-1 0 0,11-17 0,-5-2 630,24-18-270,-17 1 359,18 4-539,-21 13 90,5 2-270,-9 15 0,4-4 0,-7 6 0,1 18-719,-3 4-91,-2 0-1978,-1 25 2788,-2-30 0,-2 14 0,0-22 0</inkml:trace>
-  <inkml:trace contextRef="#ctx0" brushRef="#br0" timeOffset="552606">18418 5398 11400,'-12'0'-89,"2"0"-1081,1 18-89,3 1 1259,-3 28 0,3-9 0,-2 8 0</inkml:trace>
-  <inkml:trace contextRef="#ctx0" brushRef="#br0" timeOffset="553356">13488 6812 11041,'29'15'0,"25"-12"-630,-24 26-2902,34-26 3127,-34 12 1,0 1-46,5-9 0,0-1-180,3 8 1,0 1 629,3-4 0,1-1 0,0 0 0,0 1 0,2-1 0,-1 1 0</inkml:trace>
-  <inkml:trace contextRef="#ctx0" brushRef="#br0" timeOffset="556441">14767 6883 9961,'0'-6'450,"0"1"-450,0 23 0,0 5 0,0 13 0,0-1-270,0-8-449,14 0-2250,1 17 2969,13-17 0,-14 11 0,-4-21 0</inkml:trace>
-  <inkml:trace contextRef="#ctx0" brushRef="#br0" timeOffset="556622">14665 7101 8612,'-3'-3'180,"1"0"-90,21-1-360,-15-1-180,44 0-179,-19-2-181,30-2 338,-4 0 0,4-3 1,3 1-1</inkml:trace>
-  <inkml:trace contextRef="#ctx0" brushRef="#br0" timeOffset="556980">15440 6986 8072,'-27'10'630,"-19"-7"-360,27 7-180,-34 0 0,23 0-180,-7 11 90,13-8 0,12 1 0,-7 2 0,18-2 90,-6 11-270,7-11-450,19 10 540,1-12-180,18 2 360,-19-8-90,12-3 0,-16-2 180,4-16 360,-8-5 0,-11-12-181,-17 3-448,12 8 89,-25 10 0,27 0 0,-11 28-810,35-3 90,-16 22-1528,30-4 2248,-12-14 0,-4 2 0,0-11 0</inkml:trace>
-  <inkml:trace contextRef="#ctx0" brushRef="#br0" timeOffset="557222">15572 6865 8342,'0'-8'1080,"0"3"-811,-13 0 1351,10 3-1620,-10 14 0,13 9 89,16 22-89,-12-4-858,31 4 768,-31-8-270,32 0-90,-32 1-989,27 13 900,-15-12-541,11 18 450,-12-28 630,-1 7 0,-13-21 0,5 0 0</inkml:trace>
-  <inkml:trace contextRef="#ctx0" brushRef="#br0" timeOffset="557344">15582 7207 7892,'-19'-15'90,"-5"12"0,17-31-90,-4 24-90,7-19-179,4 16-1530,25-7 1799,5 10 0,14-2 0,-3 6 0</inkml:trace>
-  <inkml:trace contextRef="#ctx0" brushRef="#br0" timeOffset="557562">15057 6868 8432,'-30'0'0,"5"0"0,7 0 90,6 0-809,6 10-181,32-7 900,-19 17 0,50-17 0,-21 7 0</inkml:trace>
-  <inkml:trace contextRef="#ctx0" brushRef="#br0" timeOffset="557722">15312 6687 7173,'0'32'-1400,"0"-5"1400,0-1 0,0-2 0,0 0 0</inkml:trace>
-  <inkml:trace contextRef="#ctx0" brushRef="#br0" timeOffset="558338">16178 6633 10141,'0'-4'0,"-12"1"-90,10 24 180,-10-2 0,12 21-180,0-3 180,0 5-90,7-7 0,1 2 0,-4 20 0,11-9 0,2-1-544,-3 5 454,5 11 90,-8-28 0,-3-6 0,-6-5-1015,6-3-694,-8-10 1709,0-25 0,-13-12 90,10-31-180,-9 13 180,12-15 0,0 28 360,0-5-180,0 19 389,12 7-569,5 27-90,8 11 90,1 27-180,-14-11 180,6-1-180,-5-3 0,5-14-539,10 5 449,-8-16 0,19-8 180,-14-3 0,17-22 0,-19-7 0,4 2 90,-12-30 0,-6 34 449,-3-35-89,-5 31 0,-21-7-360,15 14 90,-31 4-180,21 6 0,-4 21 0,8 9 0,11 20 0,0-6 0,0 0-450,0-12 0,0 0 0,23-3-359,-17-1-270,38-5 1079,-27-7 0,19 2 0,-7-5 0</inkml:trace>
-  <inkml:trace contextRef="#ctx0" brushRef="#br0" timeOffset="558540">16910 6929 9422,'0'34'180,"0"4"-180,0-8-90,16 3-270,-13-8-270,30 0-89,-29 1-91,31-3 810,-21 0 0,16-3 0,-8 0 0</inkml:trace>
-  <inkml:trace contextRef="#ctx0" brushRef="#br0" timeOffset="558742">16750 7137 7982,'46'0'-1259,"-7"-15"1259,7 11 0,-7-27 0,1 12 0</inkml:trace>
-  <inkml:trace contextRef="#ctx0" brushRef="#br0" timeOffset="559026">16473 7042 9062,'-10'-13'1439,"5"-1"-899,0-16-360,25 4-180,-16 4-90,31 5 180,-31 7-90,30 5-90,-11-2-180,10 6-270,-4-2-809,2 3 449,-9 17 900,16-13 0,-18 28 0,7-12 0</inkml:trace>
-  <inkml:trace contextRef="#ctx0" brushRef="#br0" timeOffset="559189">16955 6665 8882,'0'-9'450,"-15"4"-1170,11 20-179,-10 11-271,14 12 1170,0 3 0,0-5 0,0 1 0</inkml:trace>
-  <inkml:trace contextRef="#ctx0" brushRef="#br0" timeOffset="559758">18018 6828 8972,'-53'-4'270,"12"0"-180,0 4-90,17 0 0,0 0 0,2 16-90,9 0 180,3 17-180,10-2 180,24 3-90,1-7-180,23 5 270,-24-14-90,9 2 90,-29-6-180,10-4 0,-5 1 90,-7-4 0,7 0-360,-9-2-1349,-17 1 1439,-4-2 270,1-18 90,20-4 90,25-11-180,11 13 0,14 0 90,-18 7 90,8 0 90,-4-9-270,-11 12 90,10-14-90,-25 9 0,8-8 0,-17 6 0,5-4 90,-6 4 89,0 0-89,-18 0 270,13 2-180,-13 1 0,-3 3 180,2 0-360,-16 4 0,12 0 0,10 20 0,5 3 0,8 22-270,17-10-180,-13 1-359,31 1 179,-8-11 630,24 10 0,-8-22 0,0 0 0</inkml:trace>
-  <inkml:trace contextRef="#ctx0" brushRef="#br0" timeOffset="560072">18405 6848 8432,'-16'-7'450,"4"4"-540,12-7 270,0 8 0,0-2-180,0 22 90,0 2-90,17 25-90,-12-12 180,13 3-90,-4-10-90,-11-2 180,11-1 449,-4 3 91,-8-9-720,12 2 90,-12-31 0,2-12 0,-4-15 0,0-6 0,0-18-90,16 14-939,-16 5 1,3 0 398,29-6-179,-28-11 137,22 27 222,-23 7-629,14 6 1079,-15 8 0,12 7 0,-6 3 0</inkml:trace>
-  <inkml:trace contextRef="#ctx0" brushRef="#br0" timeOffset="560430">18765 6759 10231,'-11'-8'900,"8"-3"-810,-8 32-90,11 1 0,17 19 0,-13-3 90,28-8-90,-28-2 0,30-1 0,-29-4 0,33-4-180,-23-9-90,25 4 180,-17-12-360,5 6 180,-10-8-90,-1-15-449,5-6 359,-8 2 180,3-19-269,-8 10 269,-5-8-900,0-8 1170,-4 22 0,0-5 0,0 11 0</inkml:trace>
-  <inkml:trace contextRef="#ctx0" brushRef="#br0" timeOffset="560689">19243 6820 11850,'0'39'-2428,"14"3"1618,-11-9-629,23 6 629,-9-25 810,-1 13 0,12-25 0,-10 9 0</inkml:trace>
-  <inkml:trace contextRef="#ctx0" brushRef="#br0" timeOffset="560840">19283 6567 10321,'-17'-22'270,"-6"3"-990,21 1-2608,-13 8 3328,13 17 0,20-6 0,12 14 0</inkml:trace>
-  <inkml:trace contextRef="#ctx0" brushRef="#br0" timeOffset="561055">19670 6763 11400,'-24'-11'630,"-11"8"-630,21-8 0,-4 32-90,-2-16-180,17 35-359,-13-22-181,14 16 1,-4-6-990,6 12 449,0-12 1350,21 8 0,-15-15 0,15-2 0</inkml:trace>
-  <inkml:trace contextRef="#ctx0" brushRef="#br0" timeOffset="561361">19752 6991 8882,'17'-14'0,"8"0"0,-3 6-90,31-5 0,-46 6 0,52-9 180,-52 7-90,30-6-90,-34 4 90,13-1 0,-15-2 0,3 0 0,-4-2 180,0-1 450,-19-6-181,-2 5-179,-17-7-90,18 13 270,-7 0-450,14 9 0,-2 17 0,5 8-450,10 10-629,0 2-1350,19 8 2429,-14-10 0,34 12 0,-14-14 0</inkml:trace>
-  <inkml:trace contextRef="#ctx0" brushRef="#br0" timeOffset="562105">20285 6736 9871,'-5'0'180,"-1"0"180,3 0-360,0 0 90,1 18 0,1 3-180,-1 23-360,2-12-179,20 11 359,6-21-360,24 4 450,-8-12-90,2-7 90,2-2 180,-9-5 0,16-19 0,-25 1 180,5-22 90,-20 22 540,-4-15 179,-6 16-269,-20-14-630,12 9-90,-26 5 90,28 28-180,-11 2-180,14 22-90,14-19-270,8 7 361,21-21 269,-8 7-90,3-9 180,-13 0-90,8-17 0,-10 12 539,5-26-89,-18 12 450,1-12-721,-11 4-179,3 5 0,-3 28-1439,0 11 270,0 28-630,17 0 1799,9-8 0,11-14 0,1-15 0</inkml:trace>
-  <inkml:trace contextRef="#ctx0" brushRef="#br0" timeOffset="562422">21305 6661 8972,'-42'0'1169,"-7"0"-1079,18 0 0,-3 16-90,17-2 90,8 16-270,9-7 180,24-9 0,-18 2-90,35-14 90,-21 6 90,14-8-90,-5 0 0,-13-18 270,1 0 180,-15-16-630,4 9-720,-6 4-359,0 28-360,0 7 1619,18 27 0,-13-21 0,12 0 0</inkml:trace>
-  <inkml:trace contextRef="#ctx0" brushRef="#br0" timeOffset="562640">20973 6087 10141,'0'-17'90,"19"0"-90,-15 7-90,33 1 180,-13 5-180,18 2-539,-17 20-361,5-13-179,-27 43 1169,8-24 0,-11 29 0,0-11 0</inkml:trace>
-  <inkml:trace contextRef="#ctx0" brushRef="#br0" timeOffset="563247">21940 6352 11400,'-9'-3'90,"4"0"270,1 3-180,3 19-90,0 7-90,19 13 0,-14 4 90,14-6-180,-5 2 180,-9 2-90,9-2 0,-1 0-90,-9 8 90,18-13 0,-18 11-90,11-25-180,-13 0-359,3-14-900,-1-2 1169,-3-21 360,2-10 0,-2-10 0,0-19 0,0 22-344,16-13 614,-12 20-1,25 5-179,-26 4 270,24 9 180,-12 2-180,12 7-270,-13 21 179,3 6-89,-15 10 344,4 1-524,-6-1 0,0-9 90,-17 14-180,-1-21-1169,-18 2 449,18-11-1438,-14-6 2248,14-1 0,-10-26 0,4-4 0</inkml:trace>
-  <inkml:trace contextRef="#ctx0" brushRef="#br0" timeOffset="563523">22417 6589 8612,'4'17'810,"4"-13"-361,-6 27-269,3-15 0,-2 16-90,-2-7-180,1 6 180,-2-11-90,1 4-90,0-1 0,2-7 0,1 5 90,-2-11 0,2-1 0,-2-6-90,0-18 90,0-7-270,-1-9-89,0-4-811,0-9 451,0 9 719,0-23 0,0 25 0,0-9 0</inkml:trace>
-  <inkml:trace contextRef="#ctx0" brushRef="#br0" timeOffset="563856">22772 6624 10951,'-34'0'0,"-2"0"0,18 16 0,-16-12 0,30 26 0,-25-27 0,26 29 0,-16-10 0,17 9 0,-4 3-360,23-15 450,5 3 0,22-14-90,2-2 0,-1-6 0,-17-16 90,-2 12-90,-24-29-270,6 17-989,-32-15-720,3 9 1979,-23 5 0,14 5 0,1 3 0</inkml:trace>
-  <inkml:trace contextRef="#ctx0" brushRef="#br0" timeOffset="564062">22882 6643 11131,'0'34'-1619,"20"4"899,-15-10 90,32 1-89,-33-9-181,32-1 900,-21 0 0,18-3 0,-7 0 0</inkml:trace>
-  <inkml:trace contextRef="#ctx0" brushRef="#br0" timeOffset="564272">23378 6559 10231,'-38'-7'90,"4"2"-90,17 20 0,-5-12 0,19 28 0,-20-27-180,12 48-449,-3-31 89,0 30-629,9-15 629,-3-11-899,2 11 1439,2-20 0,0-2 0,1-10 0</inkml:trace>
-  <inkml:trace contextRef="#ctx0" brushRef="#br0" timeOffset="564440">23123 6594 8882,'-1'-21'1349,"1"-3"-1169,0 11-90,20 17-90,0 16 0,25 29-360,-14-7-449,3 7-720,5 1-767,-7-12 2296,12 8 0,-13-20 0,-1-3 0</inkml:trace>
-  <inkml:trace contextRef="#ctx0" brushRef="#br0" timeOffset="564608">23773 6549 9691,'-20'-7'0,"1"4"0,-19 15 0,6 9-539,14 9-271,-8 3-179,23-4-540,-17 1 1529,18 0 0,-6-2 0,8 0 0</inkml:trace>
-  <inkml:trace contextRef="#ctx0" brushRef="#br0" timeOffset="564888">23982 6543 9512,'-25'-7'90,"6"2"-90,-22 0-90,-3 4 90,12 0 90,-8 1-180,15 16 180,5-12-720,4 26 270,7-10 180,5 15-90,4-6 90,25-2-89,2-2 179,3-7 0,12 4-180,-37-10 0,31-1 0,-32-1-270,24 2 130,-26-5 410,10 3 0,-12-6 0,0 0 0</inkml:trace>
-  <inkml:trace contextRef="#ctx0" brushRef="#br0" timeOffset="565171">24147 6759 7443,'24'-11'270,"0"-1"-270,-5 7 0,-2-5 0,-4-5 0,-7 2 90,-3-5 179,-3-6 181,-18 6 360,-8-14-451,3 14 1,-20-9-180,16 15-90,0-2-90,-7 10 90,22 1 0,-4 18 0,3-11-90,12 43-180,-4-27-450,5 27 181,22-20-91,-17 0-180,40-3-629,-11 5 1349,10-9 0,4 2 0,-12-10 0</inkml:trace>
-  <inkml:trace contextRef="#ctx0" brushRef="#br0" timeOffset="565488">24423 6574 9422,'-20'-10'269,"4"0"-269,16 5 360,0 1-360,0 19 0,15 4 0,-11 21 0,26-20 0,-27 16 180,11-18 270,-4 2 0,-8 1-181,8-33-269,-10-6 90,0-17-90,0-26 0,18 19 0,-17 5 0,2-1-438,34-6 348,-32-10-360,28 22-449,-29 5 89,24 3-1079,-10 5 1889,6 8 0,-2 3 0,-7 8 0</inkml:trace>
-  <inkml:trace contextRef="#ctx0" brushRef="#br0" timeOffset="565643">24953 6752 11940,'6'0'-180,"-2"-13"0,-4-2 0</inkml:trace>
+  <inkml:trace contextRef="#ctx0" brushRef="#br0" timeOffset="33532.27">8313 2542 7803,'-21'0'1799,"2"0"-810,11 6-1169,-11-4-180,15-7 0,-22 2 181,24-17 89,-19 10 90,19-10 0,-7 6 0,9-2 90,0 8 0,0-1 179,0 1 1,0 2 180,17 2-90,4 3-270,11 16-90,-13 5 0,0 11 0,-17 1 0,6 12 0,-8-8-45,-11-3 0,-1 1-45,6 7-437,-15-15 1,-1 0 256,17 9-90,-36-2-180,35-3-449,-46 6 539,44-14 180,-44 3 270,39-18 0,-14-2 270,19-25 1233,5 3-1143,21-6 0,-13-2 179,28 22-89,-11-9-360,19 12 0,6 17-90,-8-13-630,12 30-629,-19-19 1259,21 5 0,-21 0 0,10-9 0</inkml:trace>
+  <inkml:trace contextRef="#ctx0" brushRef="#br0" timeOffset="34163.27">9262 2275 9961,'0'-11'1889,"0"1"-1799,2 2 180,0 5 180,4 0-270,0 3-180,6 18 0,0-13 0,3 35 0,-3-19 0,2 23-180,0-3-765,-5-9 1,1 2-136,5 20-134,-5-8 0,0 0 884,2 5 1,3 11-1,-3-23 1</inkml:trace>
+  <inkml:trace contextRef="#ctx0" brushRef="#br0" timeOffset="34364.27">9683 2401 9871,'-45'0'2519,"20"22"-2339,-17-16-180,27 24 0,0 3 0,-24-5-45,19 12 0,2 2-45,-9 3-450,19-8 1,2-1-91,-7 3-1259,13 20 810,21-32 89,-15 4 990,46-19 0,-25-5 0,27-5 0</inkml:trace>
+  <inkml:trace contextRef="#ctx0" brushRef="#br0" timeOffset="34547.27">9990 2529 9961,'-18'-10'1889,"14"19"-1889,-14 15-270,18 10-359,0 1-91,0-6 1,18-1-91,-14 0 0,27-1 1,-27-3-180,24-2 989,-24-4 0,24-3 0,-12-3 0</inkml:trace>
+  <inkml:trace contextRef="#ctx0" brushRef="#br0" timeOffset="34697.27">10115 2384 9062,'-24'-10'0,"5"0"-90,4 3 90,11 1 0,-11 4 0,15-1 0</inkml:trace>
+  <inkml:trace contextRef="#ctx0" brushRef="#br0" timeOffset="35316.27">10377 2760 9242,'-14'-17'-450,"23"-11"450,-4-9 0,30-6-573,-31 10 663,26-2-90,-27 3 0,11 1 338,-14-4-158,0 10 270,0-3 529,-17 12-619,-9 9-180,-8 18-180,11 17 0,2 10 0,19 5 0,-8-7 0,10 20-90,19-14-295,-14 13-65,35-11 181,-9-15-91,-3-9 0,2-4 0,20-5 135,-16-4 0,-1-5 135,7-18 90,9 11 180,-8-45 90,-14 29 1259,2-38-809,-20 24-360,-4-3-180,-24 12-270,14 28 180,0 13 0,23 15-90,19-9 0,-1-11 0,-4-10 0,-1 0 0,-20-22 0,10 16 629,-19-35-449,7 17 0,-9-9-270,0-2 0,0 16 0,0 25-629,0 15-361,22 19-719,3 12 630,2-21 1169,0-5 0,-1-2 0,-5-8 0,28 4 0</inkml:trace>
+  <inkml:trace contextRef="#ctx0" brushRef="#br0" timeOffset="35546.27">10435 2265 9062,'-27'-9'719,"-2"-3"-539,14 3-90,2-5-90,30 0 0,-13 2-90,34 0-1169,-11 5 719,20 3-899,1 1 1439,-14 3 0,-3 17 0,-13 5 0</inkml:trace>
+  <inkml:trace contextRef="#ctx0" brushRef="#br0" timeOffset="35716.27">10658 2069 9512,'36'-3'269,"-7"-1"-269,-3 4-449,-5 15-181,0-12-449,1 31 1079,8 1 0,-8 10 0,5 8 0</inkml:trace>
+  <inkml:trace contextRef="#ctx0" brushRef="#br0" timeOffset="36252.27">12255 2536 10231,'-34'-3'270,"0"1"270,-10 2-450,10 0-270,-19 15 180,25 0 0,-10 19 0,23-18-450,1 16 270,11-15 90,3 9-270,24-6-89,3-6 269,27-7-90,-15-2 180,2-25 180,-12 15-180,-2-42 90,0 24 45,-11-9 0,-2-4 45,0-11 269,0 3 1,-3 0 90,-9-9 90,2 9 0,0 0-447,-4-3 266,-16-10 1,13 18-360,-26 14 0,25-3 90,-19 21-90,21 21 0,-8 36 0,10 1-180,9-5 0,0 1-629,-4 3-91,10-6 1,4-2-1,7 6-76,-10-18 1,3-2-15,22 6 990,-8-5 0,3-7 0,1-4 0</inkml:trace>
+  <inkml:trace contextRef="#ctx0" brushRef="#br0" timeOffset="36582.27">12883 2432 11311,'-40'-9'719,"0"2"-719,0 7 0,17 19 0,-11 6 0,21-1 0,-4 25-270,8-33-449,27 31 359,8-26 180,22-3 180,-8-10-90,9-23 90,-22 12 180,10-43 90,-25 26 449,6-36-539,-17 27-270,4-4 270,-5 12-180,0 35-90,0 9-495,10 7 1,0 4-226,-5 15-135,22-15 1,3-5-585,-5-7 1529,3-1 0,2-4 0,8-13 0,3 9 0</inkml:trace>
+  <inkml:trace contextRef="#ctx0" brushRef="#br0" timeOffset="36786.27">13580 2089 10771,'-29'-21'809,"-9"1"-179,34 11-540,-12 18-90,16 21 90,0 11-90,0 8-1066,0-7 976,0-1-1305,18 22 585,-13-18 180,11-9 1,2-2 89,-4 2-89,5 6 629,-2-12 0,-15-12 0,6 3 0</inkml:trace>
+  <inkml:trace contextRef="#ctx0" brushRef="#br0" timeOffset="36913.27">13363 2418 9062,'-14'-17'90,"-4"13"90,16-25-630,-4 20 0,6-11-449,28 12 359,4 1-449,18 7 989,-5 0 0,-8 0 0,0 0 0</inkml:trace>
+  <inkml:trace contextRef="#ctx0" brushRef="#br0" timeOffset="37250.27">13973 2325 9602,'-18'-11'2338,"-9"1"-2068,-13 10-270,-3 16 0,9 9 0,15 9 0,-1 4-90,18 7-270,-5-11 180,7 11-449,24-9 89,-18-11 0,38 1 360,-15-18 180,20-4 0,-8-23 90,-8-10 180,-8-9 90,-13-3 540,-1-5-541,-11 13-89,0-16-360,0 26 180,0-4-630,-14 19-269,11 20-450,9-7-91,-1 33 1350,30-8 0,-8 8 0,18 2 0</inkml:trace>
+  <inkml:trace contextRef="#ctx0" brushRef="#br0" timeOffset="37646.27">15132 2048 12030,'-16'-15'1619,"0"1"-1349,1 5-270,3 1-90,1 2 180,5 2-90,2 17-540,2 35 91,2 1-893,8-2 1,1 2 802,-5 10 44,4-20 0,1-1-404,11 15-1126,-16-3 1305,27-4-1891,-28 10 2611,17-18 0,-17 4 0,6-20 0</inkml:trace>
+  <inkml:trace contextRef="#ctx0" brushRef="#br0" timeOffset="37797.27">15007 2455 9871,'-21'-30'90,"-4"0"-90,23 1 0,-7 4 0,9 0 0,0 4-90,23 3-359,11 2-1,13 7 45,-12 5 0,-1 1-44,12 1-271,5 9 0,0 6 203,2 8 228,-10-10 1,-2 2 0,-1 18 0,-1-11 0</inkml:trace>
+  <inkml:trace contextRef="#ctx0" brushRef="#br0" timeOffset="38174.27">15660 2429 8072,'3'4'810,"2"5"-720,-2-7-90,5 7 0,-2-2 0,3 1-90,1 2-90,1-3-90,1 0-449,11 3 269,-3-2-180,17 2 180,-13-5 91,15-2 449,-18-3 449,5-14 181,-14 11-180,-1-24-181,-5 23 631,-2-24 179,-2 11-449,-2-12-91,-20 7-359,4 10-270,-6 21 90,11 17-180,11 27 90,0-2 45,10-12 0,1 0-135,-6 12-447,5-16 1,1-2 446,5 16 180,-12-1-90,23 1-1459,-20-7 1,-3 0 1458,8 12-45,-7-16 0,-2 1-1738,-3 19 974,0-24-361,0 11-89,0-31 1439,-15-6 1,11-3 0,-12-4 0</inkml:trace>
+  <inkml:trace contextRef="#ctx0" brushRef="#br0" timeOffset="38631.27">16225 2482 8972,'-18'19'1709,"18"5"-1619,4 12-90,10 0 0,-2-5 90,-9 0-180,9 3 90,-3 14 90,-7-13-90,7 9 90,-9-20-90,0-5 0,0-2-360,0-5 90,0-20 180,0-14 0,0-14 90,-14-10-1043,11 3 1043,-10-6 90,13-5-90,0 14 0,0-2-90,0-22 135,-2 13 0,4 2 135,14-4-84,-16 16 1,4 4 83,31 3 89,-17 2-89,16 19 0,-9 24-90,-10 13 0,-2 27-90,-12-8 0,2-12 0,-1-1-1025,-2 5 306,-18 14-1620,13-6 900,-32-16 1439,33 8 0,-15-22 0,19-1 0</inkml:trace>
+  <inkml:trace contextRef="#ctx0" brushRef="#br0" timeOffset="38932.27">16532 2366 9242,'11'18'629,"2"-4"-449,-4 0 0,12-11-90,-5 11-90,9-14 0,-5 0 90,4 0 0,1 0 0,13 0 0,-10-15 0,17-2 180,-24-1 359,5-22-539,-18 25 180,-2-21-90,-6 19-90,0-1 90,-22 10-90,0-1-90,-18 25 0,20 7-360,-5 24-90,22-7-1349,11 18 810,-4-25 989,26-5 0,6-2 0,0 1 0,3-10 0,0 1 0</inkml:trace>
+  <inkml:trace contextRef="#ctx0" brushRef="#br0" timeOffset="39318.27">17807 2370 10681,'-6'-9'630,"2"0"-630,4 2-90,0-1 90,21 0-450,-15 2-675,25 2 1,6 3 315,-13-1 809,11 8 0,1 0 0,-8-2 0,5 10 0</inkml:trace>
+  <inkml:trace contextRef="#ctx0" brushRef="#br0" timeOffset="39446.27">18008 2657 10681,'0'12'1529,"0"-2"-1529,19-4-450,10-3-2428,34-20 899,-5-6 1589,-23 12 0,-1-1 0,-5-8 0,-1-1 0,31-7 0</inkml:trace>
+  <inkml:trace contextRef="#ctx0" brushRef="#br0" timeOffset="40180.27">19053 2137 10771,'0'-11'180,"0"4"269,0 2-359,18 19 0,1 21-180,3 3 135,-6-6 0,-4 1-45,-9 4 0,20 22 0,-21-25 0,7 3-180,-6-17 91,-2-4-1441,6-3 1081,-6-20 449,2-15 0,-3-14 0,0-8 90,14 5 179,-10-18 91,28 15 180,-16-20-270,4 33 180,2 0-450,-9 20 89,5 5 91,3 25-90,-8-15-90,3 57 0,-5-37 0,-5 11 0,-1 1 0,1-2 0,1 8 0,-4-20 0,1-5-90,-1-8-629,-1 3 359,0-12 360,1 6 0,0-25-90,2 12 180,3-35-180,1 20 180,4-23-90,-1 7-90,4-2 180,-1 0 360,5-8-270,-4 15 269,5-3-359,-7 23 0,0 4-90,-4 7 0,-1 0 90,2 18-90,-1-13-90,0 39 180,0-22-629,5 40-451,-2-20 90,-1-8 1,1-1-482,7 5-148,10 8 1529,-1-21 0,4-6 0,3-3 0</inkml:trace>
+  <inkml:trace contextRef="#ctx0" brushRef="#br0" timeOffset="40534.27">20385 2174 9871,'-59'-4'1799,"1"0"-1619,14 4-90,2 0-90,1 16 0,11 7 0,-12 22 90,28-7-360,-8 13 90,21-21 90,-6 6-89,25-13 89,-14-7-90,37-2 180,-21-7-90,20-3 90,-7-4 0,13-15 0,-11 12 180,16-30 0,-26 9 359,2-21-269,-20 9-90,-1 3-90,-6 14-90,0-1-90,0 24-899,0 10 269,0 27-1079,0 4 810,0-9 989,18 1 0,3-24 0,17 2 0</inkml:trace>
+  <inkml:trace contextRef="#ctx0" brushRef="#br0" timeOffset="40868.27">20643 2216 10951,'-21'-3'629,"4"22"-629,17 2 0,0 23 0,0-11 0,0-3-90,0-11-89,14-8 89,-10 7 90,10-9-180,-5 3 270,1-21-180,6-14 180,-1-24-90,-5 8 180,7-19-180,-9 25 89,10-20 1,-11 35-90,5-9 0,-7 26 0,1 14-539,-2 15-990,3 25 809,1-6-269,3 4 989,11-5 0,-2-13 0,10 8 0</inkml:trace>
+  <inkml:trace contextRef="#ctx0" brushRef="#br0" timeOffset="41284.27">21240 2192 10411,'-40'-6'450,"3"1"-360,15 20 90,-6-12-180,25 26-90,-9-8-180,12 17 180,26 0-90,10-6 270,12-14-818,0-8 638,-16-10 180,1 0-90,5 0 0,-18-17 90,10 13 450,-27-32-180,8 9 180,-11-21-271,0 10-89,-21-4-180,-2 18 638,-13 5-548,16 30-90,9 21 90,11 13-1076,21 4 986,-15-7 0,37 1 0,-37 1 0,21-13 0,3 1 0,-10 13 0,8-9 0,-1-1 90,-11 1-691,12 11 242,-26-29-2970,9 1 2070,-39-14 1259,-17-17 0,15 1 0,-1-4 0,-3-6 0,0 0 0</inkml:trace>
+  <inkml:trace contextRef="#ctx0" brushRef="#br0" timeOffset="41518.27">20232 1610 9512,'0'-24'809,"24"1"-449,-18-1-90,39 2 179,-19-3-359,-1 8-269,12 0-1800,-33 27 539,12 18-358,-47 12 1488,4 12 0,-1-29 0,-2 0 0,7 2 0,0 0 0</inkml:trace>
+  <inkml:trace contextRef="#ctx0" brushRef="#br0" timeOffset="42529.27">8778 2752 7982,'-15'16'2789,"21"-12"-2699,-2 29-90,26-17 0,-27 16 90,20-6-90,-21 1 0,10 1-90,-12 1-180,0 2-270,0 3-89,-20 3-316,-3-5 1,-5 1 336,-2-5 1,-4-1-1,-10 11 1,-1 0-1,6-9 1,1 0 0</inkml:trace>
+  <inkml:trace contextRef="#ctx0" brushRef="#br0" timeOffset="70682.27">7985 4067 9062,'-1'-11'1349,"-1"-3"-1169,1 9-90,-2-9-90,3 6 270,0-2 0,0 1-270,0 2 90,16-7-180,-12 4 90,31-3 0,-31 3 0,33 1 90,-33 0-180,29 3 90,-29 2 0,26 3 90,-14 0-180,6 1 269,3 14-268,-13-11 178,3 26-89,-8-25 0,-2 28 0,-3-19-89,-1 21-181,-1-13-360,-16 10 360,12-15-449,-13 1 89,17-7 630,17-6-90,5-1 180,11-3 0,1 0 0,6 0 90,-9 0 180,20 0-91,-23 13 181,11 1-180,-23 1-90,3 6-180,-12-19 0,-3 20 90,-3-12 0,-19 18 0,14-9-90,-32 15 0,8-16 0,-8 7-90,-4-12 180,11-2-360,0-2-270,-1-2-449,0-3-1,1-1 990,-8-3 0,9 0 0,-6 0 0</inkml:trace>
+  <inkml:trace contextRef="#ctx0" brushRef="#br0" timeOffset="71036.27">8700 4304 8162,'-16'-12'2159,"4"21"-2069,27-17 0,-11 31 90,26-20-90,-27 21 0,25-13 0,-25 13 90,21-5-90,-21 2-90,14 1 0,-15 3-180,4 2-810,-28 18 91,0-7-406,-12-3 1,-6 0 1127,11-11 1,-2-2 0,-12 8-1,-3-1 1,10-8 0,0-1-1</inkml:trace>
+  <inkml:trace contextRef="#ctx0" brushRef="#br0" timeOffset="72811.27">9560 3694 9602,'0'-9'1439,"0"2"-1169,0 1-270,0 1 629,0 3-719,0 17 180,0 14-90,0 12 0,0 10 0,15-5 0,-14-9 0,2 2-169,12-10 0,3 2 34,-8 22 0,-1 0-315,13 7-450,-4-11 1,-2 0 90,-5 4 314,2-20 0,1-1-1124,1 18 1619,-7-15 0,1 2 0,-8-16 0</inkml:trace>
+  <inkml:trace contextRef="#ctx0" brushRef="#br0" timeOffset="72948.27">9393 4312 7623,'0'-18'0,"19"-1"0,-15-2-135,24 4 0,4 0-225,-5-10 360,14 1 0,3 2 0,4-5 0,-15 9 0,0 0 0</inkml:trace>
+  <inkml:trace contextRef="#ctx0" brushRef="#br0" timeOffset="73368.27">9962 3718 7533,'-13'17'1709,"2"5"-1709,11 12 90,23 2-90,-18-5 0,32 5 0,-33 4 0,10-10 0,3 1 0,2 17 0,-2-6 0,-1-1 0,2 7-90,-2-10 0,-3 0-906,-5 1 996,11 7 240,-12-23-510,-3-5-180,0-7 180,-3-5 270,1-23-90,-2-25 90,0-4 510,0-11-420,0 22 0,0 2 0,0 2 630,16-1-541,-12 10-89,23 5-90,-10 11 90,-2 21-90,12-12 157,-17 30-157,13-29-270,-5 35-720,10-9 541,-4 10-811,18 9 1260,-13-22 0,7 3 0,-9-11 0</inkml:trace>
+  <inkml:trace contextRef="#ctx0" brushRef="#br0" timeOffset="73646.27">10800 4044 8702,'-38'-7'1259,"0"1"-1349,6 23 180,4 7-180,13 9 90,6 2 0,9-7-269,0 12 89,22-10-270,8 16 270,-1-24 180,23-2-90,-17-6 180,14-12-90,2 6 0,-25-23-90,2-5 90,-19-19-90,-3 7 180,-28-1-180,17 11-540,-57 1 1,38-2 629,-11 14 0,-2 1 0,5-5 0,-10 7 0</inkml:trace>
+  <inkml:trace contextRef="#ctx0" brushRef="#br0" timeOffset="73862.27">11410 4109 8972,'0'30'-360,"0"-6"-270,0 4-179,0-7-181,0 3 990,15-1 0,-11 1 0,10 1 0</inkml:trace>
+  <inkml:trace contextRef="#ctx0" brushRef="#br0" timeOffset="74028.27">11622 3989 8972,'0'-9'-3058,"-17"2"3058,13 23 0,-12-13 0,16 15 0</inkml:trace>
+  <inkml:trace contextRef="#ctx0" brushRef="#br0" timeOffset="74264.27">10782 3887 8522,'-12'-17'270,"2"3"-270,3 2 180,4 3-90,1 1 0,2 2 0,0 2 0,19 2 0,-15 17-360,35-11 90,-34 29-810,26-5 361,-28 9 629,8 16 0,-11-20 0,0 9 0</inkml:trace>
+  <inkml:trace contextRef="#ctx0" brushRef="#br0" timeOffset="74416.27">10712 3673 8252,'26'-14'180,"9"3"-270,-31 5-90,31 3-269,-17 1-541,21 2 990,-4 0 0,6 20 0,6 4 0</inkml:trace>
+  <inkml:trace contextRef="#ctx0" brushRef="#br0" timeOffset="74912.27">12462 3820 9422,'-55'0'-90,"3"0"90,1 0-45,17 7 0,0 4 45,-13 15-45,13-3 0,3 2-45,3 16-360,3 11 180,18-24-359,50 15 359,-15-29 225,14-4 0,3-4 45,0-6 45,-6-6 0,0-5-45,3-13-1541,9 1 1811,-24-18 359,-7 25 630,-3-26-1079,-10 13-180,-1-1 0,-23 14 282,1 24-192,-4 20-90,8 27 90,12-5-45,9-11 0,1-1-418,-5 11 373,15-16 0,-1 0 0,-14 11 90,15-2-90,-6-4 0,-11-1 0,10-6 0,-13-1-134,0 1-856,0-9 990,-16 2 0,12-16 0,-12-1 0</inkml:trace>
+  <inkml:trace contextRef="#ctx0" brushRef="#br0" timeOffset="75112.27">12858 3764 8612,'14'15'1619,"-2"-13"-1619,-7 29 0,0-27 0,-3 32 0,4-19-180,2 32-359,1-18-361,2 9 180,-2-14 1,-1-1-271,3-3 990,-3-3 0,3-3 0,-3-2 0</inkml:trace>
+  <inkml:trace contextRef="#ctx0" brushRef="#br0" timeOffset="75248.27">12842 3767 9332,'-14'-24'90,"11"1"-270,-19 6-360,20 2 360,-13 5-1619,14 1 1799,13 6 0,-8 15 0,13 5 0</inkml:trace>
+  <inkml:trace contextRef="#ctx0" brushRef="#br0" timeOffset="75612.27">13450 3849 9332,'-46'0'1439,"-3"0"-1529,14 0 90,-1 0 0,13 0-90,2 17 90,-1-1-180,11 17-360,1-2 271,34 5 269,-18-12 0,37 1 0,-19-20 89,15 0-89,-6-5 810,-15-15-270,-9-4-450,-9-10-270,0 2-90,0 34-989,0 5 539,14 32 90,-11-13-89,22 0 719,-9-2 0,0-16 0,-3 3 0</inkml:trace>
+  <inkml:trace contextRef="#ctx0" brushRef="#br0" timeOffset="75928.27">13667 3933 9062,'14'38'270,"-11"1"-270,22-20 0,-22 11-180,19-18 180,-19 9-270,15-10 270,-13-6-90,7-5 90,-5-18 0,-1 13 0,-1-33 90,1 22 360,3-33-360,-3 20 179,2-16-89,-5 30 180,0-12-360,1 24 180,0-7-270,7 30-180,-2-16-1799,10 60 630,-4-34 1350,-4 3 0,-1 3 0,9 8 0,1 2 0</inkml:trace>
+  <inkml:trace contextRef="#ctx0" brushRef="#br0" timeOffset="76302.27">14548 3610 11580,'-12'-21'270,"2"2"-360,0 5 90,4 2 0,2 5 0,2 2 0,2 19 0,-1 16 90,18 9-270,-13 9-741,25-7 381,-25 5-89,22 1-136,-17-14 1,-2 0 44,9 15-180,-5-10 1,-1-1 899,0 0 0,2 8 0,-5-19 0</inkml:trace>
+  <inkml:trace contextRef="#ctx0" brushRef="#br0" timeOffset="76461.27">14448 3911 9152,'-12'-26'-90,"10"-1"-90,-10 1-180,12 0-359,21-7 359,-15 9 45,32 5 0,9 4 135,-12 2 0,20 5 0,2 2-179,-4 5-21,-16 1 1,-1 0 0,15 0 0,-1 0 0</inkml:trace>
+  <inkml:trace contextRef="#ctx0" brushRef="#br0" timeOffset="76678.27">15155 3739 8162,'0'17'1440,"-20"-5"-1440,15 2 0,-30-4 0,31 4 0,-27 2-90,15 15 180,-3-6-90,7 30 0,12-26-180,0 15 0,27-24 90,-20-4-180,47-2 180,-30-3-90,24-4 90,8-3-90,-17-2-180,23-21 91,-34 15 89,-2-31-180,-14 32-719,-11-33 1079,-14 13 0,8-10 0,-12 4 0</inkml:trace>
+  <inkml:trace contextRef="#ctx0" brushRef="#br0" timeOffset="76937.27">15688 3887 7803,'4'19'269,"-2"13"-179,2-28-90,-2 27 90,4-12-90,-3 7-270,9 6 91,-6-19-541,10 3 270,-8-12 450,11-3 0,-7-1 0,6 0 0</inkml:trace>
+  <inkml:trace contextRef="#ctx0" brushRef="#br0" timeOffset="77078.27">15902 3788 8792,'7'-11'989,"-1"2"-719,-3 9-90,0 0-180,-1 0 0,2 15 0,0-11 0,1 27 0,4-7-629,-2-3-1440,6 17 719,-4-18 1350,2 2 0,0 4 0,-2-12 0</inkml:trace>
+  <inkml:trace contextRef="#ctx0" brushRef="#br0" timeOffset="77428.27">15142 3653 9781,'-8'-13'720,"3"-1"-630,2 2-90,2-7-90,1 7 180,19-5-360,-15 10-989,29 1-90,-18 4-270,13 16 1619,-2-10 0,-6 26 0,-2-9 0</inkml:trace>
+  <inkml:trace contextRef="#ctx0" brushRef="#br0" timeOffset="77578.27">15273 3528 9512,'0'-26'989,"24"6"-989,-18 3 0,41 6-450,-26-1-2068,38-2 775,-16 5 1743,13-1 0,-13 7 0,2 2 0</inkml:trace>
+  <inkml:trace contextRef="#ctx0" brushRef="#br0" timeOffset="78114.27">15700 3957 9152,'-5'-17'899,"21"-2"-899,-11-11 0,31 13 0,-21 1-1079,15 14 179,-8-5 900,-2 21 0,-11 9 0,-2 16 0</inkml:trace>
+  <inkml:trace contextRef="#ctx0" brushRef="#br0" timeOffset="78564.27">16527 3437 11131,'0'-9'629,"0"2"-449,0 2-90,0 24-360,0 27-719,18 4-136,-8-6 1,0 1 135,12 6 989,-6-6 0,-2 2 0,2 5 0,-1-17 0,0-1 0</inkml:trace>
+  <inkml:trace contextRef="#ctx0" brushRef="#br0" timeOffset="78700.27">16487 3817 8882,'0'-23'-1169,"20"1"1169,25-17 0,2 17 0,-17 4 0,1 1 0</inkml:trace>
+  <inkml:trace contextRef="#ctx0" brushRef="#br0" timeOffset="79211.27">17225 3761 8792,'-24'24'1169,"17"1"-1169,-41-5 0,27 3 90,-33 12-180,23-8 90,-13 19 0,29-19 0,-10 4-270,23-11-89,-7-4 269,9-1-180,0-2 0,20-3 90,-15-5-360,54-1 450,-34-3-45,10 1 1,2-3 134,1-18 0,10 14 0,-20-31 0,-4 32 180,-12-34 719,3 11-539,-13-10 90,5 2-360,-7 14 179,0 3-269,-19 4 0,15 1 90,-29 6-90,30 17 0,-11 9-180,14 15 90,23-17-89,-17 8-91,40-22 90,-27 7-90,33-10 270,-18 0 0,21 0-90,-24-17 180,5 13 90,-15-30 90,-6 30 90,-1-30 89,-6 29 541,-4-29-720,-2 18-360,-2-10-270,0 30-989,0 11-450,18 27 1799,4-5 0,20-1 0,1-5 0</inkml:trace>
+  <inkml:trace contextRef="#ctx0" brushRef="#br0" timeOffset="79394.27">17443 3298 9781,'-12'-3'-1349,"2"1"-270,5 17 1619,25 5 0,-15 12 0,17 0 0</inkml:trace>
+  <inkml:trace contextRef="#ctx0" brushRef="#br0" timeOffset="79532.27">17590 4456 8522,'0'5'-270,"0"-1"0,0-3 1</inkml:trace>
+  <inkml:trace contextRef="#ctx0" brushRef="#br0" timeOffset="80413.27">18347 3591 10231,'0'-18'720,"-17"1"-720,13 7 0,-12-1 0,3 7-180,9 24-720,-9 28 451,13 4 179,12-11 0,2-1-981,-8 0 1116,18-14 1,6-2-747,9 9 701,15-17 45,-19-7 0,0-2 225,5-7-90,23-19 90,-33 14 0,6-37 180,-20 24 180,-3-21 1079,-8-10-1169,0 19-270,-5-14-180,-17 24 1189,13 6-1099,-12 23 582,16 27-672,22 6 90,-9-9 0,1-1-270,13 1-374,18 8 284,-25-18 91,22-4-1,-9-3 0,14-4 270,-11-5-46,17-3 46,-24-19 269,6-4 91,-22 0 270,0-14 89,-11 11-449,1-14 13,-3 8-1542,-15 13-313,11 25-227,-11 9 1799,37 18 0,-17-19 0,17-4 0</inkml:trace>
+  <inkml:trace contextRef="#ctx0" brushRef="#br0" timeOffset="80750.27">19597 3603 9152,'-47'-8'1889,"2"2"-1619,7 24-360,1-14 180,23 30-90,-10-30 0,22 31 0,-6-20 89,8 24-89,0-15-449,17 13 269,6-18 90,24 3 90,-8-15 0,2-2 0,1-5 0,-11-20 90,12-4 0,-21-1 629,-1-28-449,-14 36-90,-4-28-270,-3 21 90,0 7-719,-13 18-900,10 30 809,-11 6 810,19 2 0,7-1 0,4-2 0,16 20 0</inkml:trace>
+  <inkml:trace contextRef="#ctx0" brushRef="#br0" timeOffset="80977.27">18913 3194 8522,'0'-18'90,"28"2"-180,-21 4 135,29 2 0,7 4 45,-12-1-90,14 1 0,1 3 0,-6 2-1349,11 17 0,-35 12 1349,-2 10 0,-14 11 0,0-8 0</inkml:trace>
+  <inkml:trace contextRef="#ctx0" brushRef="#br0" timeOffset="81411.27">20408 3465 10501,'-27'-9'-90,"-11"2"90,14-2-180,-15 6 180,0-1 0,18 23 0,-4-14 0,23 33 90,-8-11-270,10 8 180,22 3 0,7-1-90,12-8 135,-13-6 0,-2-1-45,7 4 0,7 3 0,-12-3 0,-14-10 0,0 9-180,-14-12-899,-20 5 539,14-8-179,-40 0 89,26-3 0,-22-2 630,11-3 0,4 0 0,-1-2 0</inkml:trace>
+  <inkml:trace contextRef="#ctx0" brushRef="#br0" timeOffset="81661.27">20517 3702 7623,'43'-4'90,"16"0"-180,-19-1 180,21-3 0,-34 5-180,5-4 180,-19 3 89,-3 0-89,-6-1 180,-2-3-90,-2 1 360,-20-7-180,-3 5 359,-23-2-719,24 4 360,-15 3-360,21 2 0,-13 2 0,15 15 0,5 7-90,9 10-450,0 1-1439,19 20 990,-14-21 989,38 17 0,-22-28 0,22-2 0</inkml:trace>
+  <inkml:trace contextRef="#ctx0" brushRef="#br0" timeOffset="81945.27">21075 3477 9062,'-29'0'0,"3"0"0,-4 0 0,16 15 90,-9-11 0,21 29-90,-6-11 90,31 21-180,-17-10 90,36 10 0,-14-18 0,-3 8 270,15-6-91,-24-9-179,4 9 0,-8-16-359,-12 7-181,-18-11-719,-5 3 629,1-6 630,-17 1 0,16-4 0,-19 1 0</inkml:trace>
+  <inkml:trace contextRef="#ctx0" brushRef="#br0" timeOffset="82248.27">21492 3609 9602,'-52'0'269,"9"12"-179,-1-9-180,25 20 180,-16-20-449,31 16 179,-11-7 0,15 4 180,0 1 0,21-4 90,11 6-90,11-2-852,5 3 941,-12-5-89,-2-2-316,-1 0 496,-6 0 180,-2-3-180,-13 1-270,7 0 180,-16-3 279,7 1-728,-34-4 258,18-1-439,-44-1 1,29-2-181,-22 0 720,0-1 0,23 0 0,-4 0 0</inkml:trace>
+  <inkml:trace contextRef="#ctx0" brushRef="#br0" timeOffset="82429.27">21847 3621 9602,'11'14'539,"-3"-11"-539,-1 11 0,-2 1 0,-2-11 0,2 21 0,-3-22 90,-1 23-180,0-15-270,-1 13-1079,0-2 630,0-6 809,0 10 0,0-13 0,0 2 0</inkml:trace>
+  <inkml:trace contextRef="#ctx0" brushRef="#br0" timeOffset="82578.27">21902 3338 9152,'-18'-14'-810,"-7"4"810,22 4 0,-8 3 0,11 2 0</inkml:trace>
+  <inkml:trace contextRef="#ctx0" brushRef="#br0" timeOffset="82878.27">22352 3623 9781,'0'5'720,"0"-1"-180,-23 3-360,17-1-90,-33 12-90,18-4 0,-14 13 0,13-8 0,8 3 0,14-7 0,0-3 0,0 0 0,0 1 0,24-6 0,7 1 0,13-6 0,5-2 89,-30-15-178,15 12 89,-30-25-270,9 8 0,-13-14-810,-23 5 361,-9-1-361,-13 20 1080,-12-7 0,25 16 0,-9-5 0</inkml:trace>
+  <inkml:trace contextRef="#ctx0" brushRef="#br0" timeOffset="83226.27">22565 3621 9332,'5'12'809,"1"-9"-629,-6 20-90,2-13 0,-1 11-90,0-2 0,1-1-90,1-1 90,0-1 90,1-4-180,1 3 90,-1-7-90,2 0 90,-4-6-180,8-1 180,-4-17 0,6 12-90,-1-30 90,3 18 180,1-18 450,8-7-360,-5 13 179,8-9-359,-11 14-90,3 12 90,-6 0-180,-1 11-180,1 23-809,-1 11-2159,3 31 3238,-2-10 0,-2 2 0,-1-17 0</inkml:trace>
+  <inkml:trace contextRef="#ctx0" brushRef="#br0" timeOffset="89097.27">23773 3233 6273,'-19'-6'-113,"3"2"1,16 2 0,0 1 0</inkml:trace>
+  <inkml:trace contextRef="#ctx0" brushRef="#br0" timeOffset="90776.27">11023 5317 9062,'0'-8'1799,"0"-1"-1529,0 1 359,0-5-359,0 3 90,-16-7-180,12 7 0,-12-6-180,5 9 0,8-3 0,-8 7-270,2 2 90,7-1 0,-13 1 0,8 0-270,-4 15 181,2-10-91,2 25 180,1-25-90,2 28 180,3-17 90,0 14 0,1-8-90,0-3 90,21 5 0,2-8 0,23 9 90,-23-13-90,11 3 90,-30-7 0,10 0-90,-14-2 0,0-2 90,0 0-180,0-1-540,0 2 91,-24 0-1080,1 0 449,-6-2 1170,-3 0 0,28-1 0,-11-1 0</inkml:trace>
+  <inkml:trace contextRef="#ctx0" brushRef="#br0" timeOffset="91011.27">11333 5175 10681,'0'36'0,"0"-5"0,0 3-90,0-4-90,0 20-90,0-11-360,7-6 1,0 0-91,-3 3-269,20 17 359,-21-28 1,7 3 629,-10-14 0,0-3 0,0-3 0</inkml:trace>
+  <inkml:trace contextRef="#ctx0" brushRef="#br0" timeOffset="91161.27">11120 5502 7443,'0'-13'360,"0"-1"-360,17 0 0,-13-1 0,35 0-90,-34-2 0,45 3-540,-11-5 0,13 6 562,-1-2 0,-17 8 1,-2 1-1</inkml:trace>
+  <inkml:trace contextRef="#ctx0" brushRef="#br0" timeOffset="92249.27">10752 5100 9512,'17'22'269,"-13"14"-179,30-18-90,-30 18 0,28-3 0,-12 19 0,1-11 45,-6-5 0,-1 1-45,-1 3-45,-2-6 0,0-1 45,-1 1 0,1 9 0,-8-20 0,1-2-90,-1-5 0,-3-2 1,1-6-181,0-1-270,1-5 450,1 0 0,-1-17 90,1 12 0,0-28-90,1 15 90,1-16 0,2 2 90,2-2-90,1-1 0,3 0-90,9-11 180,-5 11 180,17-12-270,-14 24 90,8 1-90,-11 12 90,3 4-90,-5 2 180,8 2 0,-9 22 449,6 3-269,-11 1 0,-2 25-450,-5-32 180,-2 25-90,-21-13 0,16-8-90,-35 12-90,14-15-1259,-20 6 539,20-13 900,-22 0 0,41-9 0,-21-2 0</inkml:trace>
+  <inkml:trace contextRef="#ctx0" brushRef="#br0" timeOffset="92613.27">11458 5495 7803,'6'0'179,"-1"0"-89,1 0-90,-1 0-90,2 0 0,1 0 1,5 0 89,-2 0-450,6-15 450,-7 1 0,2-3-90,-9-6 90,-1 8 0,-2-6 0,0 3 90,0 7 0,-17-3 0,13 7 269,-30-3 1,16 8-90,-16 1-270,17 15 0,-7-10 0,21 24 90,-7-9-90,10 15 0,0-6 0,20 4 0,8-21-180,-3 11-629,41-17 179,-41 5 630,10-8 0,2-1 0,-6-1 0,7 0 0</inkml:trace>
+  <inkml:trace contextRef="#ctx0" brushRef="#br0" timeOffset="93227.27">11838 5320 8882,'-29'20'0,"12"3"-90,5 12 90,5-5 0,5-8-180,-6 3 180,26-13-180,-13 8 90,29-19 0,-9 5 90,18-20 0,0-4 180,-4-17 0,-12 4 90,-12 0 0,-9 9-90,-6 5-180,0 26 90,-12 14-180,10 14 90,-10 27 0,12-22-1094,0 18 1094,0-20 90,0-1-90,17-4 0,-13 7 90,13-16-90,-17 9-90,0-25-2698,0 2 2788,-14-30 0,10 14 0,-10-15 0</inkml:trace>
+  <inkml:trace contextRef="#ctx0" brushRef="#br0" timeOffset="93367.27">12258 5432 7083,'8'21'0,"-1"11"0,-1-28 0,-1 27 0,-2-17 0,-1 12 0,-1-6 0</inkml:trace>
+  <inkml:trace contextRef="#ctx0" brushRef="#br0" timeOffset="93527.27">12145 5191 6633,'0'-3'0,"0"1"0</inkml:trace>
+  <inkml:trace contextRef="#ctx0" brushRef="#br0" timeOffset="93827.27">12653 5393 7533,'0'16'180,"0"-1"-180,0-1 0,0-1 0,0 6 0,0-6 0,0 6 90,0-10-90,0-2-90,0-4 90,0-21 0,0-2 90,11-22 539,-8 11-359,16-3-270,-10 15 0,17 5 0,-7 24 0,6-6-630,-9 33-449,0-19 1079,0 19 0,2-7 0,1 0 0</inkml:trace>
+  <inkml:trace contextRef="#ctx0" brushRef="#br0" timeOffset="94010.27">13150 5271 8072,'-8'15'-158,"6"12"1,-6-9 0,8 14 0</inkml:trace>
+  <inkml:trace contextRef="#ctx0" brushRef="#br0" timeOffset="94135.27">13297 5559 10501,'0'6'-473,"0"-1"1,-14-3 0,-2-1 0</inkml:trace>
+  <inkml:trace contextRef="#ctx0" brushRef="#br0" timeOffset="95010.27">13982 4969 9062,'0'-9'90,"9"3"-90,-7 21 90,7 19-4342,-9 11 4162,0 10 0,0-7 460,0 1-820,0 1-180,0-3-809,14 10 1439,-10-19 0,25 5 0,-11-21 0</inkml:trace>
+  <inkml:trace contextRef="#ctx0" brushRef="#br0" timeOffset="95211.27">14297 5029 8612,'-23'-4'2069,"-1"23"-1979,-26 11 0,12 14-2123,2-2 2033,11-9 0,13-1 237,-10-1-507,19-3 308,-9-2-487,12-3-181,0-3-1349,23-1 900,9-8 1079,15-3 0,1-8 0,-8 0 0</inkml:trace>
+  <inkml:trace contextRef="#ctx0" brushRef="#br0" timeOffset="95717.27">14492 4951 8522,'-11'21'270,"9"16"-270,-9-20 0,11 35 0,0-15 0,10 3 0,0 1 0,-5 2 0,14-4 0,2-2-270,-5-7 90,18 10 0,-21-23-449,6-3 539,-8-11-90,4-3 180,5-18 0,-9-7 90,10-20-90,-12 9 90,9-7 180,-12 28-91,4-14 181,-4 26-360,-2-8 90,4 11 0,-2 0-90,5 21 90,-2 2-90,2 2 0,0 13 0,-1-23 0,2 17 90,3-7-90,1-14-90,8 9 0,-8-19 0,13 6 90,-10-25-90,6 13 90,-7-35 0,0 23 90,-1-20 180,0-1-90,-4 10 0,-4-6 0,-3 14-180,-5 25 0,0 22-270,-1 10-1709,16 23 1979,-2-31 0,4 7 0,-7-14 0</inkml:trace>
+  <inkml:trace contextRef="#ctx0" brushRef="#br0" timeOffset="95863.27">15005 4878 7533,'-12'15'0,"2"4"0</inkml:trace>
+  <inkml:trace contextRef="#ctx0" brushRef="#br0" timeOffset="96449.27">15745 4768 10501,'4'-4'450,"2"2"-450,-3 1 0,3 16 90,-1-12-180,5 49 90,-3-25-1483,4 34 584,-3-17-91,-1 1 181,2 3 809,-3-15 0,-1 0 0,5 15 0,1 14 0</inkml:trace>
+  <inkml:trace contextRef="#ctx0" brushRef="#br0" timeOffset="96593.27">15777 5126 9062,'0'-22'-90,"0"0"-180,0-4-90,0 6-359,20-7-181,6 13 900,13 2 0,0 8 0,-8 2 0</inkml:trace>
+  <inkml:trace contextRef="#ctx0" brushRef="#br0" timeOffset="96928.27">16265 5077 8612,'0'8'450,"-16"2"-360,13 6-90,-26-3-90,26 6 90,-9-4 180,12 0-270,0 1-270,0 3-90,0-5-179,17 3 89,9-10 360,23-1 180,-10-5 0,2-1 90,-5-18 0,-11-1 809,4-17-269,-20 1 180,-2 3-541,-7 4-89,-16 12 0,13 1-90,-24 14-360,24 13-1079,-8 7-450,32 18 1799,4-7 0,14-12 0,-2-5 0</inkml:trace>
+  <inkml:trace contextRef="#ctx0" brushRef="#br0" timeOffset="97193.27">16812 5015 9242,'-39'18'1259,"17"2"-1259,6 18 0,16-1-270,21-3 90,8-5 0,12-14 180,1-7 0,-9-8 0,-1 0 0,-2 0 0,-4-20 0,-4 15 0,-10-32 0,2 32 0,-13-30-90,6 12 0,-32-7-449,19 3-181,-43 17 1,29-5-271,-22 13 990,11-6 0,0 8 0,0 0 0</inkml:trace>
+  <inkml:trace contextRef="#ctx0" brushRef="#br0" timeOffset="97333.27">16500 5539 9602,'0'0'0</inkml:trace>
+  <inkml:trace contextRef="#ctx0" brushRef="#br0" timeOffset="97743.27">17320 4982 11221,'-10'-7'-270,"8"0"270,-12 3 90,13 0 0,-4 18-90,25 5 0,-15 22 90,32 4-180,-21-8 90,13 7 0,-14-21 269,2 8 1,-10-20-180,4 4-450,-6-28-539,-2-19 269,-3-7-179,0-14 89,0 16 91,0-1-181,0-1 810,0 3 0,19 2 0,4 2 0</inkml:trace>
+  <inkml:trace contextRef="#ctx0" brushRef="#br0" timeOffset="98123.27">18018 4991 8702,'-21'-14'1349,"-12"10"-989,11-21-360,-16 22 0,1-7 0,5 10 0,16 17 0,0 4 0,15 19 0,-4-8-450,28 6 270,-1-15 1,23-4 179,-6-10 0,-1-9 89,-9-32 1,-5 24 810,-14-41-360,-4 29-630,-6-13 180,0 7-450,0 28-319,19 61 1,5-15-1,-2-3 1,0-1 0</inkml:trace>
+  <inkml:trace contextRef="#ctx0" brushRef="#br0" timeOffset="100133.27">18878 4905 10141,'-3'13'720,"0"8"-720,3 10 0,17 4 0,-13-2 0,13 4 0,-6 2 0,-8-1 0,8 1 0,-11-2 0,7-4 90,-5-2-180,6-7 270,-8-4-180,0-4-90,0-3-1439,0-3 1349,0-22 0,-17-11 270,13-31-90,-12 7-45,15 8 0,2-1-280,-1-10 325,0 16 0,0 0 90,0-13-90,0 4 180,0 4-90,0 6 62,0 4 208,0 8-90,16 1-360,-12 11 180,26 2-90,-17 6 410,12 20-410,-8 2 212,-5 18-662,-5-3-89,-6-7-271,-1-4 810,-19 1 0,15-15 0,-15 5 0</inkml:trace>
+  <inkml:trace contextRef="#ctx0" brushRef="#br0" timeOffset="100359.27">19412 4318 8972,'13'-11'1079,"0"4"-899,-2 5 270,1 2-360,-2 21-90,-2-16 90,-1 43-90,-4-26 0,1 26 0,-1 11-90,-2-11-405,0-7 0,1 0-494,0 6 134,1-9 1,0-1-225,2 3 1079,1 8 0,-3-20 0,0-2 0</inkml:trace>
+  <inkml:trace contextRef="#ctx0" brushRef="#br0" timeOffset="100509.27">19295 4797 8162,'-8'-27'90,"1"6"-90,7 3 0,24 5-90,-17 0-180,45 3-179,-29 2-91,27 4-449,-12 1 791,2 3 1,-1 0 0,0 0 0</inkml:trace>
+  <inkml:trace contextRef="#ctx0" brushRef="#br0" timeOffset="100797.27">19800 4916 7803,'0'20'0,"0"0"0,0-2 89,0-4-89,0-3 0,0-4 90,0 0-449,0-2-271,21-3 0,21-17 450,2 10 225,-10-9 0,-2-4 135,-1-2 360,5 1 0,-23-14-91,6 29-89,-16-25 630,11 16-631,-13-8-898,2 26-721,-3 4-538,0 21 1798,0-7 0,19-10 0,4-3 0</inkml:trace>
+  <inkml:trace contextRef="#ctx0" brushRef="#br0" timeOffset="101030.27">19885 4566 8162,'0'-5'360,"24"1"-360,-18 0 90,42 1-90,-28 0 0,23 1 0,-11 0 0,0 2-90,9 0 90,-12 0-899,5 17-181,-16 0 1080,-9 15 0,-2-6 0,-7-1 0</inkml:trace>
+  <inkml:trace contextRef="#ctx0" brushRef="#br0" timeOffset="101198.27">20270 4141 8342,'13'-3'450,"-3"1"-360,5 18-90,-4-12-270,-10 51-539,2-27 809,-2 14 0,-2 4 0,1 8 0,0-17 0,0 1 0</inkml:trace>
+  <inkml:trace contextRef="#ctx0" brushRef="#br0" timeOffset="101477.27">21020 4807 9961,'-41'-6'-90,"3"-4"90,10 9 0,0-4 0,1 5 0,1 0 0,-4 18 0,12 7-539,-3 19-91,16 1 90,21-19-89,-11 5-181,41-27 810,-22 8 0,26-12 0,-9 0 0</inkml:trace>
+  <inkml:trace contextRef="#ctx0" brushRef="#br0" timeOffset="101877.27">21147 4477 8792,'-14'-13'899,"2"1"-359,-3 6 180,6 1-630,9 27-90,0 9 90,14 33-90,-11-8-45,12-16 0,-1-1 135,-10 10-90,10-9 0,0-1-90,-11 2-450,10-6 0,0-3 1,-11-5-721,14 8 721,-12-28-361,5-2 360,0-5 181,1-22 339,2 17 20,0-38 110,1 38 429,2-40-89,-1 29-90,2-20 449,2 11-539,-2 12 270,8 0-450,-12 13 180,5 0-180,-8 16 0,1-11-90,-3 32 90,2-3-180,-3 9-720,7 16 360,-4-26-809,9 16 270,-3-26 989,5-2 0,-1-11 0,1-6 0</inkml:trace>
+  <inkml:trace contextRef="#ctx0" brushRef="#br0" timeOffset="102126.27">21798 4768 8432,'-19'-6'450,"-1"2"-450,-3 24 90,-6 4-180,25 13 90,-9 5-90,13-16-90,0 6-270,22-12 180,5 0 1,26-11 179,-12 0 0,11-9 90,-23-18 0,8-5 0,-25-19 0,0 9 0,-12 0-360,-24 10-899,-11-9 1259,-12 9 0,-4-4 0,11 11 0</inkml:trace>
+  <inkml:trace contextRef="#ctx0" brushRef="#br0" timeOffset="102843.27">22882 4406 9062,'0'-16'899,"0"1"-719,-20 2-180,16 1 270,-31 3-270,13 3 0,-19 3-90,8 24 90,-1-16 0,7 51 0,12-31-180,4 9 0,3 2 90,7 4 45,12-7 0,2 0 45,-6 8 0,18-15 0,6 0-90,8 21 180,14-11-90,-20-11 0,-1 1 0,6 0 90,12 8-90,-32-17 0,8 2 0,-24-11 0,7 0 0,-32-1 0,18-3-719,-61 3-1,39-3-604,-12-2 0,-2 0 1108,-1 0 1,-9-2 0,17 0-1</inkml:trace>
+  <inkml:trace contextRef="#ctx0" brushRef="#br0" timeOffset="103329.27">22772 4200 9152,'-5'-7'1709,"2"3"-1529,0 15-90,17 11-90,-10 11 0,30 22 45,-26-15 0,0 1-843,10-6 1,0 0 842,-10 7 0,-1 1-90,5-7 0,0-3 45,-1 21-315,0-10 1,0 0-676,0 8-719,-3-2 0,-1-1 1709,-3 1 0,1-14 0,0-2 0,1-2 0</inkml:trace>
+  <inkml:trace contextRef="#ctx0" brushRef="#br0" timeOffset="103696.27">23305 4998 9781,'-4'9'450,"0"1"-540,21-9-809,20-15-91,7 10 990,-4-13 0,0 0 0,9 12 0,-15-3 0,0-1 0</inkml:trace>
+  <inkml:trace contextRef="#ctx0" brushRef="#br0" timeOffset="104143.27">24265 4284 10051,'-30'-13'90,"2"0"-90,3 6 0,0 0 0,-5 5 0,0 0 0,-3 1 0,1 1 0,2 0 0,-7 16-90,13 1 180,-2 20-90,18-8 0,4 4-90,23-8 90,-15 3 0,44 1-311,-22 2 311,26 1 0,-8 0 0,-11-8 0,0 1 0,15 11 0,-10-3 0,-2 0 90,1 4 90,2 12 270,-19-3-360,-10-11 0,-3 18-90,-27-24-70,-9 10-200,-11-21-1618,-15 3 628,19-14-359,-9-2 1619,16-5 0,2 0 0,4 0 0</inkml:trace>
+  <inkml:trace contextRef="#ctx0" brushRef="#br0" timeOffset="104462.27">24572 4298 10501,'-10'-2'1169,"3"15"-1169,7 10 0,0 11 0,0 7 0,0 17 0,0-11 0,7-6 0,0 0-1637,-3 8 738,20 10-990,-13-7 900,1-18 989,7 13 0,-14-26 0,9 1 0</inkml:trace>
+  <inkml:trace contextRef="#ctx0" brushRef="#br0" timeOffset="105710.27">24660 4382 9062,'0'18'1889,"0"0"-1799,0-4 0,0-1 0,0 2 0,0 2-90,0 4 0,0 1 0,12 5 89,-9 14-89,9-4 0,-11-4 0,-2 1-89,1 7-631,0 3 0,0-1 1,0-2-1,0-3 1,0-1-91,0-8 810,0 5 0,0-15 0,0-2 0</inkml:trace>
+  <inkml:trace contextRef="#ctx0" brushRef="#br0" timeOffset="106012.27">24543 4221 9691,'-1'-12'810,"0"1"-720,0-1 0,1 2 0,0-4 0,25 0-90,-19-2 0,28 2 0,6 2 0,-7-9-397,4 7 0,3 2-52,11-4-271,3 2 90,1 1 90,-18 7 1,0 2 89,19-2 450,-15 3 0,0 2 0,-2 1 0,8 0 0</inkml:trace>
+  <inkml:trace contextRef="#ctx0" brushRef="#br0" timeOffset="106227.27">24787 4568 7803,'46'0'-1709,"1"0"1709,-10 0 0,-1-13 0,-9-2 0</inkml:trace>
+  <inkml:trace contextRef="#ctx0" brushRef="#br0" timeOffset="106430.27">24753 5064 10141,'47'2'-360,"-8"0"-449,0-17-1,-5 11 1,2-26 809,21 12 0,-12 0 0,15 3 0</inkml:trace>
+  <inkml:trace contextRef="#ctx0" brushRef="#br0" timeOffset="106982.27">25820 4141 8882,'0'-11'540,"0"-1"-1,0-6-449,0 3 360,-18-11-180,14 12 0,-31-4-270,31 11 90,-29 1-90,17 4 90,-13 0-90,3 2-90,0 0 180,-15 21-180,11 7 135,5-1 0,1 2-135,-1 18-990,-4 4 1170,15-12-90,7 0-180,3 2-539,2 18 269,27-14 270,-8-7 0,4-2-26,3-14 1,4-2 205,13 14 0,-1 0-642,13 5 642,-18-15 0,1 0 0,-4-1 0,-2-1 180,15 10 90,-15-7 0,-2 0-1,-1 0 956,-3 12-1225,-17-20 270,-27 11-180,13-18-90,-24 1 0,-6-4-270,7-2-270,-12-3 1,-2 0-361,-2-1-503,-12-1 414,22 0 989,3-18 0,7 13 0,2-13 0</inkml:trace>
+  <inkml:trace contextRef="#ctx0" brushRef="#br0" timeOffset="107509.27">26447 4189 9332,'0'-12'719,"0"0"-449,0 6-180,0-2 90,-16 4 180,12-2-180,-24 3-90,13 1 0,-13 2-180,-2 15 90,6 2 0,0 1-90,2 13 180,5-9-360,-3 20 180,12-10-180,1 9 90,6-19 180,39 21 0,-28-23 0,26 0 0,5-1 0,-16-1 0,10-2 0,1 0 0,-1 4 90,20 15 0,-27-14 0,5 9 90,-14-8-180,-2 0 0,-4 1 360,4 9-270,-7-7-1,0 13-89,-7-16 90,-2 2-180,-1-9 180,0-3-90,-24-1-90,17-3 90,-38 0-269,40-3-901,-54-3 361,35 0-91,-9-2 1,-1 0-630,1 0 1529,-6-18 0,14 13 0,1-13 0</inkml:trace>
+  <inkml:trace contextRef="#ctx0" brushRef="#br0" timeOffset="107859.27">27073 3937 8072,'36'-9'0,"-1"1"0,6-6-269,-8 6-451,24-6 0,-26 8 720,9 1 0,-18 3 0,-2 1 0</inkml:trace>
+  <inkml:trace contextRef="#ctx0" brushRef="#br0" timeOffset="108078.27">27252 4109 9781,'0'9'1080,"0"2"-900,12-1 0,-10 9-180,10-2 90,-2 20-90,-8-11 0,8 13-630,-10 5-90,4-7-989,-3 27 810,2-27 899,-3 27 0,0-30 0,0 10 0</inkml:trace>
+  <inkml:trace contextRef="#ctx0" brushRef="#br0" timeOffset="108260.27">27182 4994 10231,'-3'5'720,"24"-19"-810,7-5-180,15-2-1079,13-12 359,-17 10-1625,13-8 2615,-14 3 0,-2 17 0,-1 3 0</inkml:trace>
+  <inkml:trace contextRef="#ctx0" brushRef="#br0" timeOffset="108776.27">28295 4018 9871,'-38'-11'540,"-11"-6"-270,14 6 360,-21-4-271,26 11-269,-23-1 0,21 5 0,-8 18-90,0 7 0,12 13 0,5-8 0,1 2-608,0 13 608,8-12 0,2 1 0,0 16 0,4 5-90,4-1 180,4 1-90,0-5 0,24-2 0,11 8-90,16-18 90,-13-13 0,2-3-180,17-5-619,-18-8 0,1-3 799,21-3 0,1-3-83,1-16 128,-21 5 0,-1-3-90,-11-1 0,0-3 45,15-7 0,-4-2 0,-2-8 0,-14-8 0,-5-2 0,-7-3-43,-4 8 0,-8 2-407,-30-3 1771,4 4-1726,-12 13 0,-6 3-225,-11-7-977,2 10 0,-1 2 1607,-12 5 0,24 6 0,1 1 0,-14 2 0</inkml:trace>
+  <inkml:trace contextRef="#ctx0" brushRef="#br0" timeOffset="109342.27">28767 4067 10141,'0'37'990,"0"-5"-721,14 6 1,-10-1-180,11 4-45,-7-8 0,0 1-45,7 18 0,-1-8 0,1 1 90,-2 6-90,-3-11 0,-2-1 0,0 1-90,1 15-90,-4-30-90,-5-2-1259,0-12 1439,0-22 90,0-10 0,0-12 0,0-6 0,0-19 0,0 9 135,0 1 0,0-2-105,0-13 419,0 8 1,0 1-1633,0-8 1273,6 24 0,0 1 90,-3-5-397,9 9 217,-12 7 450,9 6-90,-7 8 355,12 6-625,-7 4 1429,4 2-1429,-1 20-90,3-15-90,0 34 90,4-21 0,0 18 485,1-4-485,7 20 0,-4-11-360,-3-5 1,-1 0-443,4 6 172,7 11-90,-10-19-539,3-3 180,-2-2-1176,8 5 2255,-8-10 0,6 1 0,-10-10 0</inkml:trace>
+  <inkml:trace contextRef="#ctx0" brushRef="#br0" timeOffset="109576.27">29395 4007 11940,'-10'-12'900,"2"1"-271,-4 5-449,3 2-180,6 24 0,-3-15 0,1 45 0,0-24 0,-1 29-90,1-3-360,0-9 1,1 0-51,2-9 0,0 1-985,-2 26 1,2-1-8,1-24 1,1-1 1491,-1 11 0,1-1 0,0 15 0,0-2 0</inkml:trace>
+  <inkml:trace contextRef="#ctx0" brushRef="#br0" timeOffset="112625.27">11122 6782 6723,'16'-41'-180,"12"-2"180,-25-1-1999,25-1 2089,-25 1 90,21 4 141,-21 4-141,15 6 443,-16 4-623,4 8 809,-6 6-629,-15 26-90,11 18 90,-29 14-90,31-9 0,0 0 0,-29 14-136,28-17 1,2 0 45,-13 13 0,14-2 455,0-4-725,0 13-269,0-16-1260,0 16 1799,18-26 0,-13 3 0,12-12 0</inkml:trace>
+  <inkml:trace contextRef="#ctx0" brushRef="#br0" timeOffset="112792.27">11080 7105 8702,'0'-40'180,"18"17"-90,-14-16-180,24 23 0,3 1-270,-2-29-1276,1 21 0,3 2 917,7-11-271,0-1 907,1 0 0,-3 2 0,0 1 1</inkml:trace>
+  <inkml:trace contextRef="#ctx0" brushRef="#br0" timeOffset="112927.27">11533 6622 8072,'-17'39'720,"12"-7"-720,-13 1 90,4-1-180,11-7 90,-20 6-270,21-11-360,-7-1-89,9-2 719,0-3 0,0-3 0,0-1 0</inkml:trace>
+  <inkml:trace contextRef="#ctx0" brushRef="#br0" timeOffset="113109.27">11353 6381 8072,'-9'-23'450,"6"4"-450,-12 6 0,13 4 0,-7 1 0,8 22 0,-3 5 0</inkml:trace>
+  <inkml:trace contextRef="#ctx0" brushRef="#br0" timeOffset="114485.27">10767 6982 8342,'55'0'1260,"-8"-18"-1081,-3 13-754,-7-31 665,1 20-90,3-16 0,3 5-1474,1-2 1564,1-1-90,-2-2 0,-2 0-26,-16 11 0,0 0 26,9-10 0,7-15 0,-26 23 0,-4-13 0,-9 17 0,-3-4 0,0 7 275,-22 2-185,-2-6 0,-23 10 0,-1-3 0,9 11 360,-12 23-450,22-16 658,-6 39-658,16-25 180,4 22-270,8-8 180,3 32-90,20-23 0,-4-4 0,3-3 0,21-6-270,5 5-270,-7-17 1,0-4-856,1-8 1,2-1 1394,9 0 0,-9-2 0,-1-1 0,3-1 0</inkml:trace>
+  <inkml:trace contextRef="#ctx0" brushRef="#br0" timeOffset="114845.27">11635 6559 8162,'-19'16'2519,"3"3"-2519,16 20 180,0-8-180,0 3-90,0-10 90,0 13 90,0-11-180,16 18-180,-13-22-90,13 10 270,-7-18-180,-7 0-629,7-8 899,-9-23 0,0-7 0,0-13 90,0-12-180,0 18 180,0-9 450,0 7-181,0 8-179,16 5-90,4 31-180,13 16 90,-13 12-1439,5 16 450,-11-19 989,14 23 0,-7-26 0,0 6 0</inkml:trace>
+  <inkml:trace contextRef="#ctx0" brushRef="#br0" timeOffset="115226.27">11988 6691 7803,'-39'0'899,"16"18"-449,-5 7-450,12 10 0,-9 16 0,11-18-90,6 22 180,8-26-90,0 5-90,0-15 90,20-5-90,2-7 90,22-2 0,-3-20 0,-17-13 0,11-25 90,-22 4-1244,5-5 1244,-10 12-90,-8 1 180,0-3-181,0-14 271,-20 14-1,15-20-358,-33 35-8,34-8 277,-14 24 449,8 2-629,7 26 1060,9 15-1060,-2 10 0,14-5 0,0 1-450,-14 15-454,14-16 0,-2 0-445,-12 17-91,24 0 1367,-25-1 0,23-1 0,-8-2 0</inkml:trace>
+  <inkml:trace contextRef="#ctx0" brushRef="#br0" timeOffset="115551.27">12650 6823 10591,'-24'-7'-90,"11"1"0,3 6 0</inkml:trace>
+  <inkml:trace contextRef="#ctx0" brushRef="#br0" timeOffset="115692.27">12725 7052 11221,'-20'-14'-1650,"3"12"1,17-14 0</inkml:trace>
+  <inkml:trace contextRef="#ctx0" brushRef="#br0" timeOffset="117736.27">13378 6728 11490,'42'-35'270,"-5"5"-180,11-1-2935,-4 3 2845,8-4 0,4-3-180,-25 15 0,1 0-180,-1 1 1,1 0-46,2-1 0,-1 0 45,0 1 0,0 0 0,-1 0 1,0 1-91,0 1 0,-1 1-809,25-13 1259,-4 7 0,-8 6 0,-2 2 0</inkml:trace>
+  <inkml:trace contextRef="#ctx0" brushRef="#br0" timeOffset="118125.27">14657 6016 9602,'0'-10'1529,"0"23"-1529,0 9 0,11 17-90,-8 26-90,8-20-405,-6-5 0,-2 0 46,-1 7-631,10-5 1,1-3 163,-5-6 1006,14 12 0,-15-34 0,-1-2 0</inkml:trace>
+  <inkml:trace contextRef="#ctx0" brushRef="#br0" timeOffset="118309.27">14607 6240 8432,'-21'-13'900,"2"5"-810,12-1 90,-1 5 89,7-3-269,-2 3-359,22 2-91,8 1-450,29 1 91,-8 0 10,-11 7 1,-1 1 528,9-5 1,13 21 0,-19-11 0</inkml:trace>
+  <inkml:trace contextRef="#ctx0" brushRef="#br0" timeOffset="118833.27">15158 6220 9242,'-19'-13'1349,"-13"5"-1259,18 3-90,-5 20-90,8 5 90,11 20 0,0-8-450,0 1 90,19-5 91,2-4 359,20-6-180,0-7 90,-1-11 0,-15-21 0,4 16 90,-26-35 89,17 14-89,-18-9 180,6 1-180,-8 12 90,0 2-180,0 1-180,0 1 360,0 5-180,0 18 0,18 9-180,-13 20-270,45-2 271,-29-13-1,41 3 90,-29-20 180,30 7-90,-34-25 0,19-5 180,-34 1 179,0-31-179,-10 32 180,-4-38-180,0 32 0,-16-5-90,12 13-180,-12 2 180,2 4 0,11 19-180,-10 13-180,13 12-1079,15 20 629,-11-19-989,25 23 1709,-15-27 0,2 4 0,-6-14 0</inkml:trace>
+  <inkml:trace contextRef="#ctx0" brushRef="#br0" timeOffset="118980.27">15565 6240 8342,'-26'-15'630,"5"2"-1530,12 3-179,24 4 1079,-10 3 0,37 2 0,-16 0 0</inkml:trace>
+  <inkml:trace contextRef="#ctx0" brushRef="#br0" timeOffset="119213.27">14967 5897 8702,'-15'14'180,"4"0"-270,34 2-270,-17 6-269,46-19-91,-28 16-624,26-18 1159,-9 7 1,2-8 0,2 0 0</inkml:trace>
+  <inkml:trace contextRef="#ctx0" brushRef="#br0" timeOffset="119359.27">15433 5813 8522,'-14'20'-383,"2"5"1,12 12 0,0-1 0</inkml:trace>
+  <inkml:trace contextRef="#ctx0" brushRef="#br0" timeOffset="119979.27">16142 5995 8972,'0'-8'989,"0"3"-899,0 22-90,15 7 0,-11 13 0,12-2 0,-2 4 0,-11-11 0,22 7 90,-22-14-90,8-3-90,-4-9-449,-5 5-91,8-12 630,-9-13 0,3-12 0,-4-26 0,0 12 0,0-14 270,15 24 180,-11-5-271,12 14-89,-5 9-90,1 20 90,8 10-90,-3 18 0,-6-18 0,-5 11-90,0-28 180,-5 23-180,2-24-179,-2 17-91,1-19 360,1 7-90,5-22 90,-2 11 90,4-26-180,-2 26 90,3-30 0,0 28 90,6-28 0,-5 21-90,9-5 0,-10 8 0,3 9 0,-3 0 0,-1 19 0,2-15-180,1 39-540,-1-24-89,2 24 809,8 3 0,-2-11 0,7 9 0</inkml:trace>
+  <inkml:trace contextRef="#ctx0" brushRef="#br0" timeOffset="120342.27">16910 6030 8702,'-37'-4'900,"3"0"-900,17 21 89,-2 4-178,17 20 89,-6-9 0,8-2-90,0-10-450,20-2 360,0 2 180,18-4-90,-5-5 180,-5-5-90,-12-25 0,-6-4 90,-10-20 90,0 11 629,0-7-629,0 15-180,-15 5 90,11 3-180,-12 31-899,36 2 179,1 25-1438,24 0 2248,-11-7 0,1-13 0,-10-14 0</inkml:trace>
+  <inkml:trace contextRef="#ctx0" brushRef="#br0" timeOffset="120960.27">17347 6103 9602,'-14'19'539,"3"7"-539,11 13 0,16 1 0,-12-8-90,12 2 0,-4-2-90,-9-1-269,19-3 89,-20-3 0,17 0 270,-6-10-90,11 0 90,-4-12 0,0-1 180,-5-22-90,-1 15-90,-2-36 180,0 24 90,-3-21 0,-1 10 720,-5-12-271,-1 11 1,-2-12-630,0 20 0,-12 4 0,9 31 0,-10 14 0,13 12 90,0 0-90,0-9 0,0 1-90,17-3 90,-13 0 90,13 3-90,-6-8-90,-8 4 0,8-17-900,-11 1-539,-22-9 630,-4 0-270,-16-3 1169,2-18 0,5 13 0,-1-13 0</inkml:trace>
+  <inkml:trace contextRef="#ctx0" brushRef="#br0" timeOffset="121129.27">17015 5805 9602,'10'11'-3508,"-7"5"3508,13 13 0,-14 2 0,4-5 0</inkml:trace>
+  <inkml:trace contextRef="#ctx0" brushRef="#br0" timeOffset="121393.27">18215 5739 10051,'-57'0'0,"26"18"180,-17-14-90,43 28 0,-43 9-90,42-1-315,-7-2 0,1 0-494,12 4-1,10-4 1,1 0-361,-6 6 956,14-16 0,-1 0 0,-14 5 0,12-1 0</inkml:trace>
+  <inkml:trace contextRef="#ctx0" brushRef="#br0" timeOffset="121559.27">17997 6114 9422,'-10'-23'-90,"3"1"0,7-11 0,23 10-90,-17-8-630,51 8 361,-36 8-811,41 1 1260,-33 10 0,9 2 0,-14 2 0</inkml:trace>
+  <inkml:trace contextRef="#ctx0" brushRef="#br0" timeOffset="121708.27">18338 6008 8522,'0'13'1439,"0"-3"-1259,0 0-270,0-3 180,0 8-90,0-2-539,0 14-91,0-10-719,0 15 269,19-12 1080,-15 5 0,29-8 0,-15-1 0</inkml:trace>
+  <inkml:trace contextRef="#ctx0" brushRef="#br0" timeOffset="121879.27">18272 5969 10411,'-18'-19'810,"8"4"-810,-7 3-360,11 1-2968,-5 5 3328,25 0 0,8 22 0,17 5 0</inkml:trace>
+  <inkml:trace contextRef="#ctx0" brushRef="#br0" timeOffset="122213.27">18552 6096 9152,'3'11'539,"-1"-3"-449,2 9-180,-1-7 90,5 10-179,-4-7-361,5 2-180,-1-1 450,-1-5-359,6 3 539,-7-9 180,4-1-180,-3-2 90,1-22 270,4-4 179,-2-14-89,2 6 270,0-2-450,-5 12 719,6-7-539,-10 21-270,4 1-90,-4 9 90,2 0-90,1 0 90,2 20-180,1-15 90,1 35-720,8-10 91,-3 8-721,13 12 901,-11-24-91,6 4-90,-8-19 630,2 0 0,-3-9 0,0 3 0</inkml:trace>
+  <inkml:trace contextRef="#ctx0" brushRef="#br0" timeOffset="122361.27">19015 6108 9152,'2'-22'1349,"0"-10"-1349,1 29 720,-2-16-630,1 18-90,-1-4 89,4 5-89,-2 16-89,5-12 89,0 27-360,3-28-1619,6 31 989,-2-10 990,11 15 0,-9-16 0,4-8 0</inkml:trace>
+  <inkml:trace contextRef="#ctx0" brushRef="#br0" timeOffset="122767.27">18993 5697 8612,'-4'-10'90,"3"2"180,-7 2-180,8 2-90,-3 19-90,22-12 90,-1 47 0,5-29-726,2 29 726,-22-17 0,21 0 0,-21 2 90,29 10-90,-22-12 0,23 14 0,-18-24-270,9 7 90,-12-18 90,3 2-90,-8-11 0,-1 0 90,-1-2 726,2-1-636,-1 0 0,11-17 0,-5-2 630,24-18-270,-17 1 359,18 4-539,-21 13 90,5 2-270,-9 15 0,4-4 0,-7 6 0,1 18-719,-3 4-91,-2 0-1978,-1 25 2788,-2-30 0,-2 14 0,0-22 0</inkml:trace>
+  <inkml:trace contextRef="#ctx0" brushRef="#br0" timeOffset="123109.27">18418 5398 11400,'-12'0'-89,"2"0"-1081,1 18-89,3 1 1259,-3 28 0,3-9 0,-2 8 0</inkml:trace>
+  <inkml:trace contextRef="#ctx0" brushRef="#br0" timeOffset="123859.27">13488 6812 11041,'29'15'0,"25"-12"-630,-24 26-2902,34-26 3127,-34 12 1,0 1-46,5-9 0,0-1-180,3 8 1,0 1 629,3-4 0,1-1 0,0 0 0,0 1 0,2-1 0,-1 1 0</inkml:trace>
+  <inkml:trace contextRef="#ctx0" brushRef="#br0" timeOffset="126944.27">14767 6883 9961,'0'-6'450,"0"1"-450,0 23 0,0 5 0,0 13 0,0-1-270,0-8-449,14 0-2250,1 17 2969,13-17 0,-14 11 0,-4-21 0</inkml:trace>
+  <inkml:trace contextRef="#ctx0" brushRef="#br0" timeOffset="127125.27">14665 7101 8612,'-3'-3'180,"1"0"-90,21-1-360,-15-1-180,44 0-179,-19-2-181,30-2 338,-4 0 0,4-3 1,3 1-1</inkml:trace>
+  <inkml:trace contextRef="#ctx0" brushRef="#br0" timeOffset="127483.27">15440 6986 8072,'-27'10'630,"-19"-7"-360,27 7-180,-34 0 0,23 0-180,-7 11 90,13-8 0,12 1 0,-7 2 0,18-2 90,-6 11-270,7-11-450,19 10 540,1-12-180,18 2 360,-19-8-90,12-3 0,-16-2 180,4-16 360,-8-5 0,-11-12-181,-17 3-448,12 8 89,-25 10 0,27 0 0,-11 28-810,35-3 90,-16 22-1528,30-4 2248,-12-14 0,-4 2 0,0-11 0</inkml:trace>
+  <inkml:trace contextRef="#ctx0" brushRef="#br0" timeOffset="127725.27">15572 6865 8342,'0'-8'1080,"0"3"-811,-13 0 1351,10 3-1620,-10 14 0,13 9 89,16 22-89,-12-4-858,31 4 768,-31-8-270,32 0-90,-32 1-989,27 13 900,-15-12-541,11 18 450,-12-28 630,-1 7 0,-13-21 0,5 0 0</inkml:trace>
+  <inkml:trace contextRef="#ctx0" brushRef="#br0" timeOffset="127847.27">15582 7207 7892,'-19'-15'90,"-5"12"0,17-31-90,-4 24-90,7-19-179,4 16-1530,25-7 1799,5 10 0,14-2 0,-3 6 0</inkml:trace>
+  <inkml:trace contextRef="#ctx0" brushRef="#br0" timeOffset="128065.27">15057 6868 8432,'-30'0'0,"5"0"0,7 0 90,6 0-809,6 10-181,32-7 900,-19 17 0,50-17 0,-21 7 0</inkml:trace>
+  <inkml:trace contextRef="#ctx0" brushRef="#br0" timeOffset="128225.27">15312 6687 7173,'0'32'-1400,"0"-5"1400,0-1 0,0-2 0,0 0 0</inkml:trace>
+  <inkml:trace contextRef="#ctx0" brushRef="#br0" timeOffset="128841.27">16178 6633 10141,'0'-4'0,"-12"1"-90,10 24 180,-10-2 0,12 21-180,0-3 180,0 5-90,7-7 0,1 2 0,-4 20 0,11-9 0,2-1-544,-3 5 454,5 11 90,-8-28 0,-3-6 0,-6-5-1015,6-3-694,-8-10 1709,0-25 0,-13-12 90,10-31-180,-9 13 180,12-15 0,0 28 360,0-5-180,0 19 389,12 7-569,5 27-90,8 11 90,1 27-180,-14-11 180,6-1-180,-5-3 0,5-14-539,10 5 449,-8-16 0,19-8 180,-14-3 0,17-22 0,-19-7 0,4 2 90,-12-30 0,-6 34 449,-3-35-89,-5 31 0,-21-7-360,15 14 90,-31 4-180,21 6 0,-4 21 0,8 9 0,11 20 0,0-6 0,0 0-450,0-12 0,0 0 0,23-3-359,-17-1-270,38-5 1079,-27-7 0,19 2 0,-7-5 0</inkml:trace>
+  <inkml:trace contextRef="#ctx0" brushRef="#br0" timeOffset="129043.27">16910 6929 9422,'0'34'180,"0"4"-180,0-8-90,16 3-270,-13-8-270,30 0-89,-29 1-91,31-3 810,-21 0 0,16-3 0,-8 0 0</inkml:trace>
+  <inkml:trace contextRef="#ctx0" brushRef="#br0" timeOffset="129245.27">16750 7137 7982,'46'0'-1259,"-7"-15"1259,7 11 0,-7-27 0,1 12 0</inkml:trace>
+  <inkml:trace contextRef="#ctx0" brushRef="#br0" timeOffset="129529.27">16473 7042 9062,'-10'-13'1439,"5"-1"-899,0-16-360,25 4-180,-16 4-90,31 5 180,-31 7-90,30 5-90,-11-2-180,10 6-270,-4-2-809,2 3 449,-9 17 900,16-13 0,-18 28 0,7-12 0</inkml:trace>
+  <inkml:trace contextRef="#ctx0" brushRef="#br0" timeOffset="129692.27">16955 6665 8882,'0'-9'450,"-15"4"-1170,11 20-179,-10 11-271,14 12 1170,0 3 0,0-5 0,0 1 0</inkml:trace>
+  <inkml:trace contextRef="#ctx0" brushRef="#br0" timeOffset="130261.27">18018 6828 8972,'-53'-4'270,"12"0"-180,0 4-90,17 0 0,0 0 0,2 16-90,9 0 180,3 17-180,10-2 180,24 3-90,1-7-180,23 5 270,-24-14-90,9 2 90,-29-6-180,10-4 0,-5 1 90,-7-4 0,7 0-360,-9-2-1349,-17 1 1439,-4-2 270,1-18 90,20-4 90,25-11-180,11 13 0,14 0 90,-18 7 90,8 0 90,-4-9-270,-11 12 90,10-14-90,-25 9 0,8-8 0,-17 6 0,5-4 90,-6 4 89,0 0-89,-18 0 270,13 2-180,-13 1 0,-3 3 180,2 0-360,-16 4 0,12 0 0,10 20 0,5 3 0,8 22-270,17-10-180,-13 1-359,31 1 179,-8-11 630,24 10 0,-8-22 0,0 0 0</inkml:trace>
+  <inkml:trace contextRef="#ctx0" brushRef="#br0" timeOffset="130575.27">18405 6848 8432,'-16'-7'450,"4"4"-540,12-7 270,0 8 0,0-2-180,0 22 90,0 2-90,17 25-90,-12-12 180,13 3-90,-4-10-90,-11-2 180,11-1 449,-4 3 91,-8-9-720,12 2 90,-12-31 0,2-12 0,-4-15 0,0-6 0,0-18-90,16 14-939,-16 5 1,3 0 398,29-6-179,-28-11 137,22 27 222,-23 7-629,14 6 1079,-15 8 0,12 7 0,-6 3 0</inkml:trace>
+  <inkml:trace contextRef="#ctx0" brushRef="#br0" timeOffset="130933.27">18765 6759 10231,'-11'-8'900,"8"-3"-810,-8 32-90,11 1 0,17 19 0,-13-3 90,28-8-90,-28-2 0,30-1 0,-29-4 0,33-4-180,-23-9-90,25 4 180,-17-12-360,5 6 180,-10-8-90,-1-15-449,5-6 359,-8 2 180,3-19-269,-8 10 269,-5-8-900,0-8 1170,-4 22 0,0-5 0,0 11 0</inkml:trace>
+  <inkml:trace contextRef="#ctx0" brushRef="#br0" timeOffset="131192.27">19243 6820 11850,'0'39'-2428,"14"3"1618,-11-9-629,23 6 629,-9-25 810,-1 13 0,12-25 0,-10 9 0</inkml:trace>
+  <inkml:trace contextRef="#ctx0" brushRef="#br0" timeOffset="131343.27">19283 6567 10321,'-17'-22'270,"-6"3"-990,21 1-2608,-13 8 3328,13 17 0,20-6 0,12 14 0</inkml:trace>
+  <inkml:trace contextRef="#ctx0" brushRef="#br0" timeOffset="131558.27">19670 6763 11400,'-24'-11'630,"-11"8"-630,21-8 0,-4 32-90,-2-16-180,17 35-359,-13-22-181,14 16 1,-4-6-990,6 12 449,0-12 1350,21 8 0,-15-15 0,15-2 0</inkml:trace>
+  <inkml:trace contextRef="#ctx0" brushRef="#br0" timeOffset="131864.27">19752 6991 8882,'17'-14'0,"8"0"0,-3 6-90,31-5 0,-46 6 0,52-9 180,-52 7-90,30-6-90,-34 4 90,13-1 0,-15-2 0,3 0 0,-4-2 180,0-1 450,-19-6-181,-2 5-179,-17-7-90,18 13 270,-7 0-450,14 9 0,-2 17 0,5 8-450,10 10-629,0 2-1350,19 8 2429,-14-10 0,34 12 0,-14-14 0</inkml:trace>
+  <inkml:trace contextRef="#ctx0" brushRef="#br0" timeOffset="132608.27">20285 6736 9871,'-5'0'180,"-1"0"180,3 0-360,0 0 90,1 18 0,1 3-180,-1 23-360,2-12-179,20 11 359,6-21-360,24 4 450,-8-12-90,2-7 90,2-2 180,-9-5 0,16-19 0,-25 1 180,5-22 90,-20 22 540,-4-15 179,-6 16-269,-20-14-630,12 9-90,-26 5 90,28 28-180,-11 2-180,14 22-90,14-19-270,8 7 361,21-21 269,-8 7-90,3-9 180,-13 0-90,8-17 0,-10 12 539,5-26-89,-18 12 450,1-12-721,-11 4-179,3 5 0,-3 28-1439,0 11 270,0 28-630,17 0 1799,9-8 0,11-14 0,1-15 0</inkml:trace>
+  <inkml:trace contextRef="#ctx0" brushRef="#br0" timeOffset="132925.27">21305 6661 8972,'-42'0'1169,"-7"0"-1079,18 0 0,-3 16-90,17-2 90,8 16-270,9-7 180,24-9 0,-18 2-90,35-14 90,-21 6 90,14-8-90,-5 0 0,-13-18 270,1 0 180,-15-16-630,4 9-720,-6 4-359,0 28-360,0 7 1619,18 27 0,-13-21 0,12 0 0</inkml:trace>
+  <inkml:trace contextRef="#ctx0" brushRef="#br0" timeOffset="133143.27">20973 6087 10141,'0'-17'90,"19"0"-90,-15 7-90,33 1 180,-13 5-180,18 2-539,-17 20-361,5-13-179,-27 43 1169,8-24 0,-11 29 0,0-11 0</inkml:trace>
+  <inkml:trace contextRef="#ctx0" brushRef="#br0" timeOffset="133750.27">21940 6352 11400,'-9'-3'90,"4"0"270,1 3-180,3 19-90,0 7-90,19 13 0,-14 4 90,14-6-180,-5 2 180,-9 2-90,9-2 0,-1 0-90,-9 8 90,18-13 0,-18 11-90,11-25-180,-13 0-359,3-14-900,-1-2 1169,-3-21 360,2-10 0,-2-10 0,0-19 0,0 22-344,16-13 614,-12 20-1,25 5-179,-26 4 270,24 9 180,-12 2-180,12 7-270,-13 21 179,3 6-89,-15 10 344,4 1-524,-6-1 0,0-9 90,-17 14-180,-1-21-1169,-18 2 449,18-11-1438,-14-6 2248,14-1 0,-10-26 0,4-4 0</inkml:trace>
+  <inkml:trace contextRef="#ctx0" brushRef="#br0" timeOffset="134026.27">22417 6589 8612,'4'17'810,"4"-13"-361,-6 27-269,3-15 0,-2 16-90,-2-7-180,1 6 180,-2-11-90,1 4-90,0-1 0,2-7 0,1 5 90,-2-11 0,2-1 0,-2-6-90,0-18 90,0-7-270,-1-9-89,0-4-811,0-9 451,0 9 719,0-23 0,0 25 0,0-9 0</inkml:trace>
+  <inkml:trace contextRef="#ctx0" brushRef="#br0" timeOffset="134359.27">22772 6624 10951,'-34'0'0,"-2"0"0,18 16 0,-16-12 0,30 26 0,-25-27 0,26 29 0,-16-10 0,17 9 0,-4 3-360,23-15 450,5 3 0,22-14-90,2-2 0,-1-6 0,-17-16 90,-2 12-90,-24-29-270,6 17-989,-32-15-720,3 9 1979,-23 5 0,14 5 0,1 3 0</inkml:trace>
+  <inkml:trace contextRef="#ctx0" brushRef="#br0" timeOffset="134565.27">22882 6643 11131,'0'34'-1619,"20"4"899,-15-10 90,32 1-89,-33-9-181,32-1 900,-21 0 0,18-3 0,-7 0 0</inkml:trace>
+  <inkml:trace contextRef="#ctx0" brushRef="#br0" timeOffset="134775.27">23378 6559 10231,'-38'-7'90,"4"2"-90,17 20 0,-5-12 0,19 28 0,-20-27-180,12 48-449,-3-31 89,0 30-629,9-15 629,-3-11-899,2 11 1439,2-20 0,0-2 0,1-10 0</inkml:trace>
+  <inkml:trace contextRef="#ctx0" brushRef="#br0" timeOffset="134943.27">23123 6594 8882,'-1'-21'1349,"1"-3"-1169,0 11-90,20 17-90,0 16 0,25 29-360,-14-7-449,3 7-720,5 1-767,-7-12 2296,12 8 0,-13-20 0,-1-3 0</inkml:trace>
+  <inkml:trace contextRef="#ctx0" brushRef="#br0" timeOffset="135111.27">23773 6549 9691,'-20'-7'0,"1"4"0,-19 15 0,6 9-539,14 9-271,-8 3-179,23-4-540,-17 1 1529,18 0 0,-6-2 0,8 0 0</inkml:trace>
+  <inkml:trace contextRef="#ctx0" brushRef="#br0" timeOffset="135391.27">23982 6543 9512,'-25'-7'90,"6"2"-90,-22 0-90,-3 4 90,12 0 90,-8 1-180,15 16 180,5-12-720,4 26 270,7-10 180,5 15-90,4-6 90,25-2-89,2-2 179,3-7 0,12 4-180,-37-10 0,31-1 0,-32-1-270,24 2 130,-26-5 410,10 3 0,-12-6 0,0 0 0</inkml:trace>
+  <inkml:trace contextRef="#ctx0" brushRef="#br0" timeOffset="135674.27">24147 6759 7443,'24'-11'270,"0"-1"-270,-5 7 0,-2-5 0,-4-5 0,-7 2 90,-3-5 179,-3-6 181,-18 6 360,-8-14-451,3 14 1,-20-9-180,16 15-90,0-2-90,-7 10 90,22 1 0,-4 18 0,3-11-90,12 43-180,-4-27-450,5 27 181,22-20-91,-17 0-180,40-3-629,-11 5 1349,10-9 0,4 2 0,-12-10 0</inkml:trace>
+  <inkml:trace contextRef="#ctx0" brushRef="#br0" timeOffset="135991.27">24423 6574 9422,'-20'-10'269,"4"0"-269,16 5 360,0 1-360,0 19 0,15 4 0,-11 21 0,26-20 0,-27 16 180,11-18 270,-4 2 0,-8 1-181,8-33-269,-10-6 90,0-17-90,0-26 0,18 19 0,-17 5 0,2-1-438,34-6 348,-32-10-360,28 22-449,-29 5 89,24 3-1079,-10 5 1889,6 8 0,-2 3 0,-7 8 0</inkml:trace>
+  <inkml:trace contextRef="#ctx0" brushRef="#br0" timeOffset="136146.27">24953 6752 11940,'6'0'-180,"-2"-13"0,-4-2 0</inkml:trace>
 </inkml:ink>
 </file>
 
@@ -1227,15 +1238,15 @@
   <inkml:trace contextRef="#ctx0" brushRef="#br0" timeOffset="120945">25652 4948 7443,'-11'0'270,"2"0"-91,1 0-179,1 0 90,-2 0-90,-6 0 90,3 0-90,-11 0 90,8 0-90,-14 0-90,9 0 90,-12 0 90,12 0-90,-16-14 0,17 11 0,-7-21 0,17 11 0,3-11 90,3 4-180,3-5 90,20 10 0,-16-2 0,30 3 0,-13 8 270,15-2-270,-3 7 0,-4 16 0,-15 6 90,-5 20-90,-9 4 90,0-5-90,-23 9 0,18-20 0,-36 7 0,36-13 0,-31-3-90,32 2 90,-33-6 0,33 1 0,-28-3-630,18 1 181,-3-5-1,0 0 450,33-8 90,-19-14 360,40 8-91,-14-10-359,19 14 0,-9 0 90,-1 0-90,7 0-90,-13 0 180,20 12-180,-25-9-989,12 22 5,-15-14 1074,4 4 0,-10-1 0,0-6 0</inkml:trace>
   <inkml:trace contextRef="#ctx0" brushRef="#br0" timeOffset="122666">26107 4903 8612,'-15'27'180,"3"1"-270,12-6 180,0 2-90,0-8 0,0 2 0,0 0 0,0-1-90,0-1 0,16-1-899,-13 3 449,13-4 540,-16 5 0,0-9 0,0 1 0</inkml:trace>
   <inkml:trace contextRef="#ctx0" brushRef="#br0" timeOffset="122828">26085 5145 6273,'19'0'0,"-5"0"0</inkml:trace>
-  <inkml:trace contextRef="#ctx0" brushRef="#br0" timeOffset="1.44613E6">29447 5053 10141,'21'0'540,"-8"-19"0,7-6-450,-10-10 179,10-2-179,-6 6 0,-1-1-90,3-10-185,-4 7 1,0 0 364,-5-3 89,-2-18-179,-2 14 180,-3-25-270,0 33 151,0-10-151,0 25-104,0 0 104,0 28 0,0 12 0,0 11-719,0 24-1,0-17 91,0 15-1080,0 2 809,0-14-90,0-8 1,0 0 989,0 2 0,0 9 0,0-17 0</inkml:trace>
-  <inkml:trace contextRef="#ctx0" brushRef="#br0" timeOffset="1.44654E6">29610 4550 8972,'-43'-33'630,"3"1"-361,10 0-373,1 1 464,-4-1-180,5 2-91,-5 3 91,5 3-180,-4 2-90,-10 1 90,10 7 90,-18 4-90,20 7 90,-7 29-180,11 0 90,2 27 90,1-2-135,8-6 0,2 3-309,4-10 0,1 2 354,2 4 0,1 4 0,1-3 0,0-3 0,4-1-90,6 24 0,7-1 0,1-27 1,4-3 44,1 9 0,5-2-45,13-6 0,1-4 45,-12-8 0,1-3-90,25 8 0,3-5-297,-20-12 0,1-5 432,12 2 0,1-2-45,-12-4 0,-2-4 45,1-6 0,1-4 0,13-4 0,-1-4 0,-13-4 0,-1-3 45,9-2 0,-2-4-45,-10-10 0,-6-2 0,-6 10 0,-3-3 0,-3-5 0,-3-6 0,-3 4-45,-1 3 0,-5-1-15,-4-3 0,-3-4 0,-5 5-30,-9 5 0,-5 3 0,-2-10 0,-5 3 0,-5 17 1,-3 4-91,4 2 0,0 1-45,-2 3 0,-3 3-585,-21 0 1,-3 4 809,15 4 0,-1 1 0,-16 0 0,0 2 0,21 3 0,-1 0 0</inkml:trace>
-  <inkml:trace contextRef="#ctx0" brushRef="#br0" timeOffset="1.45618E6">29388 4719 8252,'16'-8'1170,"14"6"-1170,-25-12 0,25 13 180,-15-5-91,7 6-89,-10 13 90,-1-10-90,-10 23 0,6-23 0,-5 27 0,3-16 90,-3 18-90,-1 1 0,0-5 90,-1 14-90,0-19 0,0 4 0,-15-10 0,11-5 0,-12 0 0,7-3-90,7-1-90,-16-1-359,9-5 359,-7 0 0,6-2 180,-2 0 0,5-19 0,-4 1 0,7-4-90,-2-8 90,4 12-90,2-10 450,0 7-180,16 11-180,3 5 90,1 19-90,7-11 180,-10 23-90,0-10-90,20 13 0,-25-12 90,26 16-180,-22-22 90,5 16-90,-7-14-270,0-1-360,-3 0-1259,5 4 1979,-8-5 0,4 3 0,-6-7 0</inkml:trace>
-  <inkml:trace contextRef="#ctx0" brushRef="#br0" timeOffset="1.45707E6">29348 4870 7353,'11'11'899,"-16"-8"-1079,-8-6 180,-3-14 0,6-15 0,10 7 0,0-8 0,0 14-90,17-12 90,-13 15 0,30-5 90,-19 12-180,16-3 270,-17 7-180,18 0 0,-22 3 0,21 1 0,-21 1 90,8 0-90,-8 14 90,8-10-90,-7 10 90,2-1 90,-1-3-90,-4 4-90,3 10 0,-7-12 0,0 15-90,-4-8 180,0-1-90,0 4 0,0-2 0,0 0 90,-16-1-270,12 6 270,-23-7-90,15 8 0,-2-13 0,-3 2 0,15-6-90,-15-2 180,15-1-90,-15-1 0,12-1 0,-8-1-90,4 1 0,2-3-90,2 0 90,22-11 180,-2 7-90,23-14 0,-12 15 0,4-9-719,4 6 89,-5-2 630,18 1 0,-16 2 0,7 1 0</inkml:trace>
-  <inkml:trace contextRef="#ctx0" brushRef="#br1" timeOffset="1.50204E6">29148 4933 3977,'11'7'6594,"-2"-2"-5102,-3-5-2592,0 0 315,-1 0 291,1 0 77,3 0 104,0-13 2160,3 10-2392,-1-24 1725,3 12 413,1-13 628,0 0-126,1-2 92,6-21 182,-4 10-1836,3-14 1172,0 1-1533,-6 17 450,7-20-481,-11 32-3,1-5 86,-5 18-516,-3 3 288,-1 5-70,-2 1-309,1 19 1031,0-12-964,6 50 877,-1-27-377,3 35 485,-2-17-120,-1 3 169,-1 2-294,-2-15 1,0 0-531,3 18 539,-2-11 0,1 0-611,2 3-298,4 12-146,-2-23-152,1-2-225,0-3-46,3-4-302,-1-3-222,4-4 1191,6 2 0,-4-7 1,6 0-1</inkml:trace>
-  <inkml:trace contextRef="#ctx0" brushRef="#br1" timeOffset="1.50232E6">29310 5175 3077,'36'0'360,"-1"0"-360,-3 0 0,4-15 1231,4 11-1285,5-22 872,3 23-1166,-11-8 0,1-1 422,22-1 16,-21 6 0,-1 0 0,13-11 0,-3 8 0</inkml:trace>
-  <inkml:trace contextRef="#ctx0" brushRef="#br0" timeOffset="1.52002E6">30610 4853 8252,'3'0'1799,"12"0"-1709,21 0-270,2 0 180,-6 0-359,0 0-1,0 0 180,0 0-360,-2 0 90,-1 0-179,-4 0 89,-2 10 540,1-8 0,-9 18 0,1-9 0</inkml:trace>
-  <inkml:trace contextRef="#ctx0" brushRef="#br0" timeOffset="1.52035E6">30625 4843 7353,'0'-6'0,"0"2"0,0 0 0,0 2 0,19-2 0,-14 2 0,31-2 90,-32 1-90,34 1 0,-21 1 180,19 0 89,-11 1-269,9 0 90,-8 0-90,12 16 0,-18-12 0,3 23 90,-10-24-180,-2 21 180,-2-21-90,-2 33 90,-4-22-180,0 31 90,-3-23-719,-20 19 179,15-16-480,-15 6 1020,2-8 0,13-2 0,-12 0 0</inkml:trace>
-  <inkml:trace contextRef="#ctx0" brushRef="#br0" timeOffset="1.52103E6">31598 4744 8342,'-37'0'90,"5"0"-180,5 0 90,14-12-180,-5 9 90,12-19 180,-4 19-270,6-19 180,1 13 0,3-13 0,0 5 0,21-14 0,-16 6 0,30-19 0,-14 20 0,-3-6 0,13 8 0,-17 9 90,9-1 0,-6 10 0,-9 26 0,-4 12-90,-4 14-90,-21 5 135,8-22 0,0 1-45,-14 19 45,-1-10 0,0 1-641,8 5 551,-5-18 0,0-2 45,0 7 0,1-5 90,3-3-90,2-5-90,3-4 90,2-4-90,3-4 90,3-5-90,2-1 686,4-18-326,18-3 0,2 0-90,22-6-90,-9 21-90,21-14 0,-19 16-45,6-3 0,2 1-315,2 3-810,-1 6 1,0 2 1169,-4-5 0,8 24 0,-16-11 0</inkml:trace>
+  <inkml:trace contextRef="#ctx0" brushRef="#br0" timeOffset="157639.81">29447 5053 10141,'21'0'540,"-8"-19"0,7-6-450,-10-10 179,10-2-179,-6 6 0,-1-1-90,3-10-185,-4 7 1,0 0 364,-5-3 89,-2-18-179,-2 14 180,-3-25-270,0 33 151,0-10-151,0 25-104,0 0 104,0 28 0,0 12 0,0 11-719,0 24-1,0-17 91,0 15-1080,0 2 809,0-14-90,0-8 1,0 0 989,0 2 0,0 9 0,0-17 0</inkml:trace>
+  <inkml:trace contextRef="#ctx0" brushRef="#br0" timeOffset="158049.81">29610 4550 8972,'-43'-33'630,"3"1"-361,10 0-373,1 1 464,-4-1-180,5 2-91,-5 3 91,5 3-180,-4 2-90,-10 1 90,10 7 90,-18 4-90,20 7 90,-7 29-180,11 0 90,2 27 90,1-2-135,8-6 0,2 3-309,4-10 0,1 2 354,2 4 0,1 4 0,1-3 0,0-3 0,4-1-90,6 24 0,7-1 0,1-27 1,4-3 44,1 9 0,5-2-45,13-6 0,1-4 45,-12-8 0,1-3-90,25 8 0,3-5-297,-20-12 0,1-5 432,12 2 0,1-2-45,-12-4 0,-2-4 45,1-6 0,1-4 0,13-4 0,-1-4 0,-13-4 0,-1-3 45,9-2 0,-2-4-45,-10-10 0,-6-2 0,-6 10 0,-3-3 0,-3-5 0,-3-6 0,-3 4-45,-1 3 0,-5-1-15,-4-3 0,-3-4 0,-5 5-30,-9 5 0,-5 3 0,-2-10 0,-5 3 0,-5 17 1,-3 4-91,4 2 0,0 1-45,-2 3 0,-3 3-585,-21 0 1,-3 4 809,15 4 0,-1 1 0,-16 0 0,0 2 0,21 3 0,-1 0 0</inkml:trace>
+  <inkml:trace contextRef="#ctx0" brushRef="#br0" timeOffset="167689.81">29388 4719 8252,'16'-8'1170,"14"6"-1170,-25-12 0,25 13 180,-15-5-91,7 6-89,-10 13 90,-1-10-90,-10 23 0,6-23 0,-5 27 0,3-16 90,-3 18-90,-1 1 0,0-5 90,-1 14-90,0-19 0,0 4 0,-15-10 0,11-5 0,-12 0 0,7-3-90,7-1-90,-16-1-359,9-5 359,-7 0 0,6-2 180,-2 0 0,5-19 0,-4 1 0,7-4-90,-2-8 90,4 12-90,2-10 450,0 7-180,16 11-180,3 5 90,1 19-90,7-11 180,-10 23-90,0-10-90,20 13 0,-25-12 90,26 16-180,-22-22 90,5 16-90,-7-14-270,0-1-360,-3 0-1259,5 4 1979,-8-5 0,4 3 0,-6-7 0</inkml:trace>
+  <inkml:trace contextRef="#ctx0" brushRef="#br0" timeOffset="168579.8">29348 4870 7353,'11'11'899,"-16"-8"-1079,-8-6 180,-3-14 0,6-15 0,10 7 0,0-8 0,0 14-90,17-12 90,-13 15 0,30-5 90,-19 12-180,16-3 270,-17 7-180,18 0 0,-22 3 0,21 1 0,-21 1 90,8 0-90,-8 14 90,8-10-90,-7 10 90,2-1 90,-1-3-90,-4 4-90,3 10 0,-7-12 0,0 15-90,-4-8 180,0-1-90,0 4 0,0-2 0,0 0 90,-16-1-270,12 6 270,-23-7-90,15 8 0,-2-13 0,-3 2 0,15-6-90,-15-2 180,15-1-90,-15-1 0,12-1 0,-8-1-90,4 1 0,2-3-90,2 0 90,22-11 180,-2 7-90,23-14 0,-12 15 0,4-9-719,4 6 89,-5-2 630,18 1 0,-16 2 0,7 1 0</inkml:trace>
+  <inkml:trace contextRef="#ctx0" brushRef="#br1" timeOffset="213549.81">29148 4933 3977,'11'7'6594,"-2"-2"-5102,-3-5-2592,0 0 315,-1 0 291,1 0 77,3 0 104,0-13 2160,3 10-2392,-1-24 1725,3 12 413,1-13 628,0 0-126,1-2 92,6-21 182,-4 10-1836,3-14 1172,0 1-1533,-6 17 450,7-20-481,-11 32-3,1-5 86,-5 18-516,-3 3 288,-1 5-70,-2 1-309,1 19 1031,0-12-964,6 50 877,-1-27-377,3 35 485,-2-17-120,-1 3 169,-1 2-294,-2-15 1,0 0-531,3 18 539,-2-11 0,1 0-611,2 3-298,4 12-146,-2-23-152,1-2-225,0-3-46,3-4-302,-1-3-222,4-4 1191,6 2 0,-4-7 1,6 0-1</inkml:trace>
+  <inkml:trace contextRef="#ctx0" brushRef="#br1" timeOffset="213829.8">29310 5175 3077,'36'0'360,"-1"0"-360,-3 0 0,4-15 1231,4 11-1285,5-22 872,3 23-1166,-11-8 0,1-1 422,22-1 16,-21 6 0,-1 0 0,13-11 0,-3 8 0</inkml:trace>
+  <inkml:trace contextRef="#ctx0" brushRef="#br0" timeOffset="-197966.92">30610 4853 8252,'3'0'1799,"12"0"-1709,21 0-270,2 0 180,-6 0-359,0 0-1,0 0 180,0 0-360,-2 0 90,-1 0-179,-4 0 89,-2 10 540,1-8 0,-9 18 0,1-9 0</inkml:trace>
+  <inkml:trace contextRef="#ctx0" brushRef="#br0" timeOffset="-197636.92">30625 4843 7353,'0'-6'0,"0"2"0,0 0 0,0 2 0,19-2 0,-14 2 0,31-2 90,-32 1-90,34 1 0,-21 1 180,19 0 89,-11 1-269,9 0 90,-8 0-90,12 16 0,-18-12 0,3 23 90,-10-24-180,-2 21 180,-2-21-90,-2 33 90,-4-22-180,0 31 90,-3-23-719,-20 19 179,15-16-480,-15 6 1020,2-8 0,13-2 0,-12 0 0</inkml:trace>
+  <inkml:trace contextRef="#ctx0" brushRef="#br0" timeOffset="-196956.93">31598 4744 8342,'-37'0'90,"5"0"-180,5 0 90,14-12-180,-5 9 90,12-19 180,-4 19-270,6-19 180,1 13 0,3-13 0,0 5 0,21-14 0,-16 6 0,30-19 0,-14 20 0,-3-6 0,13 8 0,-17 9 90,9-1 0,-6 10 0,-9 26 0,-4 12-90,-4 14-90,-21 5 135,8-22 0,0 1-45,-14 19 45,-1-10 0,0 1-641,8 5 551,-5-18 0,0-2 45,0 7 0,1-5 90,3-3-90,2-5-90,3-4 90,2-4-90,3-4 90,3-5-90,2-1 686,4-18-326,18-3 0,2 0-90,22-6-90,-9 21-90,21-14 0,-19 16-45,6-3 0,2 1-315,2 3-810,-1 6 1,0 2 1169,-4-5 0,8 24 0,-16-11 0</inkml:trace>
 </inkml:ink>
 </file>
 
@@ -1372,114 +1383,789 @@
   <inkml:trace contextRef="#ctx0" brushRef="#br0" timeOffset="156273">32232 7609 8162,'-7'-12'900,"5"-5"-720,-4 8-270,6-7 90,0 6-90,21-1-810,19-2 91,3 5 809,22-7 0,-34 10 0,10-1 0</inkml:trace>
   <inkml:trace contextRef="#ctx0" brushRef="#br0" timeOffset="156806">32535 7423 8342,'-9'15'630,"1"5"-630,8 12 0,0 1-90,0-5 180,0-6-180,0-4-90,0-7 90,0-3 0,0-1-989,0-2 1079,0-21 90,0 1 90,0-21 269,0 6-269,0 1 270,0 8-450,0 21-90,0 12 90,16 5-360,-12 7-90,11-14 271,-15 6-1,9-8 180,-1-2 90,2-23 179,-3 13-89,-5-23-90,3 24-90,-4-21 0,4 21-90,-3-10-629,3 13 359,-1 0 360,7 16 0,-4-12 0,4 11 0</inkml:trace>
   <inkml:trace contextRef="#ctx0" brushRef="#br0" timeOffset="157070">32763 7476 7713,'0'-17'0,"1"-2"-90,-1 2 90,2-4 0,-2 0 0,1-1 90,-1 0-90,1-5 0,0 6 629,1-7-269,-1 15-90,0 1 270,3 9-271,0 3 91,2 14-270,0 10-90,2 22 90,-3-5-180,3 3-989,4 2 359,-2-11-1708,15 19 2428,-7-25 0,9 6 0,-6-12 0</inkml:trace>
-  <inkml:trace contextRef="#ctx0" brushRef="#br0" timeOffset="723250">3122 8099 10771,'0'23'180,"0"-1"-180,0-3-90,0-2 0,13-2-360,-10-1-1079,11 6 360,-7-6 1169,-5 10 0,10-11 0,-7 3 0</inkml:trace>
-  <inkml:trace contextRef="#ctx0" brushRef="#br0" timeOffset="723462">3093 7835 7803,'-4'-3'0,"0"0"0</inkml:trace>
-  <inkml:trace contextRef="#ctx0" brushRef="#br0" timeOffset="723884">3290 7979 7713,'0'7'179,"0"1"1,0-1-180,0 2 0,0 9 0,0-2 0,0 16 90,0-10-180,0 6 90,12 2 90,-9-9 0,19 13-90,-12-18 180,9 5-180,-10-14 90,4 0-90,-9-6 0,9-1 0,-8-21 90,9-6 90,-8-12 90,8-18-90,-11 22 269,3-30-269,-6 29 90,0-8 180,0 8-360,0 15 0,0-2 270,0 14-360,0 34 0,0-2-90,0 23-900,15 3-179,0-16 1169,17 25 0,-9-23 0,2 11 0</inkml:trace>
-  <inkml:trace contextRef="#ctx0" brushRef="#br0" timeOffset="724648">3922 8127 9242,'-6'0'2158,"0"0"-2158,20 0-539,3 0-181,22 0 1,-9 0-181,4 0 1,-8 0-181,1 0 1080,0 0 0,-2 0 0,-1 0 0</inkml:trace>
-  <inkml:trace contextRef="#ctx0" brushRef="#br0" timeOffset="724799">4097 8295 8612,'39'0'-180,"-17"-14"-539,19 11-361,-21-11 1080,19-1 0,-6 12 0,-1-12 0</inkml:trace>
-  <inkml:trace contextRef="#ctx0" brushRef="#br0" timeOffset="725749">4845 8232 9781,'0'-31'0,"0"-4"0,16 9 0,-12-5 0,13 11 90,-5-19 0,-10 18 180,10-18-270,-12 24 180,0-5-180,0 13 0,0-2 90,0 23-90,0 1 0,0 20 0,0-5 0,14-4 0,-10-5-360,10-4-179,-14-4-1260,0 7 719,7-8 1080,-5 1 0,6-2 0,-8-2 0</inkml:trace>
-  <inkml:trace contextRef="#ctx0" brushRef="#br0" timeOffset="726166">5210 7962 8702,'-14'-3'720,"0"0"-540,-3 18 89,0 5-269,11 18 0,-2-7 0,4 1 90,4-10-180,0 0 180,16 14-90,-12-15 0,30 11 90,-29-22-90,27-2 0,-12-6 0,14-17 90,-7 12-180,-4-27 180,-7 7-180,-5-8-359,-2-13 89,-6 17-540,-2-17 271,-1 20-181,-21-4 810,16 13 0,-32 8 0,17 3 0</inkml:trace>
-  <inkml:trace contextRef="#ctx0" brushRef="#br0" timeOffset="726586">5592 7803 7803,'6'-2'179,"-1"1"-89,9 0-90,-5 1 90,10 16-90,-10-12 0,2 28 0,-7-28 0,0 27 0,-4-17 0,0 11 0,0-5-90,0-1-90,-14 6 1,10-5 89,-11 4 0,15-13 90,0-1 0,21-6 0,2-2 180,2 0 89,10 3-179,-16-1 0,11 8-90,-14-2 0,-7 5 0,-9-1 0,0 3-449,-23 3 449,-8 14 0,-14-7 0,-1 12 0</inkml:trace>
-  <inkml:trace contextRef="#ctx0" brushRef="#br0" timeOffset="746399">16245 8684 8612,'22'13'90,"13"-10"0,-17 10 90,9-3-90,-4-8-180,-6 8 90,2-2 90,-1-6-180,11 10 90,-7-4 90,18 5-180,-15-1 180,7 0-90,-9-2 0,-2-3 0,1 2 0,7 1 0,-7-2 0,11 1 0,-17-5 0,5 1 90,-10-3-90,0 0-90,-3-1 90,2 0 0,-4-1-90,2 1 180,-5-1-90,2 1 0,-2 0 0,0 0-90,-2-1-720,-1 1-1438,3 0 2248,-2 0 0,2-1 0,-1 0 0</inkml:trace>
-  <inkml:trace contextRef="#ctx0" brushRef="#br0" timeOffset="747022">16882 8693 8612,'-5'-1'990,"0"0"-631,2 0-89,-2 1-270,2-2 180,0 2-90,0-2-180,0 2 180,2 10-180,16-8 180,-11 17-90,23-10 0,-8 14-90,1-10 180,5 4-180,-2-1 180,-4-3-90,10 9-90,-10-8 90,7 11 90,-11-11-90,2 5 0,-6-6 0,-2 0 0,0 0 0,-4 4 0,-2-4-90,-2 7 180,-1-9-90,0 5 0,-17-6 90,12 2-90,-29-1-90,29 2 90,-39 0 90,22 3-90,-10-5 0,-3 0 90,-8 7-135,5-2 0,-1-1-896,-5 5-408,-10 4-90,22-9 1439,6-1 0,5-2 0,3-1 0</inkml:trace>
-  <inkml:trace contextRef="#ctx0" brushRef="#br0" timeOffset="758283">18348 9401 9961,'27'-15'540,"17"11"-360,-26-11-90,21 1-180,-5 10 90,2-20 0,5 21-408,3-18 318,5 13-1112,1-10 1202,4 6-90,0 2-495,-13 4 1,-1 1-676,22 0 495,-22 1 1,-1 1 764,13 3 0,-2-1 0,-2 1 0</inkml:trace>
-  <inkml:trace contextRef="#ctx0" brushRef="#br0" timeOffset="759717">19910 9068 8162,'0'-8'1170,"0"1"-1080,-19 2-180,14 1 90,-31 1 0,17 1 0,-15 17 0,4 3 0,6 17 0,8-1 90,9 0-90,7-7 0,20 0 90,0-11-90,21-3 0,-4-7 0,2-6 0,-10 0 0,0-14 179,-13-5-89,-1 1-90,-7-9 0,-4 18-90,-4 10-1079,17 8-360,-12 23 450,27-1 1079,-28-6 0,25-1 0,-12-9 0</inkml:trace>
-  <inkml:trace contextRef="#ctx0" brushRef="#br0" timeOffset="759984">20268 9051 7803,'-14'13'89,"2"6"-89,12 11 90,0 2-90,0-4 0,16 2 0,-12 16 0,12-12 0,-2 22 0,-11-25 0,10 6 90,-13-7-90,0-10-269,0 5 269,0-14 0,0-3 0,0-6 0</inkml:trace>
-  <inkml:trace contextRef="#ctx0" brushRef="#br0" timeOffset="760138">20267 8948 6363,'11'0'0,"-2"0"0</inkml:trace>
-  <inkml:trace contextRef="#ctx0" brushRef="#br0" timeOffset="760550">20760 9008 7803,'-22'11'359,"-8"-9"-359,27 18 0,-19-18 0,9 24 0,0-14 0,-3 22 90,15-16-180,-4 14 180,5-15 0,0 6-90,0-11 0,21-1 0,-16-3-180,28-2 180,-15-4 0,11 0 0,-11-20 0,4-1 0,-13-2 180,2-11 180,-5 9-90,-6-7 0,0-3-270,0 14 0,0 1-90,-14 10 180,11 21-180,-10 7 0,13 18-1709,14 2 540,-10-9 1259,28-2 0,-28-20 0,13-2 0</inkml:trace>
-  <inkml:trace contextRef="#ctx0" brushRef="#br0" timeOffset="760737">21020 9047 7443,'17'33'0,"-13"-1"90,32-13-180,-32 12-180,32-20-270,-21 17 540,15-11 0,-6 0 0,0-1 0</inkml:trace>
-  <inkml:trace contextRef="#ctx0" brushRef="#br0" timeOffset="760933">21403 8979 7713,'-32'0'0,"3"18"90,-1 7-90,5 11 0,4-9 0,0 1-360,-6 11 360,5-2 0,0 2 0,0 9 0,8-16 0,-1 1 0</inkml:trace>
-  <inkml:trace contextRef="#ctx0" brushRef="#br0" timeOffset="761849">22042 9078 10411,'22'14'180,"11"-10"-180,-29 25 0,31-25 0,-18 29 0,17-17 0,-5 15-90,-3-6-360,4-1-1978,12 11 1258,-8-10 909,8 6 0,-14-14 0,-1-2 0</inkml:trace>
-  <inkml:trace contextRef="#ctx0" brushRef="#br0" timeOffset="762049">22437 9088 8522,'-27'-5'90,"3"0"-90,8 3 0,2 1 0,0 1 0,0 0 0,-1 16 0,0-12 0,0 29 0,0-17 0,-1 18-720,0-2-1168,-5 20 1888,5-10 0,-3 16 0,7-18 0</inkml:trace>
-  <inkml:trace contextRef="#ctx0" brushRef="#br0" timeOffset="762433">22703 9279 8972,'-16'-4'-90,"-2"15"90,-2 6-90,-4 17 270,21-3-270,-7-3 90,27-3 0,6-13 90,13-4-180,0-26 90,-11-5 0,-10-19 0,-7 8-90,-8-6 90,0 17-180,-20-9 0,-1 21-180,-2-8-629,-9 17 989,15-4 0,-2 6 0,6 0 0</inkml:trace>
-  <inkml:trace contextRef="#ctx0" brushRef="#br0" timeOffset="762822">23027 9218 7892,'-42'0'180,"6"0"-180,16 15 180,-1 3-180,18 18 90,-7-9-90,10 2 90,0-9-180,36 11 0,-28-14-45,25-4 0,4-5 45,-16-4-89,41-4 269,-32-18-90,15-2 0,-22-1 89,1-13 631,-11 13-450,-7-15-360,-1 6 90,-21 7 90,1 12-90,-4 40 0,8 3-90,11 22-270,0-15-1259,21-2 1619,-15-12 0,34-1 0,-16-17 0</inkml:trace>
-  <inkml:trace contextRef="#ctx0" brushRef="#br0" timeOffset="763016">23473 8790 8162,'-32'0'180,"2"17"-180,9-13-90,1 37 180,2-20-90,0 24 0,6-8-180,0 3-719,7 2 899,2 2 0,3-1 0,0-1 0</inkml:trace>
-  <inkml:trace contextRef="#ctx0" brushRef="#br0" timeOffset="763500">24010 8990 9781,'0'35'90,"0"-5"-90,0 0-90,17-3 90,-13 16 90,24-8-1463,-25 13 1283,19-15-90,-20 0-359,21-1-154,-10 9 333,6-12-403,-2 8 403,-10-21 450,-1-2 629,-27-10 502,-3-18-592,-23-3-89,4-17-24,5 1-516,17-1 0,-1 7 104,20 3-644,-6 2-90,28 3-629,8-9 180,13 10 890,3-3 0,-8 7 0,2 0 0</inkml:trace>
-  <inkml:trace contextRef="#ctx0" brushRef="#br0" timeOffset="763901">24385 8914 8882,'-13'-5'450,"9"0"-91,-9 3-269,5 1-90,6 22 0,-6 9 0,8 13 0,0 3-716,0-8 716,16 1 0,-12 18 0,26-15 0,-26 13 0,10-20 0,-1-3-240,-10-5 150,16-2 0,-17-6-90,4-3-449,0-7 359,-3-4 608,7-17-428,-4 8 348,5-44-258,-4 26 45,3-15 0,0-4 45,1 6 180,11-25-90,-11 45-90,6-8-90,-6 21 90,5-7-90,-5 26 0,3-13 90,3 29-180,-4-7 0,9 18-360,-7-6-449,12 6 449,-10-21-90,9 4 540,-7-18 0,1 3 0,2-5 0</inkml:trace>
-  <inkml:trace contextRef="#ctx0" brushRef="#br0" timeOffset="764240">24935 9222 8522,'-34'0'360,"2"0"-360,16 19 90,3 2-180,13 20 180,0-11-90,0 0 0,0-12-90,20 5 0,-15-6-180,33-3 270,-23-8 0,15-6 0,-17-16 90,3-3 270,-15-16-180,6 4-180,-7 3 0,0 7 0,0 26-360,0 8-540,16 23 361,-13-2-900,27-1 1439,-15-14 0,2 0 0,-6-9 0</inkml:trace>
-  <inkml:trace contextRef="#ctx0" brushRef="#br0" timeOffset="764585">25197 9222 7982,'0'29'180,"0"4"-90,12 0-90,-9 2 0,20-8 90,-21-3 0,14-15-450,-14 3 91,8-11 269,-9-15 0,6 9 0,-6-28 0,6 29 0,-2-30-90,3 14 269,1-14-179,-2 15 90,2 2 0,-3 16-180,4-6 180,-4 22-90,10 5 0,-7 18-719,11 2 269,-7-7-180,5-4 630,-2-18 0,1 9 0,0-3 0</inkml:trace>
-  <inkml:trace contextRef="#ctx0" brushRef="#br0" timeOffset="764961">25602 9279 7803,'0'31'179,"0"2"-179,0-1-90,20 0 1,-1-3 89,22-10 0,-8-8 0,0-8 0,-16-19 179,1 12 541,-17-27 90,5 11-91,-6-14-629,0 2-180,0 8 180,-13 10 0,10 26-180,-9 17 90,12 9 90,0 19-270,0-21 180,0 25 90,0-28-360,11 17-629,-8-28-91,8 5 91,-11-15 899,0-3 0,0-5 0,0-2 0</inkml:trace>
-  <inkml:trace contextRef="#ctx0" brushRef="#br0" timeOffset="765201">24727 8980 7803,'16'33'-900,"2"-5"360,23-5 540,-10-12 0,0-5 0,-7-6 0</inkml:trace>
-  <inkml:trace contextRef="#ctx0" brushRef="#br0" timeOffset="765417">24923 8844 8612,'0'-7'810,"0"2"-541,0 0-179,0 3-90,16-2 0,8 4 0,-4 16-90,14 2-179,-20 20-721,2-10-179,-5 4 1169,-11-7 0,0 2 0,0 0 0</inkml:trace>
-  <inkml:trace contextRef="#ctx0" brushRef="#br0" timeOffset="765804">26578 8994 8612,'-5'21'450,"0"4"-450,5 13 45,0-3 0,0 0-135,0 7-221,-1-8 1,2 0-320,15 3-269,-12-2-90,11-1 989,0-3 0,-11-2 0,11-3 0</inkml:trace>
-  <inkml:trace contextRef="#ctx0" brushRef="#br0" timeOffset="766034">26760 9120 9332,'-27'0'629,"4"17"-449,2 2-90,10 21-180,5-10-90,6 1-90,0-11-269,17 0-1,-12-3-719,33 0 539,-9-8 720,10-1 0,2-8 0,-10 0 0</inkml:trace>
-  <inkml:trace contextRef="#ctx0" brushRef="#br0" timeOffset="766433">26988 8933 8522,'-14'-6'1169,"11"17"-899,-11 23-270,14 3 45,-2-2 0,4-1-45,18 6 0,-19-5 0,3 0 0,31 5 0,-21 22 0,4-29 90,-1 15-180,-9-29-1259,0 3 989,-2-37 270,-6-7 90,0-23 0,17-3 90,-12 9 270,24-3 180,-27 21-91,23-2-269,-15 15-180,12 3 0,-9 21 0,3 3 0,-7 1 0,9 14-90,-9-11-179,12 20-181,-9-12-90,8-3 0,-6-19-89,2 6-181,1-13 810,2 9 0,0-10 0,0 3 0</inkml:trace>
-  <inkml:trace contextRef="#ctx0" brushRef="#br0" timeOffset="766705">27588 9187 8522,'-20'17'900,"4"-1"-810,16 18 0,0-4-1,0 1 1,0-7-90,0-2 180,17-10-180,-13-1 0,25-7-90,-18-1-90,3-22-89,-6 1-361,-8-18 270,0 6-180,-17 13-809,13-6 1349,-13 15 0,17-4 0,0 6 0</inkml:trace>
-  <inkml:trace contextRef="#ctx0" brushRef="#br0" timeOffset="766933">27907 9165 10141,'0'34'-1259,"16"-14"-450,-12 7 340,26-11 1369,-27 8 0,21-5 0,-10-7 0</inkml:trace>
-  <inkml:trace contextRef="#ctx0" brushRef="#br0" timeOffset="767100">28145 9088 5824,'0'17'0,"0"-4"0</inkml:trace>
-  <inkml:trace contextRef="#ctx0" brushRef="#br0" timeOffset="767317">27603 8789 8252,'16'-6'180,"1"2"-180,15 2 0,-4 16-899,-4 3 269,-10 19 630,-6-6 0,-8 4 0,0-8 0</inkml:trace>
-  <inkml:trace contextRef="#ctx0" brushRef="#br0" timeOffset="767835">28975 9197 8882,'-57'0'360,"12"0"-360,3 0 90,26 15 0,-13 3 90,11 2-180,-3 9 89,7-9-89,14 8 0,0-2 0,0-9 0,0-2-89,23-2-1,-18-3 0,35-5-90,-16-2 180,15-3-90,-7-17 90,-2-5-180,-11-24 180,-6 8 0,-6-21 0,-7 20 135,0 2 0,0-1 135,0-7 44,-7 6 1,-2 0 45,6-3-270,-12 6 0,-2 2-90,2 6 450,-5-10-450,9 53 90,11 11-90,0 16-90,17 6-118,-13-11 118,12 5-450,0-1-989,2 16 629,1-14 900,0-10 0,-1 0 0,-2 1 0,20 7 0</inkml:trace>
-  <inkml:trace contextRef="#ctx0" brushRef="#br0" timeOffset="768384">29330 8882 10411,'0'39'720,"0"-6"-630,0 5-90,0-5 90,0 21-180,0-12 90,6-7 0,1-1 90,-3 4-90,9 7-90,-1-19-90,-9-4 90,9-4-270,-2 0 180,-1-8-540,8 1 631,-4-10-181,-5 1 180,2-22 0,-2 15 270,5-50-180,0 33 90,9-40 90,-8 34 359,10-15-359,-12 30 540,13-10-720,-14 22 359,11 8-179,-13 13 0,2 17-90,-7-5-90,-1 8-90,-3-16 180,0 3-270,-22-4-359,-10-7-766,2-5 1,-3-2-585,-21 3 1771,-9-2 0,17-4 0,-4-2 0</inkml:trace>
-  <inkml:trace contextRef="#ctx0" brushRef="#br0" timeOffset="780583">18377 9541 7263,'11'13'0,"-9"10"0,22-5 0,-22 6 90,18 2-90,-18-6 0,19 3 0,-4 13 0,8-6 0,2 12 0,6 3 0,-6-8 0,-3-6 0,0 0 0,6 7-45,-4-7 0,0 0 135,4 4-45,-4-5 0,-1 0-135,2 3 90,8 9 0,-5-6 0,-10-8 0,10 13 90,-15-19-90,6 11-630,-9-16 630,2 5 0,-5-9 0,-1 0 0</inkml:trace>
-  <inkml:trace contextRef="#ctx0" brushRef="#br0" timeOffset="782973">19583 10986 9961,'0'-35'360,"17"16"-270,-13-17-180,12 19 90,1-19 0,0-7 0,3 7 0,-2-4 0,-4-2 0,-9-4 0,7 0 0,0 0 0,-11 0 0,2 8 0,0-1 90,-3-4-180,-17-19 90,12 30-90,-12-2 90,17 16 0,-12 8 0,1 22 0,-10 18 0,5 32 0,6-5 0,0 5 45,8-27 0,1 0-45,-2 18 0,3-8 0,0-1 0,0 8 0,8-12 0,1 0-226,-4 5 226,30 9-180,-30-21 91,29-3-181,-30-4-270,37 5 90,-27-13-89,27 6 359,-21-18-90,9 1 180,-11-7 226,1 0-136,-6-16 0,-2 12 90,-1-12 89,1-2 1,-3 2 0,-1-14-180,-3 10 0,-4 26 0,0 6 90,0 24-90,0-1 0,0 1-180,17-6-90,0-7 91,17-12 89,-10-6 0,-1-5 90,-7 0 0,-2 0 0,0-16 180,1-2-90,-4-2 269,0-7 1,-7 12-180,-2-11-180,-2 7 0,0 27 0,0 6 0,0 23-90,17-5-90,-1-13-539,18 3 629,-3-15 0,-5 3 0,-2-5 90,-3-20 90,-6 11 359,7-44-269,-15 39 450,1-42-180,-7 32-450,-1-12 0,-14 8 0,10 26 0,-10 11-180,28 24-720,2-8 1,1 1 899,11-2 0,-8-10 0,15 6 0</inkml:trace>
-  <inkml:trace contextRef="#ctx0" brushRef="#br0" timeOffset="783233">20143 10844 8342,'17'10'-158,"-4"3"1,-13 19 0,0 1 0</inkml:trace>
-  <inkml:trace contextRef="#ctx0" brushRef="#br0" timeOffset="784271">21073 10883 8792,'0'34'0,"0"3"0,0-10 0,0 0 0,0-7-90,0-1-809,0 0-181,0-2 1080,9-2 0,-7-3 0,7-1 0</inkml:trace>
-  <inkml:trace contextRef="#ctx0" brushRef="#br0" timeOffset="784451">21122 10673 6903,'0'21'0,"0"-4"0</inkml:trace>
-  <inkml:trace contextRef="#ctx0" brushRef="#br0" timeOffset="784850">21585 10803 8252,'-41'0'540,"1"18"-450,6 0-90,4 18 0,13-10 0,7-1 180,10-1-180,0-5 180,0 10-90,18-13-90,-13 1 0,26-8 90,-27-4-90,26-3-90,-9-1 0,16-22 90,-4-5 0,-8-27 90,-10 11-90,-9-3 180,-6-5 89,0 11 91,-17-21-270,12 30-180,-29-7 720,30 22-540,-12 22-90,16 19 0,17 33-90,2-7-1113,0-12 1,2-1-57,10 10 1259,-8-8 0,0 0 0,8 5 0,-11-18 0,1 1 0</inkml:trace>
-  <inkml:trace contextRef="#ctx0" brushRef="#br0" timeOffset="785451">22247 10834 9242,'-5'-10'1169,"0"0"-1079,1 4-90,1-1 0,1 20 0,1 5 0,15 1 0,-10 20 0,11-20 0,-2 19 0,-9 3 90,19-11-90,-20 16 0,15-24 0,-15 7-90,8-20-1169,-10 3 1079,5-11 0,-4-14 0,2 9 180,1-30 0,1 5-90,6-22 180,-3 8 90,4 3 270,3 8-450,-4 11 90,7-2 0,-8 17-90,4 2 0,-6 20 0,5 4 0,-7 0 0,3 16 0,-3-20 0,1 16-450,-1-8-809,10 5 629,-4-9 630,15 5 0,-8-17 0,7-1 0</inkml:trace>
-  <inkml:trace contextRef="#ctx0" brushRef="#br0" timeOffset="785817">22785 10853 8522,'-19'-6'540,"-5"0"-630,-12 22 180,4 2 0,17 19-90,6-1 0,9-7 0,0-2-90,0-11-360,16-1 90,3 0 90,16-8 91,1 1 268,-3-25 1,-5 0 360,-12-18-90,-7 3-360,-9 2 0,0 8 0,0 29 0,0 8 90,0 30-180,13-13 0,-10 0-630,24-5 361,-8-15-721,17 11 321,-8-20 759,2 5 0,-10-8 0,0 0 0</inkml:trace>
-  <inkml:trace contextRef="#ctx0" brushRef="#br0" timeOffset="786187">23120 10880 8612,'-17'17'180,"4"1"-90,13 19-90,0-7 0,0 3 180,17-8-90,-13-6 270,13-24-91,-17-10-359,0-14 270,-11 10-90,8 29-180,-8 9 90,29 22 0,-13-5-210,27 4 210,-28 3 0,27 4 90,-27 1-90,28 2 0,-28-5 0,22 1 90,-23-5-90,15-2 0,-16 6-90,4-16-90,-6 3-450,0-18 0,0-5-1169,-20-5 1799,-3-2 0,-3-21 0,9-6 0</inkml:trace>
-  <inkml:trace contextRef="#ctx0" brushRef="#br0" timeOffset="786350">22410 10796 8702,'24'-7'-90,"18"1"-180,-20 1-539,39-2 179,-18 4 428,16-2 1,-14 5 0,1 0 0</inkml:trace>
-  <inkml:trace contextRef="#ctx0" brushRef="#br0" timeOffset="786700">23782 10893 9152,'-14'18'719,"23"4"-719,-4 11-90,29-13 180,-31 11-180,28-16 180,-26 16 270,27-4 270,-14-9-450,12 5-180,-7-16 0,-7-1 0,-6-6-270,-3-23-180,-2-4-719,3-30 449,-3 13-899,6-16 1619,-4 25 0,4-10 0,-2 16 0</inkml:trace>
-  <inkml:trace contextRef="#ctx0" brushRef="#br0" timeOffset="787073">24497 10866 8972,'-38'0'630,"-3"0"-630,4 0 179,1 0 1,10 16-180,11-1 90,8 14-90,24-4-90,2-4 0,19-5 0,1-7 90,-1-6-90,-4-3 90,-15-17-89,-2 13 268,-15-28 271,5 12-450,-7-12-90,0 1 90,-15 9-539,11 28-541,6 8 361,2 27 719,45-7 0,-30-1 0,27-4 0</inkml:trace>
-  <inkml:trace contextRef="#ctx0" brushRef="#br0" timeOffset="787334">24845 10849 9332,'-17'18'989,"-4"-13"-989,19 26 0,-6-13 0,8 12 0,40 1 0,-30-6 180,47-4-180,-40-11-720,12-4-269,-14-20-360,-30-3 449,9-14 900,-40 14 0,27-13 0,-20 9 0</inkml:trace>
-  <inkml:trace contextRef="#ctx0" brushRef="#br0" timeOffset="787475">24250 10596 9691,'47'-2'-269,"-9"0"-451,8 2-449,-7 14-616,4-11 1675,3 11 0,1 1 0,0 3 1</inkml:trace>
-  <inkml:trace contextRef="#ctx0" brushRef="#br0" timeOffset="787917">25652 10979 9781,'-26'0'1440,"1"0"-1261,8 0-89,3 0-90,9-16 0,2 0 0,46-32 0,-32 18 0,20 3 0,3 0 0,-8-2 0,12-20 0,-15 17 90,-4-17-90,-17 18 0,6-4-90,-8 7 90,0 9 90,0 1-90,0 28 0,0 17 0,0 11 0,0 10-90,0-8-1169,0 24 270,0-13 89,6-8 1,0 1-1523,-3 6 2422,10 13 0,-13-19 0,0-1 0</inkml:trace>
-  <inkml:trace contextRef="#ctx0" brushRef="#br0" timeOffset="788051">25623 11320 9602,'0'-33'-1710,"28"2"631,13 1 1079,17 9 0,3 0 0,-12 8 0</inkml:trace>
-  <inkml:trace contextRef="#ctx0" brushRef="#br0" timeOffset="788800">26580 10525 9961,'-4'-4'270,"1"2"360,-2 1-540,3 16 270,-3-11-271,3 31-89,0-17 90,2 40-90,0-19 90,0 16-296,0-14 206,0-3 0,0 0 0,12 12-90,-9-15 180,10 16-180,-13-27 180,0 2-360,7-15-1169,-5-4 989,6-21 270,-8-8 180,0-24 0,0 10 0,0-17 0,0 22 207,0-8 242,14 10-269,6 9 0,13 3 90,-1 29-180,-3 9-90,-9 0 0,-2 17 180,-10-23-180,-1 29 90,-4-20-90,-1 15 0,-2-20 0,-20 10-90,-3-14-1169,-25 2 539,14-11-89,-2-2-1221,0-4 2030,11 0 0,-6-20 0,13-6 0</inkml:trace>
-  <inkml:trace contextRef="#ctx0" brushRef="#br0" timeOffset="789789">26553 10522 9152,'-3'-3'1889,"0"0"-1619,2 22-181,0 7-89,1 11 90,0 2-90,0-8 90,13 4-90,-10 1 0,9 0 0,-12 0 0,8 14 90,-5-13-180,5 23 90,-8-29 0,0 29 0,0-36 90,0 11-1619,0-28 1349,0-45 180,0 17-270,0-38 91,0 9 89,0 10 90,0 4 0,0 0 0,0-6 0,5 7 0,2 1 0,4-5 0,12-17 0,-6 27 0,0-3-90,-2 15 180,2 1 0,1 5 359,11-1-269,-8 6 0,17 0-90,-18 6-90,15 15 90,-16-11 0,1 30-90,-6-17 90,-4 16 0,0-4 0,-4 0-90,-3 3 0,-2 0 90,-1 15-90,0-11 90,-20 23-90,-3-27 0,-2 10-45,-3-23 0,0-2-45,4 9 135,-9-6 0,-3-2-585,1 0-899,-21 3 539,25-13-1078,-16-3 1978,25-4 0,-5-1 0,14 0 0</inkml:trace>
-  <inkml:trace contextRef="#ctx0" brushRef="#br0" timeOffset="790135">27272 10301 9152,'5'16'1169,"0"8"-809,-5 27-360,0-4 90,-9-9 0,-2 1-90,-5 13-710,5-18 0,0 0 710,-15 16 0,22-3 0,-23 0 0,24-3-360,-20-4-269,20-1-569,-16 6 388,17-13 810,-5 9 0,7-23 0,0 1 0</inkml:trace>
-  <inkml:trace contextRef="#ctx0" brushRef="#br0" timeOffset="790441">27442 10749 8882,'-17'-3'450,"12"14"-360,-12 4-90,17 16 0,0 2 90,0-4-90,0 0 90,0-8 89,20 1 1,-16 0 0,16 2 0,-6-2 360,-11 12-360,22-10 0,-23 14-1,9-21-89,-28 8-90,12-16-90,-29 1-899,8-8-450,-17-1-270,1-16 1709,10-3 0,14-18 0,10 0 0</inkml:trace>
-  <inkml:trace contextRef="#ctx0" brushRef="#br0" timeOffset="790823">27755 10849 10321,'-45'15'450,"0"1"-360,6 16-90,15-9 0,-6 2 0,27-6 0,-9-1-90,12-1 90,0 11-180,17-12 90,9 9-90,17-20 360,3 0-360,-5-24 270,-9-2 90,-14-18 450,-10 2-630,-8 3-90,-18 5 180,13 10-90,-24 9-270,26 25-540,-8 6-449,30 20-180,3-5 539,23-3 900,-11-15 0,2 0 0,-9-11 0</inkml:trace>
-  <inkml:trace contextRef="#ctx0" brushRef="#br0" timeOffset="791017">28032 10844 9691,'-20'-9'630,"16"0"-450,-28 8-180,21-1 90,-3 22-180,5 0-180,26 24-180,-13-14 1,29 3-91,-29-12-585,26-7 1,5-1 1124,-10 9 0,7-13 0,1-1 0,-3 0 0</inkml:trace>
-  <inkml:trace contextRef="#ctx0" brushRef="#br0" timeOffset="791417">28225 10466 9602,'0'-12'2158,"0"2"-1888,0 27-270,19-14 90,-15 42-90,19-18 0,0 0 90,-16 25-135,12-8 0,2-1 45,-8-2 0,-1-7 0,0 0 0,0 1 0,4 19 0,-14-31-180,6 3-1079,-7-20 1079,1-19 180,1 10 0,0-26 0,3 25 0,1-28 0,1 27 90,2-31 90,0 32 180,1-24-180,-3 25-91,6-7 1,-5 10-180,6 14 90,-8-10 0,1 32 90,-3-17-90,0 20-179,-1-7-361,1 13 90,-3-11-1529,2 13 1979,-3-25 0,0 1 0,-1-12 0</inkml:trace>
-  <inkml:trace contextRef="#ctx0" brushRef="#br0" timeOffset="791605">28090 10012 10411,'-20'25'-90,"0"-3"-540,2 26-179,2-10-2277,1 5 1377,2 2 1709,0 5 0,2 2 0,0 1 0</inkml:trace>
-  <inkml:trace contextRef="#ctx0" brushRef="#br0" timeOffset="792105">29205 10723 12030,'-14'14'270,"24"4"-270,10 20 0,4-6-90,11 4-540,-9 2 91,11-9-1290,-2 6 1020,-9-12 154,-1-4-424,-1-3-1,-3-2 1080,-2-5 0,-6-3 0,-1-1 0</inkml:trace>
-  <inkml:trace contextRef="#ctx0" brushRef="#br0" timeOffset="792301">29378 10764 10501,'-9'-1'180,"-3"0"-180,8 0 90,-4 19-90,2-13 0,-1 31 0,0-19-270,-6 33-360,2-16-629,0 3 0,0 0 269,-1 1 990,-1 18 0,10-32 0,2-1 0</inkml:trace>
-  <inkml:trace contextRef="#ctx0" brushRef="#br0" timeOffset="792650">29792 10820 10411,'4'-4'270,"-2"0"-270,0 16 90,-21 6-180,14 16 90,-25-6 0,27 7 90,-8-7-180,28-9 90,-13 4 180,27-18-270,-10 5 180,13-7-180,0-22 0,-4-2 0,-15-19 90,-5 10-90,-10 1-180,0 1 180,-21 8-899,0-3 269,-4 7-359,-7 6 1079,18 2 0,-4 6 0,8 2 0</inkml:trace>
-  <inkml:trace contextRef="#ctx0" brushRef="#br0" timeOffset="793050">30155 10785 9871,'-28'-8'540,"12"19"-540,5 6 0,11 22 90,20-7-90,2 0-90,20-8 90,-3-11-90,-8-7 90,-3-6-90,-12 0 180,-1-16-90,-1-1 180,-6-19 0,-1 3 180,-7 4-450,0 1 270,-17 12-180,13 24-360,-12 8 0,36 26-1169,-15-12-990,34 5 2519,-21-13 0,4-5 0,-8-7 0</inkml:trace>
-  <inkml:trace contextRef="#ctx0" brushRef="#br0" timeOffset="793241">30572 9921 12750,'-16'26'-2069,"12"21"450,-28-21-1221,27 26 2840,-35-4 0,19 2 0,0-23 0,0 0 0</inkml:trace>
-  <inkml:trace contextRef="#ctx0" brushRef="#br0" timeOffset="796011">19358 12760 7892,'-13'-1'540,"-7"1"-450,7-1-90,-10 1-90,6 0 90,2 0 90,7 0-180,1 11 90,0-8 0,3 8 0,-1-11 0,4 8 0,-1 0 0,2 10 0,0-3 90,21 1-90,-16-2-90,32 7 90,-17-4 90,16 13 0,-15-11 540,8 12-450,-19-12 539,4 16-629,-7-17-180,-7 8 90,-18-16 0,-4 1 0,-1-6-809,-12-2-810,13-1 809,-14-2 810,16-14 0,6-1 0,14-14 0</inkml:trace>
-  <inkml:trace contextRef="#ctx0" brushRef="#br0" timeOffset="796719">19737 12762 9242,'-45'-1'180,"1"17"-180,10-1 0,13 16 90,1-16-90,18 12 0,-6-15 90,8 13-90,0-7 0,24 6-90,2-7-180,24 6 0,-13-14 180,-1 0-180,-2-7 270,-8-2 0,10-20 0,-19 15 90,2-29 180,-13 16 0,-2-13-180,-4 2 0,-15 6-90,11 28 0,-12 10 0,16 27 0,20-11 0,-2 5-90,4-16-90,7-3 0,-25-2-180,26-14 90,-18 6 0,11-7 1,-1 0 89,-5-19 180,8-4 0,-11-12 0,1 3 269,-7-2 91,-5 12 0,0-8-360,-3 10 630,0 5-360,0 18-360,0 10 180,0 21-90,0-1 0,0 1 0,13-9-90,0-11 0,10-7 90,-6-23 0,-3 13 0,-1-27 0,-5 15 90,3-11-90,-6 11 0,2 7 0,-5 8 90,5 0-90,-4 0 0,7 0 0,-2 21-720,10 2-180,-3 14 900,15 4 0,-8-15 0,8 6 0</inkml:trace>
-  <inkml:trace contextRef="#ctx0" brushRef="#br0" timeOffset="797183">20913 12808 8162,'-39'19'90,"3"11"-90,14-26 0,2 30 0,0-10 90,10 18 0,1-10-90,9 1 0,17-17-270,4 4-89,20-13 179,3-2 180,-8-23-180,6-8 180,-19-11 0,4-17 90,-9 18 180,-10-30-1,1 26-89,-9-13 630,0 3-360,0 13 269,-17-20-539,12 28-180,-13-4-90,4 18 180,11 4 270,-11 4-360,14 24 0,0 9 0,0 29 0,14-9-45,-13-12 0,2 0-405,24 6-269,-24 14-631,21-10 811,-13-12-721,12 11 1260,-12-23 0,-3-2 0,-8-9 0</inkml:trace>
-  <inkml:trace contextRef="#ctx0" brushRef="#br0" timeOffset="797317">20865 12738 8162,'-6'-13'90,"0"1"-180,6-6 90,25 6-359,-19-2-91,41 8-180,-27 2-269,23 1 899,-7 3 0,4 0 0,0 0 0</inkml:trace>
-  <inkml:trace contextRef="#ctx0" brushRef="#br0" timeOffset="797634">21560 12756 8252,'-35'0'360,"-1"0"-360,2 0 0,15 12 180,-7-9-90,23 24 0,-7-12-90,10 15-90,0-10 180,17-7-90,-12 1 0,31-8 0,-10 3 0,17-5 0,-7-4 450,5-18-270,-26-2-1,9-20-89,-23 12-180,5-9 90,-26 17 0,16-5-269,-32 10-901,11 1 361,-19 5-91,6 3 900,2 4 0,13 2 0,2 0 0</inkml:trace>
-  <inkml:trace contextRef="#ctx0" brushRef="#br0" timeOffset="797817">21687 12298 8972,'-17'-5'-990,"1"22"451,-4 8-271,9 13 810,11-2 0,0-7 0,0 1 0</inkml:trace>
-  <inkml:trace contextRef="#ctx0" brushRef="#br0" timeOffset="798355">22252 12586 8972,'-23'-8'630,"-14"6"-630,10-6 0,-19 8 179,2 0-269,8 15 180,17 4 0,9 19-180,10-7 0,17 2 90,-13-8 0,31 1-89,-30 0 89,32 8-180,-14-8 180,15 8 90,-17-15-630,0 4-90,-19-15 450,5 2-179,-25-8-1,-3-1 360,-16-1-180,17-19 270,-9 4-90,26-18 270,6 8-180,23 0-90,25 2 90,-8 6-966,5 3 966,-13 5 0,1-1-423,-1 1 513,-2-2-90,-3 2 90,-2-2 90,2-6-91,-9 5 91,0-12-180,-14 11 1016,-3-8-836,-4 10 192,0 0-282,-20 5-90,-4 4-90,-1 19 0,-4-13-450,26 29 91,-7-11-271,27 7-180,-13 0 810,30-9 0,-10 2 0,17 1 0</inkml:trace>
-  <inkml:trace contextRef="#ctx0" brushRef="#br0" timeOffset="798634">22462 12359 7623,'37'-1'1079,"-2"-1"-809,0 19-180,-4-1-90,-4 13 90,-8-15-90,-3 4-90,-5-15 90,1 5-270,0-8-270,0 0-269,1 0-271,2 0 1080,0 0 0,1 0 0,1 0 0</inkml:trace>
-  <inkml:trace contextRef="#ctx0" brushRef="#br0" timeOffset="799100">23045 12439 10591,'-1'-10'899,"1"2"-359,-3 3-180,3 3-360,20 1 90,7 18-270,26 0-180,-9 3-1152,0 7 792,-7-23-179,-2 27-1,3-19-1106,19 21 836,-14-16 1170,12 6 0,-18-11 0,-1-1 0</inkml:trace>
-  <inkml:trace contextRef="#ctx0" brushRef="#br0" timeOffset="799267">23623 12439 8702,'-40'-4'270,"1"1"-270,11 3 0,-2 0-90,-11 20 90,9 5-945,3 6 1,2 4-282,2 8 1226,8-13 0,1-1 0,4 4 0,2 1 0</inkml:trace>
-  <inkml:trace contextRef="#ctx0" brushRef="#br0" timeOffset="799633">24025 12502 9062,'-41'0'450,"3"17"-360,6-13-90,1 25 179,-10-10-269,13-3 180,-5 14-90,24-12 0,2 7-449,7-3 89,27-9 90,6-5 180,17-2-45,-8-11 0,-2-5 135,5-11 0,-4 4 0,-3-4 90,-8-13 0,4-9 0,-23 17-180,-4-14 90,-7 18 0,-24-5-90,-3 18-180,-3-3-719,-10 11 989,19-2 0,-3 18 0,9 3 0</inkml:trace>
-  <inkml:trace contextRef="#ctx0" brushRef="#br0" timeOffset="799991">24455 12475 8882,'-44'0'450,"4"0"-360,20 15-90,-5-12 90,22 26-180,-8-15 90,32 12-90,5-13 0,1 0 0,17-11 0,-26 3 90,21-5 0,-13 0 0,-1 0 0,-4-16 0,3 12 540,-13-31-1,0 17-359,-11-14-180,0 9 0,-16 10 90,-1 5-180,-2 28-809,6 3 269,13 21-90,0-11-1596,19-2 2316,1-6 0,3-14 0,-7 2 0</inkml:trace>
-  <inkml:trace contextRef="#ctx0" brushRef="#br0" timeOffset="800170">24680 12021 9781,'-26'0'0,"3"17"-90,5-13-629,-5 50-271,5-27 990,5 11 0,2 4 0,0 5 0,-1 17 0</inkml:trace>
-  <inkml:trace contextRef="#ctx0" brushRef="#br0" timeOffset="800517">25272 12228 11670,'-16'-15'-90,"1"2"90,2 4 90,7 22-270,17 26-449,-7 3-246,13-12 1,-1-1 244,-12 7 0,27 1-766,-10 11 766,10-14-179,-11 7 809,2-18 0,-20-4 0,10-1 0</inkml:trace>
-  <inkml:trace contextRef="#ctx0" brushRef="#br0" timeOffset="800650">25307 12563 8882,'0'-24'-720,"0"-4"361,17 7-91,-12-3 0,37 6-449,-20 0 899,23-2 0,-7 2 0,1-2 0</inkml:trace>
-  <inkml:trace contextRef="#ctx0" brushRef="#br0" timeOffset="801034">25633 12126 8252,'-23'19'1529,"9"4"-1529,6 12 90,8-2-90,19-4 0,-15 2 180,15 2-270,5 3 90,0 18 0,4-14-180,-9-5 1,-1-2-91,3 2-90,1 8 270,9-20-90,-28-4-180,18-6-539,-15-5 719,6-4 180,-8-25 90,-1-3 180,-2-1-90,1-16-1,1 26 91,1-20 0,2 14 540,3-5-810,-1 14 270,7-7-270,-2 17 0,9-4-90,-7 25 180,5-15-180,4 33 90,-5-13-990,15 19 540,-13-9-629,17 1 180,-14-23 899,9 8 0,-11-18 0,-1 6 0</inkml:trace>
-  <inkml:trace contextRef="#ctx0" brushRef="#br0" timeOffset="801573">26267 12468 9242,'-41'0'719,"4"0"-629,19 20-90,-3-16 0,19 31-90,-6-14-90,8 7 1,17 1-91,-13-10-270,29-2 180,-10 1 0,15-6 360,1-3 0,-7-5 0,-15-23 270,-7-2 270,-10-19-180,0 2 0,0 9-181,-14 10-179,10-1-90,-11 9 180,2-2 0,9 19-270,8 12-359,17 18 179,21-1 0,-9-13-90,13 7 181,-18-19 89,10 5 0,-3-7 90,-11-8 180,14-19-90,-20 14 270,5-42 89,-15 28 271,-3-13 0,-2-3-91,-1 4 271,-1-27-810,-1 33 0,0-7 180,0 17 0,0 1-180,0 43 0,0-12-180,15 31-90,-11-19-629,25 9 359,-11-6-450,18 14 541,-9-23-1170,12 7 1619,-19-20 0,6-1 0,-10-9 0</inkml:trace>
-  <inkml:trace contextRef="#ctx0" brushRef="#br0" timeOffset="801834">26637 12394 9512,'45'0'-653,"3"0"1,-11 0 0,1 0 0</inkml:trace>
-  <inkml:trace contextRef="#ctx0" brushRef="#br0" timeOffset="802071">25923 12418 10321,'-4'-28'1079,"0"1"-989,4 6 0,27 0-90,-3-1-1136,26 0 1136,-9 1 0,4 1-270,4 4-630,-15 8 1,0 2-180,18-2 1079,-13 3 0,-2 5 0,3 15 0,8 5 0</inkml:trace>
-  <inkml:trace contextRef="#ctx0" brushRef="#br0" timeOffset="802217">26435 13111 9152,'18'9'-300,"7"-5"0,-11 0 0</inkml:trace>
-  <inkml:trace contextRef="#ctx0" brushRef="#br0" timeOffset="802607">27653 12054 13199,'0'-8'0,"0"0"360,0 3-360,18 2 90,-1 18-90,16 13-90,-18 11-180,10 4-315,-14-5 1,0 0 134,13 9-225,-5-2 1,0-1-45,0-7-451,16 15 451,-14-30-721,14 3 1440,-16-18 0,5-3 0,-10-4 0</inkml:trace>
-  <inkml:trace contextRef="#ctx0" brushRef="#br0" timeOffset="802767">28045 12349 9871,'-22'-11'900,"-17"2"-900,20-4 90,-19 7-180,10 22-450,11 6 90,7 17-899,10-6 180,21 5 269,8-10 900,12-8 0,-1-7 0,-11-13 0</inkml:trace>
-  <inkml:trace contextRef="#ctx0" brushRef="#br0" timeOffset="803301">28212 12004 10501,'0'-16'90,"0"4"270,0 4-180,0 24-90,0 12 0,17 15-1,-12 5-179,9-18 1,3 0 179,0 18-46,-2-7 1,1 0-45,1 4-135,-1-9 1,-2-2-136,-5 0 0,9 7 0,-7-21 0,-8-5-1259,6-1 1439,-7-22 180,3 10 0,-3-33 360,6 18 90,-4-5-271,5 8 1,-4 2-180,2 5-90,0-5 180,1 8 0,1 0-180,2 0 90,6 0-90,-2 16 0,12 0 0,-11 4 0,18 14-180,-16-28-180,16 23 180,-19-27 0,9 5 270,-11-7-180,6-16 180,-8-2 90,-2-1 270,-2-10-180,-2 25 90,-1-23-270,-1 16 89,0-3 91,-1 6-270,0 8 90,1 0-180,1 0-359,4 18-91,-1 4-989,7 18 719,-5-18-269,3 13 1079,-2-31 0,-2 22 0,2-12 0</inkml:trace>
-  <inkml:trace contextRef="#ctx0" brushRef="#br0" timeOffset="803468">28737 12120 9152,'37'19'-780,"-16"-15"1,-4 15-1</inkml:trace>
-  <inkml:trace contextRef="#ctx0" brushRef="#br0" timeOffset="804067">29678 12354 10681,'7'-17'1799,"1"1"-1259,-7 0-1,3-2-269,-4 0 0,0-1-90,0-4-180,-17 6-90,-1-5 180,-3 13-180,-7-2-90,10 10 0,-15-1-180,16 20-89,-4 3 359,19 19 90,-4-2 0,23-7 0,5 4 90,-1-15-180,16 10 180,-14-14-90,1 3 90,5-5-180,-26-5 180,9 4-180,-12-8 180,-23 4-180,17-5-270,-53 2-270,37-4-719,-29 1-990,18-3-89,6 0 2428,7-17 0,9 13 0,11-13 0</inkml:trace>
-  <inkml:trace contextRef="#ctx0" brushRef="#br0" timeOffset="804534">29945 12184 9512,'3'-14'0,"-2"-1"179,0-3 1,-1 3-180,0-3 270,0 9 90,0 2-90,0 22-180,0 9 0,0 25 0,0-8-90,14 16-90,-10-22-135,9-3 0,0-1-135,-10-2 90,19 15 90,-14-30-179,2 2 89,-1-11 270,-8-15 540,2-5-91,-3-16 181,0 4-630,0 1 270,0 6-270,0 24 0,16 5-90,-13 21 90,29-15-630,-20 11 360,5-13-3935,5 9 4205,-19-28 0,10 8 0,-13-19 0</inkml:trace>
-  <inkml:trace contextRef="#ctx0" brushRef="#br0" timeOffset="805185">29958 12243 9242,'0'10'629,"0"0"-179,18 4-180,-13-3-90,29 11-180,-30-9 0,28 13 0,-18-10 0,4 5 0,1-8 90,-17-1-180,15 0 0,-6 0-90,4-3-270,5-1 180,-9-5-179,10-2 359,-9-15-360,7-3 450,-10 0 0,3-14 0,-9 27 0,1-29 540,-4 21-270,0-20-91,0 10 541,0 1-900,0 25-539,14 6 269,-11 20-720,24-4 361,-14-11 809,3 5 0,0-18 0,-6 7 0</inkml:trace>
-  <inkml:trace contextRef="#ctx0" brushRef="#br0" timeOffset="805417">30387 12133 9422,'13'0'989,"-5"17"-899,-1-13 90,-4 28-270,3-28 90,-1 38 90,-1-25-270,1 33-90,-3-26-809,1 13 449,-2-16-2068,1 9 2698,-2-18 0,1 2 0,-1-11 0</inkml:trace>
-  <inkml:trace contextRef="#ctx0" brushRef="#br0" timeOffset="805770">30647 11929 8522,'7'0'900,"1"0"-541,-2 0 1,3 13-180,-2-9-90,6 40 0,-7-25 180,2 40-270,-6-26 90,-2 22-90,0-21 0,0 18 0,0-25 0,0 12 0,-14-21 0,10 1 0,-21-7 0,22-6-1170,-19 1 631,9-6-181,-7 0-179,4-1-181,4 0 1080,1 0 0,0-15 0,1-2 0</inkml:trace>
-  <inkml:trace contextRef="#ctx0" brushRef="#br0" timeOffset="806385">30427 11948 9871,'0'39'1170,"0"-5"-990,0-1-90,0-4-90,0 2 0,0 3 89,0 0-89,0 18 0,0-13 0,0 23 0,0-30-89,0 15-91,0-25-1529,0 5 1529,0-33 0,0-6 180,0-29 0,0 5-90,0-4 90,0 8 0,0 0 0,17 1 0,-12-1 0,28-9 0,-29 10 180,24-11 0,-11 23 0,5-2 269,6 13-179,-12 4 90,11 1-180,-12 3 0,10 18 0,-13 1 0,5 21-91,-9-12-89,0 20 0,-6-22-179,-17 21-361,11-24-1259,-31 13 809,5-16 990,-26 15 0,6-17 0,-1 6 0</inkml:trace>
-  <inkml:trace contextRef="#ctx0" brushRef="#br0" timeOffset="807401">31173 12147 9332,'0'37'1169,"0"5"-899,0-11-180,0 18 90,0-20-270,0 22 90,0-24-90,0 9 90,11-21-90,-9 1-1619,9-10 1349,-11-18 180,0-4 270,6-22-180,-5 10 90,9-5 90,0-16 90,-1 18-180,6-22 360,-8 32 90,4-2-271,-6 16 1,1 1-90,-2 6 0,0 0-90,2 18 0,-3 3 0,3 2 90,-2 12-180,0-13 270,0 15-1349,-2-8 1259,-1-28-180,-1-9 90,0-24 360,0 6 269,0 4-449,13 10-180,1 23 0,10 8-90,-2 20 180,-7-19-90,1 15 0,-6-30-90,0 26-90,-1-28 180,5 20-180,-6-21 180,8 6 0,-9-8 0,7-18-90,-6 13 180,4-31 0,-4 31 90,0-34 90,-2 34 360,2-40-360,-4 39-270,3-30 269,-6 28-179,2-4 0,-2 7-90,2 21-90,2 5 0,2 21-269,1-10-811,5 11 361,-3-29-810,8 19 359,-5-20 1260,2 3 0,-4-2 0,-2-10 0</inkml:trace>
-  <inkml:trace contextRef="#ctx0" brushRef="#br0" timeOffset="807584">31565 11980 8432,'19'17'-563,"9"0"1,-24 3 0,10-7 0</inkml:trace>
-  <inkml:trace contextRef="#ctx0" brushRef="#br0" timeOffset="807800">31918 11982 10591,'0'48'0,"0"-10"90,0 1-360,0-8-180,0-1-89,0 1-91,0-3 0,0-1-809,0 6 1439,14-12 0,-11 5 0,10-12 0</inkml:trace>
-  <inkml:trace contextRef="#ctx0" brushRef="#br0" timeOffset="807935">31740 12247 10141,'17'-17'-90,"-13"3"0,39 2-1079,-3 0 269,14 4 624,-14 2 1,0 1-1,9 1 1,16 0-1</inkml:trace>
-  <inkml:trace contextRef="#ctx0" brushRef="#br0" timeOffset="808633">29783 13629 9422,'28'-15'-270,"-1"-1"-270,-6-22 360,-1 1 180,-6 4 180,2-20-90,-9 27 180,1-15 270,-5 14 809,-2 13-1259,-1 14-90,0 25 0,0 12 0,0 26-90,0-19-495,0-4 0,0 2-405,0 9 270,0 15 1,0-22-181,0-3 900,0-1 0,0-5 0,0-1 0</inkml:trace>
-  <inkml:trace contextRef="#ctx0" brushRef="#br0" timeOffset="808800">29675 13985 9871,'51'-19'-270,"-14"-3"1,-1 0-1,15 3-1309,1-9 1,0-1 1353,-19 14 0,1 0-270,26-12 1,0 0 134,-25 12 0,-1-1 360,11-4 0,-2-1 0,13-6 0,-3 0 0</inkml:trace>
-  <inkml:trace contextRef="#ctx0" brushRef="#br0" timeOffset="809069">30595 13415 8792,'0'-13'989,"0"2"-719,-17 2 90,13 2 0,-13 2 359,-1 3-269,2 1-450,-18 1 0,19 16 90,-9-12 0,21 25-180,-19-25 180,15 28-180,-12-7 90,13 8 0,-3 8-90,9-18 0,-2 8 90,2-18 90,0 2-180,20-9 90,-3-2-180,5-20-179,1-3-181,-21-19 0,9 2-719,-11 5-540,-17-1 1799,12 12 0,-12 1 0,17 6 0</inkml:trace>
-  <inkml:trace contextRef="#ctx0" brushRef="#br0" timeOffset="809367">30678 13425 10771,'1'36'0,"0"-7"0,-1 0 0,0-7 0,0-1 0,0-2 0,0-1 90,0-1-180,0-5-90,0-19-630,0-10 361,0-27-271,0 8 0,0-5-989,0-1 1709,0 10 0,0-9 0,0 14 0</inkml:trace>
-  <inkml:trace contextRef="#ctx0" brushRef="#br0" timeOffset="809907">30937 13336 8972,'6'0'630,"2"0"-451,-3 0-89,3 0 180,-2 0-180,-1 0-90,1 16 0,-2-12 90,0 28-180,2-7 180,-4 8-180,3 1 90,-3-10-90,-1-3 270,1 0-270,-1-1-1169,-1-5 1079,0-18 180,0-13 0,0-24 270,0-6-90,0 8 90,14-8 179,-10 22 721,23-8-1080,-16 21 89,9 17-268,-5 14 89,-5 19-180,-4 0-180,-3-1-90,-2-7 270,1-14 0,1-8 180,1-9 0,3 0 0,0-19 0,3 14 90,3-34 180,6 11 180,-1-8 179,9-6-179,-10 26 0,8-10-360,-11 23-90,4-7 0,-7 10 0,-2 0-90,1 14-899,2 11-91,-3 7-2518,3 22 3598,-7-20 0,2 13 0,-3-15 0</inkml:trace>
-  <inkml:trace contextRef="#ctx0" brushRef="#br0" timeOffset="810050">31693 13518 11490,'19'0'-5576,"-5"0"5576,-3 0 0,-5 0 0,-2 0 0</inkml:trace>
-  <inkml:trace contextRef="#ctx0" brushRef="#br0" timeOffset="853135">19243 10325 7892,'0'-8'900,"0"0"-810,0 2 180,0-1-90,0 2 0,0-2-90,0 3-1,10 1 631,-8 0-810,8 16 90,-28 6 90,14 9-180,-29 3 180,29-3-90,-18-5 0,-3 2 0,6 16 45,-10-4 0,-3 1-881,1 11 881,10-17 0,-2 1-90,-1 5 0,0 0 45,5-9 0,-1 2 45,-15 25 0,0 1-90,13-21 0,0 1 75,-3 7 0,-2 6 0,2-4-30,2-1 0,-1 3 0,1 2 0,-3 9 0,1 1 0,3-6-453,4-11 0,2-4 1,-1 5 474,-5 14 0,-1 8 1,-1 0-1,4-8 23,0 3 0,2-1-45,5-12 0,-1 4 0,0 0 0,2-5 0,-1 10 0,1 0 0,0 2 0,1 6 0,1-6 0,3-5 0,1-3 45,-2 13 0,2 2-90,3-2 0,2-3 45,0-15 0,0 0 30,-1 4 0,1 3 0,3-4-30,7-6 0,3-1-30,-6 3 0,0 3 0,2-4 120,3-6 0,2-1-315,3 21 1,1-2-316,7 4 315,-14-25 0,3-1-630,10-8 1,0-1-315,-8 8 1169,20 3 0,-18-18 0,-2-4 0</inkml:trace>
+  <inkml:trace contextRef="#ctx0" brushRef="#br0" timeOffset="-135743.46">3122 8099 10771,'0'23'180,"0"-1"-180,0-3-90,0-2 0,13-2-360,-10-1-1079,11 6 360,-7-6 1169,-5 10 0,10-11 0,-7 3 0</inkml:trace>
+  <inkml:trace contextRef="#ctx0" brushRef="#br0" timeOffset="-135531.46">3093 7835 7803,'-4'-3'0,"0"0"0</inkml:trace>
+  <inkml:trace contextRef="#ctx0" brushRef="#br0" timeOffset="-135109.46">3290 7979 7713,'0'7'179,"0"1"1,0-1-180,0 2 0,0 9 0,0-2 0,0 16 90,0-10-180,0 6 90,12 2 90,-9-9 0,19 13-90,-12-18 180,9 5-180,-10-14 90,4 0-90,-9-6 0,9-1 0,-8-21 90,9-6 90,-8-12 90,8-18-90,-11 22 269,3-30-269,-6 29 90,0-8 180,0 8-360,0 15 0,0-2 270,0 14-360,0 34 0,0-2-90,0 23-900,15 3-179,0-16 1169,17 25 0,-9-23 0,2 11 0</inkml:trace>
+  <inkml:trace contextRef="#ctx0" brushRef="#br0" timeOffset="-134345.46">3922 8127 9242,'-6'0'2158,"0"0"-2158,20 0-539,3 0-181,22 0 1,-9 0-181,4 0 1,-8 0-181,1 0 1080,0 0 0,-2 0 0,-1 0 0</inkml:trace>
+  <inkml:trace contextRef="#ctx0" brushRef="#br0" timeOffset="-134194.46">4097 8295 8612,'39'0'-180,"-17"-14"-539,19 11-361,-21-11 1080,19-1 0,-6 12 0,-1-12 0</inkml:trace>
+  <inkml:trace contextRef="#ctx0" brushRef="#br0" timeOffset="-133244.46">4845 8232 9781,'0'-31'0,"0"-4"0,16 9 0,-12-5 0,13 11 90,-5-19 0,-10 18 180,10-18-270,-12 24 180,0-5-180,0 13 0,0-2 90,0 23-90,0 1 0,0 20 0,0-5 0,14-4 0,-10-5-360,10-4-179,-14-4-1260,0 7 719,7-8 1080,-5 1 0,6-2 0,-8-2 0</inkml:trace>
+  <inkml:trace contextRef="#ctx0" brushRef="#br0" timeOffset="-132827.46">5210 7962 8702,'-14'-3'720,"0"0"-540,-3 18 89,0 5-269,11 18 0,-2-7 0,4 1 90,4-10-180,0 0 180,16 14-90,-12-15 0,30 11 90,-29-22-90,27-2 0,-12-6 0,14-17 90,-7 12-180,-4-27 180,-7 7-180,-5-8-359,-2-13 89,-6 17-540,-2-17 271,-1 20-181,-21-4 810,16 13 0,-32 8 0,17 3 0</inkml:trace>
+  <inkml:trace contextRef="#ctx0" brushRef="#br0" timeOffset="-132407.46">5592 7803 7803,'6'-2'179,"-1"1"-89,9 0-90,-5 1 90,10 16-90,-10-12 0,2 28 0,-7-28 0,0 27 0,-4-17 0,0 11 0,0-5-90,0-1-90,-14 6 1,10-5 89,-11 4 0,15-13 90,0-1 0,21-6 0,2-2 180,2 0 89,10 3-179,-16-1 0,11 8-90,-14-2 0,-7 5 0,-9-1 0,0 3-449,-23 3 449,-8 14 0,-14-7 0,-1 12 0</inkml:trace>
+  <inkml:trace contextRef="#ctx0" brushRef="#br0" timeOffset="-112594.46">16245 8684 8612,'22'13'90,"13"-10"0,-17 10 90,9-3-90,-4-8-180,-6 8 90,2-2 90,-1-6-180,11 10 90,-7-4 90,18 5-180,-15-1 180,7 0-90,-9-2 0,-2-3 0,1 2 0,7 1 0,-7-2 0,11 1 0,-17-5 0,5 1 90,-10-3-90,0 0-90,-3-1 90,2 0 0,-4-1-90,2 1 180,-5-1-90,2 1 0,-2 0 0,0 0-90,-2-1-720,-1 1-1438,3 0 2248,-2 0 0,2-1 0,-1 0 0</inkml:trace>
+  <inkml:trace contextRef="#ctx0" brushRef="#br0" timeOffset="-111971.46">16882 8693 8612,'-5'-1'990,"0"0"-631,2 0-89,-2 1-270,2-2 180,0 2-90,0-2-180,0 2 180,2 10-180,16-8 180,-11 17-90,23-10 0,-8 14-90,1-10 180,5 4-180,-2-1 180,-4-3-90,10 9-90,-10-8 90,7 11 90,-11-11-90,2 5 0,-6-6 0,-2 0 0,0 0 0,-4 4 0,-2-4-90,-2 7 180,-1-9-90,0 5 0,-17-6 90,12 2-90,-29-1-90,29 2 90,-39 0 90,22 3-90,-10-5 0,-3 0 90,-8 7-135,5-2 0,-1-1-896,-5 5-408,-10 4-90,22-9 1439,6-1 0,5-2 0,3-1 0</inkml:trace>
+  <inkml:trace contextRef="#ctx0" brushRef="#br0" timeOffset="-100710.46">18348 9401 9961,'27'-15'540,"17"11"-360,-26-11-90,21 1-180,-5 10 90,2-20 0,5 21-408,3-18 318,5 13-1112,1-10 1202,4 6-90,0 2-495,-13 4 1,-1 1-676,22 0 495,-22 1 1,-1 1 764,13 3 0,-2-1 0,-2 1 0</inkml:trace>
+  <inkml:trace contextRef="#ctx0" brushRef="#br0" timeOffset="-99276.46">19910 9068 8162,'0'-8'1170,"0"1"-1080,-19 2-180,14 1 90,-31 1 0,17 1 0,-15 17 0,4 3 0,6 17 0,8-1 90,9 0-90,7-7 0,20 0 90,0-11-90,21-3 0,-4-7 0,2-6 0,-10 0 0,0-14 179,-13-5-89,-1 1-90,-7-9 0,-4 18-90,-4 10-1079,17 8-360,-12 23 450,27-1 1079,-28-6 0,25-1 0,-12-9 0</inkml:trace>
+  <inkml:trace contextRef="#ctx0" brushRef="#br0" timeOffset="-99009.46">20268 9051 7803,'-14'13'89,"2"6"-89,12 11 90,0 2-90,0-4 0,16 2 0,-12 16 0,12-12 0,-2 22 0,-11-25 0,10 6 90,-13-7-90,0-10-269,0 5 269,0-14 0,0-3 0,0-6 0</inkml:trace>
+  <inkml:trace contextRef="#ctx0" brushRef="#br0" timeOffset="-98855.46">20267 8948 6363,'11'0'0,"-2"0"0</inkml:trace>
+  <inkml:trace contextRef="#ctx0" brushRef="#br0" timeOffset="-98443.46">20760 9008 7803,'-22'11'359,"-8"-9"-359,27 18 0,-19-18 0,9 24 0,0-14 0,-3 22 90,15-16-180,-4 14 180,5-15 0,0 6-90,0-11 0,21-1 0,-16-3-180,28-2 180,-15-4 0,11 0 0,-11-20 0,4-1 0,-13-2 180,2-11 180,-5 9-90,-6-7 0,0-3-270,0 14 0,0 1-90,-14 10 180,11 21-180,-10 7 0,13 18-1709,14 2 540,-10-9 1259,28-2 0,-28-20 0,13-2 0</inkml:trace>
+  <inkml:trace contextRef="#ctx0" brushRef="#br0" timeOffset="-98256.46">21020 9047 7443,'17'33'0,"-13"-1"90,32-13-180,-32 12-180,32-20-270,-21 17 540,15-11 0,-6 0 0,0-1 0</inkml:trace>
+  <inkml:trace contextRef="#ctx0" brushRef="#br0" timeOffset="-98060.46">21403 8979 7713,'-32'0'0,"3"18"90,-1 7-90,5 11 0,4-9 0,0 1-360,-6 11 360,5-2 0,0 2 0,0 9 0,8-16 0,-1 1 0</inkml:trace>
+  <inkml:trace contextRef="#ctx0" brushRef="#br0" timeOffset="-97144.46">22042 9078 10411,'22'14'180,"11"-10"-180,-29 25 0,31-25 0,-18 29 0,17-17 0,-5 15-90,-3-6-360,4-1-1978,12 11 1258,-8-10 909,8 6 0,-14-14 0,-1-2 0</inkml:trace>
+  <inkml:trace contextRef="#ctx0" brushRef="#br0" timeOffset="-96944.46">22437 9088 8522,'-27'-5'90,"3"0"-90,8 3 0,2 1 0,0 1 0,0 0 0,-1 16 0,0-12 0,0 29 0,0-17 0,-1 18-720,0-2-1168,-5 20 1888,5-10 0,-3 16 0,7-18 0</inkml:trace>
+  <inkml:trace contextRef="#ctx0" brushRef="#br0" timeOffset="-96560.46">22703 9279 8972,'-16'-4'-90,"-2"15"90,-2 6-90,-4 17 270,21-3-270,-7-3 90,27-3 0,6-13 90,13-4-180,0-26 90,-11-5 0,-10-19 0,-7 8-90,-8-6 90,0 17-180,-20-9 0,-1 21-180,-2-8-629,-9 17 989,15-4 0,-2 6 0,6 0 0</inkml:trace>
+  <inkml:trace contextRef="#ctx0" brushRef="#br0" timeOffset="-96171.46">23027 9218 7892,'-42'0'180,"6"0"-180,16 15 180,-1 3-180,18 18 90,-7-9-90,10 2 90,0-9-180,36 11 0,-28-14-45,25-4 0,4-5 45,-16-4-89,41-4 269,-32-18-90,15-2 0,-22-1 89,1-13 631,-11 13-450,-7-15-360,-1 6 90,-21 7 90,1 12-90,-4 40 0,8 3-90,11 22-270,0-15-1259,21-2 1619,-15-12 0,34-1 0,-16-17 0</inkml:trace>
+  <inkml:trace contextRef="#ctx0" brushRef="#br0" timeOffset="-95977.46">23473 8790 8162,'-32'0'180,"2"17"-180,9-13-90,1 37 180,2-20-90,0 24 0,6-8-180,0 3-719,7 2 899,2 2 0,3-1 0,0-1 0</inkml:trace>
+  <inkml:trace contextRef="#ctx0" brushRef="#br0" timeOffset="-95493.46">24010 8990 9781,'0'35'90,"0"-5"-90,0 0-90,17-3 90,-13 16 90,24-8-1463,-25 13 1283,19-15-90,-20 0-359,21-1-154,-10 9 333,6-12-403,-2 8 403,-10-21 450,-1-2 629,-27-10 502,-3-18-592,-23-3-89,4-17-24,5 1-516,17-1 0,-1 7 104,20 3-644,-6 2-90,28 3-629,8-9 180,13 10 890,3-3 0,-8 7 0,2 0 0</inkml:trace>
+  <inkml:trace contextRef="#ctx0" brushRef="#br0" timeOffset="-95092.46">24385 8914 8882,'-13'-5'450,"9"0"-91,-9 3-269,5 1-90,6 22 0,-6 9 0,8 13 0,0 3-716,0-8 716,16 1 0,-12 18 0,26-15 0,-26 13 0,10-20 0,-1-3-240,-10-5 150,16-2 0,-17-6-90,4-3-449,0-7 359,-3-4 608,7-17-428,-4 8 348,5-44-258,-4 26 45,3-15 0,0-4 45,1 6 180,11-25-90,-11 45-90,6-8-90,-6 21 90,5-7-90,-5 26 0,3-13 90,3 29-180,-4-7 0,9 18-360,-7-6-449,12 6 449,-10-21-90,9 4 540,-7-18 0,1 3 0,2-5 0</inkml:trace>
+  <inkml:trace contextRef="#ctx0" brushRef="#br0" timeOffset="-94753.46">24935 9222 8522,'-34'0'360,"2"0"-360,16 19 90,3 2-180,13 20 180,0-11-90,0 0 0,0-12-90,20 5 0,-15-6-180,33-3 270,-23-8 0,15-6 0,-17-16 90,3-3 270,-15-16-180,6 4-180,-7 3 0,0 7 0,0 26-360,0 8-540,16 23 361,-13-2-900,27-1 1439,-15-14 0,2 0 0,-6-9 0</inkml:trace>
+  <inkml:trace contextRef="#ctx0" brushRef="#br0" timeOffset="-94408.46">25197 9222 7982,'0'29'180,"0"4"-90,12 0-90,-9 2 0,20-8 90,-21-3 0,14-15-450,-14 3 91,8-11 269,-9-15 0,6 9 0,-6-28 0,6 29 0,-2-30-90,3 14 269,1-14-179,-2 15 90,2 2 0,-3 16-180,4-6 180,-4 22-90,10 5 0,-7 18-719,11 2 269,-7-7-180,5-4 630,-2-18 0,1 9 0,0-3 0</inkml:trace>
+  <inkml:trace contextRef="#ctx0" brushRef="#br0" timeOffset="-94032.46">25602 9279 7803,'0'31'179,"0"2"-179,0-1-90,20 0 1,-1-3 89,22-10 0,-8-8 0,0-8 0,-16-19 179,1 12 541,-17-27 90,5 11-91,-6-14-629,0 2-180,0 8 180,-13 10 0,10 26-180,-9 17 90,12 9 90,0 19-270,0-21 180,0 25 90,0-28-360,11 17-629,-8-28-91,8 5 91,-11-15 899,0-3 0,0-5 0,0-2 0</inkml:trace>
+  <inkml:trace contextRef="#ctx0" brushRef="#br0" timeOffset="-93792.46">24727 8980 7803,'16'33'-900,"2"-5"360,23-5 540,-10-12 0,0-5 0,-7-6 0</inkml:trace>
+  <inkml:trace contextRef="#ctx0" brushRef="#br0" timeOffset="-93576.46">24923 8844 8612,'0'-7'810,"0"2"-541,0 0-179,0 3-90,16-2 0,8 4 0,-4 16-90,14 2-179,-20 20-721,2-10-179,-5 4 1169,-11-7 0,0 2 0,0 0 0</inkml:trace>
+  <inkml:trace contextRef="#ctx0" brushRef="#br0" timeOffset="-93189.46">26578 8994 8612,'-5'21'450,"0"4"-450,5 13 45,0-3 0,0 0-135,0 7-221,-1-8 1,2 0-320,15 3-269,-12-2-90,11-1 989,0-3 0,-11-2 0,11-3 0</inkml:trace>
+  <inkml:trace contextRef="#ctx0" brushRef="#br0" timeOffset="-92959.46">26760 9120 9332,'-27'0'629,"4"17"-449,2 2-90,10 21-180,5-10-90,6 1-90,0-11-269,17 0-1,-12-3-719,33 0 539,-9-8 720,10-1 0,2-8 0,-10 0 0</inkml:trace>
+  <inkml:trace contextRef="#ctx0" brushRef="#br0" timeOffset="-92560.46">26988 8933 8522,'-14'-6'1169,"11"17"-899,-11 23-270,14 3 45,-2-2 0,4-1-45,18 6 0,-19-5 0,3 0 0,31 5 0,-21 22 0,4-29 90,-1 15-180,-9-29-1259,0 3 989,-2-37 270,-6-7 90,0-23 0,17-3 90,-12 9 270,24-3 180,-27 21-91,23-2-269,-15 15-180,12 3 0,-9 21 0,3 3 0,-7 1 0,9 14-90,-9-11-179,12 20-181,-9-12-90,8-3 0,-6-19-89,2 6-181,1-13 810,2 9 0,0-10 0,0 3 0</inkml:trace>
+  <inkml:trace contextRef="#ctx0" brushRef="#br0" timeOffset="-92288.46">27588 9187 8522,'-20'17'900,"4"-1"-810,16 18 0,0-4-1,0 1 1,0-7-90,0-2 180,17-10-180,-13-1 0,25-7-90,-18-1-90,3-22-89,-6 1-361,-8-18 270,0 6-180,-17 13-809,13-6 1349,-13 15 0,17-4 0,0 6 0</inkml:trace>
+  <inkml:trace contextRef="#ctx0" brushRef="#br0" timeOffset="-92060.46">27907 9165 10141,'0'34'-1259,"16"-14"-450,-12 7 340,26-11 1369,-27 8 0,21-5 0,-10-7 0</inkml:trace>
+  <inkml:trace contextRef="#ctx0" brushRef="#br0" timeOffset="-91893.46">28145 9088 5824,'0'17'0,"0"-4"0</inkml:trace>
+  <inkml:trace contextRef="#ctx0" brushRef="#br0" timeOffset="-91676.46">27603 8789 8252,'16'-6'180,"1"2"-180,15 2 0,-4 16-899,-4 3 269,-10 19 630,-6-6 0,-8 4 0,0-8 0</inkml:trace>
+  <inkml:trace contextRef="#ctx0" brushRef="#br0" timeOffset="-91158.46">28975 9197 8882,'-57'0'360,"12"0"-360,3 0 90,26 15 0,-13 3 90,11 2-180,-3 9 89,7-9-89,14 8 0,0-2 0,0-9 0,0-2-89,23-2-1,-18-3 0,35-5-90,-16-2 180,15-3-90,-7-17 90,-2-5-180,-11-24 180,-6 8 0,-6-21 0,-7 20 135,0 2 0,0-1 135,0-7 44,-7 6 1,-2 0 45,6-3-270,-12 6 0,-2 2-90,2 6 450,-5-10-450,9 53 90,11 11-90,0 16-90,17 6-118,-13-11 118,12 5-450,0-1-989,2 16 629,1-14 900,0-10 0,-1 0 0,-2 1 0,20 7 0</inkml:trace>
+  <inkml:trace contextRef="#ctx0" brushRef="#br0" timeOffset="-90609.46">29330 8882 10411,'0'39'720,"0"-6"-630,0 5-90,0-5 90,0 21-180,0-12 90,6-7 0,1-1 90,-3 4-90,9 7-90,-1-19-90,-9-4 90,9-4-270,-2 0 180,-1-8-540,8 1 631,-4-10-181,-5 1 180,2-22 0,-2 15 270,5-50-180,0 33 90,9-40 90,-8 34 359,10-15-359,-12 30 540,13-10-720,-14 22 359,11 8-179,-13 13 0,2 17-90,-7-5-90,-1 8-90,-3-16 180,0 3-270,-22-4-359,-10-7-766,2-5 1,-3-2-585,-21 3 1771,-9-2 0,17-4 0,-4-2 0</inkml:trace>
+  <inkml:trace contextRef="#ctx0" brushRef="#br0" timeOffset="-78410.46">18377 9541 7263,'11'13'0,"-9"10"0,22-5 0,-22 6 90,18 2-90,-18-6 0,19 3 0,-4 13 0,8-6 0,2 12 0,6 3 0,-6-8 0,-3-6 0,0 0 0,6 7-45,-4-7 0,0 0 135,4 4-45,-4-5 0,-1 0-135,2 3 90,8 9 0,-5-6 0,-10-8 0,10 13 90,-15-19-90,6 11-630,-9-16 630,2 5 0,-5-9 0,-1 0 0</inkml:trace>
+  <inkml:trace contextRef="#ctx0" brushRef="#br0" timeOffset="-76020.46">19583 10986 9961,'0'-35'360,"17"16"-270,-13-17-180,12 19 90,1-19 0,0-7 0,3 7 0,-2-4 0,-4-2 0,-9-4 0,7 0 0,0 0 0,-11 0 0,2 8 0,0-1 90,-3-4-180,-17-19 90,12 30-90,-12-2 90,17 16 0,-12 8 0,1 22 0,-10 18 0,5 32 0,6-5 0,0 5 45,8-27 0,1 0-45,-2 18 0,3-8 0,0-1 0,0 8 0,8-12 0,1 0-226,-4 5 226,30 9-180,-30-21 91,29-3-181,-30-4-270,37 5 90,-27-13-89,27 6 359,-21-18-90,9 1 180,-11-7 226,1 0-136,-6-16 0,-2 12 90,-1-12 89,1-2 1,-3 2 0,-1-14-180,-3 10 0,-4 26 0,0 6 90,0 24-90,0-1 0,0 1-180,17-6-90,0-7 91,17-12 89,-10-6 0,-1-5 90,-7 0 0,-2 0 0,0-16 180,1-2-90,-4-2 269,0-7 1,-7 12-180,-2-11-180,-2 7 0,0 27 0,0 6 0,0 23-90,17-5-90,-1-13-539,18 3 629,-3-15 0,-5 3 0,-2-5 90,-3-20 90,-6 11 359,7-44-269,-15 39 450,1-42-180,-7 32-450,-1-12 0,-14 8 0,10 26 0,-10 11-180,28 24-720,2-8 1,1 1 899,11-2 0,-8-10 0,15 6 0</inkml:trace>
+  <inkml:trace contextRef="#ctx0" brushRef="#br0" timeOffset="-75760.46">20143 10844 8342,'17'10'-158,"-4"3"1,-13 19 0,0 1 0</inkml:trace>
+  <inkml:trace contextRef="#ctx0" brushRef="#br0" timeOffset="-74722.46">21073 10883 8792,'0'34'0,"0"3"0,0-10 0,0 0 0,0-7-90,0-1-809,0 0-181,0-2 1080,9-2 0,-7-3 0,7-1 0</inkml:trace>
+  <inkml:trace contextRef="#ctx0" brushRef="#br0" timeOffset="-74542.46">21122 10673 6903,'0'21'0,"0"-4"0</inkml:trace>
+  <inkml:trace contextRef="#ctx0" brushRef="#br0" timeOffset="-74143.46">21585 10803 8252,'-41'0'540,"1"18"-450,6 0-90,4 18 0,13-10 0,7-1 180,10-1-180,0-5 180,0 10-90,18-13-90,-13 1 0,26-8 90,-27-4-90,26-3-90,-9-1 0,16-22 90,-4-5 0,-8-27 90,-10 11-90,-9-3 180,-6-5 89,0 11 91,-17-21-270,12 30-180,-29-7 720,30 22-540,-12 22-90,16 19 0,17 33-90,2-7-1113,0-12 1,2-1-57,10 10 1259,-8-8 0,0 0 0,8 5 0,-11-18 0,1 1 0</inkml:trace>
+  <inkml:trace contextRef="#ctx0" brushRef="#br0" timeOffset="-73542.46">22247 10834 9242,'-5'-10'1169,"0"0"-1079,1 4-90,1-1 0,1 20 0,1 5 0,15 1 0,-10 20 0,11-20 0,-2 19 0,-9 3 90,19-11-90,-20 16 0,15-24 0,-15 7-90,8-20-1169,-10 3 1079,5-11 0,-4-14 0,2 9 180,1-30 0,1 5-90,6-22 180,-3 8 90,4 3 270,3 8-450,-4 11 90,7-2 0,-8 17-90,4 2 0,-6 20 0,5 4 0,-7 0 0,3 16 0,-3-20 0,1 16-450,-1-8-809,10 5 629,-4-9 630,15 5 0,-8-17 0,7-1 0</inkml:trace>
+  <inkml:trace contextRef="#ctx0" brushRef="#br0" timeOffset="-73176.46">22785 10853 8522,'-19'-6'540,"-5"0"-630,-12 22 180,4 2 0,17 19-90,6-1 0,9-7 0,0-2-90,0-11-360,16-1 90,3 0 90,16-8 91,1 1 268,-3-25 1,-5 0 360,-12-18-90,-7 3-360,-9 2 0,0 8 0,0 29 0,0 8 90,0 30-180,13-13 0,-10 0-630,24-5 361,-8-15-721,17 11 321,-8-20 759,2 5 0,-10-8 0,0 0 0</inkml:trace>
+  <inkml:trace contextRef="#ctx0" brushRef="#br0" timeOffset="-72806.46">23120 10880 8612,'-17'17'180,"4"1"-90,13 19-90,0-7 0,0 3 180,17-8-90,-13-6 270,13-24-91,-17-10-359,0-14 270,-11 10-90,8 29-180,-8 9 90,29 22 0,-13-5-210,27 4 210,-28 3 0,27 4 90,-27 1-90,28 2 0,-28-5 0,22 1 90,-23-5-90,15-2 0,-16 6-90,4-16-90,-6 3-450,0-18 0,0-5-1169,-20-5 1799,-3-2 0,-3-21 0,9-6 0</inkml:trace>
+  <inkml:trace contextRef="#ctx0" brushRef="#br0" timeOffset="-72643.46">22410 10796 8702,'24'-7'-90,"18"1"-180,-20 1-539,39-2 179,-18 4 428,16-2 1,-14 5 0,1 0 0</inkml:trace>
+  <inkml:trace contextRef="#ctx0" brushRef="#br0" timeOffset="-72293.46">23782 10893 9152,'-14'18'719,"23"4"-719,-4 11-90,29-13 180,-31 11-180,28-16 180,-26 16 270,27-4 270,-14-9-450,12 5-180,-7-16 0,-7-1 0,-6-6-270,-3-23-180,-2-4-719,3-30 449,-3 13-899,6-16 1619,-4 25 0,4-10 0,-2 16 0</inkml:trace>
+  <inkml:trace contextRef="#ctx0" brushRef="#br0" timeOffset="-71920.46">24497 10866 8972,'-38'0'630,"-3"0"-630,4 0 179,1 0 1,10 16-180,11-1 90,8 14-90,24-4-90,2-4 0,19-5 0,1-7 90,-1-6-90,-4-3 90,-15-17-89,-2 13 268,-15-28 271,5 12-450,-7-12-90,0 1 90,-15 9-539,11 28-541,6 8 361,2 27 719,45-7 0,-30-1 0,27-4 0</inkml:trace>
+  <inkml:trace contextRef="#ctx0" brushRef="#br0" timeOffset="-71659.46">24845 10849 9332,'-17'18'989,"-4"-13"-989,19 26 0,-6-13 0,8 12 0,40 1 0,-30-6 180,47-4-180,-40-11-720,12-4-269,-14-20-360,-30-3 449,9-14 900,-40 14 0,27-13 0,-20 9 0</inkml:trace>
+  <inkml:trace contextRef="#ctx0" brushRef="#br0" timeOffset="-71518.46">24250 10596 9691,'47'-2'-269,"-9"0"-451,8 2-449,-7 14-616,4-11 1675,3 11 0,1 1 0,0 3 1</inkml:trace>
+  <inkml:trace contextRef="#ctx0" brushRef="#br0" timeOffset="-71076.46">25652 10979 9781,'-26'0'1440,"1"0"-1261,8 0-89,3 0-90,9-16 0,2 0 0,46-32 0,-32 18 0,20 3 0,3 0 0,-8-2 0,12-20 0,-15 17 90,-4-17-90,-17 18 0,6-4-90,-8 7 90,0 9 90,0 1-90,0 28 0,0 17 0,0 11 0,0 10-90,0-8-1169,0 24 270,0-13 89,6-8 1,0 1-1523,-3 6 2422,10 13 0,-13-19 0,0-1 0</inkml:trace>
+  <inkml:trace contextRef="#ctx0" brushRef="#br0" timeOffset="-70942.46">25623 11320 9602,'0'-33'-1710,"28"2"631,13 1 1079,17 9 0,3 0 0,-12 8 0</inkml:trace>
+  <inkml:trace contextRef="#ctx0" brushRef="#br0" timeOffset="-70193.46">26580 10525 9961,'-4'-4'270,"1"2"360,-2 1-540,3 16 270,-3-11-271,3 31-89,0-17 90,2 40-90,0-19 90,0 16-296,0-14 206,0-3 0,0 0 0,12 12-90,-9-15 180,10 16-180,-13-27 180,0 2-360,7-15-1169,-5-4 989,6-21 270,-8-8 180,0-24 0,0 10 0,0-17 0,0 22 207,0-8 242,14 10-269,6 9 0,13 3 90,-1 29-180,-3 9-90,-9 0 0,-2 17 180,-10-23-180,-1 29 90,-4-20-90,-1 15 0,-2-20 0,-20 10-90,-3-14-1169,-25 2 539,14-11-89,-2-2-1221,0-4 2030,11 0 0,-6-20 0,13-6 0</inkml:trace>
+  <inkml:trace contextRef="#ctx0" brushRef="#br0" timeOffset="-69204.46">26553 10522 9152,'-3'-3'1889,"0"0"-1619,2 22-181,0 7-89,1 11 90,0 2-90,0-8 90,13 4-90,-10 1 0,9 0 0,-12 0 0,8 14 90,-5-13-180,5 23 90,-8-29 0,0 29 0,0-36 90,0 11-1619,0-28 1349,0-45 180,0 17-270,0-38 91,0 9 89,0 10 90,0 4 0,0 0 0,0-6 0,5 7 0,2 1 0,4-5 0,12-17 0,-6 27 0,0-3-90,-2 15 180,2 1 0,1 5 359,11-1-269,-8 6 0,17 0-90,-18 6-90,15 15 90,-16-11 0,1 30-90,-6-17 90,-4 16 0,0-4 0,-4 0-90,-3 3 0,-2 0 90,-1 15-90,0-11 90,-20 23-90,-3-27 0,-2 10-45,-3-23 0,0-2-45,4 9 135,-9-6 0,-3-2-585,1 0-899,-21 3 539,25-13-1078,-16-3 1978,25-4 0,-5-1 0,14 0 0</inkml:trace>
+  <inkml:trace contextRef="#ctx0" brushRef="#br0" timeOffset="-68858.46">27272 10301 9152,'5'16'1169,"0"8"-809,-5 27-360,0-4 90,-9-9 0,-2 1-90,-5 13-710,5-18 0,0 0 710,-15 16 0,22-3 0,-23 0 0,24-3-360,-20-4-269,20-1-569,-16 6 388,17-13 810,-5 9 0,7-23 0,0 1 0</inkml:trace>
+  <inkml:trace contextRef="#ctx0" brushRef="#br0" timeOffset="-68552.46">27442 10749 8882,'-17'-3'450,"12"14"-360,-12 4-90,17 16 0,0 2 90,0-4-90,0 0 90,0-8 89,20 1 1,-16 0 0,16 2 0,-6-2 360,-11 12-360,22-10 0,-23 14-1,9-21-89,-28 8-90,12-16-90,-29 1-899,8-8-450,-17-1-270,1-16 1709,10-3 0,14-18 0,10 0 0</inkml:trace>
+  <inkml:trace contextRef="#ctx0" brushRef="#br0" timeOffset="-68170.46">27755 10849 10321,'-45'15'450,"0"1"-360,6 16-90,15-9 0,-6 2 0,27-6 0,-9-1-90,12-1 90,0 11-180,17-12 90,9 9-90,17-20 360,3 0-360,-5-24 270,-9-2 90,-14-18 450,-10 2-630,-8 3-90,-18 5 180,13 10-90,-24 9-270,26 25-540,-8 6-449,30 20-180,3-5 539,23-3 900,-11-15 0,2 0 0,-9-11 0</inkml:trace>
+  <inkml:trace contextRef="#ctx0" brushRef="#br0" timeOffset="-67976.46">28032 10844 9691,'-20'-9'630,"16"0"-450,-28 8-180,21-1 90,-3 22-180,5 0-180,26 24-180,-13-14 1,29 3-91,-29-12-585,26-7 1,5-1 1124,-10 9 0,7-13 0,1-1 0,-3 0 0</inkml:trace>
+  <inkml:trace contextRef="#ctx0" brushRef="#br0" timeOffset="-67576.46">28225 10466 9602,'0'-12'2158,"0"2"-1888,0 27-270,19-14 90,-15 42-90,19-18 0,0 0 90,-16 25-135,12-8 0,2-1 45,-8-2 0,-1-7 0,0 0 0,0 1 0,4 19 0,-14-31-180,6 3-1079,-7-20 1079,1-19 180,1 10 0,0-26 0,3 25 0,1-28 0,1 27 90,2-31 90,0 32 180,1-24-180,-3 25-91,6-7 1,-5 10-180,6 14 90,-8-10 0,1 32 90,-3-17-90,0 20-179,-1-7-361,1 13 90,-3-11-1529,2 13 1979,-3-25 0,0 1 0,-1-12 0</inkml:trace>
+  <inkml:trace contextRef="#ctx0" brushRef="#br0" timeOffset="-67388.46">28090 10012 10411,'-20'25'-90,"0"-3"-540,2 26-179,2-10-2277,1 5 1377,2 2 1709,0 5 0,2 2 0,0 1 0</inkml:trace>
+  <inkml:trace contextRef="#ctx0" brushRef="#br0" timeOffset="-66888.46">29205 10723 12030,'-14'14'270,"24"4"-270,10 20 0,4-6-90,11 4-540,-9 2 91,11-9-1290,-2 6 1020,-9-12 154,-1-4-424,-1-3-1,-3-2 1080,-2-5 0,-6-3 0,-1-1 0</inkml:trace>
+  <inkml:trace contextRef="#ctx0" brushRef="#br0" timeOffset="-66692.46">29378 10764 10501,'-9'-1'180,"-3"0"-180,8 0 90,-4 19-90,2-13 0,-1 31 0,0-19-270,-6 33-360,2-16-629,0 3 0,0 0 269,-1 1 990,-1 18 0,10-32 0,2-1 0</inkml:trace>
+  <inkml:trace contextRef="#ctx0" brushRef="#br0" timeOffset="-66343.46">29792 10820 10411,'4'-4'270,"-2"0"-270,0 16 90,-21 6-180,14 16 90,-25-6 0,27 7 90,-8-7-180,28-9 90,-13 4 180,27-18-270,-10 5 180,13-7-180,0-22 0,-4-2 0,-15-19 90,-5 10-90,-10 1-180,0 1 180,-21 8-899,0-3 269,-4 7-359,-7 6 1079,18 2 0,-4 6 0,8 2 0</inkml:trace>
+  <inkml:trace contextRef="#ctx0" brushRef="#br0" timeOffset="-65943.46">30155 10785 9871,'-28'-8'540,"12"19"-540,5 6 0,11 22 90,20-7-90,2 0-90,20-8 90,-3-11-90,-8-7 90,-3-6-90,-12 0 180,-1-16-90,-1-1 180,-6-19 0,-1 3 180,-7 4-450,0 1 270,-17 12-180,13 24-360,-12 8 0,36 26-1169,-15-12-990,34 5 2519,-21-13 0,4-5 0,-8-7 0</inkml:trace>
+  <inkml:trace contextRef="#ctx0" brushRef="#br0" timeOffset="-65752.46">30572 9921 12750,'-16'26'-2069,"12"21"450,-28-21-1221,27 26 2840,-35-4 0,19 2 0,0-23 0,0 0 0</inkml:trace>
+  <inkml:trace contextRef="#ctx0" brushRef="#br0" timeOffset="-62982.46">19358 12760 7892,'-13'-1'540,"-7"1"-450,7-1-90,-10 1-90,6 0 90,2 0 90,7 0-180,1 11 90,0-8 0,3 8 0,-1-11 0,4 8 0,-1 0 0,2 10 0,0-3 90,21 1-90,-16-2-90,32 7 90,-17-4 90,16 13 0,-15-11 540,8 12-450,-19-12 539,4 16-629,-7-17-180,-7 8 90,-18-16 0,-4 1 0,-1-6-809,-12-2-810,13-1 809,-14-2 810,16-14 0,6-1 0,14-14 0</inkml:trace>
+  <inkml:trace contextRef="#ctx0" brushRef="#br0" timeOffset="-62274.46">19737 12762 9242,'-45'-1'180,"1"17"-180,10-1 0,13 16 90,1-16-90,18 12 0,-6-15 90,8 13-90,0-7 0,24 6-90,2-7-180,24 6 0,-13-14 180,-1 0-180,-2-7 270,-8-2 0,10-20 0,-19 15 90,2-29 180,-13 16 0,-2-13-180,-4 2 0,-15 6-90,11 28 0,-12 10 0,16 27 0,20-11 0,-2 5-90,4-16-90,7-3 0,-25-2-180,26-14 90,-18 6 0,11-7 1,-1 0 89,-5-19 180,8-4 0,-11-12 0,1 3 269,-7-2 91,-5 12 0,0-8-360,-3 10 630,0 5-360,0 18-360,0 10 180,0 21-90,0-1 0,0 1 0,13-9-90,0-11 0,10-7 90,-6-23 0,-3 13 0,-1-27 0,-5 15 90,3-11-90,-6 11 0,2 7 0,-5 8 90,5 0-90,-4 0 0,7 0 0,-2 21-720,10 2-180,-3 14 900,15 4 0,-8-15 0,8 6 0</inkml:trace>
+  <inkml:trace contextRef="#ctx0" brushRef="#br0" timeOffset="-61810.46">20913 12808 8162,'-39'19'90,"3"11"-90,14-26 0,2 30 0,0-10 90,10 18 0,1-10-90,9 1 0,17-17-270,4 4-89,20-13 179,3-2 180,-8-23-180,6-8 180,-19-11 0,4-17 90,-9 18 180,-10-30-1,1 26-89,-9-13 630,0 3-360,0 13 269,-17-20-539,12 28-180,-13-4-90,4 18 180,11 4 270,-11 4-360,14 24 0,0 9 0,0 29 0,14-9-45,-13-12 0,2 0-405,24 6-269,-24 14-631,21-10 811,-13-12-721,12 11 1260,-12-23 0,-3-2 0,-8-9 0</inkml:trace>
+  <inkml:trace contextRef="#ctx0" brushRef="#br0" timeOffset="-61676.46">20865 12738 8162,'-6'-13'90,"0"1"-180,6-6 90,25 6-359,-19-2-91,41 8-180,-27 2-269,23 1 899,-7 3 0,4 0 0,0 0 0</inkml:trace>
+  <inkml:trace contextRef="#ctx0" brushRef="#br0" timeOffset="-61359.46">21560 12756 8252,'-35'0'360,"-1"0"-360,2 0 0,15 12 180,-7-9-90,23 24 0,-7-12-90,10 15-90,0-10 180,17-7-90,-12 1 0,31-8 0,-10 3 0,17-5 0,-7-4 450,5-18-270,-26-2-1,9-20-89,-23 12-180,5-9 90,-26 17 0,16-5-269,-32 10-901,11 1 361,-19 5-91,6 3 900,2 4 0,13 2 0,2 0 0</inkml:trace>
+  <inkml:trace contextRef="#ctx0" brushRef="#br0" timeOffset="-61176.46">21687 12298 8972,'-17'-5'-990,"1"22"451,-4 8-271,9 13 810,11-2 0,0-7 0,0 1 0</inkml:trace>
+  <inkml:trace contextRef="#ctx0" brushRef="#br0" timeOffset="-60638.46">22252 12586 8972,'-23'-8'630,"-14"6"-630,10-6 0,-19 8 179,2 0-269,8 15 180,17 4 0,9 19-180,10-7 0,17 2 90,-13-8 0,31 1-89,-30 0 89,32 8-180,-14-8 180,15 8 90,-17-15-630,0 4-90,-19-15 450,5 2-179,-25-8-1,-3-1 360,-16-1-180,17-19 270,-9 4-90,26-18 270,6 8-180,23 0-90,25 2 90,-8 6-966,5 3 966,-13 5 0,1-1-423,-1 1 513,-2-2-90,-3 2 90,-2-2 90,2-6-91,-9 5 91,0-12-180,-14 11 1016,-3-8-836,-4 10 192,0 0-282,-20 5-90,-4 4-90,-1 19 0,-4-13-450,26 29 91,-7-11-271,27 7-180,-13 0 810,30-9 0,-10 2 0,17 1 0</inkml:trace>
+  <inkml:trace contextRef="#ctx0" brushRef="#br0" timeOffset="-60359.46">22462 12359 7623,'37'-1'1079,"-2"-1"-809,0 19-180,-4-1-90,-4 13 90,-8-15-90,-3 4-90,-5-15 90,1 5-270,0-8-270,0 0-269,1 0-271,2 0 1080,0 0 0,1 0 0,1 0 0</inkml:trace>
+  <inkml:trace contextRef="#ctx0" brushRef="#br0" timeOffset="-59893.46">23045 12439 10591,'-1'-10'899,"1"2"-359,-3 3-180,3 3-360,20 1 90,7 18-270,26 0-180,-9 3-1152,0 7 792,-7-23-179,-2 27-1,3-19-1106,19 21 836,-14-16 1170,12 6 0,-18-11 0,-1-1 0</inkml:trace>
+  <inkml:trace contextRef="#ctx0" brushRef="#br0" timeOffset="-59726.46">23623 12439 8702,'-40'-4'270,"1"1"-270,11 3 0,-2 0-90,-11 20 90,9 5-945,3 6 1,2 4-282,2 8 1226,8-13 0,1-1 0,4 4 0,2 1 0</inkml:trace>
+  <inkml:trace contextRef="#ctx0" brushRef="#br0" timeOffset="-59360.46">24025 12502 9062,'-41'0'450,"3"17"-360,6-13-90,1 25 179,-10-10-269,13-3 180,-5 14-90,24-12 0,2 7-449,7-3 89,27-9 90,6-5 180,17-2-45,-8-11 0,-2-5 135,5-11 0,-4 4 0,-3-4 90,-8-13 0,4-9 0,-23 17-180,-4-14 90,-7 18 0,-24-5-90,-3 18-180,-3-3-719,-10 11 989,19-2 0,-3 18 0,9 3 0</inkml:trace>
+  <inkml:trace contextRef="#ctx0" brushRef="#br0" timeOffset="-59002.46">24455 12475 8882,'-44'0'450,"4"0"-360,20 15-90,-5-12 90,22 26-180,-8-15 90,32 12-90,5-13 0,1 0 0,17-11 0,-26 3 90,21-5 0,-13 0 0,-1 0 0,-4-16 0,3 12 540,-13-31-1,0 17-359,-11-14-180,0 9 0,-16 10 90,-1 5-180,-2 28-809,6 3 269,13 21-90,0-11-1596,19-2 2316,1-6 0,3-14 0,-7 2 0</inkml:trace>
+  <inkml:trace contextRef="#ctx0" brushRef="#br0" timeOffset="-58823.46">24680 12021 9781,'-26'0'0,"3"17"-90,5-13-629,-5 50-271,5-27 990,5 11 0,2 4 0,0 5 0,-1 17 0</inkml:trace>
+  <inkml:trace contextRef="#ctx0" brushRef="#br0" timeOffset="-58476.46">25272 12228 11670,'-16'-15'-90,"1"2"90,2 4 90,7 22-270,17 26-449,-7 3-246,13-12 1,-1-1 244,-12 7 0,27 1-766,-10 11 766,10-14-179,-11 7 809,2-18 0,-20-4 0,10-1 0</inkml:trace>
+  <inkml:trace contextRef="#ctx0" brushRef="#br0" timeOffset="-58343.46">25307 12563 8882,'0'-24'-720,"0"-4"361,17 7-91,-12-3 0,37 6-449,-20 0 899,23-2 0,-7 2 0,1-2 0</inkml:trace>
+  <inkml:trace contextRef="#ctx0" brushRef="#br0" timeOffset="-57959.46">25633 12126 8252,'-23'19'1529,"9"4"-1529,6 12 90,8-2-90,19-4 0,-15 2 180,15 2-270,5 3 90,0 18 0,4-14-180,-9-5 1,-1-2-91,3 2-90,1 8 270,9-20-90,-28-4-180,18-6-539,-15-5 719,6-4 180,-8-25 90,-1-3 180,-2-1-90,1-16-1,1 26 91,1-20 0,2 14 540,3-5-810,-1 14 270,7-7-270,-2 17 0,9-4-90,-7 25 180,5-15-180,4 33 90,-5-13-990,15 19 540,-13-9-629,17 1 180,-14-23 899,9 8 0,-11-18 0,-1 6 0</inkml:trace>
+  <inkml:trace contextRef="#ctx0" brushRef="#br0" timeOffset="-57420.46">26267 12468 9242,'-41'0'719,"4"0"-629,19 20-90,-3-16 0,19 31-90,-6-14-90,8 7 1,17 1-91,-13-10-270,29-2 180,-10 1 0,15-6 360,1-3 0,-7-5 0,-15-23 270,-7-2 270,-10-19-180,0 2 0,0 9-181,-14 10-179,10-1-90,-11 9 180,2-2 0,9 19-270,8 12-359,17 18 179,21-1 0,-9-13-90,13 7 181,-18-19 89,10 5 0,-3-7 90,-11-8 180,14-19-90,-20 14 270,5-42 89,-15 28 271,-3-13 0,-2-3-91,-1 4 271,-1-27-810,-1 33 0,0-7 180,0 17 0,0 1-180,0 43 0,0-12-180,15 31-90,-11-19-629,25 9 359,-11-6-450,18 14 541,-9-23-1170,12 7 1619,-19-20 0,6-1 0,-10-9 0</inkml:trace>
+  <inkml:trace contextRef="#ctx0" brushRef="#br0" timeOffset="-57159.46">26637 12394 9512,'45'0'-653,"3"0"1,-11 0 0,1 0 0</inkml:trace>
+  <inkml:trace contextRef="#ctx0" brushRef="#br0" timeOffset="-56922.46">25923 12418 10321,'-4'-28'1079,"0"1"-989,4 6 0,27 0-90,-3-1-1136,26 0 1136,-9 1 0,4 1-270,4 4-630,-15 8 1,0 2-180,18-2 1079,-13 3 0,-2 5 0,3 15 0,8 5 0</inkml:trace>
+  <inkml:trace contextRef="#ctx0" brushRef="#br0" timeOffset="-56776.46">26435 13111 9152,'18'9'-300,"7"-5"0,-11 0 0</inkml:trace>
+  <inkml:trace contextRef="#ctx0" brushRef="#br0" timeOffset="-56386.46">27653 12054 13199,'0'-8'0,"0"0"360,0 3-360,18 2 90,-1 18-90,16 13-90,-18 11-180,10 4-315,-14-5 1,0 0 134,13 9-225,-5-2 1,0-1-45,0-7-451,16 15 451,-14-30-721,14 3 1440,-16-18 0,5-3 0,-10-4 0</inkml:trace>
+  <inkml:trace contextRef="#ctx0" brushRef="#br0" timeOffset="-56226.46">28045 12349 9871,'-22'-11'900,"-17"2"-900,20-4 90,-19 7-180,10 22-450,11 6 90,7 17-899,10-6 180,21 5 269,8-10 900,12-8 0,-1-7 0,-11-13 0</inkml:trace>
+  <inkml:trace contextRef="#ctx0" brushRef="#br0" timeOffset="-55692.46">28212 12004 10501,'0'-16'90,"0"4"270,0 4-180,0 24-90,0 12 0,17 15-1,-12 5-179,9-18 1,3 0 179,0 18-46,-2-7 1,1 0-45,1 4-135,-1-9 1,-2-2-136,-5 0 0,9 7 0,-7-21 0,-8-5-1259,6-1 1439,-7-22 180,3 10 0,-3-33 360,6 18 90,-4-5-271,5 8 1,-4 2-180,2 5-90,0-5 180,1 8 0,1 0-180,2 0 90,6 0-90,-2 16 0,12 0 0,-11 4 0,18 14-180,-16-28-180,16 23 180,-19-27 0,9 5 270,-11-7-180,6-16 180,-8-2 90,-2-1 270,-2-10-180,-2 25 90,-1-23-270,-1 16 89,0-3 91,-1 6-270,0 8 90,1 0-180,1 0-359,4 18-91,-1 4-989,7 18 719,-5-18-269,3 13 1079,-2-31 0,-2 22 0,2-12 0</inkml:trace>
+  <inkml:trace contextRef="#ctx0" brushRef="#br0" timeOffset="-55525.46">28737 12120 9152,'37'19'-780,"-16"-15"1,-4 15-1</inkml:trace>
+  <inkml:trace contextRef="#ctx0" brushRef="#br0" timeOffset="-54926.46">29678 12354 10681,'7'-17'1799,"1"1"-1259,-7 0-1,3-2-269,-4 0 0,0-1-90,0-4-180,-17 6-90,-1-5 180,-3 13-180,-7-2-90,10 10 0,-15-1-180,16 20-89,-4 3 359,19 19 90,-4-2 0,23-7 0,5 4 90,-1-15-180,16 10 180,-14-14-90,1 3 90,5-5-180,-26-5 180,9 4-180,-12-8 180,-23 4-180,17-5-270,-53 2-270,37-4-719,-29 1-990,18-3-89,6 0 2428,7-17 0,9 13 0,11-13 0</inkml:trace>
+  <inkml:trace contextRef="#ctx0" brushRef="#br0" timeOffset="-54459.46">29945 12184 9512,'3'-14'0,"-2"-1"179,0-3 1,-1 3-180,0-3 270,0 9 90,0 2-90,0 22-180,0 9 0,0 25 0,0-8-90,14 16-90,-10-22-135,9-3 0,0-1-135,-10-2 90,19 15 90,-14-30-179,2 2 89,-1-11 270,-8-15 540,2-5-91,-3-16 181,0 4-630,0 1 270,0 6-270,0 24 0,16 5-90,-13 21 90,29-15-630,-20 11 360,5-13-3935,5 9 4205,-19-28 0,10 8 0,-13-19 0</inkml:trace>
+  <inkml:trace contextRef="#ctx0" brushRef="#br0" timeOffset="-53808.46">29958 12243 9242,'0'10'629,"0"0"-179,18 4-180,-13-3-90,29 11-180,-30-9 0,28 13 0,-18-10 0,4 5 0,1-8 90,-17-1-180,15 0 0,-6 0-90,4-3-270,5-1 180,-9-5-179,10-2 359,-9-15-360,7-3 450,-10 0 0,3-14 0,-9 27 0,1-29 540,-4 21-270,0-20-91,0 10 541,0 1-900,0 25-539,14 6 269,-11 20-720,24-4 361,-14-11 809,3 5 0,0-18 0,-6 7 0</inkml:trace>
+  <inkml:trace contextRef="#ctx0" brushRef="#br0" timeOffset="-53576.46">30387 12133 9422,'13'0'989,"-5"17"-899,-1-13 90,-4 28-270,3-28 90,-1 38 90,-1-25-270,1 33-90,-3-26-809,1 13 449,-2-16-2068,1 9 2698,-2-18 0,1 2 0,-1-11 0</inkml:trace>
+  <inkml:trace contextRef="#ctx0" brushRef="#br0" timeOffset="-53223.46">30647 11929 8522,'7'0'900,"1"0"-541,-2 0 1,3 13-180,-2-9-90,6 40 0,-7-25 180,2 40-270,-6-26 90,-2 22-90,0-21 0,0 18 0,0-25 0,0 12 0,-14-21 0,10 1 0,-21-7 0,22-6-1170,-19 1 631,9-6-181,-7 0-179,4-1-181,4 0 1080,1 0 0,0-15 0,1-2 0</inkml:trace>
+  <inkml:trace contextRef="#ctx0" brushRef="#br0" timeOffset="-52608.46">30427 11948 9871,'0'39'1170,"0"-5"-990,0-1-90,0-4-90,0 2 0,0 3 89,0 0-89,0 18 0,0-13 0,0 23 0,0-30-89,0 15-91,0-25-1529,0 5 1529,0-33 0,0-6 180,0-29 0,0 5-90,0-4 90,0 8 0,0 0 0,17 1 0,-12-1 0,28-9 0,-29 10 180,24-11 0,-11 23 0,5-2 269,6 13-179,-12 4 90,11 1-180,-12 3 0,10 18 0,-13 1 0,5 21-91,-9-12-89,0 20 0,-6-22-179,-17 21-361,11-24-1259,-31 13 809,5-16 990,-26 15 0,6-17 0,-1 6 0</inkml:trace>
+  <inkml:trace contextRef="#ctx0" brushRef="#br0" timeOffset="-51592.46">31173 12147 9332,'0'37'1169,"0"5"-899,0-11-180,0 18 90,0-20-270,0 22 90,0-24-90,0 9 90,11-21-90,-9 1-1619,9-10 1349,-11-18 180,0-4 270,6-22-180,-5 10 90,9-5 90,0-16 90,-1 18-180,6-22 360,-8 32 90,4-2-271,-6 16 1,1 1-90,-2 6 0,0 0-90,2 18 0,-3 3 0,3 2 90,-2 12-180,0-13 270,0 15-1349,-2-8 1259,-1-28-180,-1-9 90,0-24 360,0 6 269,0 4-449,13 10-180,1 23 0,10 8-90,-2 20 180,-7-19-90,1 15 0,-6-30-90,0 26-90,-1-28 180,5 20-180,-6-21 180,8 6 0,-9-8 0,7-18-90,-6 13 180,4-31 0,-4 31 90,0-34 90,-2 34 360,2-40-360,-4 39-270,3-30 269,-6 28-179,2-4 0,-2 7-90,2 21-90,2 5 0,2 21-269,1-10-811,5 11 361,-3-29-810,8 19 359,-5-20 1260,2 3 0,-4-2 0,-2-10 0</inkml:trace>
+  <inkml:trace contextRef="#ctx0" brushRef="#br0" timeOffset="-51409.46">31565 11980 8432,'19'17'-563,"9"0"1,-24 3 0,10-7 0</inkml:trace>
+  <inkml:trace contextRef="#ctx0" brushRef="#br0" timeOffset="-51193.46">31918 11982 10591,'0'48'0,"0"-10"90,0 1-360,0-8-180,0-1-89,0 1-91,0-3 0,0-1-809,0 6 1439,14-12 0,-11 5 0,10-12 0</inkml:trace>
+  <inkml:trace contextRef="#ctx0" brushRef="#br0" timeOffset="-51058.46">31740 12247 10141,'17'-17'-90,"-13"3"0,39 2-1079,-3 0 269,14 4 624,-14 2 1,0 1-1,9 1 1,16 0-1</inkml:trace>
+  <inkml:trace contextRef="#ctx0" brushRef="#br0" timeOffset="-50360.46">29783 13629 9422,'28'-15'-270,"-1"-1"-270,-6-22 360,-1 1 180,-6 4 180,2-20-90,-9 27 180,1-15 270,-5 14 809,-2 13-1259,-1 14-90,0 25 0,0 12 0,0 26-90,0-19-495,0-4 0,0 2-405,0 9 270,0 15 1,0-22-181,0-3 900,0-1 0,0-5 0,0-1 0</inkml:trace>
+  <inkml:trace contextRef="#ctx0" brushRef="#br0" timeOffset="-50193.46">29675 13985 9871,'51'-19'-270,"-14"-3"1,-1 0-1,15 3-1309,1-9 1,0-1 1353,-19 14 0,1 0-270,26-12 1,0 0 134,-25 12 0,-1-1 360,11-4 0,-2-1 0,13-6 0,-3 0 0</inkml:trace>
+  <inkml:trace contextRef="#ctx0" brushRef="#br0" timeOffset="-49924.46">30595 13415 8792,'0'-13'989,"0"2"-719,-17 2 90,13 2 0,-13 2 359,-1 3-269,2 1-450,-18 1 0,19 16 90,-9-12 0,21 25-180,-19-25 180,15 28-180,-12-7 90,13 8 0,-3 8-90,9-18 0,-2 8 90,2-18 90,0 2-180,20-9 90,-3-2-180,5-20-179,1-3-181,-21-19 0,9 2-719,-11 5-540,-17-1 1799,12 12 0,-12 1 0,17 6 0</inkml:trace>
+  <inkml:trace contextRef="#ctx0" brushRef="#br0" timeOffset="-49626.46">30678 13425 10771,'1'36'0,"0"-7"0,-1 0 0,0-7 0,0-1 0,0-2 0,0-1 90,0-1-180,0-5-90,0-19-630,0-10 361,0-27-271,0 8 0,0-5-989,0-1 1709,0 10 0,0-9 0,0 14 0</inkml:trace>
+  <inkml:trace contextRef="#ctx0" brushRef="#br0" timeOffset="-49086.46">30937 13336 8972,'6'0'630,"2"0"-451,-3 0-89,3 0 180,-2 0-180,-1 0-90,1 16 0,-2-12 90,0 28-180,2-7 180,-4 8-180,3 1 90,-3-10-90,-1-3 270,1 0-270,-1-1-1169,-1-5 1079,0-18 180,0-13 0,0-24 270,0-6-90,0 8 90,14-8 179,-10 22 721,23-8-1080,-16 21 89,9 17-268,-5 14 89,-5 19-180,-4 0-180,-3-1-90,-2-7 270,1-14 0,1-8 180,1-9 0,3 0 0,0-19 0,3 14 90,3-34 180,6 11 180,-1-8 179,9-6-179,-10 26 0,8-10-360,-11 23-90,4-7 0,-7 10 0,-2 0-90,1 14-899,2 11-91,-3 7-2518,3 22 3598,-7-20 0,2 13 0,-3-15 0</inkml:trace>
+  <inkml:trace contextRef="#ctx0" brushRef="#br0" timeOffset="-48943.46">31693 13518 11490,'19'0'-5576,"-5"0"5576,-3 0 0,-5 0 0,-2 0 0</inkml:trace>
+  <inkml:trace contextRef="#ctx0" brushRef="#br0" timeOffset="-5858.46">19243 10325 7892,'0'-8'900,"0"0"-810,0 2 180,0-1-90,0 2 0,0-2-90,0 3-1,10 1 631,-8 0-810,8 16 90,-28 6 90,14 9-180,-29 3 180,29-3-90,-18-5 0,-3 2 0,6 16 45,-10-4 0,-3 1-881,1 11 881,10-17 0,-2 1-90,-1 5 0,0 0 45,5-9 0,-1 2 45,-15 25 0,0 1-90,13-21 0,0 1 75,-3 7 0,-2 6 0,2-4-30,2-1 0,-1 3 0,1 2 0,-3 9 0,1 1 0,3-6-453,4-11 0,2-4 1,-1 5 474,-5 14 0,-1 8 1,-1 0-1,4-8 23,0 3 0,2-1-45,5-12 0,-1 4 0,0 0 0,2-5 0,-1 10 0,1 0 0,0 2 0,1 6 0,1-6 0,3-5 0,1-3 45,-2 13 0,2 2-90,3-2 0,2-3 45,0-15 0,0 0 30,-1 4 0,1 3 0,3-4-30,7-6 0,3-1-30,-6 3 0,0 3 0,2-4 120,3-6 0,2-1-315,3 21 1,1-2-316,7 4 315,-14-25 0,3-1-630,10-8 1,0-1-315,-8 8 1169,20 3 0,-18-18 0,-2-4 0</inkml:trace>
+</inkml:ink>
+</file>
+
+<file path=ppt/ink/ink6.xml><?xml version="1.0" encoding="utf-8"?>
+<inkml:ink xmlns:inkml="http://www.w3.org/2003/InkML">
+  <inkml:definitions>
+    <inkml:context xml:id="ctx0">
+      <inkml:inkSource xml:id="inkSrc0">
+        <inkml:traceFormat>
+          <inkml:channel name="X" type="integer" min="-2.14748E9" max="2.14748E9" units="cm"/>
+          <inkml:channel name="Y" type="integer" min="-2.14748E9" max="2.14748E9" units="cm"/>
+          <inkml:channel name="F" type="integer" max="32767" units="dev"/>
+        </inkml:traceFormat>
+        <inkml:channelProperties>
+          <inkml:channelProperty channel="X" name="resolution" value="1000" units="1/cm"/>
+          <inkml:channelProperty channel="Y" name="resolution" value="1000" units="1/cm"/>
+          <inkml:channelProperty channel="F" name="resolution" value="0" units="1/dev"/>
+        </inkml:channelProperties>
+      </inkml:inkSource>
+      <inkml:timestamp xml:id="ts0" timeString="2021-07-30T05:05:48.938"/>
+    </inkml:context>
+    <inkml:brush xml:id="br0">
+      <inkml:brushProperty name="width" value="0.09071" units="cm"/>
+      <inkml:brushProperty name="height" value="0.09071" units="cm"/>
+      <inkml:brushProperty name="color" value="#FF0000"/>
+    </inkml:brush>
+    <inkml:brush xml:id="br1">
+      <inkml:brushProperty name="width" value="0.12095" units="cm"/>
+      <inkml:brushProperty name="height" value="0.12095" units="cm"/>
+      <inkml:brushProperty name="color" value="#FF0000"/>
+    </inkml:brush>
+  </inkml:definitions>
+  <inkml:trace contextRef="#ctx0" brushRef="#br0">2928 1650 8342,'4'-17'1439,"-3"2"-989,8-3 90,-6 1-2437,4-1 2789,-3-2 258,1 1-434,-2-2 539,2 0-124,0-1-71,0 1-62,0 0-1105,-1 3 521,0 0-505,-2-3 387,-1 8-272,-1-2 427,-24 11 634,-13 18-1205,-15-10 235,24 14 0,-1 7-415,-18 6 1,0 3-24,17-4 0,0 2-62,-4 1 1,-5 1-1,7-3-817,-7 16 567,18-14 1,4 0-971,5 3 1335,7 17 358,37-23 1111,1 1 0,4-2 69,-2-13 1,2-2-114,24 14 0,-3 1 1219,2-4-1257,-12-5 1,-2 1 1016,1 4-1208,-15-7 1,-2 1 613,-4 1-1560,-4 5 66,-16-1-635,-6-6-820,-28 13-1303,21-14 316,-48 6 108,32-10-333,-25 0 320,14-6-154,3-1 1062,3-4 563,3-1 1529,3-18 0,11-4 1,3-18-1</inkml:trace>
+  <inkml:trace contextRef="#ctx0" brushRef="#br1" timeOffset="282">3082 2090 16520,'25'-4'-952,"2"-2"521,-1 4 769,1-2-441,-2-1-68,1-3-231,-1-1 81,13-13-723,-9 4 319,20-25-261,-21 15 454,-6 1 0,-2 0-448,0-5 796,0-27-35,-13 32 469,-3-14 532,-28 28 1987,1 2-417,-25 7-479,9 19-1151,5 5-412,15 10-748,8 0 134,11 9 390,0-9-2226,21 24 1019,-15-23 245,42 6 1751,-24-16-421,26-3 1,-8-4 0,2-2 0</inkml:trace>
+  <inkml:trace contextRef="#ctx0" brushRef="#br1" timeOffset="591">4140 1503 17869,'-28'-3'1583,"-15"0"-1521,19 2-216,-11 1-18,5 16-1196,6-12 1099,13 28-526,-5-6-568,15 9 864,-4 17-145,28-19 1613,2 23-505,3-23 1660,12 10-609,-15-3 244,1-11 820,8 14-1193,-23-21-398,5 8-1147,-9-15 225,-7 1-1608,0-5-279,-17-3-653,12 0-2152,-30-1 4282,14-2 1,0-2 0,4-2 0</inkml:trace>
+  <inkml:trace contextRef="#ctx0" brushRef="#br1" timeOffset="908">4675 1510 17419,'-40'15'-2504,"4"-12"2876,15 21-3129,-2-21 3523,21 17-703,-8-8-1368,30 5 3378,-15 0-1688,36-3 816,-10 6 211,10-5 971,12 11-1305,-24-12 376,-2 2 1621,-4-5-3286,-19-3 377,9 1 451,-13 4-2009,0-2 410,-20 12-1717,-9-7-515,-11 10-17,-11-10 2885,30 0 0,-22-10 0,20-2 0</inkml:trace>
+  <inkml:trace contextRef="#ctx0" brushRef="#br1" timeOffset="1113">5185 1590 16700,'0'30'-886,"0"-6"531,0 0 178,0-5 70,0 7 36,0-5-879,0 12 940,0-15 1,0 4-1,0-8 1</inkml:trace>
+  <inkml:trace contextRef="#ctx0" brushRef="#br1" timeOffset="1285">5178 1176 16250,'0'0'0</inkml:trace>
+  <inkml:trace contextRef="#ctx0" brushRef="#br1" timeOffset="1608">5697 1502 17689,'-16'12'-4629,"12"2"4241,-11 2-1320,1 13 1289,10-6 962,-10 9-758,14-8 869,0 1-921,0-2 1271,0 8-490,22-10 2387,4 10-651,1-17-760,17 1 131,-26-11-1099,22-2-165,-11-2-181,-1 0 180,-2-17-2888,-2 13 1014,-1-30-960,-11 9 632,-1-21 497,-11 8 812,0 0-179,-23 13 1507,17 1-193,-36 1-215,37 3 1,-34 2 0,14 1 0</inkml:trace>
+  <inkml:trace contextRef="#ctx0" brushRef="#br1" timeOffset="1857">6105 1489 16430,'0'8'-1065,"0"-1"710,0 0 177,0 4 72,0-1 35,0 4 20,13 1 1440,-9-2-1161,22 5 1175,-23-6-1503,20 0 971,-20-6-683,16-2 1,-11-2-1,6-2 1</inkml:trace>
+  <inkml:trace contextRef="#ctx0" brushRef="#br1" timeOffset="1965">6303 1431 17059,'10'0'360,"-3"0"-360,1 0 0,2 0 0,1 15 572,10 7-336,-5 9 1,9 1-1,-6-7 1</inkml:trace>
+  <inkml:trace contextRef="#ctx0" brushRef="#br1" timeOffset="6391">7088 1630 22200,'9'0'809,"0"0"-539,1-8 289,3 6 188,1-13-744,13 5 696,-4-3-415,10-1 395,-7 2 1,1 2-51,13-6-219,-7 5-1544,23-8 711,-21 9 372,10-2 1,-15 6 0,-1 0-1</inkml:trace>
+  <inkml:trace contextRef="#ctx0" brushRef="#br1" timeOffset="10861">8922 709 22920,'0'29'-5936,"0"-4"3807,0 1 1065,0 1 425,12 6-755,-9 6 1221,3-6 1,1 1-405,6 21-347,-13-6 1,3-1 826,19 8-109,-20-21 0,-2 1 82,14 22-343,-9-18 512,4 16-189,-3-31-454,-2 6 368,-1-19-827,4-3 1069,-3-7 632,11-23 991,-3-6-640,17-28 250,-7 11 117,12-3 156,-6 14 401,5 0-84,0 3-790,19-5-229,-14 12 92,-7 10 1,0 2 659,1 3-42,15 3-696,-25 20-1547,1-11 576,-11 31-1947,-4-29 719,-3 40-883,-3-25-132,-1 23 368,-1-11 239,-20 12 2182,15-13-1397,-30 16 2740,15-24-976,1 2 395,-13-14 723,28-4-2344,-25-4 888,12-3 0,0-1 1,5 0-1</inkml:trace>
+  <inkml:trace contextRef="#ctx0" brushRef="#br1" timeOffset="11065">9858 1092 22110,'0'40'-6386,"0"-3"4348,0-8 884,0-3 425,0 3 34,0-4-599,0 9 1237,0-12 0,0 4 0,0-13 0</inkml:trace>
+  <inkml:trace contextRef="#ctx0" brushRef="#br1" timeOffset="11241">9888 699 22110,'-10'-4'-4850,"7"18"4218,-7 6 1,10 12 0,0-1-1</inkml:trace>
+  <inkml:trace contextRef="#ctx0" brushRef="#br1" timeOffset="11545">10335 1394 22380,'5'3'-4302,"0"-1"3889,2-1 1161,0-1 135,0-20-1617,6-2 614,-6-21-609,5 2-262,-9 10 958,-1-5-626,-2 15-306,0-1-451,-13 13 1110,10 18-64,-11 12 1133,14 20-1458,0-7 207,18 2-649,-13-10 352,26-4 526,-28-1 248,36-2 0,-22-1 1,22 1-1</inkml:trace>
+  <inkml:trace contextRef="#ctx0" brushRef="#br1" timeOffset="11880">10817 1169 23279,'0'39'-6025,"0"3"3896,0-13 1065,0 0 425,0-9 124,14-1 16,-10 1-62,11-4-1509,-9-2 1296,1-8 915,4-20 997,-1 9 1182,4-45-1806,-3 27-76,1-9 1,1-1 622,2-1-226,7-7 900,-9 19-861,0 3-877,-2 10-568,4 3 2370,-6 6-910,9 0 4,-11 20-2562,11 6-54,-10 12-510,4-2-595,-6-8 2329,0-1 0,-3 0 1,0-3-1</inkml:trace>
+  <inkml:trace contextRef="#ctx0" brushRef="#br1" timeOffset="12107">10142 944 22110,'0'-12'-6206,"0"1"4078,0 2 1064,0 2 425,22-3 3168,1 5-1050,26 0-1036,-13 4-1129,1 1 923,-8 0 1,0 19-1,2 5 1</inkml:trace>
+  <inkml:trace contextRef="#ctx0" brushRef="#br1" timeOffset="12308">10902 582 23009,'0'46'-6745,"0"-6"3987,0 3 794,0-5 1804,0 5 1,0 3-1,0 1 1</inkml:trace>
+  <inkml:trace contextRef="#ctx0" brushRef="#br1" timeOffset="12557">11952 803 24449,'0'-7'-6476,"0"0"4348,-15 5 3776,11 20-2154,-11 14 552,15 10-846,0-6 0,0 0-513,0 11-283,-1-3 0,2-1 1530,11 8 0,-9 15 0,9-22 0</inkml:trace>
+  <inkml:trace contextRef="#ctx0" brushRef="#br1" timeOffset="12708">11715 1166 22200,'0'-18'-6476,"0"1"4078,0-1 524,21-5 2872,9 5-431,14-4 1,0 10 0,-8 1-1</inkml:trace>
+  <inkml:trace contextRef="#ctx0" brushRef="#br1" timeOffset="13048">12430 1109 23009,'-22'6'2828,"-12"-1"-2422,30 5-2546,-33 5 3337,12-5-534,-14 12-387,16-9-28,0 5-352,21-5-1738,-7 0 1055,9 1-492,0 7-1405,0-5-326,23 9 681,7-14 939,13 0 572,-2-9 1881,-10-2-659,0 0 1193,-2 0-1,-1-19 308,-5 15 253,1-29-1360,-13 16-527,0-15-1138,-11 2-639,-21 12 27,16-3-587,-33 18 1549,19-12 475,-14 13 0,16 10 1,5 10-1</inkml:trace>
+  <inkml:trace contextRef="#ctx0" brushRef="#br1" timeOffset="13777">12937 1103 23549,'-43'0'1169,"6"0"-1169,1 16 1363,10-12-1337,12 27-1590,6-15 646,8 11-789,0-5 21,0-5-270,0-1-1,0 1-680,23-2 732,-18 0-77,34-4 1662,-35-2-595,29-4 2007,-29-1-1339,32-2 1758,-16-1 145,14-14 592,-11 9 618,-5-9-1733,-9-2 905,-1 11-609,-3-22-762,-2 15-1079,-1-8-817,11 26-529,-10 5-590,21 8 508,-21 11-115,20-19 56,-12 18 55,10-10 1247,-5-6 77,5-6 575,-12-8 2005,5 0-703,-8 0 711,0-16-1181,3-4 748,-6-17-1224,7 1 78,-8 15-637,2-4-523,-3 16-731,1-3 264,2 5 1582,1 7 311,6 14-1156,-2 0-419,7 15 1,-3-14 592,1 8-391,-1-20 1430,-1 17-2324,1-18 1182,2 11 798,-2-12 1217,2 3-148,5-4 80,-6 0 404,9-16-1364,-11-3 843,1-1-1670,-6-9 652,-1 25 232,0-22-1284,-1 24 1185,-1-15-1738,-1 15 1461,-1-4-811,3 21-1390,0-11 1709,4 26-3072,6-6 1578,-3 7-2283,5 4 3713,-4-11 0,0-2 0,0-1 0</inkml:trace>
+  <inkml:trace contextRef="#ctx0" brushRef="#br1" timeOffset="13991">12992 801 23729,'-6'-5'-5370,"2"1"1919,23 2 5146,13 1-1875,12 16 128,6-12 1,-8 28-1,2-12 1</inkml:trace>
+  <inkml:trace contextRef="#ctx0" brushRef="#br1" timeOffset="14359">14328 1017 23729,'-9'-12'-6374,"1"2"4515,2 3 1115,0 3 1007,0 1 260,-1 1 238,1 25-1269,-4 24-1059,7 3 1466,0-9 0,1-2-113,2 2-385,6-8 1,5-1-1075,11 2 64,0 3 1484,20-19 0,-22-9 1,22-5-1</inkml:trace>
+  <inkml:trace contextRef="#ctx0" brushRef="#br1" timeOffset="14691">14693 1134 24359,'0'28'-6476,"0"3"4078,19-5 358,1-3 1300,21-11 1602,-10-6 77,0-6 67,-10 0-1095,0-21 1661,-2 16 643,-1-34-1138,1 15 440,-7-9-1691,0 12 156,-9-3-855,-1 12-128,-2-9-572,0 51-1092,14-1 587,5 28-2494,20-10 4442,-8-22 1,4 5 0,-8-13-1</inkml:trace>
+  <inkml:trace contextRef="#ctx0" brushRef="#br1" timeOffset="14879">15502 1084 24179,'-35'0'1079,"15"14"-425,6 2-1495,14 18-2090,0-8 858,0 4 399,0-8 126,24 0-1100,-18 0-448,45-2 2828,-28-2 1,25-2 0,-11-2-1</inkml:trace>
+  <inkml:trace contextRef="#ctx0" brushRef="#br1" timeOffset="15042">15385 1772 20671,'0'0'0</inkml:trace>
+  <inkml:trace contextRef="#ctx0" brushRef="#br1" timeOffset="16741">7185 2054 21750,'10'8'-5129,"-8"1"1344,23 0 4848,-11 2-1499,16 0 932,-2 2-307,19 8-38,-7-3-690,-3-2 0,1 1-314,9 5 1082,-14-6 1,-1 0 0,15 10 0,1 2-1</inkml:trace>
+  <inkml:trace contextRef="#ctx0" brushRef="#br1" timeOffset="17724">8930 2952 21570,'13'-42'-3883,"9"-18"2927,6 19 1017,-6 0 1,-1-2-96,5-12-4,-4 7 1,-2 0 120,2-11-205,-9 22 1,-1 0-685,-2-14 798,-1 4-60,-6 2-427,-1-9-241,-2 18-199,-18-12-636,14 31 404,-27 0 1171,16 28 1400,-1 16-720,5 10-146,11 10-709,0-6 216,0-7 0,0 2 651,0 20-521,7-7 0,5 0-1254,15 12-178,-16-22 1,3-2 513,10-10 0,0-1 249,-4 22-195,23-4 502,-20-17 1,0-1-123,14 8 134,-5-11 1,0-4 995,6-4 319,24-2 303,-29-10-50,8-2 833,-10-19-74,-10-2-8,2-18-920,-13 18-439,-4-11-1437,-3 16-249,-3-11-475,0 28-162,0 9-511,17 25-137,0 0 511,20-1 994,-10-15 351,1 3-19,-5-21 1307,-1 6-800,12-8 383,-8 0 0,8-15 1,-11-5-1</inkml:trace>
+  <inkml:trace contextRef="#ctx0" brushRef="#br1" timeOffset="18042">10037 2732 22110,'0'35'-6386,"14"3"2397,-11-6 3062,26 0 618,-25-11-312,28-3 1244,-6-2-267,8-1-1313,13-7 1961,-17-2 534,19-26 868,-21 14-441,7-35-267,-15 24-593,-3-18-531,-3 6 179,-4-12-1259,-4 8 347,-3-15-1978,-3 24 193,0-3 578,-14 13-123,10 28 1102,5 23-507,2 7 226,32 10-295,-31-22-188,36-1 581,-21-2 641,18-5 0,-6-3 0,-1-3 0</inkml:trace>
+  <inkml:trace contextRef="#ctx0" brushRef="#br1" timeOffset="18899">10527 2817 22380,'19'28'-7376,"3"-3"5370,22-3 2577,-11-10 105,2-5 187,-11-7 278,10 0-352,-11 0-789,5 0 1867,-13 0-182,-3-19-1264,-4 14 739,0-41-2040,-5 29 66,0-37-405,-3 27 73,0-20-451,-15 24-245,11-5 364,-12 10-654,16 8 1707,-9 1 218,6 24 505,11 2-1264,11 20-321,20-1-19,0-3 1482,-6-13 0,0 1 0,-12-10 0</inkml:trace>
+  <inkml:trace contextRef="#ctx0" brushRef="#br1" timeOffset="19241">9817 2620 22650,'0'-21'-6476,"0"1"4438,0-2 973,24-5 2637,3 8 73,23-6-82,-24 16-220,25 2-1793,-35 27-1151,16 14 1497,-23 15 0,-9 8 0,0-8 0</inkml:trace>
+  <inkml:trace contextRef="#ctx0" brushRef="#br1" timeOffset="19958">12065 2262 24808,'-17'13'1067,"4"11"-2908,13 14-1001,0 6 1083,0-5 496,0 5 246,15 2-1027,-11 3-690,10-2 637,-7-13 0,0 0 1734,4 13 1,5 14-1,-8-24 1</inkml:trace>
+  <inkml:trace contextRef="#ctx0" brushRef="#br1" timeOffset="20243">12225 2522 21300,'27'15'-3735,"-1"-12"4291,-2 27-3186,4-9 1815,-7-2 533,10 25-323,-17-37 1702,4 26-3208,-13-31 2445,0 5-1972,-3-7 3272,0-19-1732,0-9-196,1-10-355,3-17-409,-1 20 1290,7-22 1,-5 27 0,3-7 0</inkml:trace>
+  <inkml:trace contextRef="#ctx0" brushRef="#br1" timeOffset="20593">12843 2722 22020,'6'12'-9087,"0"-1"6727,-2-3 984,1-2 1145,0-2 742,-1-2 117,0-1 700,5-1-1418,-1 0 2362,3 0-251,-1 0 98,0 0-373,2-17-905,7 0 252,-4-3-1175,8-17-352,-10 21 614,2-25-827,-7 23-129,-1 2-55,-5 4 126,0 11 525,-2 14-1022,18 7 188,-13 23-1053,28-1 423,-10-7 1515,21 4 0,-5-20 1,1 1-1</inkml:trace>
+  <inkml:trace contextRef="#ctx0" brushRef="#br1" timeOffset="20857">13067 2302 22200,'0'32'-8185,"0"4"7653,0 0 0,0-7 0,0-2 0</inkml:trace>
+  <inkml:trace contextRef="#ctx0" brushRef="#br1" timeOffset="21042">13135 2055 22020,'10'-3'3577,"0"-1"-3015,2 4-1440,0 0 442,4 15-1868,0-12 1395,19 24-1548,-6-10 2229,15-1 0,-8 11 1,2-13-1</inkml:trace>
+  <inkml:trace contextRef="#ctx0" brushRef="#br1" timeOffset="21492">14390 2254 24898,'-8'12'-2005,"0"-8"3794,3 8-6301,1-5 3908,2 2 1,20 3 0,4-1 0</inkml:trace>
+  <inkml:trace contextRef="#ctx0" brushRef="#br1" timeOffset="21625">14595 2824 22740,'0'0'0</inkml:trace>
+  <inkml:trace contextRef="#ctx0" brushRef="#br1" timeOffset="22207">15345 2374 24539,'-26'-5'-1347,"-18"0"1245,26 2-190,-33 1 504,24 2-32,-16 0 102,20 17 97,4-1-296,10 22-953,31-12-604,-16 5 764,22-15 1,5-2-28,-10 12 78,11-6 0,1-1-292,-3 1-402,-3 5-113,-1-13 1918,-24-1-1022,19-4 1864,-22 1-2552,6-4 1274,-7 0-931,-18-3 2097,14-12-2131,5 8 950,31-22 2496,11 21-1878,4-20 1751,-7 21-1298,-4-20 787,3 13-1523,-4-13 2267,14 0-1322,-15 5-821,14-15-308,-26 15-492,2-17-172,-16 17-528,-2-8-420,-6 10-317,0 1-235,-22 1 468,1 0 217,-5 5 313,-3 1 953,14 5 588,0 22 386,3 2-201,31 21-1888,1-10-388,3-2-11,13-8 304,-31-2 1088,35-1 1,-26-3-1,17-3 1</inkml:trace>
+  <inkml:trace contextRef="#ctx0" brushRef="#br1" timeOffset="22524">15973 2387 22920,'-14'-3'-1528,"2"16"1777,29-13 44,-13 25-3132,29-4 2077,-29 4-736,23 4 661,-24-7-903,16-1 518,-17 1-162,7 4-539,-4-8 1879,-4 4-506,5-32 1674,-6-10-1011,0-14 121,0-5-294,0 5 170,0-5 252,15-21 143,-11 15-963,10 8 0,2 2-597,1-2 1350,1-5 1,10 21 0,-10 4 0</inkml:trace>
+  <inkml:trace contextRef="#ctx0" brushRef="#br1" timeOffset="22792">16507 2261 23909,'-15'-12'-5393,"11"20"5117,-11 17 557,15 10-1703,17 3-570,-13-7 1201,12 0-242,3 3-1028,3 9 765,2-12-298,9 6-659,-11-11 1433,7-10 1196,1 1 0,-11-13 0,0-2 0</inkml:trace>
+  <inkml:trace contextRef="#ctx0" brushRef="#br1" timeOffset="22991">16758 2384 22290,'34'12'-2867,"3"-8"3362,-7 20-2642,2-21 2747,-7 9-1173,3-3 191,2-7 604,1 8-975,1-10 1268,-1 0-804,-2 0 1192,7-16-778,-12 12 0,2-25 0,-14 12 1</inkml:trace>
+  <inkml:trace contextRef="#ctx0" brushRef="#br1" timeOffset="23142">17203 2260 22560,'-20'-17'-4584,"14"2"263,-14 4 4907,5 2-303,1 6 606,-4 18 319,8 8-1126,10 11-1679,0-2 1214,20-8 912,-15 0-1778,34-2 847,-35-2-2375,49-1 1061,-34 1 1714,28-10 0,-23 3 0,0-7 0</inkml:trace>
+  <inkml:trace contextRef="#ctx0" brushRef="#br1" timeOffset="23463">17457 2253 22740,'19'19'-6142,"12"-14"7393,-27 30-3544,25-31 3454,-26 28-2509,25-17 1366,-11 25-1364,6-16-234,-3 8 1172,-7-13-1078,-3-2 1639,0-3-978,-2 0 692,-3-8-680,0 0 1392,-3-23-417,1 12 1577,2-34-1148,0 20 315,7-40-252,-2 19-241,0 2 0,0 0 458,5-7-895,-2 8 1,1 2-236,3-1-1873,13-13 2443,-13 30 1,6 0 0,-8 14 0</inkml:trace>
+  <inkml:trace contextRef="#ctx0" brushRef="#br1" timeOffset="24431">7207 2381 21840,'16'16'-5842,"12"10"4002,-25 9 239,27 5 685,-16-7-373,17 5 999,-4 6-178,4 4-1485,4 8 1713,-17-27 1,0 2 13,2 1 0,-1 2 103,1 0 0,0 1-5,1 4 1,0 0 216,-1-2 0,2 4-219,-1-2 0,1 4 1,-1-2 91,2 5 1,2 3-33,2 4 0,2 6 0,-2-5-26,-2-4 1,-2-1-149,-3-6 1,1 2 0,-2-3-174,2 5 0,-2-3 382,0 1 0,-1 1 0,-1-1 0,0 0 0,0 0 0,-1 1 0</inkml:trace>
+  <inkml:trace contextRef="#ctx0" brushRef="#br1" timeOffset="26495">9157 4099 22020,'0'35'-5936,"0"-5"3808,0 0 1063,0 0 517,0 5 122,0 6 122,0 3 76,0 2-1368,16 0 923,-12-2 493,12-3-554,1 10 101,-2-16 22,12 12 147,-15-27 102,-4 2-452,-3-18 1529,0 1-428,4-30 952,6-30-89,-6-2-579,1 10 1,-1 1 296,0-2-545,-1 10 0,0 3 730,-1 0-760,3-3-8,-3 22-126,-1 7 474,2 2 727,5 6-48,-2-2 569,10 21-2029,-9 8-767,6 9-143,-7 2-381,0-9-402,-2 2-391,0-1-44,-2-2-419,1-3 2026,-1 2 705,-2-8 37,2 1-56,-5-13 1,8-43 1123,-4 10-699,2-11 0,2-3 626,2 1-527,-1 7 1,0 1 677,4-3 49,4-5 278,0 16 603,-5 13-921,10 1 755,-11 10-835,11 20-1483,-7-15 676,3 41-1764,-4-25 399,-1 25-919,1-8-630,0 1-874,1 1 550,1-3 2777,15 11 1,-6-17-1,11 6 1</inkml:trace>
+  <inkml:trace contextRef="#ctx0" brushRef="#br1" timeOffset="26873">10367 4234 23189,'-23'-10'-2993,"-16"1"2843,19 4-118,-19 2 746,8 16 1031,3 5-892,8 19-1106,9 4-594,5-5 690,6 10-694,19-20-229,-15 6-422,29-10-112,-14-7 233,14-3 1649,-1-9 861,-1-26 688,-7-15-298,-5-4 465,-7-12-1068,-6 26-777,-5-1-212,-1 29-617,0 15-931,0 26-763,20-4 218,-15 2 394,29-11 1903,-30-2 0,29-1 0,-10-3 0</inkml:trace>
+  <inkml:trace contextRef="#ctx0" brushRef="#br1" timeOffset="27246">10717 4327 21840,'-17'21'-327,"4"3"-735,13 22-1559,0-11 1049,0 1 524,17-11-19,-12-1 186,13-3-726,-5-2 101,-10-4 76,20-1 1809,-16-7-261,3-16 1414,2-28-642,-8 1-574,2 3 1,0 0 257,2-1 5,3-23 234,-2 28-651,3-11 299,0 28-644,-1-2 1090,5 14 326,-4 0 69,12 14-1180,-10 12-999,6 7-161,-6 5-234,2-8-693,0 0-69,3 0-379,1 0-242,2-5 2652,17 5 0,-9-17 0,14 2 0</inkml:trace>
+  <inkml:trace contextRef="#ctx0" brushRef="#br1" timeOffset="27661">11480 4284 23099,'-36'-5'-995,"16"21"1982,4 7-1911,16 21-1300,0-5 592,0-8 620,18-13 340,-13 1-1383,29-17 2210,-12 8-1140,18-10 1628,-4-15 1818,-4-8-148,-10-20-921,-10 7-118,-6-11-481,-6 21-2430,0-10 870,0 17-740,-16 5-620,13 24 1037,3 38 118,4 0 426,13-12 0,0 1-330,-13 12 707,32 2-110,-31 0-39,19-16 0,2-1 51,-8 16-510,2-12 1,1-2 451,1 1 288,-6 12-130,-5-30-621,-5 4-162,-6-17 777,0 0-1334,-20-5 1960,-9 0 0,-13-17 1,0-3-1</inkml:trace>
+  <inkml:trace contextRef="#ctx0" brushRef="#br1" timeOffset="27879">10838 3603 22110,'34'-23'1308,"-1"4"-616,-2 5 98,-5 4-80,-5 5-720,-4 2-257,-9 18-2852,-1 12 2891,-7 10 1,-27 10 0,-8-8-1</inkml:trace>
+  <inkml:trace contextRef="#ctx0" brushRef="#br1" timeOffset="28958">7082 2785 21750,'13'18'-6705,"5"15"3538,-16-4 2569,19 33-713,-11-21 982,4 1 1,1 2-250,5 14 387,-8-17 0,2 1-838,4 7 0,-1 0 843,-3-11 0,0 2 218,3 7 0,1 4 1,0-3-312,-1-2 0,0 0 300,5 17 0,1-1-103,-5-15 0,0-3 99,0 4 1,-1 1-96,2 1 1,0 0 99,-1 2 1,1 1-11,0 2 1,0 1 41,0-1 1,1 4-57,-2-4 1,0 4 0,-1-2 60,-3-13 0,0-1 0,0 3-29,3 7 1,0 5-1,1-1 1,-3-4 12,-1-9 0,-1-3 1,0 1-20,4 11 0,1 1 0,0-4 26,1 2 1,0-3-124,2-3 0,-1 0-95,1-3 1,0 0-25,0-3 0,1-1-155,-1-2 1,0-1-195,1-1 0,1-1 590,-2-2 0,1-1 0,0-2 0,1 0 0,-1-1 0,0-1 0</inkml:trace>
+  <inkml:trace contextRef="#ctx0" brushRef="#br1" timeOffset="31431">8923 5945 22110,'-7'-1'-1120,"1"-2"-191,6-1-1206,30-1 4144,-7-3-952,14 0 0,4-1 55,15-8-1360,0-2 1,1 0 730,-19 5 0,-1 0 0,15-6 1,-2 0-1,-13 6 0,-1-1 1</inkml:trace>
+  <inkml:trace contextRef="#ctx0" brushRef="#br1" timeOffset="31945">8948 5619 22920,'-1'27'-5755,"16"-12"3716,-11 16 420,26-13 1930,-27 19-1089,28-3 387,-27 5-68,30 7-1353,-20 2 1277,16 6 116,-15-11 1,-2 1-158,-1-9 0,-1 2 445,3 28 0,-2 0 1,-4-24-1,-2-1 0,1 12 1,0 1-1</inkml:trace>
+  <inkml:trace contextRef="#ctx0" brushRef="#br1" timeOffset="32291">10063 5470 24808,'0'-4'-6655,"-18"1"7874,2 2-30,-18 0-523,20 24-673,-24 13 478,22 13-694,-1-20 1,-2 0-272,-2 22 1358,2 5-1490,2 6 4,9-30 0,0 1-66,3 1 0,1 1-521,-2 14 1,2 0-10,2-12 0,1 0 230,0 9 0,-1-1 715,2 9 1,0-6 0,0-5 0</inkml:trace>
+  <inkml:trace contextRef="#ctx0" brushRef="#br1" timeOffset="32657">10452 5791 24359,'0'-6'-6206,"-17"0"6511,-9 2 835,-17 18 842,-4 8-603,0 20-1218,13-7-64,5 4-330,20-1 684,2-6-962,7 20-940,26-22-942,9 17-89,15-24 2056,-6-7 0,1-3-64,5-5 561,-2-2 0,-2-3 928,-5-3 196,16-15 813,-31 12-216,2-23-396,-21 13-2349,-1-10-91,-6 1-1991,-20-1 2731,-4 3 0,0 3 0,5 4 0</inkml:trace>
+  <inkml:trace contextRef="#ctx0" brushRef="#br1" timeOffset="33013">10527 5962 22380,'-10'16'-1505,"19"7"-3701,-5 12 3570,13 3-132,0-3 854,-12 3 576,27 6 84,-28 1-664,10-11 0,1 1-760,0 17 1799,-2-9 0,0 0-446,1 4 552,-9-4 1,-2 1 295,-3-4-280,-11-4 0,0-2 697,6-6-428,-37 12 931,16-23-18,-11 0-32,3-12-850,10-3 1,12-2-1,2 0 1</inkml:trace>
+  <inkml:trace contextRef="#ctx0" brushRef="#br1" timeOffset="33257">11113 5867 24269,'0'12'-6296,"0"7"4078,0 25 1153,0-6-113,0 1 33,0-10-149,0-2-193,18-3 1065,-13-2 1,25-4 0,-14-2-1</inkml:trace>
+  <inkml:trace contextRef="#ctx0" brushRef="#br1" timeOffset="33413">11102 5559 23189,'-11'-9'-1098,"9"18"0,-9 10 0,11 17 1</inkml:trace>
+  <inkml:trace contextRef="#ctx0" brushRef="#br1" timeOffset="33824">11718 5916 23549,'-19'5'3146,"14"1"-4200,-35 4 1864,12 0 59,-18 11-385,11-6-79,15 5-840,0-4 591,17 1-1908,-13 0 2028,14 1-2320,-2-1 230,4 1-785,22 5 135,-16-9-275,36 5 1308,-13-14 2274,19-1-921,-9-21 2223,-4 13-801,-14-32-210,2 12 898,-6-10 38,-4-3-2260,-8 13-587,-5 1-643,0 27-843,0 12 421,19 28 128,-14-9-238,28 2 578,-29-15-769,26 0 1480,-9-2-287,18-9 1551,-9-2-251,-2-9 0,-10 0 0,-2 0 0</inkml:trace>
+  <inkml:trace contextRef="#ctx0" brushRef="#br1" timeOffset="34124">12085 5995 23009,'0'6'-5935,"0"6"3806,16 20 4,-13-4 1379,13-7 422,-8-10-56,-2-19 1481,7-15-1671,-6 3 1197,-1-19-391,0 23 1001,4-25-482,-1 26 974,7-11-324,-6 23-530,3-5 1,-4 8 94,3 15-1437,0-11 817,10 45-1492,-4-28-150,-2 11 1,1 3-1810,6 2 2525,10 13 0,-8-16 1,2 1-1</inkml:trace>
+  <inkml:trace contextRef="#ctx0" brushRef="#br1" timeOffset="34442">13282 5451 26068,'-16'0'60,"6"14"-1003,6 9-1170,4 9 248,20 20-333,-3-14 656,6 13-35,6-13-965,-26-1-151,30-2-578,-16 13 1156,3-14 1949,2 8 0,-19-18 1,6-1-1</inkml:trace>
+  <inkml:trace contextRef="#ctx0" brushRef="#br1" timeOffset="34581">13142 5889 23639,'-6'-23'-8398,"4"1"6503,-4 3 112,6-2 1536,21 2 1636,-16-1-1822,40 1 1642,-25 4-1801,24 1 1235,-8 5 0,2 0 1,2 2-1</inkml:trace>
+  <inkml:trace contextRef="#ctx0" brushRef="#br1" timeOffset="34861">13787 5734 23459,'-24'5'2672,"-14"0"-2430,33 3-1719,-25 5 2605,16-5-474,-8 14-893,9-8 170,5 8-984,8-6-852,0 1-37,0 8 1046,17-6-1405,-13 6-145,31-5 1403,-9-4 2,19 1 1288,-8-11 944,4-1 109,-16-5-153,-5-20-175,-10-1-1086,-10-20-129,-20 6 0,-2 2 0,-19 4 0</inkml:trace>
+  <inkml:trace contextRef="#ctx0" brushRef="#br1" timeOffset="35391">14112 5765 22920,'0'17'-6116,"0"-2"3987,0-4 1065,0 1 515,0 7 124,0-2 121,0 7 76,12-7-1717,-9 0 1675,10-1 99,-13-2 171,0-2-90,10-3-178,-8 0-431,14-5 1728,-12-1-368,5-3 1295,-3-17-1140,0 13 1133,0-30-1513,2 30 1675,1-37-1015,-1 25-1164,0-20 376,1 15-1146,-2-4 1113,2 7-904,-5 3 969,1 9-1151,-2 6 2189,2 0-652,0 0 430,5 13-2190,-2-9 1310,10 21-1398,-7-9 242,7-1-181,-5 11-1132,-1-23 1630,1 20-2192,2-14 3320,-4 4-2013,4-3 1971,-8-7 652,-1 1-1059,-4-14 59,-2-2 1,0-1 0,0 4-1</inkml:trace>
+  <inkml:trace contextRef="#ctx0" brushRef="#br1" timeOffset="35663">13662 5470 24898,'-5'-8'-8387,"1"1"5872,1 0 719,1 2 678,1-2 619,1 3 694,20-1 506,6 3-1562,20 0 1294,-3 15 1,-11-10-1,-4 9 1</inkml:trace>
+  <inkml:trace contextRef="#ctx0" brushRef="#br1" timeOffset="35824">13903 5317 23279,'0'-17'-6295,"23"2"9166,-17-1-3758,36 2 2778,-37 1-3648,48-1 1005,-30 7 873,28 0 0,-20 7 0,0 0 0</inkml:trace>
+  <inkml:trace contextRef="#ctx0" brushRef="#br1" timeOffset="36175">15305 5251 25168,'-26'-7'-2223,"3"-1"1175,6 6 1345,3-2-301,8 25-905,0 12-12,6 13 15,17 6-1375,-13-6 1134,27 0-372,-27 4-287,27-3-236,-27 0 789,11-16 0,2-1-252,-1 14 1368,-3-11 1,0-1 0,2 0 0,-8 5 0</inkml:trace>
+  <inkml:trace contextRef="#ctx0" brushRef="#br1" timeOffset="36293">15212 5732 22650,'-7'-26'-8444,"5"0"6103,-4-11 453,26 8 2456,9-16 1,12 21 0,0-4 0</inkml:trace>
+  <inkml:trace contextRef="#ctx0" brushRef="#br1" timeOffset="36813">15818 5521 24089,'-23'9'3326,"18"6"-6576,-38-7 4100,39 8-2532,-34-2 2828,33 0-1897,-31 12 1289,20-5-887,-4 18-918,9-14 1501,11 8-2186,0-11 1280,0-2-1701,0-1 1689,25-2-980,-19-4-370,44-4 1618,-16-3 555,14-3 1163,12-16 711,-24 9-223,7-24 138,-18 24-529,-5-27 340,-4 26-405,-8-28-1854,-3 14-153,-5-8-1340,0 2 133,-17 12 338,13 18 990,6 8-1002,19 5-273,3 3 1558,9-19 1217,-13 5-56,9-7 795,-3 0-477,-15-15-1349,4 0 2358,-14-15-2239,5 6 213,-6 2-1590,0 6 504,0 23-793,0 6-360,18 5 176,-14 12-938,28-26 2817,-14 27 0,0-17 0,-3 14 1</inkml:trace>
+  <inkml:trace contextRef="#ctx0" brushRef="#br1" timeOffset="36991">16262 5272 24359,'-11'-13'-6861,"8"2"3638,-8 2 3079,3 3-2063,6 2 1897,-5 16 0,25 9 0,4 16 1</inkml:trace>
+  <inkml:trace contextRef="#ctx0" brushRef="#br1" timeOffset="37157">16233 6225 24449,'0'4'-2429,"0"-16"1,0 9-1,0-12 1</inkml:trace>
+  <inkml:trace contextRef="#ctx0" brushRef="#br1" timeOffset="37383">17005 5291 25978,'-38'0'-204,"14"11"1,11 5-1,13 11 1</inkml:trace>
+  <inkml:trace contextRef="#ctx0" brushRef="#br1" timeOffset="37525">17187 5748 23549,'0'8'-6385,"0"-1"3806,0-3 166,0-2 2253,0 1 0,0-2 1,0 0-1</inkml:trace>
+  <inkml:trace contextRef="#ctx0" brushRef="#br1" timeOffset="38324">17793 4951 23369,'0'-18'-5576,"10"3"6635,-8 4-1753,8 2 2693,-10 4-3188,0 21 276,0 11 229,0 13-174,8-7 1,0 1 375,-4 12-292,4-11 1,1 0-584,5 17-1503,-10 2 1736,24-1-185,-21-18 0,-2 1 1195,10 17 0,2 9 0,-9-22 0</inkml:trace>
+  <inkml:trace contextRef="#ctx0" brushRef="#br1" timeOffset="38624">17750 5551 22830,'-14'-31'-9012,"6"2"6303,2-6 1761,6 7 910,26-24 1253,-19 20-676,20 12 0,4 0 1051,-6-6-1593,30 3 2923,-12 2-208,19 1-178,-15 9-1549,-10 6 0,-1 1-120,2 3-320,17 18-1532,-28 6-279,4-2-628,-15 17-981,-2-23 623,-2 8-125,-1 3-29,-2-12 1113,-1 11-246,-3-13 542,-2-7 132,0-22 2093,-1 12-502,3-34-1041,3 4 380,1-11 132,3-5 1,-3 13 0,1-1 0</inkml:trace>
+  <inkml:trace contextRef="#ctx0" brushRef="#br1" timeOffset="38957">18803 5454 23279,'7'-14'-2882,"0"10"5243,3-25-4067,-2 7 731,4-19 145,-5 7 6,-2-9 61,-4 18-714,-1-5 624,0 11-1347,0 4 1533,-18 2 327,14 5-669,-30 3 2046,31 19-621,-23 8 1130,24 22-1440,-8-8 311,33 4-1319,-17-12-1649,37 11 2772,-11-11 0,11 7 1,4-15-1</inkml:trace>
+  <inkml:trace contextRef="#ctx0" brushRef="#br1" timeOffset="39295">19318 5218 22020,'0'34'-6385,"0"4"4256,17 0-150,-12-7 1479,12-3 91,-5-12 353,-10 1 108,18-8-556,-18 3 500,10-12 1780,-7 3-404,4-24 55,3-7 72,-3-12-402,6 2 507,-4 8-1213,2 0 1111,-2 3-1911,7-6 1327,-8 18-80,9-10-104,-9 23 1110,4-6-169,-3 22-2237,0-11 1061,-2 30-1641,-1-28 445,-2 37 611,3-10 1,-4 12 0,2-1 0</inkml:trace>
+  <inkml:trace contextRef="#ctx0" brushRef="#br1" timeOffset="39508">18687 4891 23279,'0'-27'-6385,"0"1"4166,29 2 4680,10-6-967,16 13-1680,-18 6 1,-1 3 339,11 3 1,13 3 0,-18 2 0</inkml:trace>
+  <inkml:trace contextRef="#ctx0" brushRef="#br1" timeOffset="39947">20393 5272 24179,'18'-21'-795,"4"-28"-1016,0 27 1824,-3-10 0,-1-2-464,5-2 413,-3 3 1,0 0-28,1-4 83,-7-13-625,-7 5-181,-5 13 184,6-15-452,-8 26-15,-15-4-441,11 39 948,-11 13 194,15 19-484,0-10 0,0 0-364,0 12 570,9-14 0,-1-1-1425,-3 16 1959,12-2 1,-7 1 0,3-3-1</inkml:trace>
+  <inkml:trace contextRef="#ctx0" brushRef="#br1" timeOffset="40107">20450 5546 23999,'-10'-18'-8196,"2"-1"4978,27-22 4607,-14 11-1841,41-2 1366,-21 8-1304,27 2 770,-6-1 1,2 1 0,4 0 0</inkml:trace>
+  <inkml:trace contextRef="#ctx0" brushRef="#br1" timeOffset="40624">21467 5114 25168,'0'-13'-6385,"-14"4"5414,11 25 385,-10 13 979,13 12-1263,0 3 338,0-8-24,16 2-1710,-12 16 2120,12-15-984,-5 21 392,-8-31-118,8 10 313,-11-22 363,0-2-90,0-9 850,0-20-614,-14-26 71,-4-4-161,9 4 1,0-2-305,-16-8 425,22 4 0,3-3 8,-10-11-69,9 20 0,2 1 13,-1-14 51,20 5 1336,-15 4-509,32-1 1026,-16 15-104,16 4 132,-4 19 449,-14 21-2012,6-10 868,-22 33-2021,16-7 252,-14 9-896,3 12-34,-5-23-940,-3 11-1458,-21-19 3132,2 5 1021,-20-17 1,21 0-1,3-8 1</inkml:trace>
+  <inkml:trace contextRef="#ctx0" brushRef="#br1" timeOffset="41191">21902 4425 22650,'6'26'-7264,"2"27"5038,-2-32 730,6 44 858,-3-29 57,10 26 28,-8-24 214,6 10-1914,-4-17 1915,0 0-71,0-4 372,5 6-93,-7-11 32,8 5 371,-11-16-78,3-1 344,-7-7 202,2-2 857,-3-1 406,2 0 101,-1 0 40,3-17-1061,3-2 163,-1-2-543,7-7-208,-5 15-355,1-4-421,-5 8-3,0 9 283,0 0 1258,3 0-609,-1 0 91,5 19-1963,-4 3-733,8 21 128,-7-10-146,15 3 3,-12-12-320,15-7 1141,-14-7-85,12-10 3061,-11-15 286,9-8 180,-13-9-732,2-3-253,-8 7-106,-1 0-961,-2 1-319,-1 1-1249,-1 5 219,0-1-424,-1 29 813,0 8-31,0 20 243,14 14-474,-10-16-1320,27 20 404,-28-24 1720,24 4 1,-24-15 0,8-2 0</inkml:trace>
+  <inkml:trace contextRef="#ctx0" brushRef="#br1" timeOffset="41345">22518 4495 23819,'-7'-16'-8925,"5"3"9237,-5 4 1,7 25-1,0 8 1</inkml:trace>
+  <inkml:trace contextRef="#ctx0" brushRef="#br1" timeOffset="41647">22860 4987 23009,'9'0'270,"-2"-13"-1847,-1 9 2934,-1-24-3197,0 25 2505,0-41-1968,-2 27 390,0-35-593,-3 26 506,0-17 29,-17 21-1213,12-6 1388,-13 14-659,18 3 1207,-11 2 216,8 23 334,-8 11 446,11 13-658,0 23-18,0-22-284,8-4 0,0 0-1343,-4 3-711,25 19 2114,-8-30 0,-3 2 0,-1-14 1</inkml:trace>
+  <inkml:trace contextRef="#ctx0" brushRef="#br1" timeOffset="42007">23130 4831 22830,'0'7'-6476,"0"4"4438,16 6 1037,-12 11-94,25-9 1318,-27 14-768,21-15 759,-21 3-1779,15-19 2902,-12 7-1761,5-9 2078,-2 0 130,-2-17-1558,4-8 795,-4-9-760,7-2 850,-5 7-1736,3-1 1901,-2 1-2277,3-8 116,-2 14 1235,2-6-388,-4 21 1302,3 1 50,-2 7-340,1 21-2270,3 6 95,-3 12-544,8 12-483,-6-18-1413,3 20 3144,-7-25 0,-1 6 0,-4-15 1</inkml:trace>
+  <inkml:trace contextRef="#ctx0" brushRef="#br1" timeOffset="42195">22903 4287 23819,'0'-33'-6386,"0"3"4258,18 3 3371,-13 4-1758,32 3 2436,-32 2-2301,40 6 1041,-27 5-801,32 5 1,-22 23 0,6 5 0</inkml:trace>
+  <inkml:trace contextRef="#ctx0" brushRef="#br1" timeOffset="42724">24115 5018 23099,'47'-47'-231,"-11"10"86,0-5-188,-12 10 36,6-22-318,-10 12 274,-6 6 0,-3-2-381,-4-7-578,3-14 101,-7 18-21,1-3 198,-3 2 5,-1 0 109,0 1 302,0 5-59,0-11 278,0 17 48,0-6 316,0 25-159,0 23 114,0 7 68,0 44 90,0-14-90,0 1 0,0 1 7,0-17 0,0 1-78,6 24 1,4 0-107,-3-25 1,3-1-857,9 19 0,2-3-733,9 1 1730,-12-19 0,1-3 0,10 1 0,2-3 0</inkml:trace>
+  <inkml:trace contextRef="#ctx0" brushRef="#br1" timeOffset="43075">24837 4761 23099,'-41'0'450,"3"20"969,4 4-1271,16 11-1426,0-1 382,17-9-772,-6 1 848,7 0-776,0-3-91,19-1-520,-14-2-202,34-3 2002,-34-4-1333,39-6 2712,-16 0-383,12-7 977,1-16 762,-16-7-623,0-21-39,-12 10-1509,-7-11 890,-6 19-2237,0-15-71,0 22-305,-14 2-908,10 5 398,-10 28 2373,14-1-1254,15 30-1368,-11-1 2259,31-9 0,-15 0 0,20-11 0</inkml:trace>
+  <inkml:trace contextRef="#ctx0" brushRef="#br1" timeOffset="43591">25177 4794 22380,'0'39'-6386,"17"-18"3915,-12 15 1013,13-21 1419,-6 15-1322,-9-9 867,20-3 703,-12-1-2012,2-1 1655,0-8 849,-12 2-805,8-9 1248,-8-12-264,5-8 26,-4-19-1080,4-3 858,0 6-239,2 1-469,-2 13 824,3 1-1408,-2 3 1205,5 4 278,-2 5 689,4 3 390,-7 5-564,5 19-2259,-7 1-164,3 3-479,-2 8 386,1-15-961,0 11 224,-2-12-906,1-7 992,-2-8 3694,1 0 165,-2 0 298,0-15-1604,1-5 276,1 1 61,7-15 147,-4 13-395,3-2-1503,-3-6-371,1 26 1745,0-15-152,5 16 876,-4-4 72,11 21-1838,-8-11 573,7 32-1719,-5-20 984,0 20-2643,0-8 1078,1 0-1213,-1-1-628,0-1 3663,-3-3 0,-1-2 0,-1-3 1</inkml:trace>
+  <inkml:trace contextRef="#ctx0" brushRef="#br1" timeOffset="43790">25002 4340 24808,'20'-15'576,"-14"1"-3916,39 3 4014,-21 3-1214,9 5 1,4 2 539,14-2 0,-15 3 0,-1 0 1,18 0-1</inkml:trace>
+  <inkml:trace contextRef="#ctx0" brushRef="#br1" timeOffset="44124">26425 4687 23639,'2'48'-5783,"-1"-8"3646,-1-1 1442,0-12 115,16 2-468,-12-3 632,11-2 417,-1 7-1878,0-11 2125,13 5-43,-9-17 586,5-1 235,-8-7 797,3-22-1025,-4 16 800,-1-44-1525,-1 26-779,-4-9 1,-1-4 741,1-8 0,0-16 0,-5 20 1</inkml:trace>
+  <inkml:trace contextRef="#ctx0" brushRef="#br1" timeOffset="44291">26817 4589 22920,'8'15'-8162,"-6"8"6237,12-8 1327,-8 5-696,2 4 310,-2-12 312,-4 6 530,0-7-2732,-2 1 2043,3 1 772,-2-2 0,2 1 0,0-1 0</inkml:trace>
+  <inkml:trace contextRef="#ctx0" brushRef="#br1" timeOffset="44463">26738 4113 23999,'-12'-16'-7774,"1"2"7059,5 4 1,2 4 0,4 4 0</inkml:trace>
+  <inkml:trace contextRef="#ctx0" brushRef="#br1" timeOffset="44841">27153 4752 21750,'6'14'-8394,"1"-1"6087,2-2 1853,8 0 1323,-5-6 232,8-1 100,-7-4 89,0 0-1020,1-16 1749,3-1 53,-4-2-773,4-23-1097,-12 23-489,1-24-616,-6 16-603,0-1-1,0 0 350,-20-2-438,16 1 272,-16 1 537,3-5-332,13 11 427,-25-6 974,26 17-721,-9 23 1978,12 11-1181,0 28-29,16-10-736,5 12 210,10-22 555,1 6-816,12-6 922,-8-11-1852,-3-4 1,1-2 592,7-1 1086,12 1 1,-18-9 0,-1-1 0</inkml:trace>
+  <inkml:trace contextRef="#ctx0" brushRef="#br1" timeOffset="45261">27803 4620 23459,'-13'-14'-4982,"10"-1"2180,-11 0 2245,14-2 624,0 0-22,-9-6-1201,0 7 669,-12-4-1153,5 10 2220,-6 2 744,6 5 0,1 3 285,3 0-13,3 15 121,1-11 765,3 29-2234,3-8-697,22 20-1286,-15-9-269,40-2-10,-25-14-439,22-2 1024,-7-2 1176,16-2 1,-12-7 0,12-2 0</inkml:trace>
+  <inkml:trace contextRef="#ctx0" brushRef="#br1" timeOffset="45579">27088 4109 24629,'17'-34'-2810,"-1"9"2369,19-10 1012,-20 21 71,22-4-80,-24 14-1034,19 0-1269,-16 4 1403,-3 21 0,1-16 0,-2 15 0</inkml:trace>
+  <inkml:trace contextRef="#ctx0" brushRef="#br1" timeOffset="45724">27557 5317 22380,'0'5'-2789,"0"-1"1,0-3 0</inkml:trace>
+  <inkml:trace contextRef="#ctx0" brushRef="#br1" timeOffset="52275">2315 7793 23549,'0'-4'-5846,"0"-1"3988,0 3 973,0-1 517,0 0 122,0 0 391,0-2-193,0 1-1368,0-3 1416,0 2 90,-15-2 611,11 3-635,-10-2 629,1 2 338,0 0 58,-16 2 187,8 2 81,-2 0 58,6 0-1061,-13 20 1398,7 1-1438,-18 24-6,18-13-383,5-1 0,3-1-568,4 0-207,-1 29-362,40-34-212,10 14-447,16-19 1474,-7 0 0,-2 1-172,6-2 519,-6 0 0,-1 0 115,-7-2 733,14 11-122,-28-14-66,0 7-442,-16-10-1394,-3 4-37,-4 0 501,-27-1 1855,-2 13-802,-17-10-230,-5 12 301,19-12 295,-9 1-33,16-7 1,0-6 0,3-1 0</inkml:trace>
+  <inkml:trace contextRef="#ctx0" brushRef="#br1" timeOffset="52699">2973 8006 22200,'26'-12'3372,"-3"0"-2568,-11-1-1759,1-4 269,-7 4 235,-1-12-1107,-25 13 1057,-2-6-277,-40 14 797,27 18 1,-1 4-15,-26 6 287,31 1 1,3 5-112,-4 20 127,12-7-198,11-8 0,2 0-568,3 8-446,11-9 1,7-2-2943,21 1 3444,12 9 0,10-24 0,-10 1 0</inkml:trace>
+  <inkml:trace contextRef="#ctx0" brushRef="#br1" timeOffset="53023">3703 7783 23819,'-40'29'920,"5"2"-1164,16 14-1637,8 4 319,11-22 241,20 2 0,7 0 855,-3-6 0,2-1 166,2 2 0,0-2-89,3-1 0,-5-4-878,-11-2-241,5 4 622,-31-1 1179,5-6-265,-53 3 833,36-11-488,-32-1 0,26-2 1,1-1-1</inkml:trace>
+  <inkml:trace contextRef="#ctx0" brushRef="#br1" timeOffset="53390">4228 7783 23549,'-41'0'540,"2"0"-630,5 0 0,17 15 308,-12 3 273,26 16-2233,-7-6 991,10 1-845,29-6 268,-22 3-802,46 0 1244,-31 0 176,6-8 1,1 0-658,5 10 2011,15 16-840,-34-19 74,13 12-360,-26-20 735,9 5-1755,-11-9 1245,-21 0 1426,16-1-1662,-57 4 1736,37-5-1129,-12-3 1,-1-1 393,3-2 0,-7-1 1,18-4-1</inkml:trace>
+  <inkml:trace contextRef="#ctx0" brushRef="#br1" timeOffset="53607">4707 7955 23819,'4'20'-7265,"-1"7"5067,0-8 934,0 7 704,2 15 233,-2-13-486,5 21-143,-2-18-2793,7 14 3687,-3-19 1,4-1 0,-3-11-1</inkml:trace>
+  <inkml:trace contextRef="#ctx0" brushRef="#br1" timeOffset="53791">4708 7625 24089,'-13'-12'-5409,"0"2"3891,5 3 608,1 3-127,2 2 367,3 18 549,18 3 1,9 2 0,17-5 0</inkml:trace>
+  <inkml:trace contextRef="#ctx0" brushRef="#br1" timeOffset="54091">5288 7898 25708,'-23'14'2179,"-12"-11"-2245,31 29-2962,-12-15 3116,6 17-1142,7 8-376,-7-10 824,10 23-1080,20-24-762,-14 8 222,36-16 2529,-23-3-1926,19-5 1822,-8-3 453,0-7-387,23-2 945,-21-22 678,17-5 359,-37-13-3073,0-10 866,-12 18-1538,0-11 5,-27 13-492,21 1 1622,-46 2 0,46 2 0,-20 2 1</inkml:trace>
+  <inkml:trace contextRef="#ctx0" brushRef="#br1" timeOffset="54457">5682 7885 23639,'5'20'-7457,"2"7"4638,-2-10 1355,5 17 464,-4-6 603,6 11-81,-5-17 77,5 13-1797,-7-18 1680,5 5 45,-6-15 266,7-1 1139,-3-25 160,11-11 698,-4-12-1136,-2 9 1,1-1 893,4-11 103,3-13 378,-2 8-686,-8 17-459,6-4-671,-11 22-444,3 7 1113,-5 20-2263,1-8 830,-2 35-756,2-17-796,-1 23-2411,6 19 4283,-3-13 1,-1-16 0,1 0 0,4 15 0</inkml:trace>
+  <inkml:trace contextRef="#ctx0" brushRef="#br1" timeOffset="54759">6813 8193 25798,'40'-2'399,"4"1"-535,-7 1-402,3 0-415,-6 0-161,1 0-531,3 0 1640,2 0 0,1 0 1,2 0-1</inkml:trace>
+  <inkml:trace contextRef="#ctx0" brushRef="#br1" timeOffset="55093">7810 7691 25798,'-39'-4'-333,"-4"1"221,6 22 1455,2-15-1025,11 33-1158,6-32 1477,1 33-1580,9-10-149,2 10-7,27 24-1085,9-29 1094,-4 0 0,2-1-910,17-1 1630,-16-4 0,-3-1-1564,3 4 1160,6 16 52,-16-20 211,-8 17 394,-3-23-1575,-29 11 1576,15-19 565,-35 0 0,17-8 1,-19-2-1</inkml:trace>
+  <inkml:trace contextRef="#ctx0" brushRef="#br1" timeOffset="55340">8468 7428 25168,'0'34'-5216,"0"6"3088,0-7 973,0 9 517,0-6 302,17 5-777,-12 3 798,12 2-2331,-3 2 1727,-7-14 1,0 1-194,9 17-289,-5-10 1,-3 0 1311,-6 1 0,12 11 0,-7-22 0</inkml:trace>
+  <inkml:trace contextRef="#ctx0" brushRef="#br1" timeOffset="55462">8355 7909 23279,'0'-30'-6835,"24"1"7361,24-16 1,2 17-1,-19 8 1,-1 0-1</inkml:trace>
+  <inkml:trace contextRef="#ctx0" brushRef="#br1" timeOffset="55875">9457 7820 24269,'0'6'-5486,"-28"2"9118,20-1-2917,-44 1 431,30 2 28,-21 1-457,10 2-82,-13 9-128,14-6 1629,-17 16-2370,27-15 463,2 9-1004,6-11-217,12 3-1008,-6-3 526,8 1-900,0-3 239,18-3 2,4 2 844,21-7 1344,1 0-110,-18-26 1616,9 16-572,-32-34-817,19 23 1860,-19-28-2387,5 17 801,-8-16-1547,0 22 86,-18-7-746,13 17-762,-12 22 3928,17 21-3617,20 7 684,-11-5 0,4-3-1004,33-1 2615,-12 12 0,0-24 1,-9-3-1</inkml:trace>
+  <inkml:trace contextRef="#ctx0" brushRef="#br1" timeOffset="56240">9507 7806 25168,'0'34'-5396,"16"-14"2844,-12 13 1098,24-4 1042,-25 9-43,19 16-505,-11-21 174,8 22-1469,-4-24 1736,-4 12 232,-4-24 56,-2 2-338,-1-15 273,0-1 888,-2-5 1552,1-24-1406,5-9 141,-2-15-996,3 11 1,0 1 335,3-14-229,-5 16 1,1 0-177,5-13-671,-2 5 599,0 4 1,0 4 0,0 3 0</inkml:trace>
+  <inkml:trace contextRef="#ctx0" brushRef="#br1" timeOffset="56595">10220 7516 23909,'-13'-1'1048,"3"0"-1197,10 15-2549,0 5 1061,0 25 486,17-8-423,-12 6 924,29 10-1454,-30-12 798,9-4 0,1 1-1195,-1 8 1224,0 10 107,7-18-155,-14-3 704,8 0 530,-3 6 1,-4-12 0,2 5 0</inkml:trace>
+  <inkml:trace contextRef="#ctx0" brushRef="#br1" timeOffset="56758">10187 7955 23819,'-17'-40'-9368,"6"8"6425,7-14 2401,4 21 163,18-2 1350,-14 13-1410,31 4 998,-31 2-485,36 4 0,-22 1 0,20 3 1</inkml:trace>
+  <inkml:trace contextRef="#ctx0" brushRef="#br1" timeOffset="57045">11012 7449 24629,'-25'0'1349,"0"15"169,-19 3-320,20 21-2336,-19 9 724,32-4-1023,0 7 341,9-9-758,2 4-372,0 1-524,0 0-445,25 1 573,-19-6 2391,24-16 1,5-1 0,-9 6 0,4-13 0,-1 1 0</inkml:trace>
+  <inkml:trace contextRef="#ctx0" brushRef="#br1" timeOffset="57307">11535 7297 22920,'0'-12'-4677,"15"3"8822,-11 4-3553,21 3 379,-15 25-3614,10 11 1067,-10 14 993,-3-13 0,-1 1-1348,-3 12 1863,0-3 0,0 1-2098,-1 8 989,-9-7 1,-2 0-1339,5 7 2748,-9-10 0,-4-1 0,-7 5 0,5-18 0,-1 1 0</inkml:trace>
+  <inkml:trace contextRef="#ctx0" brushRef="#br1" timeOffset="57919">12490 7560 24898,'0'14'-3193,"0"-2"1</inkml:trace>
+  <inkml:trace contextRef="#ctx0" brushRef="#br1" timeOffset="58064">12623 7993 25258,'0'5'-2219,"0"-1"1,0-3 0</inkml:trace>
+  <inkml:trace contextRef="#ctx0" brushRef="#br1" timeOffset="58873">13597 7490 23189,'-23'20'732,"-18"-15"-174,23 34-2204,-21-22 3031,14 18-1939,9-6 36,-7 14 111,19-9-906,21 24-885,7-31 1474,11-8 1,3-3 751,10-9-463,-5-2 1,0-4 879,7-19 183,-11 7 0,-3-1 618,0-11 531,2-16 284,-26 15-1563,-6-10-1594,-23-4-1288,12 18 761,-22 5 0,-6 1-1188,6-2 2504,-37-1 1,27 7 0,1 2 0</inkml:trace>
+  <inkml:trace contextRef="#ctx0" brushRef="#br1" timeOffset="59090">13677 7227 23639,'9'-4'3822,"0"1"-3102,5 2-1010,-2 1-290,9 0 193,-8 14-1786,4-10 1251,-3 25-1937,-6-8-1938,2 15 1351,-8-5 2961,0-3 0,-2-10 0,0-2 0</inkml:trace>
+  <inkml:trace contextRef="#ctx0" brushRef="#br1" timeOffset="59229">13918 7121 22830,'32'0'-90,"-8"21"-4117,-4-16 3147,-7 40 383,-2-23 0,-1 22 0,0-9 0</inkml:trace>
+  <inkml:trace contextRef="#ctx0" brushRef="#br1" timeOffset="59673">14882 7530 25438,'-55'0'810,"13"17"1038,3-13-1914,14 27-777,-1-7 706,13 7-1257,1 14 49,12-17-1241,25 22-23,10-28 1347,-3-7 1,3-4-31,19-6 1348,-15-14 0,-1-1 339,6 5 363,-8-21 1,-2-5 465,0 7-385,-13-4 0,-3-4 739,3-26-1347,-11 9-233,-4 5 0,-3-2-1176,-3-10 231,-11 18 0,-2 1-1284,7-15 1272,-39 4-88,40 2 382,-16 20 1,-3 1 29,1-8 659,-14-4-92,17 42 2316,10 17-823,10 18-1204,0 11-402,19-5-211,-10-10 1,0 1-824,14 22-149,-7-9 0,-1-1-744,4 7 1564,-9-20 1,2-2 0,17 9 0,-12-2 0</inkml:trace>
+  <inkml:trace contextRef="#ctx0" brushRef="#br1" timeOffset="59841">14805 7389 23459,'0'-24'-6385,"0"0"4166,21-2 3332,8 6-586,28-3 117,-7 13-466,5 1 1,-13 7 0,1 2 0</inkml:trace>
+  <inkml:trace contextRef="#ctx0" brushRef="#br1" timeOffset="60579">15605 7377 24179,'-26'4'2200,"-9"1"-1595,31 1-1925,-25 8 2195,12 0-778,0 17-953,-5-7 582,20 23-1329,-6-16 3,26 11-1143,-14-14 1302,33 0-512,-32-3-336,38-2 1848,-24-3-1176,22-2 2071,4 0-217,-11-8 930,23-1 416,-27-7-460,9-2 843,-19-15-766,-1 12 771,-6-30-1772,-3 9 118,-5-10-459,-2-11-561,-3 21-323,-20-14-1266,15 21-96,-29-4 915,30 32 1161,9 5-1373,18 25 768,22-3 577,3-4 444,-7-15 797,10-8 737,-21-11-456,15 0-280,-20-17 1597,1 13-97,-11-32-1763,-4 20 194,-4-16-402,-3-1-739,-2 9-628,-2-6-571,0 9-2,0 4-322,0 22 1042,0 8-238,15 27-245,3-20 791,17 17 186,-8-18 369,1 2-198,5 3 206,-8-17 681,9 5 27,-12-7 1006,0-5-49,3-15 317,-6 12-540,1-25-455,-7 9-247,-5 1-355,0-14-483,-6 13-486,0-9-756,-2 3-630,0 11 19,1 4 800,2 5 1000,2 5 795,6 19-1953,-2 5-165,4 12-257,-2-3 12,2-6-142,3-1-35,1-2 1498,1 0 0,0-3 1,1 0-1</inkml:trace>
+  <inkml:trace contextRef="#ctx0" brushRef="#br1" timeOffset="60890">15642 7146 24718,'27'-18'2539,"13"1"-957,-36 0-4212,34 0 3867,-14-3-1104,10 6 553,8-1-296,-19 12-1417,20-1-230,-22 22-3001,15 0 4128,-19 3 1,1 7 0,-7-9 0</inkml:trace>
+  <inkml:trace contextRef="#ctx0" brushRef="#br1" timeOffset="61031">16173 6954 25528,'21'-16'727,"1"1"-277,15-4-358,-6 7-2233,29-3 2103,-20 11 0,15 0 1,-14 4-1</inkml:trace>
+  <inkml:trace contextRef="#ctx0" brushRef="#br1" timeOffset="62774">17625 7778 24988,'18'-5'3905,"5"-11"-3665,22-24-645,-21 2-738,20 0 1119,-39 7-1521,32 3 1855,-34-1-1466,23 3 578,-24 0-1078,8 2 857,-10 2-224,0-5-644,0 9 1337,0-4-1469,0 15 1539,0 0-1218,-14 7 2757,11 21-1726,-19 12 754,19 0 0,4 3-776,-10 24-74,8-11 0,2 0-298,-1 14 346,0-20 1,0 1-586,0 19-1639,0 1 2642,0 0 1,0-2-1,0-1 1</inkml:trace>
+  <inkml:trace contextRef="#ctx0" brushRef="#br1" timeOffset="62929">17618 8343 23189,'0'-24'-5935,"19"0"7146,-15-1-1074,22 3 0,4 1 1037,-4-13-1367,2 10 0,3 0 297,0-1 0,-2 1 1,20-14-1,-17 13 1,0 0-1</inkml:trace>
+  <inkml:trace contextRef="#ctx0" brushRef="#br1" timeOffset="63124">18350 7562 25888,'16'35'-9831,"-1"3"5212,4-7 1006,4 12 3402,-8-16 1,-1 9 0,-1-12 0</inkml:trace>
+  <inkml:trace contextRef="#ctx0" brushRef="#br1" timeOffset="63307">18350 7062 23549,'0'-5'-8274,"0"18"7283,16-9 0,-13 34 0,13-11 0</inkml:trace>
+  <inkml:trace contextRef="#ctx0" brushRef="#br1" timeOffset="63679">18827 7838 26068,'6'0'360,"2"0"-360,1-18-1459,12-5 1549,-1-10-498,13-2 593,-5 4-184,3-5-328,-1-3 144,-9 8 1,-2-1-450,9-18 663,-10 5 0,-3-1-913,-5-11 494,-3-3 1,-6-1-595,-19-2 252,9 8 0,-1 2-1015,-12 14 93,-5-10 753,24 31-332,-10 24 2816,13 24-1783,0 16 58,7-6 0,4 0-14,9 16-391,-2-3 0,0 0 224,-8-21 1,0 0-135,6 10 0,-1-1-884,-2 16-2168,15-4 1997,-10-3 1423,-3-18 0,1-1 0,6 14 0,9 10 0</inkml:trace>
+  <inkml:trace contextRef="#ctx0" brushRef="#br1" timeOffset="63974">19412 7776 25168,'6'0'180,"3"0"-90,-2-10-937,7 7 1522,0-15-1005,16 3 1057,-4-2-443,24-14 121,-17 12-21,9-9 41,-15 10 288,-1-2-911,-3-1 460,-1-8-1160,-9 5 86,-3-16-525,-7 16 257,-24-14-1079,16 17-113,-30-1 1436,18 11-234,-11 5 1037,12 23 512,6 11-614,10 11-1756,11-1 0,1 1 3,-6 8 1911,17-10 1,4 0 0,-2 6 0,26-2 0</inkml:trace>
+  <inkml:trace contextRef="#ctx0" brushRef="#br1" timeOffset="64859">20765 7382 24179,'0'-4'-3777,"0"20"1648,0 9 1065,0 13 515,0 4 124,16-5-641,-12 6 748,13 1-1963,-3 7 1751,-11-1 392,22 1-212,-17-15 0,-2 1 46,7 16-7,-2-19 1,-2-1 378,-7 7 9,13-8 112,-13-4-45,9-8-845,-8-5 444,2-5-207,-2-29 1219,-20 16 946,13-50-1834,-25 26 865,25-29-733,-22 7-20,22-5 33,-7 12 0,-2-1 89,7 10 0,1-2-379,-2-24 1,1 0-433,1 24 0,2 1 717,0-21 1,6 1-54,18-5 375,-20 23 0,4 3 590,23 7 0,3 3 1335,-7-7-1038,8 12 1,3 4 1435,-2 5-253,14 3-379,-30 26-2029,10 16-752,-25 3-788,8 20-1260,-36-31 1061,-1 17-586,-4-24 2362,-13 4 1,21-14 0,-21 0 0</inkml:trace>
+  <inkml:trace contextRef="#ctx0" brushRef="#br1" timeOffset="65257">21430 6872 25078,'7'0'1440,"4"20"-7153,-3-15 4984,6 53-1284,-5-31 1398,0 10 1,-1 4-260,4 5 130,4 15-1353,-3-16-65,2 1 2113,-1-3-1269,8 15 884,-4-16-115,10 17 178,-10-29 86,9 5 381,-13-22 418,5-2 485,0-10 1086,-3-18 144,13-11 16,-11-10-1448,-2 7 0,0 0 713,2-9-553,-1-1 0,-1 0-241,-1 2-33,9-22-1229,-15 47 99,3-1 262,-5 15 960,3 0-184,-3 18-2091,2-13 1154,0 37-1972,7-9 82,-3 13-1617,10 14-1,-9-23 3300,5 8 0,-4-16 0,1-3 0</inkml:trace>
+  <inkml:trace contextRef="#ctx0" brushRef="#br1" timeOffset="65689">22387 7307 23999,'1'38'-6148,"0"-4"4038,4 7 698,-1-5 691,8 24-89,-3-13 564,0-6 1,2 0-349,0 6-394,-2-10 1,0-1 583,0 1 82,2 6 47,-4-13 42,-3-13-143,0 1 173,-24-35 833,15-14-567,-32-15 283,32-7-35,-13 8-636,6-6 309,10-6 182,-5 11 1,2-1-85,3 11 1,4-3 277,9-25 1,2 0 24,-11 26 0,2 2 131,19-11 1,3 2 941,-6-9 425,23 10 323,-10 7-132,14 6 208,-12 16-88,20 3-448,-30 27-1750,11 14-678,-26 9-379,-3 4 1,-4 2-1713,-20 6 834,5 3 1,-4-1 1764,-21-1 0,16-19 1,0 0-1,-12 12 1</inkml:trace>
+  <inkml:trace contextRef="#ctx0" brushRef="#br1" timeOffset="66734">23775 7101 23999,'-18'-5'-1539,"14"0"-1996,-28 3 4927,11 1-662,-22 0-112,9 1-143,-2 17 427,15-13-428,1 25-430,3-11 1619,8 12-2595,2-5-110,33-1-422,-20-7-828,49 2 1447,-12 10-513,14-6 1372,-20-3 1,-2 2-906,5 3 910,-11-3 1,-2 0-191,-2 1 334,-3 5 437,-8-15-1439,-12-1 14,5-3-89,-7-2 131,0-2-275,0-2-905,-23-1 1981,-2-1 1234,-18-1-1234,21-14 1,7-7 0,15-15 0</inkml:trace>
+  <inkml:trace contextRef="#ctx0" brushRef="#br1" timeOffset="67277">24150 7233 22650,'20'0'539,"-1"0"-269,4 14-2386,-9-11 2149,3 12-1147,-9-15 1853,-1 0-139,-2 8-2408,-2-6 742,1 6-1128,-1-8 3297,1 0-623,6-14 420,-2-2-1611,5-2 406,0-12 1509,-3 7-920,1-15 833,-8 7-2412,-1 0-211,-2 15 364,0-3 347,0 11 493,0 1-510,-13 4 1391,10 22-489,-10 7 754,29 29-1469,-12-10 389,11-12 1,0 0-387,-11 6 436,24 9-260,-9-4-1446,6-15 1463,9 14-621,-14-24 1540,17 4 414,-13-17 430,19 0 107,-16-6 602,8-23 603,-2-4-839,-8-13-550,11-11-96,-18 21-628,2-11-631,-12 14-694,-2 1-259,-4 1-501,-1 3-36,-1 2 597,0 5-127,0-1 422,0 7-187,0 21 329,0 11-171,0 13 218,0-2-72,20-9-1131,1 9 160,2-11 1640,20 5 0,-28-10 0,22-1 0</inkml:trace>
+  <inkml:trace contextRef="#ctx0" brushRef="#br1" timeOffset="67587">24695 6837 23459,'12'-8'2322,"-9"2"-4143,20-2 3664,-20 4-2153,17 0 836,-11 2-133,9 2-751,-6 20-3474,-3 16 785,-5 4 1070,-4 6-1243,0-20 2942,0-1 0,0-4 1,0 0-1</inkml:trace>
+  <inkml:trace contextRef="#ctx0" brushRef="#br1" timeOffset="67774">24972 6489 24359,'24'-30'206,"-1"5"-22,17 2 1174,-16 13-1101,20 19-1603,-29-5-238,3 43-1972,-10-21-551,-3 30 3741,-2-6 1,0 2 0,0 4-1</inkml:trace>
+  <inkml:trace contextRef="#ctx0" brushRef="#br1" timeOffset="68473">26130 7014 26338,'-47'-7'-725,"1"3"714,11 1 54,-19 3 203,14 0-81,-23 20 634,32 6-692,-4 26-547,24-10-736,5 13 1,6-24-464,27 6-455,13-11 862,16-13 552,-15-5 1,-1-3 222,14-5 682,-10-9 0,-1-2 1165,5 6-406,-19-15 0,-2-2 540,2 3 577,-5-21-1534,-7 6-825,-8-23-873,-4 8 214,-13 3 0,-1-2-1525,5-14 1267,-12 5 1,-3-1 190,7 21 0,0 0-65,1-12 0,0-2 571,-8 0 1,1 1-234,10 13 0,1 0 344,-3-20 1,0 4 64,-1 1 1082,11-9-454,0 58 297,0 6-128,17 36-530,-7-7 0,1 2-58,10 24-35,-5-1 0,-1 2 47,-5-22 0,0 0 88,-2 13 1,3 0-305,5-16 0,-1-1-49,-9 0 0,-1 0-146,20 28 86,-11-22 1,0 0 36,7 15-144,-1-17 0,2-2 83,4-1-700,17 5 1524,-14-25 323,13-3 476,-16-9 990,2-2 271,-10-16 107,-3 12 338,-2-25-1082,0 12-291,-5 1-897,1-7-906,-7 21 757,1-16-1726,-2 15 946,2-5-1270,-1 23 490,1-12-399,0 27 247,2-26 754,2 32-2357,6-9 1562,-1 8-2222,11-3 1775,-8-10 1892,7-11 0,-9-1 0,1-10 0</inkml:trace>
+  <inkml:trace contextRef="#ctx0" brushRef="#br1" timeOffset="68659">26915 6936 22740,'0'-11'-6476,"0"0"4438,0 23 973,0 9 427,0 24 212,15-8-709,-11 0 815,24-13-1147,-25-1 376,24 3 665,-6-13 646,13 7 1,-5-18-1,-3 5 1</inkml:trace>
+  <inkml:trace contextRef="#ctx0" brushRef="#br1" timeOffset="68990">27230 6929 23909,'7'0'630,"1"0"-630,-2 0 0,3 18-3482,-1 2 960,3 17 908,-4-18 241,8 12-1018,-6-16-7,4 3 22,0 0 293,-1-16 3974,10 5-147,-8-7 418,11-16 551,-11-5-940,3 2 242,-5-17-866,-3 31 1422,-1-31-3179,1 32 2149,-5-26-2590,2 27 1807,-3-17-1509,0 19 1433,1-5-276,0 6-894,0 0 1649,5 17-4037,0 4 1571,6 1-2108,10 24 1856,-5-30-2311,24 31 3690,-14-33 0,11 12 1,-10-13-1</inkml:trace>
+  <inkml:trace contextRef="#ctx0" brushRef="#br1" timeOffset="69324">28055 6924 23369,'-19'14'599,"5"5"-1643,14 8-2240,21-9 1783,2-1 632,22-15 1762,-7 7-442,-5-9 89,-15-18-245,-2 13 1865,-15-26-1257,5 15-414,-6-10-555,0 4-1437,0 32 444,0 16-628,0 19 185,17 3-1548,-12-8 2296,12 2-1278,-3-1 133,-11 1-1234,11 15 3096,-14-15 0,0 11 0,0-19 0</inkml:trace>
+  <inkml:trace contextRef="#ctx0" brushRef="#br1" timeOffset="69461">27180 7602 22650,'0'0'0</inkml:trace>
+  <inkml:trace contextRef="#ctx0" brushRef="#br1" timeOffset="69909">29213 6725 26428,'-42'-13'-2392,"11"5"1728,-16-3 473,23 8 316,-7 0 136,15 3 109,1 0-182,4 16-669,3 0 299,5 16-799,20-17 110,-13 15-874,54-11 1278,-32 7-1071,34-1 773,1-1 603,-15-6 126,-7-2 0,1-1 876,2 3-29,17 11 194,-34-11-1568,-3 3 532,-16-7-1401,-6 0 567,0-1-261,-21 4 1545,-12-5-1385,-27 6-70,11-12 1383,-5 2 1,35-7-1,0-1 1</inkml:trace>
+  <inkml:trace contextRef="#ctx0" brushRef="#br1" timeOffset="70257">29978 6684 23639,'-24'-4'-1233,"-8"1"1473,19 1-269,-2 21 219,6 2-880,27 21-1475,-14-11 1560,21-8 0,4-3-442,-8 5 49,29 8 110,-24-12 137,-2 0-226,-11-1-100,10-2 2034,-20-2-753,9-1-656,-12 0 521,0-6-1410,-17 2 1299,-9-9-686,-20 1 1096,0-18 1,19 12 0,8-12 0</inkml:trace>
+  <inkml:trace contextRef="#ctx0" brushRef="#br1" timeOffset="70477">30450 6817 25348,'0'21'-6295,"0"1"4166,0-7 975,0 1 335,0 0 34,0-2-868,0 9 435,0-7 819,0 9 0,0-14 0,0 3 0</inkml:trace>
+  <inkml:trace contextRef="#ctx0" brushRef="#br1" timeOffset="70648">30363 6409 24898,'0'-11'-6745,"0"4"6808,0 1 0,21 19 0,5 5 0</inkml:trace>
+  <inkml:trace contextRef="#ctx0" brushRef="#br1" timeOffset="71065">30763 6905 23549,'12'6'-3283,"0"-2"2847,0-4 1264,3 0 56,-5-20-727,2 0 116,-8-19-799,-1 6-536,-21 1-145,13 5 590,-27 6-305,16 10-233,-11 6 1618,11 19 24,-4-10 1324,17 28-1930,-14-27 2674,12 47-2049,-3-31-259,5 41-504,3-34-984,0 10-491,21-16-84,-16-3 1163,30-3-694,-16-1 1456,15-7 343,1-2 674,-10-23 590,2 13 8,-18-32-1747,7 9 1306,-14-9-2946,4-17 1055,-6 23-1558,-18-20-356,13 24-520,-31-3 160,32 14 2833,-15 4 0,6 3 1,-2 1-1</inkml:trace>
+  <inkml:trace contextRef="#ctx0" brushRef="#br1" timeOffset="71490">31248 6731 25078,'5'-10'-1592,"-2"3"808,-1 21-1952,-2 4 1402,-14-1 2413,11 19-1671,-11-9 789,14 9-1973,0 7 937,0-22-73,0 4 520,0-11 471,14-27 194,1-5 881,2-20-1243,7 5 1381,-7-6-381,7 9 685,0-5 189,-1 12-215,-5 5-1399,10 8 747,-14 2 310,10 25-2148,-13-12 313,6 42-1942,-9-28-378,1 27-2526,-2-6 4983,-1-10 1,1 8-1,-1-13 1</inkml:trace>
+  <inkml:trace contextRef="#ctx0" brushRef="#br1" timeOffset="71632">32137 7027 26607,'24'12'-8646,"-2"-9"8600,-6 9 1,-5-12 0,-4 0 0</inkml:trace>
+  <inkml:trace contextRef="#ctx0" brushRef="#br1" timeOffset="74121">1425 10290 25348,'16'16'-6092,"-4"-3"3604,-4 15 90,4 1 565,4-4 767,3 8 18,-1-4 154,2 0-1815,3 1 1374,2-2 1378,2-1 0,2-3 1,1-1-1</inkml:trace>
+  <inkml:trace contextRef="#ctx0" brushRef="#br1" timeOffset="74331">1765 10321 23639,'-22'0'-90,"1"17"408,-16 12 20,9 9-1143,-17 8 416,22-15 1,1 1-695,-12 21 148,7-6 0,3 1 760,0 8 1,11-22-1,2 0 1,0 8-1</inkml:trace>
+  <inkml:trace contextRef="#ctx0" brushRef="#br1" timeOffset="74690">2405 10322 24359,'-42'0'719,"1"18"989,1 1-953,6 20-1547,14-12 28,7 1-248,13-10-492,0 0-93,0 3-89,0-7-494,18 2 116,5-9 1758,19-2 456,-1-17 1157,-4-7 814,-17-18-1141,-8 6-310,-12-8-2289,-20 9-640,-2-2 2115,-20 10 0,20 11 0,5 7 0</inkml:trace>
+  <inkml:trace contextRef="#ctx0" brushRef="#br1" timeOffset="75063">3022 10219 23999,'-21'-17'-4221,"0"4"2966,-18 6 2290,8 5-277,14 19-45,6 2-1130,11 17-768,20-2-1000,-14-8 1378,36-8 1005,-23 1-1395,19-16 1123,-8 13-932,0-15 1470,-2 4 705,0-5 746,-4 0 151,-1-22-1304,-4 16 1429,-3-37-2477,1 17 1153,-10-9-1621,4 3 23,-11 9-834,2 6-312,-2 24-592,17 30-1412,-13 8 3627,11-9 0,3-1 0,4-2 0,17 10 0</inkml:trace>
+  <inkml:trace contextRef="#ctx0" brushRef="#br1" timeOffset="75257">3175 9520 24269,'-23'18'-214,"0"-13"510,-2 45-2721,-1-24 1116,0 33 1034,2-9 1,3 10-1,2 3 1</inkml:trace>
+  <inkml:trace contextRef="#ctx0" brushRef="#br1" timeOffset="76892">4302 10360 22920,'0'-38'-5487,"0"-5"3449,0 11 1154,0-4 425,10 9 1158,-7-2-756,7 2 693,-10 2-2053,0 2 1687,0 2-180,0 4 0,0 2 0,0 5-619,0 3 442,0 21-633,0 9 810,0 13-630,16 17-583,-12-16-93,12-4 0,2 0 7,-1 7 1070,1-6 0,-1-1 0,0 5 0,-3 12 0</inkml:trace>
+  <inkml:trace contextRef="#ctx0" brushRef="#br1" timeOffset="77073">4332 10723 23549,'25'-17'-563,"33"-1"799,-30-3 1,3 5 0,1 0-1,12-7 1</inkml:trace>
+  <inkml:trace contextRef="#ctx0" brushRef="#br1" timeOffset="77923">5128 10206 24629,'0'55'-5666,"0"-9"3717,0 5 885,0-7 515,0 4 289,6-11 0,1 0-317,-4 21 296,11-9 1,0 0-1774,-10 7 1894,9-11 0,2-1-560,-3 2 107,2 7 195,3-23 59,-16-6 379,10-5-2114,-10-4 2163,2-23 782,-21-16-473,-2-16-515,-3-12-39,-7 2 279,26-6-218,-9 25 1,0-1 136,11-15 0,1-1-30,-4 12 0,-1-2-412,5-21 1,2 2 884,-1-2 177,9 16 0,5 4 888,9 6 318,4-2 84,4 24 1000,-14 5-436,11 20-1664,-3 6-597,-7 19-1598,-8 2-318,-5-7-696,-5-3 273,0-11-1255,0-3 2791,0-1 0,0-3 0,0 0 0</inkml:trace>
+  <inkml:trace contextRef="#ctx0" brushRef="#br1" timeOffset="78144">5718 9739 24898,'7'0'1170,"0"16"-7192,2 10 2975,-2 9 1740,7 19 367,-6-17 446,-1-4 1,0 2-514,1 7-1871,3 14 292,-3-14 2033,-1-2 120,1 1 439,1 15 1,-1-16-1,1 11 1</inkml:trace>
+  <inkml:trace contextRef="#ctx0" brushRef="#br1" timeOffset="78575">5583 10255 23549,'0'-19'-6385,"0"0"4166,19 3 4564,13 3-109,27-4-878,-4 10-776,3 0-226,2 6-316,-12 1 660,-10 8 0,-1 2 504,6-6-1516,-10 10 1,-3 3-1377,3 0 277,4-1 343,-18 12-953,-3-24 1562,-3 21-1485,0-13 952,-5 2-578,0 1 398,-5-10 255,3 5-483,-2-5 1873,11-2-554,-2-3 2041,18 0-575,-8-17 814,19-3 650,-16 0-830,7-16 58,-9 11-331,-7-10-1347,-1-4-865,-11 20 215,-1-6-1285,-3 35-927,-1 6-352,19 28-230,4-9 2685,22 11 1,-11-19-1,2 6 1</inkml:trace>
+  <inkml:trace contextRef="#ctx0" brushRef="#br1" timeOffset="78824">6432 9832 22650,'0'-6'-5396,"18"0"9134,1 4-2720,3 14-2479,-8 4-1078,-14 15-512,0-2 2833,0-4 0,0-11 1,0-6-1</inkml:trace>
+  <inkml:trace contextRef="#ctx0" brushRef="#br1" timeOffset="78974">6625 9342 23279,'23'-12'2974,"8"4"-2211,-8 4-1463,12 24-2485,-17 16-1926,5 13 4587,-8 14 0,0-5 1,-1 4-1</inkml:trace>
+  <inkml:trace contextRef="#ctx0" brushRef="#br1" timeOffset="79657">7632 10019 24449,'-24'0'899,"2"0"-809,3 0-90,3 21-464,1-16 1424,3 39-2268,2-24 703,5 22-748,2-7-67,2-1-584,20 14-492,-15-13 1426,22-9 1,4-2-1273,-5 0 1963,11-9 1,3-3 254,-1-4 902,16-4 394,-20-4 382,0 0 763,-4-19 251,7-3-819,-12-1-359,5-26-1190,-21 30-140,-1-25-716,-8 22-513,0 2-338,0 3-319,-14 2-205,10 26 1077,-11 6 1295,15 28-1333,19-10 72,4-1 528,1-6-84,26-7 1116,-32-4-577,29-9 284,-10-8-148,-10-16 1889,16-8 497,-22-11-1099,7-13-338,-16 16-895,0-10 502,-7 15-1416,-4 0-764,0 5-535,-1 2-37,0 2 836,0 30 40,0 9 47,0 19 82,0 4 125,18-8-1590,10 13 525,11-13 2034,5 4 1,-5-19-1,2-4 1</inkml:trace>
+  <inkml:trace contextRef="#ctx0" brushRef="#br1" timeOffset="79990">8900 10045 24179,'-16'-5'-1530,"12"-2"-2944,-30 6 6199,14-2-1194,-14 18 1236,15 6-1563,6 18-977,13-6-1004,0-1 451,23-3 1366,7-5-1286,24-5 883,-11-9-729,-3-10 1240,-10 0 814,-4-17 967,-8-6-536,-9-19-494,-9 8-754,0-8-1074,-17 18-580,13-9-251,-24 16 185,25 22 127,11 16-1281,-3 15 1124,37 4 429,-24-8 1192,23 1 0,-10-3 0,3-1 0</inkml:trace>
+  <inkml:trace contextRef="#ctx0" brushRef="#br1" timeOffset="80225">8737 9360 22920,'23'-18'1024,"-18"2"-3403,41 3 4167,-41 4-2540,38 4 1175,-19 1-467,14 25-1721,-17-1-939,-8 24 2232,-13-2 0,0 10 0,0 5 0</inkml:trace>
+  <inkml:trace contextRef="#ctx0" brushRef="#br1" timeOffset="80611">10595 9713 24629,'-58'-4'-251,"1"1"230,3 3-1,3 0 117,7 0 58,4 16 687,10-11-546,7 29-726,12-9-308,4 12-305,7 0-551,24 6-500,10-9 1342,-4-6 1,2 0-1430,20 5 1090,-4 6 352,-17-16 725,-16-4-200,11-2 706,-22-3-473,10-3 203,-14-1-688,-20-4 682,-6 1 724,0-4-1973,-20 0 1340,23-3 1,-6-15 0,12-3 0</inkml:trace>
+  <inkml:trace contextRef="#ctx0" brushRef="#br1" timeOffset="80930">11198 9671 24629,'0'-4'-4767,"-23"0"6049,-8 3-124,-24 0-440,2 1-270,23 14 572,-5 1-138,31 18-2273,-10-7 2293,14 4-2181,29-6-15,-22 2-789,54 0 1294,-34 0-136,10-7 1,2-1-615,8 10 1706,-9-5 0,-2 0-643,3 1 1343,12 12-734,-35-18 391,7 2-1108,-21-6-21,5-4-1132,-34 8 2192,-13-7-954,1 0 1,-3 0 742,7-5 1,0 0 0,-4 2 0,1 0 0,-17 1 0</inkml:trace>
+  <inkml:trace contextRef="#ctx0" brushRef="#br1" timeOffset="81357">12243 9785 25888,'0'-6'-1619,"0"0"0,0 24 0,0 6 0</inkml:trace>
+  <inkml:trace contextRef="#ctx0" brushRef="#br1" timeOffset="81471">12325 10209 25978,'0'6'-6386,"0"-1"5854,0-1 0,0-3 0,0 0 0</inkml:trace>
+  <inkml:trace contextRef="#ctx0" brushRef="#br1" timeOffset="84311">14168 9690 22920,'-9'-13'-5778,"6"-1"3767,-6 3 1711,9 0 191,-6 0-965,5 2 680,-4 1 622,5 4-1914,0 23 2051,0 12-35,0 13-196,14 5-778,-10-8 1093,10 0-707,-2 3-43,-10-3-290,21 13-369,-6-16-812,13 15 795,-4-30 1053,2-3-609,7-14 2008,-6-6 98,27-22 871,-22-10-1263,-4 4 0,-2-4 949,4-19-236,5-3-407,-15 18-565,-6 1-888,-3 3 112,-2-5-1523,-5 12 725,-1-6 776,-3 20-923,-1 21-443,-1 11 210,0 23 161,17-11-517,-13 0 31,30 3 270,-30-11-79,26 10 126,-27-13 177,24-1 145,-16-4 828,21 3 1,-12-10-1,4 2 1</inkml:trace>
+  <inkml:trace contextRef="#ctx0" brushRef="#br1" timeOffset="84740">15033 9595 23819,'17'24'-6554,"-13"11"4324,12-11 1016,-3 8-204,-9 1 1146,18 4-179,-20-9 372,15 18-2210,-15-22 2528,9 14-537,-11-20 537,2 3 248,-2-12-295,0-2-404,0-2 190,3-4 1117,-3-20-874,2-5 484,-2-13-734,0 1 328,16 8 595,-12-1-635,11 1 842,4 3 1,-15 3-581,26 3 1896,-14 5-484,-1 1 32,17 8-1022,-20 1 1073,15 4-1342,-9 17-1848,-1-13 1877,0 31-3957,7-9 763,-4 8-1693,12 17 62,-10-20 3492,4 13 0,-2-16 1,0 1-1</inkml:trace>
+  <inkml:trace contextRef="#ctx0" brushRef="#br1" timeOffset="85362">16067 9578 24629,'-22'-8'-2167,"-14"3"2444,9 0-270,-8 4 421,0 1-141,14 14 339,1-10-119,4 24-1470,2-24 1657,7 41-1964,3-26 87,25 37-1213,-16-26 285,36 19-68,-13-21 274,-2 7 595,13-13-174,-34-2 694,23-2 766,-25 2 440,8-7-222,-11 2-103,0-9 49,-16-2 2071,-8-4-1099,-8-13 131,9-2-1108,30-8 736,17 4 1022,25 5 246,-12 7-187,5-4-1943,3 3 320,-11-4 1072,25-7 343,-29 5-72,10-4-1221,-17 3-650,-5-1-75,-1-2-248,-2-9-433,-5 5-278,0-16-589,-8 14 203,-1-11-363,-1 15 401,-17-1-86,13 9-474,-13 1 1656,17 4 190,-13-2 376,10 25 27,-10 7 814,13 16-922,18 18-597,1-20 471,2-4 1,1 0-904,9 2 547,-8-8 1,2-2-763,6-1 272,11-5-147,-10-9 1464,1-9 0,0 3 0,1-4 1</inkml:trace>
+  <inkml:trace contextRef="#ctx0" brushRef="#br1" timeOffset="85610">16863 9370 22920,'0'-14'-5307,"0"3"3898,-13-1 1193,10 5-256,-11 0 1259,14 19-1049,15 5-90,-11 13-1581,11-3 1509,2 14-240,0-10 307,-2 0 1,-1 0 40,0 9-1309,4 11 434,-10-13 267,7-2-246,-5-1 495,1-1-151,-3-5-254,1-2 1117,-2 2 1,-3-10 0,0 1 0</inkml:trace>
+  <inkml:trace contextRef="#ctx0" brushRef="#br1" timeOffset="85773">16668 9639 23909,'0'-22'-5936,"28"1"8732,11-7-1659,17 7-2122,-4 3 1,1 1 1108,7 4 1,-12 3 0,-2 2 0,2 6 0</inkml:trace>
+  <inkml:trace contextRef="#ctx0" brushRef="#br1" timeOffset="85948">17785 9808 25168,'0'-27'-3193,"0"2"1</inkml:trace>
+  <inkml:trace contextRef="#ctx0" brushRef="#br1" timeOffset="87041">18205 9138 24089,'-24'-12'-2324,"1"1"1711,7-1-224,-2 2 944,-7-3-90,7 5 305,-17 2 147,14 5-527,-23 38 1068,16-9-644,8 2 0,0 3 311,-8 16-179,3 9-471,12-28 0,2 3-169,0 17 0,2 2-281,3-13 1,2 1-69,0 4 0,2 5 0,0-5-555,1-5 0,2 0-414,9 25 1,6-1-62,-3-28 0,4-2-119,5 10 1,4-2 1491,-3-15 1,2-4 0,20 20 0,3-6 0</inkml:trace>
+  <inkml:trace contextRef="#ctx0" brushRef="#br1" timeOffset="93198">19322 9262 23639,'0'-14'-4227,"0"0"2549,0 2 1063,0 0 246,0 0 214,0 1 210,0-5-103,-11 6-1467,8-3 1190,-8 5 657,-3 4 731,3 2 27,-15 2 596,3 0-90,-5 19 195,-5-14-85,-3 35 46,-2-21-1295,11 8 1,1 2-187,-11 8-278,10-3 1,4 0-594,4 5-304,3 26-504,15-31-475,23 10-104,11-9 101,14-8 1470,-13-8 1,1-1-358,13 2 611,-9-5 1,1-2 236,5 3 385,9 2 793,-17-1 239,-15-6-719,1 10-1203,-18-9-893,-1 10 232,-27-6 1937,17 4-1336,-46-3 1817,27 1-557,-30 1-412,24-6 1,0-1 730,-20 5-875,10-5 1,1-1 352,-5-3 0,-6 1 0,20-7 0</inkml:trace>
+  <inkml:trace contextRef="#ctx0" brushRef="#br1" timeOffset="93507">19107 8987 23819,'0'-6'-3777,"-10"3"4458,8 16-1475,9-9 886,-3 33-1179,13-16 527,-7 11 0,-1 5-303,9 15-200,-7-14 1,0 1 642,2 26-276,-5-30 0,-2 1 401,-4 1 1,0 3-122,8 19 1,1 0 279,-5-13 0,-1 1-70,0 5 0,1 5 0,-1-5-315,2-6 1,-1 1-542,-1 3 0,0 4 0,-1-4 1104,0-8 1,-1-1-1,3 12 1,0-1 0,-1-19-1,0 1 1</inkml:trace>
+  <inkml:trace contextRef="#ctx0" brushRef="#br1" timeOffset="93894">20125 10006 25888,'0'-9'-4947,"0"1"3089,0-2 1153,18-4 2880,-14 3-2071,52-10 1746,-30 8-1032,35-4-997,-18 4 1435,5 2-1008,3 1 11,1 2-252,2 2 0,0 2 0,1 1 0</inkml:trace>
+  <inkml:trace contextRef="#ctx0" brushRef="#br1" timeOffset="94691">21712 9033 23819,'0'-5'-4766,"0"-1"3177,0 0 794,-18-1 1809,13 0-2097,-24-2 1907,26 3-1825,-26 0 587,4 3 1780,-10 1 126,-13 18 735,18-12-1231,-7 30 1001,8-6-1494,13 10 767,-1 16-1966,14-20-504,22 23-912,17-25 34,10 9 1306,-6-22 1,1-2 7,14 9 361,-7-5 0,-1-1 411,8 1 120,-16-4 1,-2 0 473,2 2 822,-2 3-1039,-20-6-620,-9-1-1179,-3 1 101,-5 6 497,-23-6 1836,-10 12 7,-11-14-646,11-4 1,1 0 617,-7-1-27,-15-1 564,20-6-508,0-2-781,5 0-520,3 0 0,4-20 0,1-5 1</inkml:trace>
+  <inkml:trace contextRef="#ctx0" brushRef="#br1" timeOffset="95191">22352 9056 24629,'0'7'-3328,"12"11"404,-9 13 1664,10 8-79,-13-5 1210,10 4-510,-8 5 438,8 3-1163,-6-11 0,-1 1 452,6 20 460,-4-21 1,2 2-895,0-2 0,0-2 136,-1 17 1151,3 10 0,-6-26 0,0-2 0</inkml:trace>
+  <inkml:trace contextRef="#ctx0" brushRef="#br1" timeOffset="95392">22445 9110 23099,'22'-18'540,"12"0"521,-8-5-1279,7 4 261,21-7-266,-18 12 260,26-2 0,-25 10 1,9 2-1</inkml:trace>
+  <inkml:trace contextRef="#ctx0" brushRef="#br1" timeOffset="95608">22500 9545 22920,'46'0'-90,"2"-17"1594,-6 13-2279,-8-25-521,-3 26 1353,-13-10 0,1 13 0,-4 0 0</inkml:trace>
+  <inkml:trace contextRef="#ctx0" brushRef="#br1" timeOffset="95790">22525 9960 23099,'22'-17'796,"13"12"-383,-31-26-3363,35 27 2436,-7-26-447,11 10 1166,2-8 1,-11 9-1,0 11 1</inkml:trace>
+  <inkml:trace contextRef="#ctx0" brushRef="#br1" timeOffset="96228">23867 8885 24449,'0'-12'-5396,"-20"0"5223,-3 3 609,-27 4 672,12 1-406,-5 4 17,9 23 135,-2-17-634,1 38 991,3-27 78,-2 31-1214,15-19-497,1 21-419,15-21-775,24 17-1111,12-19 979,13 7 1248,-11-16 1,0-1-903,12 8 1107,-9-2 1,0-1-307,6 4 548,-13-3 1,-2 1 54,1 5 306,-13 4 0,-3 2-1184,-4 0 552,-4 1 0,-7-1-171,-24-4 1233,-10 17-68,-13-26 28,15-6 0,1-2 574,-9-1-55,-13-1-589,7-8 0,11-2 0,-6-2 0</inkml:trace>
+  <inkml:trace contextRef="#ctx0" brushRef="#br1" timeOffset="96677">24722 8804 24359,'-23'-16'-4144,"-12"-1"3893,30 4-2523,-35 1 3602,21 1-747,-33 5 789,19 1-362,-11 4-473,3 19 1874,11-14-947,-11 48 791,26-29-1992,5 10 1,3 3-34,4 3-1052,1 14-3,23-16-650,-15 0-573,41-3 577,-10 12 417,15-12 1298,-18-7 0,0-1 194,9 3 193,-10-4 1,-1-1 117,2 3 452,6 10-267,-19-12-923,-4-1 450,-3-1-771,-5-1-91,-3-1-41,-3 0 609,-3 1 161,-17-7 1571,-11 5 628,-10-13-48,-6 0-201,5-6-230,-4 0-455,-4-1-821,12 1 0,0-2 0,-18-13 1,19 6-1,0-1 0</inkml:trace>
+  <inkml:trace contextRef="#ctx0" brushRef="#br1" timeOffset="97024">25248 8719 23099,'23'-2'488,"-1"0"-80,2 0-355,2-1 77,3 0-595,1-1-230,1 1-458,1-1 1182,0 2 1,-1 1 0,-1 0 0</inkml:trace>
+  <inkml:trace contextRef="#ctx0" brushRef="#br1" timeOffset="97226">25372 8913 23459,'-6'12'-2495,"2"2"931,4 1-479,0 3 817,0 0 409,0 13 143,15-5-442,-11 11-1674,12 2 386,-1-6 2149,-11 21 0,12-20 1,-16 10-1</inkml:trace>
+  <inkml:trace contextRef="#ctx0" brushRef="#br1" timeOffset="97414">25192 9843 24449,'39'0'180,"-4"-15"1662,0 12-2011,-1-29-733,26 7 863,-11-9-1174,-4 12 0,2 1 1300,7-2 1,-18 8 0,0 2-1,14-4 1</inkml:trace>
+  <inkml:trace contextRef="#ctx0" brushRef="#br1" timeOffset="97906">26593 8758 23909,'-51'-25'-2142,"10"10"2283,6 6 0,-1 2 386,-7 4 319,-14 2-282,19 21 422,1-15-422,2 39-857,1-21 1485,5 24-1097,4-8-221,4 24-673,10-15 217,4-7 0,6-1-1394,22 4 803,-4-10 1,4-3-540,31 0 1017,-23-12 1,3-2 592,9-7 1,0-3 172,24 4 288,-7-7 1,0-1 850,6-3-396,-12-5 0,-3-5 1634,-2-6-1580,-14 0 0,-5-3-225,-10-17-1777,-20-6-690,-20 8 652,-9 13 1,-5 2-756,-18-2 1800,16 8 0,0 1 0,-21-1 0,1 1 0</inkml:trace>
+  <inkml:trace contextRef="#ctx0" brushRef="#br1" timeOffset="98456">27402 8759 25978,'0'47'-5396,"0"-6"3177,0 6 1155,0-5 425,0 5 214,0 2 273,0-13 0,0 1-76,0 15-571,0-17 1,0-1 798,0 6-90,0-3 0,0-6 0,0-5 180,0-5-449,0-6-811,0-2 1170,0-50-90,0 15 90,0-41 0,0 3 90,0 9-90,0 4 0,0-1 180,0-14 144,6 10 1,1 0 26,-4-7-121,3 24 0,2 1 641,6-15-226,1 21 418,18 2 773,-9 20 221,15 20-1147,-12 11-1066,10 10-11,-9 7-825,2-6-144,-1 3-598,0 2-998,0 0-583,-2-2-175,11 14 3431,-10-17 0,8 7 0,-11-20 1</inkml:trace>
+  <inkml:trace contextRef="#ctx0" brushRef="#br1" timeOffset="98658">28162 8693 25438,'-22'-24'-5184,"5"4"2835,5 4 1002,9 4 100,-19 4 2219,20 21-807,-18 18 683,7 14-1556,2-5 1,-1 2 785,-7 18-777,9-2 0,0 1 188,4-22 1,1 0-213,-2 13 0,1-1 630,2-13 1,0-2 0,0 1 0,0-1 0,0 1-1,1-1 1</inkml:trace>
+  <inkml:trace contextRef="#ctx0" brushRef="#br1" timeOffset="100108">29038 8509 24089,'0'-5'-5216,"0"2"3447,0 0 1154,0 1 247,0-2 122,0 2 122,0-3-14,0 1-1459,-10-2 2227,7 0-1244,-27-1 1640,15 0-267,-29-1 603,15 5-19,-11 0 125,7 2 1,0 1-502,-1 0 1243,1 0-1999,2 13 1231,4-9-1248,-3 9 626,13-1-553,1-9-47,12 20-1669,3-9-44,1 6-193,22-1-333,-1 5 66,5-5 50,7 19-33,-16-11-353,3 24 1242,0-17 657,-17 6 0,-4 2 505,9 5-338,-16-1 0,-6 1 915,-8-1-406,0-6 0,0 1 599,1 6-258,3-16 1,2 0 897,13 10-755,-23-2 330,24 0-1076,-8 9-473,10-14-1552,21 15-542,12-27 2565,27 4 1,-5-18 0,3-1-1</inkml:trace>
+  <inkml:trace contextRef="#ctx0" brushRef="#br1" timeOffset="100490">29417 8554 24718,'0'-4'-5755,"0"1"3716,0 21 885,-11-14 3511,9 32-4024,-15-13 1301,15 16-1472,-5-4-651,27-10 2624,-2-12 0,5-6 1,-9-7-1</inkml:trace>
+  <inkml:trace contextRef="#ctx0" brushRef="#br1" timeOffset="100590">29545 8635 22830,'5'-32'-4140,"-4"3"1826,5 11 1386,-6 0 672,0 31 0,0 8 0,0 31 0</inkml:trace>
+  <inkml:trace contextRef="#ctx0" brushRef="#br1" timeOffset="100944">30428 8429 23909,'0'32'-6925,"-17"-3"7288,12 2-2290,-13-10 2216,4-7-207,11 1 1,-11-9 0,14 8 0</inkml:trace>
+  <inkml:trace contextRef="#ctx0" brushRef="#br1" timeOffset="101090">30515 8421 24359,'7'-9'-683,"-5"18"-4788,6 16 93,-8 24 5181,0-8 0,0 5 0,0-13 0</inkml:trace>
+  <inkml:trace contextRef="#ctx0" brushRef="#br1" timeOffset="101890">30737 8336 24629,'0'-6'-5846,"0"0"3807,0 2 1335,0-2 65,0 2 213,0-1 122,20 1 2049,4 3-1514,24-1 1440,-10 2-74,16 17-606,-18-12 275,9 24-631,-14-25 769,-3 21-3141,-2-22 1619,2 21-1136,-9-12 177,1 9 148,-13-4-1128,-3-4 986,-4-1-333,0 1 1259,0 3-1204,-18 13 2176,14-5-895,-29 25 1160,29-19-335,-19 29 608,21-22-1156,-7 13 42,9 5-341,0-11-587,8-6 1,4 0-264,6 8-59,1-7 0,0 1 76,-2 6 254,-1-15 0,-1-1-159,-12 11 303,29 0 315,-22-1-7,18 14 243,-15-14 18,-2 19 184,-7-30 295,-4 14 97,-22-23 1183,17 3-1139,-40-12 1932,23-3 334,-20-2-545,-5-4-308,12-1-1012,-20-1-278,26-20-3878,-10 2 2222,22-5 193,2-7 0,11 25 1,4-12-1</inkml:trace>
+  <inkml:trace contextRef="#ctx0" brushRef="#br1" timeOffset="102496">31722 8178 23549,'12'-3'2775,"8"1"-2441,-10-1 1054,7 3-1519,-3-2 416,-3 2-217,4 0 73,4 20-1658,-1-15 702,3 38-1324,-4-25 102,1 23-200,4-5 1125,-4-3 0,0 1-936,12 23 1062,-3-1 0,-1 2 668,-9-21 0,-2 0-560,5 12 0,0 3 885,-3 3 0,-1-2-282,-5-13 0,-1 2 370,-1 2 0,0 4 0,-3-4-5,-1-5 0,-3-1 216,-7 24 1,-3 0 52,7-25 0,-3-3 254,-16 11 1,-6 0-46,3 0 0,-1-3 191,-6-9 0,-2-1-355,1 2 0,-2 2 0,3-4 154,1-4 0,-2-2-1137,-18 15 0,-2-4 901,22-17 1,0-3-1,-6 4 1,1-2 0,-11 1-1</inkml:trace>
+  <inkml:trace contextRef="#ctx0" brushRef="#br1" timeOffset="102906">32697 8870 28137,'0'-7'-6296,"0"3"3808,0-4 1154,0 5 1174,0-5 0,0 7 1,0-2-1</inkml:trace>
+  <inkml:trace contextRef="#ctx0" brushRef="#br1" timeOffset="103123">32813 9141 25078,'4'31'-7053,"0"-1"4851,7 17 537,-2-13 691,9 30 327,-6-27 410,-1-3 0,1-1-344,3 6-1658,4 12 1785,0-3-27,-5-12 231,5 19 10,-11-25 139,-1 4-113,-5-6 204,-2-9-1056,-27 6 1752,-8-14-33,-16-1 0,-1-6 0,10-2 0</inkml:trace>
+  <inkml:trace contextRef="#ctx0" brushRef="#br1" timeOffset="104770">12505 11506 21210,'0'0'0</inkml:trace>
+  <inkml:trace contextRef="#ctx0" brushRef="#br1" timeOffset="104958">12490 11923 25348,'0'5'-1349,"0"0"0,0-2 0,0-1 0</inkml:trace>
+  <inkml:trace contextRef="#ctx0" brushRef="#br1" timeOffset="109256">14582 11396 24539,'0'-10'-5127,"-19"3"5439,-2 1 213,-22 3 448,21 19 170,-21-12-409,26 31-1180,-19-17 1023,12 16 619,3-4-854,1-1-128,11 2-1186,-5-2-30,13 0-660,-6 8 1225,26-10-1990,9 16 870,-3-19 470,24 6 456,-29-9 84,23-1 638,-12-2 430,-2 1-196,-2-2 663,-4 0-168,2 8-881,-14-7-798,1 14 114,-12-12-192,0 4 32,-26-5 1255,20 1-1465,-43 0 1814,28-1-760,-20-1 716,10-2 1,3-2-1,0-1 1</inkml:trace>
+  <inkml:trace contextRef="#ctx0" brushRef="#br1" timeOffset="109607">15023 11873 22830,'31'-6'1792,"-2"-1"-1094,0-1-132,0-3 154,-1-4-548,0-2-196,10-15-304,-9 6 816,14-22-670,-23 17-613,2-8 209,-13 0-1150,-5 13 339,-3-15-185,-25 21 613,-4-5-244,-16 15 1329,-7 1 169,18 8 308,-9 1 682,5 18 801,11 6-552,-8 25-646,24-8-525,-1 3-1075,11-11-626,0 2-624,0 0-434,0 0-774,25-1 256,-19-1 702,24-12 1,5-2 2233,-7 10 1,3-12-1,2-2 1,9 3-1</inkml:trace>
+  <inkml:trace contextRef="#ctx0" brushRef="#br1" timeOffset="110092">15908 11603 25708,'-17'-16'-4309,"-11"12"5551,11-22-3869,-16 24 3733,7-9-1033,0 11 700,8 0-125,-1 0-648,-1 0 1414,2 21-1338,0-16 2384,5 36-3270,1-10 669,7 10-1477,21 16-496,-12-22 170,41 8 433,-23-13-22,24-4-89,-8-1 1524,15 6-38,-14-8 479,16 7 772,-36-14-527,11-1 45,-28-8-984,8-2 144,-10-1-1765,-17 1 1632,-9-4 258,-21 1 201,7-2 0,-8-22 1,11-5-1</inkml:trace>
+  <inkml:trace contextRef="#ctx0" brushRef="#br1" timeOffset="110432">16375 11420 25708,'-46'0'270,"20"16"824,-10-12-1015,32 26-2333,-28-27 2713,28 26-2011,-10-9 1393,14 8-1618,0-1 91,0-9-411,22 0 635,7 6 1410,11-6-985,10 15 1269,-18-15-763,5 7 953,-14-8 170,-3-1-90,-10-1-998,6 5 201,-14-6-692,7 10-189,-29-10 2623,-9 12-426,-13-10 582,-1 4-1246,-5-4 930,13-5-746,-15 0 1,33-8 0,0-2-1</inkml:trace>
+  <inkml:trace contextRef="#ctx0" brushRef="#br1" timeOffset="110644">16877 11632 24089,'6'0'1529,"-3"15"-6994,-1 2 3123,-16 20 2546,10-8-642,-11 3 278,15 5-906,0-8-1160,0 7 90,0-11 1779,0-2-105,0 1 108,0 3 1,14-9-1,4 2 1</inkml:trace>
+  <inkml:trace contextRef="#ctx0" brushRef="#br1" timeOffset="110816">16983 11313 23549,'0'13'-2458,"0"8"0,22 23 1,5 6-1</inkml:trace>
+  <inkml:trace contextRef="#ctx0" brushRef="#br1" timeOffset="111123">17440 11586 24539,'-21'-12'-2334,"16"20"2288,-33-3 1584,33 37-3213,-24-5 1994,17 11-687,5-12 1,0-1-264,-2 7-617,9 13 707,0-21-690,23-3-717,-17-6 1100,55 0 194,-39-11 825,11-6 1,1-4 891,-1-2-196,22-22 1316,-25-8-721,3-12 31,-22-2-608,2 9-1263,-12-2-1403,5-15-43,-6 15-1101,-26-19 2455,-4 31 0,-26-4 0,3 14 1</inkml:trace>
+  <inkml:trace contextRef="#ctx0" brushRef="#br1" timeOffset="111507">18080 11603 24359,'0'44'-6116,"0"-9"3988,0 0 1153,0-7 427,0-1 122,0 11 122,0-12-14,0 15-1279,0-22 1687,0 5-359,0-15-91,10-1 687,-8-26-67,16 13 1780,-16-38-1948,22 4 1100,-12-10-749,4 13 0,1 1 820,2-7-467,-2 10 0,0 2 414,2 2 52,6 1-1736,-3 17 2591,-5 8-1495,8 14-763,-11 17-2811,2 27 7,-11-2-322,0 7 2966,-5-11 1,0 2-1,0 1 1</inkml:trace>
+  <inkml:trace contextRef="#ctx0" brushRef="#br1" timeOffset="112477">19140 11885 27687,'35'0'-270,"7"0"-450,-5 0-179,8 0-540,-8 0-270,6 0 1709,-10 0 0,2 0 0,21 0 0,-19 0 0,0 0 0</inkml:trace>
+  <inkml:trace contextRef="#ctx0" brushRef="#br1" timeOffset="112778">20313 11560 25258,'-19'-15'-3495,"14"0"-385,-26 1 4773,28 1-2518,-18-1 1685,12 5-446,-3-1-205,6 21-1381,20-11 1160,-11 23-1397,11-13 1867,-14 10 1,0-11-1,0-1 1</inkml:trace>
+  <inkml:trace contextRef="#ctx0" brushRef="#br1" timeOffset="113324">20427 11527 24089,'0'-16'-4767,"-22"3"4341,17 2-1880,-34 5 3872,13 2-469,-11 3-96,-2 1-129,8 21-573,-3-15 720,9 22 1,2 5-355,-14-9 428,10 12 1,4 4-1348,0-1-50,4 13-596,14-17-408,5-2-767,0-3-233,23 4 651,7-12 180,30 0 1242,-11-16 466,-13-15 0,-1-2 1285,8 5-510,-13-18 0,-2-5 520,8 3 394,0-30-559,-7 11-607,-2-5-693,-4-2-926,-4-5 45,-9 16 0,-2-2-1109,2-22 1284,-5 9 1,-2 1-987,-2-8 1310,-1 22 1,0 2-358,0-11-27,-20 3-689,15 8 586,-30-6 197,31 19 899,-12-2-890,16 44 662,0 34 36,0 10-83,-1-5 0,2 1 83,8-24 1,-1 0-798,-7 28 1,3 0 1,11-24 0,1-1 52,-14 12 0,-1 1-901,15-2 1,0-3 1428,-5 22 1,3-25 0,1-1-1,2 10 1</inkml:trace>
+  <inkml:trace contextRef="#ctx0" brushRef="#br1" timeOffset="113657">20927 11863 23819,'7'0'90,"3"0"-90,1 0 0,3 0 90,4 0-180,2-15 373,3 11 2,3-25-435,3 25 394,12-37-407,-11 23 696,5-22-642,-16 15-123,-5-1-493,-4 0 27,-5 0-159,-2 1-390,-3-1 623,-18-8-1765,13 11 717,-28-10 579,11 21 749,-17 1 802,3 27 1345,6 13-520,15 10-1570,6 21 118,9-22-800,9-3 0,1 0-912,-6 4 1757,17-13 0,5-2 0,1 4 0,26-1 1</inkml:trace>
+  <inkml:trace contextRef="#ctx0" brushRef="#br1" timeOffset="113960">21960 11353 24359,'-25'-10'-2342,"-16"4"2478,12 3 80,-17 2 229,19 22 241,-4-16-111,28 37-1921,-10-24 935,13 20-487,0 10-491,24-11-344,-18 13-66,40-15 345,-40 0-789,40 0 2420,-40-1-1694,37-1 1928,-37-2-645,28 10 666,-31-13-340,10 13-1055,-13-22 1280,-17 3 602,12-11 192,-37-2 306,21-2 684,-23-3-1015,8-1-288,-1-3-242,-12 0 1,14 0 0,-9 0 0</inkml:trace>
+  <inkml:trace contextRef="#ctx0" brushRef="#br1" timeOffset="114376">22578 11014 25528,'-2'-10'-6054,"1"2"3619,0 0 1569,1 3 1074,-1 1-788,1 24 518,0 13 59,-1 14-834,1-7 1,0 1 1197,0 15-454,0-3 1,0 1-269,0 11 146,-2-23 0,4 0-173,15 13-1098,-13-3 384,13-3-1003,-2 12 807,-11-19 1168,21 16 1,-22-30-1,8 4 1</inkml:trace>
+  <inkml:trace contextRef="#ctx0" brushRef="#br1" timeOffset="114690">22462 11704 22650,'0'-41'-6476,"0"8"4258,0-21 1064,25 23 2436,10-17-490,16 24 957,0-3-541,-9 16-721,-1 5 1408,1 4-94,13 17-722,-13-12-1128,-10 19 1,-2 3-499,1-5-837,7 28-720,-19-20 155,-2 0-205,-6 0 111,0-1 588,-6-5 503,1-2 734,-4 1-439,-1-29 1228,0-11-180,-1-22-42,0-8 162,0 8 135,0-7-1003,0 14 0,0-2 59,0-20-416,5 10 1,5 1-460,11-4 1422,-2-10 1,18 29 0,-12 1 0</inkml:trace>
+  <inkml:trace contextRef="#ctx0" brushRef="#br1" timeOffset="115057">23778 11485 24179,'-33'-14'-2179,"-21"11"3071,32-12-2409,-28 4 1719,-8 8 332,11-8-345,10 18 0,0 3 695,-4-6-484,13 20 1,4 5 63,6-5-708,7 11 1,5 3-98,6 2-907,20 14-944,14-7 257,12-14 935,-8-11 0,1-3-598,14-6 1548,-18-6 1,1-2 467,13-5 854,-2 0 324,-3 0 690,-6-19 159,-6 15-1023,-9-33-1038,-7 7-505,-8-7-975,-25-17-989,12 22 762,-24 7 0,-1 1-449,20-3 410,-24 12 0,2 1-506,25-1-532,-41 3 1596,42 2 933,-25 5 0,28 2 1,-8 3-1</inkml:trace>
+  <inkml:trace contextRef="#ctx0" brushRef="#br1" timeOffset="115307">24173 11505 25888,'0'33'-6746,"0"3"4258,0-5 704,17 10-453,2-16 695,21 12 958,-9-18-155,17 0-876,-16-13 1979,9-3 1,-10-3 0,-1 0 0</inkml:trace>
+  <inkml:trace contextRef="#ctx0" brushRef="#br1" timeOffset="115573">24590 11512 23729,'0'-20'-4946,"0"3"3087,-18 1 1218,14 4-1144,-14 1 2480,5 3-178,-1 4 76,-2 23-779,6 14 793,10 32-607,0-7-211,0 7 460,9-25 0,2-1-1376,10 22 549,-1-6 1,0 0-239,-10-22 1,-1-1-115,6 22 0,-1-2-205,2 7 938,-8-23 1,2-1-325,10 7 171,-18-5 734,6-4-31,-8-5 193,0-5-6,0-4-642,-21 0 1646,-11-10-691,-34 2 142,9-9-563,-6-1 0,17-1 0,-1 0 0</inkml:trace>
+  <inkml:trace contextRef="#ctx0" brushRef="#br1" timeOffset="116324">25545 10888 24808,'-44'0'1440,"19"21"-889,-15-16 34,20 44-944,-7-26 0,-2 0 208,11 7 1,1 4-172,-13 17 1,1 0 49,13-16 0,3 1-657,-2 26 0,4 1-7,4-25 0,5 0-808,15 24 0,8-3-75,-7-26 0,5-2 414,14 9 0,5-5 1309,-5-14 0,1-5 0,4-1 0,2-2 1,2-2-1,-1 0 0</inkml:trace>
+  <inkml:trace contextRef="#ctx0" brushRef="#br1" timeOffset="116612">25887 10812 22650,'28'-8'3506,"23"3"-2684,-6 1-649,10 4-149,-16 5 0,-1 4-576,7 14-461,11 8 290,-21 7-956,-5-7-366,-5 7 35,-7 26-265,-7-10 1476,-17-2 1,-3 1 337,9-19 1,-5 0 93,-15 5 1,-8 4 0,2-4-63,9-3 0,-2 0 600,-18 9 0,-9 4 1,6-5-1,11-12 1,2-1-1,-15 16 1,0 1-1</inkml:trace>
+  <inkml:trace contextRef="#ctx0" brushRef="#br1" timeOffset="116891">26957 11213 26428,'7'-1'-553,"-3"0"538,-2 0-394,-2-3-3407,0 1 1062,0-3 286,-16 3 2504,12-1 1,-13 4-1,17-1 1</inkml:trace>
+  <inkml:trace contextRef="#ctx0" brushRef="#br1" timeOffset="117308">26895 11711 20671,'0'-11'-3193,"0"2"0</inkml:trace>
+  <inkml:trace contextRef="#ctx0" brushRef="#br1" timeOffset="118030">26895 11736 27597,'0'29'-6206,"0"5"4078,0-7 1153,0 5 247,0-6 302,0 2 32,0 5-823,-19 17-856,-6-8 1705,-10 12-294,-5-14 1039,8-1 0,-8 0 0,-1-1 1</inkml:trace>
+</inkml:ink>
+</file>
+
+<file path=ppt/ink/ink7.xml><?xml version="1.0" encoding="utf-8"?>
+<inkml:ink xmlns:inkml="http://www.w3.org/2003/InkML">
+  <inkml:definitions>
+    <inkml:context xml:id="ctx0">
+      <inkml:inkSource xml:id="inkSrc0">
+        <inkml:traceFormat>
+          <inkml:channel name="X" type="integer" min="-2.14748E9" max="2.14748E9" units="cm"/>
+          <inkml:channel name="Y" type="integer" min="-2.14748E9" max="2.14748E9" units="cm"/>
+          <inkml:channel name="F" type="integer" max="32767" units="dev"/>
+        </inkml:traceFormat>
+        <inkml:channelProperties>
+          <inkml:channelProperty channel="X" name="resolution" value="1000" units="1/cm"/>
+          <inkml:channelProperty channel="Y" name="resolution" value="1000" units="1/cm"/>
+          <inkml:channelProperty channel="F" name="resolution" value="0" units="1/dev"/>
+        </inkml:channelProperties>
+      </inkml:inkSource>
+      <inkml:timestamp xml:id="ts0" timeString="2021-07-30T05:08:05.996"/>
+    </inkml:context>
+    <inkml:brush xml:id="br0">
+      <inkml:brushProperty name="width" value="0.12095" units="cm"/>
+      <inkml:brushProperty name="height" value="0.12095" units="cm"/>
+      <inkml:brushProperty name="color" value="#FF0000"/>
+    </inkml:brush>
+  </inkml:definitions>
+  <inkml:trace contextRef="#ctx0" brushRef="#br0">2580 1467 23999,'-26'15'2669,"0"3"-2103,-1-3 59,1 3-498,-1 0-79,2 1-134,2 4-265,-1-2 480,5 4-760,-1-1-47,4 2-357,0 2 200,4-1-225,2 1-192,3 0 233,3-1-456,2 0 254,2-2-503,0-2 8,27-1-476,-21-5-787,51-2 3111,-31-3 1,30-5 0,-10-2-1</inkml:trace>
+  <inkml:trace contextRef="#ctx0" brushRef="#br0" timeOffset="332">2965 1765 24359,'-28'28'832,"0"-3"-303,2-8 159,-7 5-266,10-4-373,-2 5-67,14-1-922,6-4 67,2 7-561,23-12 191,13 1 113,10-10 891,0-10 1,1-2 427,3 4 78,-1-11 0,-3-4 932,-9-6-428,5-16 253,-27 6-2035,-6-8-120,-27 28-1358,-8-16-366,1 25 2669,-21-4 1,43 7 0,-19 3 0</inkml:trace>
+  <inkml:trace contextRef="#ctx0" brushRef="#br0" timeOffset="668">3693 1587 23369,'-38'0'1260,"-1"17"460,4 1-1015,14 13-1866,6-5 52,5-3 226,8-1-498,-8 0 605,27 6-1216,-12-9-703,49 6 1244,-29-15 1470,12-5 0,1-2 459,2-2 251,13-1 563,-9-18 264,-15-6 614,4-19-595,-20 8-1709,-6-9-868,-3 19-443,-26-6-1171,-6 14 933,1 0 1413,-34 9 0,40 1 1,-32 7-1</inkml:trace>
+  <inkml:trace contextRef="#ctx0" brushRef="#br0" timeOffset="948">4273 1085 23819,'-32'-1'1516,"11"14"-338,11 10-2792,10 9-743,19 8-37,-15-4 1525,11-6 0,3 2-653,2 19 145,-12-16 1,2 1-1197,20 16-554,-26 1 1534,10 1 373,-7-1 665,-5-1 671,5-3 1,-7-4 0,0-3 0</inkml:trace>
+  <inkml:trace contextRef="#ctx0" brushRef="#br0" timeOffset="1190">4740 1287 23909,'-39'18'4439,"-6"3"-3545,10 2-1012,10 18-1332,-7-21 1661,17 22-1523,-7-10 791,-2 1-7,20 14-1920,-10-12 124,14 19-431,18-27 424,-14 7-974,39-16 3356,-22-3 0,25-3 0,-10-2 0</inkml:trace>
+  <inkml:trace contextRef="#ctx0" brushRef="#br0" timeOffset="1381">5107 1533 24359,'0'30'-6656,"0"1"3808,0-6-375,17 5 3067,-12-12 1,30 4-1,-14-9 1</inkml:trace>
+  <inkml:trace contextRef="#ctx0" brushRef="#br0" timeOffset="1548">5177 1168 22830,'0'-10'-6386,"-7"1"2519,5 3 3852,-4 24 1,6-14-1,0 17 1</inkml:trace>
+  <inkml:trace contextRef="#ctx0" brushRef="#br0" timeOffset="1884">5627 1671 22290,'10'0'360,"0"0"-270,2 0-90,1-19-591,3 15 1431,2-29-1574,0 29 1289,0-25-884,1 11 584,-6 0-257,-2-17-710,-7 23 401,-3-15-1610,-1 14 1296,-18 2-391,14 1-342,-31 4 1109,12 2 486,-16 2 651,17 17 495,-6-11 425,26 25-1635,-9-6-144,11 19 151,0-5-2862,25 13-89,-19-22 2512,21-5 0,5-1 0,-8 0 0,29 5 0</inkml:trace>
+  <inkml:trace contextRef="#ctx0" brushRef="#br0" timeOffset="2165">6187 1319 24089,'-16'-11'-3461,"12"-1"-744,-24 6 5640,25 0-3389,-10 20 3361,13 8-2045,16-1-81,-12 20-1062,31-22 2010,-5 33 25,7-19-771,-12-5 0,-1-1 949,1 5-1798,-1 9 929,-9-16 375,-13-2 105,5-1-1618,-27 6 2474,15-7-1530,-25-4 0,-6-3 1106,7 4 1,-4-8 0,-3-1 0,-7 4 0</inkml:trace>
+  <inkml:trace contextRef="#ctx0" brushRef="#br0" timeOffset="4476">7283 1334 25708,'-17'0'0,"3"0"0</inkml:trace>
+  <inkml:trace contextRef="#ctx0" brushRef="#br0" timeOffset="4662">7327 1723 24539,'-5'3'997,"4"-1"1,-3-2-1</inkml:trace>
+  <inkml:trace contextRef="#ctx0" brushRef="#br0" timeOffset="9620">9212 1200 24089,'0'-6'-4947,"-20"2"6318,16 0-2413,-30 3 2460,15-1-682,-14 16 731,3 4-695,4 14-972,13 3 817,5-6-1251,8 0 185,0-9-1355,0 0 44,19-1-842,-15-1-393,32-1 1968,-31-2-144,26-4 0,6-2 877,-10 0 647,14 0 0,3-7 1,-6-19-1,13-3 1</inkml:trace>
+  <inkml:trace contextRef="#ctx0" brushRef="#br0" timeOffset="10186">9547 695 23189,'0'-9'-5036,"-14"3"5233,2 17 1514,-4 34-2231,8-1 70,7 1 1,2 3-523,-1 8 528,9-16 1,2-1-1656,-6 21 1934,15-3-1331,-3 2-563,-12-4 1132,27-2 122,-29-4 358,14-18 0,0 0-173,-6 10 293,19 16-1,-18-34-51,4 0 512,-8-17 126,2-3 1080,-3-3 648,3-22-854,0 16 1411,6-51-1497,0 36-260,-3-10 0,1-1 270,4 3 214,12-13-800,-14 28-113,8-8 585,-4 21-1184,0-5 1887,9 29-2242,-9-18 847,6 41-1818,-7-27 387,0 20-1070,0-8 124,10 12-23,-8-12-619,18 12 2057,-15-28-346,22 5 2227,-16-19 234,11 4 521,-13-28 275,-2 17 137,-1-43-855,2 14 144,-9-11-636,0-10-813,-14 27-1125,-1-4 390,-3 11-1136,0 30-418,0 5 1196,14 9-920,-10 21 333,23-26 745,-24 21-611,28-13 401,-16-2 1017,17 0 1,-9-5-1,1-1 1</inkml:trace>
+  <inkml:trace contextRef="#ctx0" brushRef="#br0" timeOffset="10434">10368 894 24089,'-9'-3'-2263,"0"1"-232,3 0 1863,20 17 1,-11-12-1,16 12 1</inkml:trace>
+  <inkml:trace contextRef="#ctx0" brushRef="#br0" timeOffset="10816">10957 1316 24898,'-41'3'1855,"2"1"-1467,8 1-107,14 2 417,-3 2-83,17 2-2322,-8 1 1349,10 2-1475,-3 8 238,4-3-671,19 9 0,-15-12-838,34 5 1463,-11-12 2092,9-1-830,1-7 1687,-13 0-91,1-1 379,4-19 631,-9 14 718,1-31-1701,-11 15-1182,-5-14-1014,-2 7-363,-3 26-501,0 17-2030,15 47 304,7-18 3086,-8-13 0,3-3 0,19 2 0,-5-2 1</inkml:trace>
+  <inkml:trace contextRef="#ctx0" brushRef="#br0" timeOffset="11368">12018 1122 23999,'0'-5'-6206,"-17"1"7257,1 2-295,-15 22 723,16 3-1816,4 13-459,11-3-496,0-8-395,0 2 1597,22 18-1810,-17-16 280,34 19-487,-35-30 468,23 4 1246,-25-14-153,8 1 741,-10-7-195,-17 0 2265,1-1-235,-4-11-1189,31 7 1632,19-7-533,27 3 435,-10 6-903,16-11 467,-24 5-1807,10-4 220,-16-2 1373,-2 1-1434,-1-1-158,-3-1 351,-4-1-219,-3-1-109,-3-8-721,-9 5 10,0-12-960,-8 13-533,0-3-33,-19 8 377,15 3-851,-15 3 1563,2 2 925,-1 3 585,-2 15 624,7 10-648,13 19-854,0-4-1238,20 14 586,4-22 886,-1-6 1,2-2 0,11 0 0,1 4 0</inkml:trace>
+  <inkml:trace contextRef="#ctx0" brushRef="#br0" timeOffset="11632">12388 891 22650,'36'0'719,"-5"0"-629,-15 15-3123,5-11 2885,-7 22-2472,10-14 2247,-1 1-341,-2 5-1101,1-16 903,3 12 842,6-13 0,4 3 1,3-4-1</inkml:trace>
+  <inkml:trace contextRef="#ctx0" brushRef="#br0" timeOffset="12348">12367 945 22830,'28'0'1079,"-1"0"-1079,-5 13-1932,-5-10 1705,-3 9-1587,-2 0 70,-2-9 876,4 20-2568,-2-21 3089,4 21 1,0-15 0,1 11 0</inkml:trace>
+  <inkml:trace contextRef="#ctx0" brushRef="#br0" timeOffset="13065">13807 1143 24539,'0'-13'-5756,"0"1"3627,0 3 1065,0 3 425,-22 2 2002,-2 2-358,-25 19 650,12-12-1686,1 33 1435,12-33 497,10 37-1295,-7-25 1044,18 19-2760,-9-1 316,12-10-1386,18 16-334,6-16 994,-1 4-647,19-10 2399,-36 0-2643,37-3 3307,-22 5-1120,5-7 1133,-3 4-12,-20-12-1745,5 4 291,-8-6-820,0 1-202,-18-2 1268,13 0 730,-32-1 1,32-2-1,-15 0 1</inkml:trace>
+  <inkml:trace contextRef="#ctx0" brushRef="#br0" timeOffset="13465">13845 655 25168,'0'43'-5666,"0"-5"3538,0 10 1064,0-4 425,0 6 303,14 7-514,-10 2 625,8-13 0,0 1-782,-10-11 0,-1 0 598,7 26 1,2-1-102,-5-26 0,0-1 42,-1 10 0,2 1-665,4-5 1,1-2 1034,-2 18 1,1-21 0,0-1 0,2 7 0</inkml:trace>
+  <inkml:trace contextRef="#ctx0" brushRef="#br0" timeOffset="13915">14475 1263 23819,'-13'-8'-3788,"9"1"-415,-20 1 5631,21 0-3102,-20 3 2929,7 0-374,-6 2 18,1 1-809,5 19 701,5 6 664,1 24-2178,7-11 1436,2 4-2152,1-4 192,22-9-978,0 10 70,23-20 1526,-13-4 506,1-9 918,-10-6 640,7-21 430,-9 16 193,8-46-765,-16 32 566,1-39-2043,-11 30 268,0-16-943,-3 21-737,0-1-393,0 12-70,0 3 246,0 22 63,0 4-608,21 21 254,4-18 2222,12 11 0,-3-28 1,-7 11-1</inkml:trace>
+  <inkml:trace contextRef="#ctx0" brushRef="#br0" timeOffset="14149">14598 910 23279,'0'-8'-5935,"0"0"4166,0 4 705,17 1 3550,-12 19-3999,24 2 1295,-27 20-886,20-20-874,-20 19 1131,8-23-339,-10 15 1186,0-11 0,0-1 0,0-1 0</inkml:trace>
+  <inkml:trace contextRef="#ctx0" brushRef="#br0" timeOffset="14332">14850 618 23639,'25'-7'3707,"-1"3"-3209,-1 1-412,8 3-530,-5 0 148,19 17-723,-15-13 420,6 13-2403,7 0 108,-11-4 2664,13 6 0,-13-9 0,1-10 1</inkml:trace>
+  <inkml:trace contextRef="#ctx0" brushRef="#br0" timeOffset="15065">16230 1569 23459,'0'-35'-7375,"0"-2"5247,0-7 1153,21-5 1509,-16-8-524,12 29 1,1-2 107,-9-14 1,-3-2-190,3 13 0,-1-2-471,0-22 0,-4 0 962,-4-7-285,0 23 0,0 2 135,0-12-699,0 6 655,0 5-193,-19-1-935,14 15 925,-28-1 138,30 35 708,-10 18 31,13 40-810,0-1-33,-2-12 1,4 0-172,6-19 0,1 0 351,-8 12 1,3-1-339,15-14 0,0-1-491,-14 28-123,15-30 1,4 0-134,-7 7 0,0-1 101,28 14 588,-15-14 1,0-3 132,4-5 223,22 0 1123,-25-19 118,5-4 549,-7-26 116,-9 17 688,8-50-1687,-15 48 1193,-1-45-1738,-8 48 252,-2-31-1775,0 32 857,-1-20-1636,-1 61-340,16-14 875,-12 32-1063,28-31 2076,-7 1-1123,8-13 1952,12 5-884,-18-9 1364,6-8 432,-12-19 426,-3 15 364,-3-35-1934,-3 22 962,-2-20-1587,-5 10 13,-2-9-758,-3 9-628,0-1-700,0 30-1071,0 12 1744,0 25-617,0-7 287,0 3 1710,14-12 1,-10-2-1,11-3 1</inkml:trace>
+  <inkml:trace contextRef="#ctx0" brushRef="#br0" timeOffset="15221">16887 867 24898,'-8'-14'-9831,"-4"2"9269,33 24 1,3 8 0,29 20-1</inkml:trace>
+  <inkml:trace contextRef="#ctx0" brushRef="#br0" timeOffset="15915">17398 1417 24269,'14'-30'-2799,"3"4"2495,15 4 1718,-1 2-601,-13 3-771,3 2 351,-18 3-1791,5-5 708,-8 4-274,0-2-68,0 4-872,-26 2 879,20 1-777,-42 2 1294,42 1 625,-39 3 730,21 1 776,-15 0 32,18 16 320,9 3-1751,12 19-8,0-9-1555,16 12 344,7-16-560,22 14 140,-7-20 218,17 8-36,-20-17 1085,9 0 1185,-2-6 263,-12-3 1020,12-16-57,-22-4-838,1 0-560,-11-14-971,-5 30 1599,-2-43-2308,-2 26-508,-1-18-274,0 16-593,-14 11 788,10 26 404,13 23-9,16 8-108,-1-12 1,3-3 902,11 1 155,-12-7 1,1-3 152,6-6 681,8 10-587,-13-23 752,-2 7 481,-2-9 549,-1 0-295,-5-19-404,-1 14 604,-4-49-2176,-6 33 868,-2-45-1501,-5 32 418,0-11-902,0 17-181,-16 1-410,12 3-485,-12 2 1576,16 32 15,17-15 2306,-12 50-2228,28-26 509,-29 22-950,31-11 350,-30 1 891,32-4 1,-33-1 0,14-2 0</inkml:trace>
+  <inkml:trace contextRef="#ctx0" brushRef="#br0" timeOffset="16131">17072 891 24898,'23'-18'1235,"0"1"-785,22 1 642,-4 3-584,1 2-232,7 2-641,1 5-320,-14 1 0,-1 3-419,18 18 879,-13-4 0,-3 3 1,2 27-1,-16-18 0,1-1 1</inkml:trace>
+  <inkml:trace contextRef="#ctx0" brushRef="#br0" timeOffset="16253">17570 2004 23549,'0'19'-1755,"15"2"0,2-10 1,14-1-1</inkml:trace>
+  <inkml:trace contextRef="#ctx0" brushRef="#br0" timeOffset="17014">19608 866 24269,'-26'-13'-2232,"-2"4"2139,-2 5 790,-5 3 130,-23 22 541,11 14-1158,8-3 0,2 3-266,15-5 0,3 1-200,-7 11 0,3 0 356,7 7-555,2 12-742,14-23-635,30-6-1103,-5-3 1716,13-14 0,5-4 507,14 2 474,0-5 0,1-5 454,-22-10 1,1-4 271,10-3 0,4-1 0,-5-3 391,-12-3 0,-2-4 124,22-14 1,-7-2 980,-23-1-1241,-9 8 1,-4-1-854,-10-5-255,-15-17-1701,-14 27-174,-22-10 416,-1 27 1123,6-2 70,19 32 1702,11 13-764,15 11-452,8-6 0,2 1 98,-5 14-212,17-16 1,5 2-60,-5 6 1,1-2-322,6-9 1,2 1 271,-4 3 1,1 4 0,-3-3-670,-2-3 1,0-2 434,6 10 0,-3 0 497,5 13 167,-7-5-66,-11-2-47,-6-5-45,-7-4 152,0-4-62,-21 5 555,-17-14-581,6-9 0,-3-4 1506,-25-3-892,-1-3 1,23-6 0,1 0 0</inkml:trace>
+  <inkml:trace contextRef="#ctx0" brushRef="#br0" timeOffset="17232">20587 999 23999,'11'0'899,"-3"0"-539,-2 21-4411,-4 4 2052,-1 15 950,-1 0 188,0-6 372,0 4-1198,0 2 349,0-3 1,0 2-709,0 8 1233,8-4 0,4-3-1133,9-9 2017,3 3 0,12-22 0,-12-2 0</inkml:trace>
+  <inkml:trace contextRef="#ctx0" brushRef="#br0" timeOffset="17387">20635 718 23729,'-12'-18'-7487,"9"3"4564,-15 2 2728,17 6 0,-5 0 0,6 5 0</inkml:trace>
+  <inkml:trace contextRef="#ctx0" brushRef="#br0" timeOffset="17931">21188 1057 25888,'0'-4'-5216,"0"19"3087,0 8 795,19 37-246,-15-18 935,28 17-281,-11-34 622,6 0-1156,4-17 2445,-6 1-138,0-8 573,1 3 348,-2-4 132,0-16 447,3-5-286,-6 1-617,5-30-1416,-15 30 38,0-27-1040,-9 23-9,-1 4-542,-1 1-481,0 4-59,0 53 215,0-19 541,8 21 0,5 3-1262,10-6 939,0-7 0,3-1 1659,13 2 1,5 3 0,-8-16 0</inkml:trace>
+  <inkml:trace contextRef="#ctx0" brushRef="#br0" timeOffset="18248">22050 1004 24988,'-19'-12'-3902,"-13"3"4163,10 4 79,-14 3 339,16 25-193,-2 5-453,19 11-1334,-5 12-164,27-22 177,6 18-447,-1-25 500,22-2 452,-27-4-473,22-14 1434,-13 6 732,6-8 376,-17-17 493,15-8 604,-22-9-1439,4-13-701,-8 17-142,-6-7-1593,0 15 482,0 2-586,-15 5-66,11 32-136,-12-3 1721,16 48-1328,0-23-152,0 16 1557,0-15 0,0-3 0,0 0 0</inkml:trace>
+  <inkml:trace contextRef="#ctx0" brushRef="#br0" timeOffset="18498">21407 635 23999,'-5'-10'-8505,"2"1"5481,2 22 3070,18-11 1942,-13 31-2870,12-6-422,-16 6-294,0 17-898,0-22 2078,0 9 585,0-16 0,0-4 0,0-2 0</inkml:trace>
+  <inkml:trace contextRef="#ctx0" brushRef="#br0" timeOffset="18669">21670 504 23369,'22'-24'831,"1"2"-355,-2 6 632,9-1-255,-7 8-49,6 1-347,0 7-626,-6 1-191,21 14-917,-17-11-291,12 11 1397,3-2 1,-7-9 0,11 10 0</inkml:trace>
+  <inkml:trace contextRef="#ctx0" brushRef="#br0" timeOffset="19048">23257 815 26428,'-28'-26'-5491,"3"2"3631,2-1 622,11 9 425,-3 2 666,11 32 302,0 13-581,2 2 0,3 2-1595,15 23 1083,-5-15 0,2-2-592,24 7 324,-7-10 0,2-3-185,15 0 1512,-14-14 1,1-3 0,19-2 0,3-3 0</inkml:trace>
+  <inkml:trace contextRef="#ctx0" brushRef="#br0" timeOffset="19381">23975 903 25798,'-49'0'180,"3"0"-180,14 0 90,1 20 618,3-15-465,1 33-858,14-22 272,-11 17 65,21-6-1167,-11 8 370,14-7-881,0 4-386,18-14 42,-13-4 94,38-6 1638,-21-3 142,24-5 1601,-11 0-550,14-20 1694,-14 15-451,8-36-430,-19 36 1249,-12-39-3327,5 26 1212,-15-21-1696,7 12 685,-9 2-1250,0-5 90,0 10 179,-16-3-1055,12 37 2134,-12 26-728,16 8 178,6-9 1,5-1-1440,14 2 2349,11 6 1,5-19 0,-5-4 0</inkml:trace>
+  <inkml:trace contextRef="#ctx0" brushRef="#br0" timeOffset="19557">24543 913 24718,'-30'0'0,"-8"15"1593,6 5-1403,8 20-1825,10-8-126,14 3-1915,27-3 3454,-4-15 0,26 12 0,-10-15 0</inkml:trace>
+  <inkml:trace contextRef="#ctx0" brushRef="#br0" timeOffset="19732">24618 400 24629,'-31'-3'-1395,"-1"1"342,-14 20 2090,11-13-1674,-11 38 515,16-20 0,2 26 1,1-7-1</inkml:trace>
+  <inkml:trace contextRef="#ctx0" brushRef="#br0" timeOffset="20185">25463 765 26607,'-9'-12'-7279,"7"2"4378,-11 5 4320,12 17-1791,17 13-629,-11 11 351,30 6 409,-31-4-1535,25 4 1637,-17-11 0,-3 2 6,11 19-677,-4-11 0,-1-1-74,0 5 573,2 7 165,3-24-7,-18-5 359,9-6 57,-10-5-32,2-4-279,-3-25 393,0-14-143,0-15-131,0-8-600,0 5-396,0-4 151,0-2 884,8 16 1,2 1 0,8-18-1,-1 21 1,0 0 0</inkml:trace>
+  <inkml:trace contextRef="#ctx0" brushRef="#br0" timeOffset="20497">26217 1134 23009,'11'8'-4724,"0"-1"3260,0-4 2117,0-1-122,1-2 393,0-16-558,2 12 1052,-3-27-1959,8 11 1590,-7 2-176,1-16-1219,-5 21 226,-4-15-957,-1 8 778,-2-8-1447,-1 8 1771,-22-7-1551,-5 15 1139,-25 1 839,4 8-168,5 20 1618,18 8-1052,3 11-4,20 2-1200,-5-6-758,7 12-1001,0-10 1634,22 7 0,-17-17 0,18-2 0</inkml:trace>
+  <inkml:trace contextRef="#ctx0" brushRef="#br0" timeOffset="20898">26807 888 25348,'-58'-1'74,"15"1"-113,1 0 255,16 0-14,2 17 157,-3 7-360,15 11-957,-1 0 57,13 8-1029,0-10 182,18 11-1176,12-7 987,10-9 249,5 3 277,-9-15 1354,0-8 403,14 0 937,-13-7 183,22-11 1175,-34-10-617,2-19-1191,-22 4-131,-5-15-1046,0 18-159,-21-9-1151,16 16-294,-16 2-2,4 6 577,13 4-349,-23 6 2529,24 20-424,-7 21 206,10 9-38,0 14-338,0-6-386,0 5-407,0 2 401,0 1-1797,7-19 1,2 1 1847,-5 19 1,5-23 0,-2-1 0,-7 12 0</inkml:trace>
+  <inkml:trace contextRef="#ctx0" brushRef="#br0" timeOffset="21249">27205 1267 23009,'12'-8'1026,"-1"-1"-757,8-5-40,-4 1-520,14-14 90,-12 7-173,12-18-41,-14 14 152,0-6 1,-1-2-771,-1-1 977,-1-1 1,-2-1-530,-1 2-16,-2-9-305,-5 16-42,0 3 329,-1 0 209,0 9-206,-1 55-75,0-11 412,0 8 1,0 4-321,0 5 86,0 3 62,16 0-1859,-12 17 1084,25-18-689,-21-14 0,1 0 1809,15-2 0,-2 2 0,-5-18 1</inkml:trace>
+  <inkml:trace contextRef="#ctx0" brushRef="#br0" timeOffset="21648">27692 1068 24269,'25'32'-6869,"3"-6"5194,30-11 2868,-14 2-830,5-15 708,-12 6-686,0-8 228,1 0-613,-2 0 1830,0 0-422,-2 0-836,3 0 131,-11-14-83,3 11 25,-18-27-1552,-4 12 85,-6-10-722,-1 3-53,-20-5-347,0 7 649,-21-18-505,21 19 343,-27-16 1233,31 19-456,-26-4 1350,21 13 81,2 3 568,3 4-64,-1 3 295,8 23-857,0 10-438,8 14-17,1 1-1050,0-9 151,21-1-872,-15 0-205,39-2 52,-25-2-178,22-4-280,7 5 1481,-10-11 859,11 0 1,-17-13 0,-3-3 0</inkml:trace>
+  <inkml:trace contextRef="#ctx0" brushRef="#br0" timeOffset="22170">28665 910 25078,'0'-12'-5306,"0"1"3268,-18-5 1480,14 7-1029,-33 0 2738,19 6-99,-17 2-43,18 16-1058,-3-11 2020,18 27-1942,-5-9 433,7 20 90,17-6-2359,5 13-32,0-20 185,17 7 63,-15-3-636,1-9 2335,7 12-891,-28-18 335,9 3 526,-13-10 275,0-3-3554,-24 1 3513,-1-5 0,-23-14 0,3-8 0</inkml:trace>
+  <inkml:trace contextRef="#ctx0" brushRef="#br0" timeOffset="22415">29098 636 24179,'11'0'809,"-4"18"-5827,0 2 2343,-6 23 2033,2-9 3,-3 5 328,0 10 77,-14-9-697,10 14-809,-10 2 2590,14-14-1065,0-7 0,0-1-536,0 1-740,0 18 591,0-29-179,0 3 912,0-14 1,0-3 0,0-4 0</inkml:trace>
+  <inkml:trace contextRef="#ctx0" brushRef="#br0" timeOffset="22548">28820 1010 25528,'0'-21'-6386,"29"2"8895,18-6-1236,15 7-937,-28 7 1,2 1-839,5 3 1,-1 2-889,20-1 1395,-20 4 0,-1 0 0,4 2 0,-2 0 0</inkml:trace>
+  <inkml:trace contextRef="#ctx0" brushRef="#br0" timeOffset="23031">29710 978 27327,'19'-19'-232,"0"2"396,-7 4-471,-3 3 439,-4 4-290,-2 2 25,-2 3 579,2 1-446,-1 0 36,4 23-2140,0 7 363,8 31-188,-3-11 300,6 2-386,-5-16-336,5-1 135,-1-5 100,10 6 2364,-5-14 72,13 0 479,-13-16-169,11-21 1675,-13 11-266,5-43-2202,-2 0 545,-6-14-1244,-5 15 1,0 1 924,-1-10 1,-4 19-1,-1 1 1,2-11-1</inkml:trace>
+  <inkml:trace contextRef="#ctx0" brushRef="#br0" timeOffset="23365">30592 874 24359,'-40'-24'-4283,"8"9"3406,2 7 1312,11 8 546,0 0-327,10 14-699,1 7-420,8 21-1132,29-6 1007,-22 3-499,50-11 707,-34 2-1302,27 0 885,-1 12 126,-11-10 531,4 15 190,-14-23 158,-15 6-803,-1-17-613,-12 0-2391,-26-7 3905,-8-3 1,-14 0 0,3-3 0</inkml:trace>
+  <inkml:trace contextRef="#ctx0" brushRef="#br0" timeOffset="24302">16175 2808 25798,'15'57'-7740,"5"-9"4385,-18 8 3042,10-8-721,-10 1 1026,5 2-182,-4 14 175,2-17-1787,-1 16 2084,0-36 143,-2 1-491,2-18-230,-2-4-167,0-3 540,1-3 873,0-19-455,3-10 53,-1-10-21,2-8-203,-2 9 686,0-1-332,1 3-271,0-5-962,-2 22 829,5-10-30,-2 26 1590,12 12-1521,-4-5 472,8 35-1581,-1-21 630,0 21-1091,3-8-993,12 17 194,-8-15 1676,-3-8 1,2-2 0,6-2 0,13 3 0</inkml:trace>
+  <inkml:trace contextRef="#ctx0" brushRef="#br0" timeOffset="24685">17002 2552 24269,'-18'17'791,"4"16"-2570,14 9-762,0 12 962,0-8 617,0 6 647,-1-12 1,2 0-158,8-7 0,1-1-478,-8 9 0,1 0-109,14 0 0,4-3-531,4 19 1002,-4-14 0,1-2 7,13 0 381,-1 11-533,-17-31-640,3 0 1681,-11-16 813,-2-25 28,-4-8-307,-3-14-440,0 2-203,0 10 235,0 2-123,0 3 224,0 4-905,0 0-83,14 11 2164,3 0 463,17 28-1599,-7-14 709,2 35-1486,-6-19 312,3 20-1018,-2-6-101,2 1-2099,0 0 2578,3-2 0,2-1 1,1-2-1</inkml:trace>
+  <inkml:trace contextRef="#ctx0" brushRef="#br0" timeOffset="25082">18000 3174 24089,'-21'-4'-99,"-8"1"113,-11 3 637,0 20 450,11-14-639,2 35-968,4-24 604,3 33-1043,9-18-119,4 22-354,7-23-988,24 14-702,9-24 1102,12-3 1254,0-9-235,-10-8 1438,-1 2 76,0-3 741,-3-23 575,-3 17-501,-11-22 1,-3-4-755,0 8-224,-3-8 0,-2-3-844,-8 5-361,4-16-263,-23 32 189,13-12-1183,-25 24 1737,27 15 8,-9 14 229,12 27-530,21-14-212,-15 1-511,33-6 608,-14-12 66,20 6-999,-9-20 1923,-2-2 1,-12-7-1,0 0 1</inkml:trace>
+  <inkml:trace contextRef="#ctx0" brushRef="#br0" timeOffset="25381">18403 3251 23999,'0'-19'-5396,"0"39"3267,0 5 1065,18 14-668,-13 2 1102,26-36 1607,-28 29-1817,28-30 238,-16 19-90,16-22 2000,-6 6-402,12-7 1317,-6-23-190,15-6-1366,-21-13 596,4 1-1156,-15 9 1287,-3 0-1775,-6 0 436,1-7-1026,-5 12-410,0-3-305,-1 16 609,0 23-294,0 10 310,0 15-1216,18 21-105,-13-17 2163,26 13 0,-28-14 1,10 0-1</inkml:trace>
+  <inkml:trace contextRef="#ctx0" brushRef="#br0" timeOffset="25531">19860 3333 24449,'11'0'-900,"-3"0"1,-3 0-1,-2 0 1</inkml:trace>
+  <inkml:trace contextRef="#ctx0" brushRef="#br0" timeOffset="27501">7645 5485 26607,'-8'0'2699,"26"-12"-1896,19 8-676,16-18 789,8 20-1208,-8-16-467,-13 14 1,2 1-1143,22-6 1917,-12 5 0,-1 2 0,6 2 0,-22 0 0,0 0 0</inkml:trace>
+  <inkml:trace contextRef="#ctx0" brushRef="#br0" timeOffset="29948">9097 5784 23639,'42'-50'485,"-7"7"-642,4-10-146,-7 6 66,4-4 14,-1-3 131,-11 11 1,0-1-18,-6 11 1,-1-2-156,7-24 1,-3-2-9,-9 24 0,-3 0-8,1-10 0,-4-1-586,0-16-69,-6 0-153,0 5 500,-10 21 0,0 1-1171,6-13 1219,-12 15 1,-2 3-532,-1 5 339,0 4 180,-9 17 1687,10 27 223,-8 3 424,3 25-414,8 3-865,8-8 1,0 3-144,1-9 1,1 2-212,2 4 1,1 5-1,0-4-12,0-3 0,0-1-696,0 13 1,4-1-266,9-18 0,0-2-1413,-5 33 1547,15-36 1,-1 0-65,-15 28 338,15-31 1,1-1 124,-5 23-228,7-18 0,2-2 47,3 14 187,-3-13 0,1-3 639,4 1 149,9 1-130,-12-16 617,0-5-116,-1-3 726,12-4 19,-11-1 207,17-21 459,-20-5-815,9-22-374,-17 23-362,-1-15-450,-8 22-989,-4-10-613,-2 30-624,-1 7-684,19 21 289,6-16 1558,22 4 328,-8-16 1119,0 5-292,-10-7 1038,10-17 854,-12-4-501,13-22 69,-22 9-678,1-13-958,-14 17-900,-1-5-51,-4 12-576,0 4-865,0 2 425,0 2 190,-16 5 1216,12 1-872,-13 22 2587,17 4-1469,0 25 25,20-10-554,3 12-262,2-20 532,24 12 98,-28-24 1037,38 10-1810,-28-21 2266,7 6 30,-2-7 724,-12-20 356,11-1-297,-21-3-478,-2-21-1019,-8 21-961,-3-21-1027,-20 26 149,15 1-587,-26 16 1595,27 10-979,-8 11 760,33 15-578,0-15 735,25 10 643,-12-15 338,14 3 809,-19 0-2304,9-16 1843,-17 5-910,0-6 2005,-5 0-429,1-17 409,-8-1-1178,-2-18-773,-7 1-710,-17 3-1468,12 5 408,-23 14-230,24 22-922,11 12-1697,11 31 4199,23-15 0,-22 7 1,1-22-1</inkml:trace>
+  <inkml:trace contextRef="#ctx0" brushRef="#br0" timeOffset="30215">9920 5127 22920,'0'-6'-5756,"0"-1"3987,0 3 885,20 0 3513,-1 3-1244,20-1-1226,-7 21-1222,0 7-1083,-15 12 239,4 3 1816,-19-4 0,6 5 1,-8 3-1</inkml:trace>
+  <inkml:trace contextRef="#ctx0" brushRef="#br0" timeOffset="30481">11418 5056 25438,'-21'41'-2639,"4"-7"1556,17 2-1292,0-4 734,0 2-172,0 23 441,0-12 217,8-7 1,2-1-2094,-6 5 2839,14 8 0,1-19 1,4-2-1</inkml:trace>
+  <inkml:trace contextRef="#ctx0" brushRef="#br0" timeOffset="30733">11283 5349 22380,'0'-19'-6026,"0"2"3988,16 0 4024,-12 1-2341,31-1 2464,-2-3-928,11 5-572,-10 4 0,0 1-128,11 0 512,-5 3 0,0 0 917,6 2-1365,12 1 1082,-23 3-2033,-3 1-76,-4 0-61,2 0-119,-12 17-2255,3-13 677,-16 27 1715,1-17 1,-6 2-1,0-6 1</inkml:trace>
+  <inkml:trace contextRef="#ctx0" brushRef="#br0" timeOffset="31265">12050 5376 25978,'0'34'-5846,"0"3"3717,0-6 1065,0 0 426,0-7 212,0 0 122,0-3 76,0 1-1369,0-5 1597,0 5 0,0-9 0,0 2 0,11-9 729,-8-17-391,18-11 951,-10-11-1273,13-22 345,-4 15-528,-6 5 1,0 0 272,5-9 47,5-10-1848,2 5 1866,-4 16 1,6-3 0,-7 17 0</inkml:trace>
+  <inkml:trace contextRef="#ctx0" brushRef="#br0" timeOffset="31681">12560 5415 25078,'-19'16'1199,"3"7"-2546,32 10-2746,-12 1 2067,25-10 1240,-27 0-398,26-4 844,-24 1-2163,37-5 1369,-25 1-314,22-9 2992,-14-1-451,0-7 201,0 0 534,0 0-593,0-20 853,-2 15-726,4-34-191,-10 13-650,1-21-335,-12 11-733,-2-4-905,-3 18-54,0 1-306,-14 11 241,11 26 571,9 3-1617,14 21 392,24-8 1284,-12-12-228,3 2 1420,-10-20 0,0 8 0,1-10 0</inkml:trace>
+  <inkml:trace contextRef="#ctx0" brushRef="#br0" timeOffset="31948">12807 5152 23729,'-4'13'-3669,"1"-2"2157,22 14-689,-1-1 543,5-5 709,-10 1-1257,-4-1 651,-7-6 1034,7 4 1,-9-10 0,0 0 0</inkml:trace>
+  <inkml:trace contextRef="#ctx0" brushRef="#br0" timeOffset="32119">12780 4825 23549,'16'-35'-1426,"-1"3"1128,22-1 1625,-11 14-299,17 2 132,-17 12-803,12 3-956,-11 2-210,4 21-727,0-16 1430,-8 20 0,0 3 0,13-6 0,-13 3 0,0 0 0</inkml:trace>
+  <inkml:trace contextRef="#ctx0" brushRef="#br0" timeOffset="32717">14467 5200 25708,'-11'-2'-938,"3"0"1,8 0 0,0 1 0</inkml:trace>
+  <inkml:trace contextRef="#ctx0" brushRef="#br0" timeOffset="32853">14535 5560 25888,'0'11'-7195,"0"-2"313,0-4 6616,0 0 0,0-4 0,0 2 0</inkml:trace>
+  <inkml:trace contextRef="#ctx0" brushRef="#br0" timeOffset="34183">15705 4818 24449,'0'-22'-4317,"0"4"2728,0 0 885,-13 3 21,10 2-234,-9-1 680,12 5 0,0-1-1179,0 5 1416,0 18 90,0 26 0,17 4-820,-13 22 820,11-27 1,0 0-784,-12 26 528,8-9 1,1 2-139,-10 9 208,7-13 1,0-2-237,-7 3 264,8 10 477,-9-29 0,2-6 113,-3-5-284,0-1-26,0-10-833,0 0 770,0-32-83,0-7 247,0-15-363,0 1 250,0-10-201,15 12 642,3-22-81,0 28 554,13-2 325,-17 16-147,16 7 1014,-9 4-48,12 4-571,-8 3-733,14 16-586,-18-12 12,5 29-2013,-16-9-438,-2 7-620,-7 0 427,-1-9 305,0-2 92,-21 1 1993,15-4-2487,-36-1 3842,12-3-727,-8-6-324,-9-2 0,30-20 1,-2-3-1</inkml:trace>
+  <inkml:trace contextRef="#ctx0" brushRef="#br0" timeOffset="34471">16298 5007 23819,'19'21'-5409,"-1"13"2188,-3-30 4840,1 34-3423,-6-22 1270,7 30-426,-8-18 254,7 22-1492,-7-21 1798,2 21 479,-5-21-1528,1 7 1806,-5-14-256,1-2 410,-1-4-53,-2 1 58,0-8-45,0 0-128,0-21-42,0-11-115,0-9-313,0-7 17,0 6-411,0-22-113,18 12 27,-7 7 1,0 0 888,12-4 1,15-6 0,-12 17-1</inkml:trace>
+  <inkml:trace contextRef="#ctx0" brushRef="#br0" timeOffset="34815">17287 5068 25168,'-46'0'990,"-7"0"-900,9 0-90,-4 0 0,12 0-90,-12 18 899,15-13-555,-6 31-312,18-11-184,10 20-977,3-9-121,34 6-656,9-20 893,12 3-653,17-12 1091,-25-3 243,22-5 501,-29-1 862,6-18 895,-25-3-402,-3-15-1585,-29 14-1047,-8-13-820,3 14-610,-21-15 420,20 16 2013,-3-4 0,-5 14 1,17-7-1</inkml:trace>
+  <inkml:trace contextRef="#ctx0" brushRef="#br0" timeOffset="35031">17485 5040 25528,'9'0'810,"0"0"-720,6 15-3225,-2-11 2931,24 43-1710,-15-28 504,1 11 0,-1 2-675,1-2-12,-4-2 1,0 1 1608,2 5 1,8 9 0,-10-13 0</inkml:trace>
+  <inkml:trace contextRef="#ctx0" brushRef="#br0" timeOffset="35249">18158 5107 24629,'-36'21'2273,"-2"5"-2073,21 12-2413,-15-1 1909,27-6-1414,-26 1 1563,20 1-1515,-16 10 655,17-12-1379,-7 10 621,14-22 726,-3 0 853,4-12 0,1-4 1,1-3-1</inkml:trace>
+  <inkml:trace contextRef="#ctx0" brushRef="#br0" timeOffset="35432">17953 5121 22560,'11'-30'-2277,"-9"2"401,18 6 3478,-12 4-1346,9 6 1187,-2 3-114,3 6-492,12 1-627,-3 23-479,23 7 702,-18 11-2068,11 1 585,-14-11-1408,0 4-578,0-1 227,0-1 85,0 0 1170,-1-2 1435,0-2 1,-1-3-1,1-2 1</inkml:trace>
+  <inkml:trace contextRef="#ctx0" brushRef="#br0" timeOffset="35617">18787 5063 24808,'-43'17'3050,"9"-13"-3511,6 34-1925,-5-5 1025,8 10 1144,6-9 0,0-1 0,2 9 0,-4 13 1</inkml:trace>
+  <inkml:trace contextRef="#ctx0" brushRef="#br0" timeOffset="36349">19357 4997 25348,'-8'-11'-6502,"-2"-2"4556,7 3-67,-8-5 1363,3 7 996,-13-3 413,4 8 257,-21 1-1111,15 17 2398,-11-11-386,7 28-16,11-7-631,-1 21-751,13-6-1584,23 13-1124,-14-21 958,33 0 0,6-2-588,-11 1 872,15-3 0,1-2 54,-10-4 294,8 5 462,-32-13-20,8 0 1157,-20-2-1259,9-1-254,-12-1-36,0 0-195,-16 1 1953,-12-2-197,-18 1 850,-1-7-697,19-17 97,11-3-1255,48-3 1932,12-5 90,17 9-1899,-17 1 1,-1-1-43,14-7 58,-8 8 0,0 1 348,8-3 296,-20 6 0,0 0 1320,7-4-1791,-3-1 57,-6 0-63,2-8-524,-14 5-230,0-14-299,-17 13-208,-2-13-802,-28 13-75,19-4-985,-35 6 1366,23 6 378,-12 0 438,13 23 1437,7 11-360,10 26-713,0-4-264,7-10 0,4-1-137,13 8-449,0-6 0,2-1-650,14 4-677,5 7 2040,-11-19 1,0-5-1,1-4 1</inkml:trace>
+  <inkml:trace contextRef="#ctx0" brushRef="#br0" timeOffset="36685">20430 5162 25888,'1'-14'-4705,"0"1"2788,-1 1 605,0 3 488,0 0 515,0 2-130,0 19 177,0 6-1334,20 3 1579,1 16-382,4-16 998,3 2 795,-25 2-1557,10-39 1552,-13 0-1479,0-19 90,0-4-381,0-13 670,17 9-360,-8 3 0,2 0-186,9-8 344,6 9 1,0 0-983,-4-1 899,10 11 1,4 5 1230,-1 3 54,12 3-983,0 13 0,-12 26 0,10 6 1</inkml:trace>
+  <inkml:trace contextRef="#ctx0" brushRef="#br0" timeOffset="40418">7803 7555 26068,'-7'-13'-6643,"0"10"7265,3-10-1695,1 13 3122,20-6-33,6 4-1467,0-8 73,18 9-2908,-11-4 2879,9 5-365,16 0 0,-23 0 0,13 0 0</inkml:trace>
+  <inkml:trace contextRef="#ctx0" brushRef="#br0" timeOffset="40821">9262 7055 25438,'0'-6'-4676,"0"1"2547,0 24 1065,0 14 425,0 14 124,0 9 31,0-5 76,0 5-705,0-12 0,0 2 933,0-12 0,0 1-585,0 26 1,0-1 314,0-26 0,0-1-630,0 22 1,0-2 1079,0 2 0,0 10 0,0-28 0</inkml:trace>
+  <inkml:trace contextRef="#ctx0" brushRef="#br0" timeOffset="41198">9860 7358 25078,'0'-6'-4676,"-25"1"6359,-5 3-546,-30 19-237,28-5 1,1 1 546,-21 10-548,2 20-965,20-26 336,4 21 817,12-13-1692,-2 8-130,13-10-2195,22 9-194,17-16 1370,14-3 1076,0-8-122,-12-5 1219,1 0 196,-2-14 754,-2 11 520,7-24 885,-12 12-733,0 0-650,-12-5-681,-9 18-340,-1-7-697,-3 28-2663,-2-14-363,8 43 57,-3-30-382,6 24-1776,6-8 5056,-2-9 0,8 6 0,-5-13 0</inkml:trace>
+  <inkml:trace contextRef="#ctx0" brushRef="#br0" timeOffset="41369">10220 7178 25078,'-24'-18'-5299,"10"2"1618,-13 2 3612,22 3 737,-21 5 1,24 19-1,-7 8 1</inkml:trace>
+  <inkml:trace contextRef="#ctx0" brushRef="#br0" timeOffset="41999">10523 7635 23639,'0'9'-5846,"1"-2"3482,2-2 1015,1-3 1593,3-1 1160,1-1-56,4-18-966,2 13 216,2-28 283,3 30 1286,0-31-922,8 11 154,-8-10-1810,5-4-88,-16 15 365,-1-4-1202,-6 3 608,-1 8-1339,-18-6 1062,13 13-1095,-12 20 3031,17 14-2027,0 12 285,0 17 312,22-19-229,3 25-150,15-26 990,-5 7-177,-6-17-2050,0-4 2202,0-3-20,0-5 263,0-3 729,0-6 580,10-1-358,-10-3 518,11-20 273,-19-6-913,-1-11-259,-10 2-701,-6 7-289,-2 2-598,-2 1-335,0 1-304,0 4-940,0-1 1111,-16 10 571,12 21 726,25 26-974,-12 2 409,18-10 1,4-4 553,-5-9 264,22 18 36,-11-30 905,-3 10-842,-6-13 343,-9 0 1290,2-17 602,-14-7-2108,-1-21-608,-6 8-82,0 1-1356,-17 13 119,12 2-2480,-12-3 421,17 28 691,0 5 2381,21 11 1,-16 20-1,16-12 1</inkml:trace>
+  <inkml:trace contextRef="#ctx0" brushRef="#br0" timeOffset="42251">10508 7198 23999,'-4'-17'-8389,"0"1"5845,25 1 5835,-16 0-3213,41-2 2134,-12 6-805,26-1-860,-15 8-927,-3 2 1471,-19 2 214,5 0-1547,-6 16 1,4-12 0,-6 12-1</inkml:trace>
+  <inkml:trace contextRef="#ctx0" brushRef="#br0" timeOffset="42403">10993 6970 23369,'26'-13'3193,"6"-2"-2294,-11 13-1699,13-3 319,-13 20-2235,5-12 2127,-1 50 1,-9-26-1,5 33 1</inkml:trace>
+  <inkml:trace contextRef="#ctx0" brushRef="#br0" timeOffset="42915">12877 7512 25798,'-55'-8'-706,"1"6"989,-1-9-885,2 11 951,2-3-184,3 3-2,8 15 625,3-12-600,-2 28 263,14-7-460,3 15-212,16-6-1179,30 1-444,10-16 793,30-3-70,-10-9 1052,-21-14 1,-1-2 512,3 5-194,-9-20 1,-4-4 8,-7 5 18,0-20 1,-4-3 426,-9-1-951,3 1 0,-1-1-720,-4-1 225,-9 9 0,-3-1-1866,-8-6 1163,2 4 0,0 2-476,1 2 1344,-5-14-692,20 64 1537,16 19-973,11 23 441,-12-23 0,2 2 152,14 6 0,-1 0 221,-6 22-657,10-10 1,3 0 192,-2 5-370,-5-13 1,1-1-925,7 0 1385,-13-16 0,0-2 520,9 3 0,0-6 0,1-4 0</inkml:trace>
+  <inkml:trace contextRef="#ctx0" brushRef="#br0" timeOffset="43098">13278 7516 25348,'-18'-4'-1625,"3"18"1976,15-1-3697,0 24 888,16-9-18,-12 1 613,27-9 1124,-27-3-1984,31-7 2647,-20 8 1,17-15 0,-11 8 0</inkml:trace>
+  <inkml:trace contextRef="#ctx0" brushRef="#br0" timeOffset="43635">13597 7392 23819,'-22'-12'-2700,"-8"1"2970,10-2-1195,2 4 637,-18-1 742,21 5-318,-17 1 444,10 2-656,-10 2 1066,8 19-81,-9 7 382,16 13-1322,3 11-517,9-17-32,5 8-945,21-13-258,-15-2-392,39-3 656,-10 1 46,12-12 1499,16 5 454,-26-16 776,21 4 228,-29-19 772,3 10 44,-12-24-1815,-11 7 93,0-18-1125,-9 8-450,0 0-174,0 12-168,0 0-834,0 3 272,-17 2 996,13 3-571,-13 3 1876,17 17-940,21 8 276,2 17-741,14-16 881,-3 15-867,-6-29 1186,20 26 0,-9-27 0,14 9 1</inkml:trace>
+  <inkml:trace contextRef="#ctx0" brushRef="#br0" timeOffset="43882">14263 7007 25528,'0'-10'-5216,"-14"1"5531,11 5-2046,-21 1 3439,22 23-2282,-8 10 589,10 30-701,0-9-340,9-13 0,3 0 142,9 8-123,1-6 1,0 0 204,-2 6-578,-1-17 0,0 0-818,4 19 250,6-14 685,-1 12-29,-21-26 1265,5 2 0,-11-14 0,2-2 0</inkml:trace>
+  <inkml:trace contextRef="#ctx0" brushRef="#br0" timeOffset="44031">14250 7389 24359,'-10'-33'-8422,"2"1"5660,8-10 2320,0 14-398,17-10 1487,-12 23-913,34 1 1861,-4 11-1863,10 3 1928,5 14-672,-11-10-725,2 24 1,3-25-1,1 10 1</inkml:trace>
+  <inkml:trace contextRef="#ctx0" brushRef="#br0" timeOffset="44382">15055 7315 24269,'-24'-16'-3279,"1"-3"1323,-26 17 3463,9 10 77,4 13-424,16 18-1570,9-6-379,11 0-1527,20-5 1262,13-2 816,12-8-545,4 0-324,-10-17 596,2 5 866,0-6 596,-2 0 556,-2-14 1128,-4 10-1123,-3-25-688,-4 26 387,-5-33-884,-4 7-302,-8-9-129,-3-12-871,-6 21-979,0-5 239,0 15 57,-17 5 65,12 3-260,-13 27 2077,18 10-1178,0 14-296,17 2-460,-12-9 194,32-2 559,-32 0 905,39-3 0,-25-3 0,21-2 1</inkml:trace>
+  <inkml:trace contextRef="#ctx0" brushRef="#br0" timeOffset="44564">15995 7096 25438,'0'-11'-7375,"0"2"4887,0 3 794,0 2-834,-17 3 2766,13 14 0,-13 6 0,17 16 0</inkml:trace>
+  <inkml:trace contextRef="#ctx0" brushRef="#br0" timeOffset="44681">16088 7519 24629,'0'12'-5846,"0"1"5313,0-4 1,0-3 0,0-3 0</inkml:trace>
+  <inkml:trace contextRef="#ctx0" brushRef="#br0" timeOffset="48581">18103 7089 24089,'2'-28'-4325,"0"2"2758,-2 0 612,0 1 400,0 4 244,-21 0 60,16 4-605,-31 4 153,12 1 1267,-7 7 614,-4 0 140,9 5 278,0 15 437,-10 5-58,13 0 321,1 26-2313,15-28-76,7 25-1194,18-20-154,-14 0-616,41 1 673,-4 10-339,12-9 1198,-18-5 1,-2 0 165,3 2 286,5 12 317,-16-16 449,-13 4-943,-2-10-490,-10 1 491,0-2-506,-19 4 1660,-11-3-1182,-21 4 695,6-7-49,4-1 1,8-5 0,1-2-1</inkml:trace>
+  <inkml:trace contextRef="#ctx0" brushRef="#br0" timeOffset="48847">18888 6575 24359,'3'-5'-2052,"-1"16"-2484,-2 11 3102,0 9 574,0 8 377,0-5-17,0 6 193,0 25-1289,0-14 1155,0-16 1,0-1 767,0 13-1046,0 0-181,13-3-1973,-10 18 2833,10-18 1,-13 12 0,0-22 0</inkml:trace>
+  <inkml:trace contextRef="#ctx0" brushRef="#br0" timeOffset="49149">18598 7037 22020,'23'-24'-479,"16"3"1211,-12 1 1,2 0-315,23-1 44,-5 2 0,0 2 91,1 8-524,-7 4 1,0 2-193,6 2 151,-9 7 0,-2 3-359,3 11-309,-6 4 0,-2 2-913,-3 9-453,10 18-17,-28-29 380,0 4-609,-8-12 413,-1-30-472,-1-26 736,0-12 235,0-11 1547,0 21 0,21 0 0,6 0 0</inkml:trace>
+  <inkml:trace contextRef="#ctx0" brushRef="#br0" timeOffset="49381">19838 6998 23459,'0'5'-6475,"0"0"4346,0-2 1155,0-1 245,0 6 304,0 0 121,0 11 76,0-4-2538,18 14 1465,-13-12 1264,26 7 0,-27-11 0,10-1 0</inkml:trace>
+  <inkml:trace contextRef="#ctx0" brushRef="#br0" timeOffset="49539">19832 6626 22740,'-2'-7'-1803,"2"20"0,-2 7 0</inkml:trace>
+  <inkml:trace contextRef="#ctx0" brushRef="#br0" timeOffset="49931">20298 6844 22740,'0'28'-6026,"0"-5"3897,0 0 1155,0-4 336,19 12-348,-15-6 350,31 23 341,-32-26-1545,21 13 1530,-22-26-105,11 0 845,-6-7 660,3-24 90,4 16 1584,-1-41-1973,13 10 742,-5-12-922,-1 16 0,1 1 927,2-3-552,15-14-504,-19 34 414,4-7-1555,-11 21 1955,-2-5-240,-2 6-371,3 15-2048,-5 7-365,6 20-287,-5-6-1786,7 18 479,-4-22 2712,6 10 0,0-16 1,1 0-1</inkml:trace>
+  <inkml:trace contextRef="#ctx0" brushRef="#br0" timeOffset="50364">21147 6777 23459,'-21'18'327,"-7"-14"421,25 34-3882,-9-20 2881,12 18-1475,0-7 494,0 2 308,20-3-852,-15 0-315,40-4 907,-13 4 1141,12-16 8,13 8 973,-25-18 665,20-12 361,-26 6 381,5-30-539,-16 30 92,-7-37-1360,-3 23-566,-5-29-727,0 19-844,-19-12-975,15 19 353,-27 5 1384,29 27-822,-10 23 1542,19-2 0,3 3-1016,-5 29 969,10-15 0,3 0-541,5 11 706,-4-9 0,1-2-214,3 4-307,-6-20 0,-1 0-154,-6 17 135,7-16 508,-11 13 175,-6-28 474,-26 5 1213,-9-17-75,-17-1-1917,18-4 1,1-2 617,-11 0 0,-13-16 0,17-4 0</inkml:trace>
+  <inkml:trace contextRef="#ctx0" brushRef="#br0" timeOffset="50565">22442 6993 22560,'4'0'-570,"-1"0"0,-2 0 1</inkml:trace>
+  <inkml:trace contextRef="#ctx0" brushRef="#br0" timeOffset="53716">7790 9460 23999,'-12'0'450,"2"0"-360,0 0-90,3 0-90,2 0 180,1 0-90,28 0 90,10 11-2099,18-8 550,5 9 1379,-4 0 1,8-9 0,3 9 0</inkml:trace>
+  <inkml:trace contextRef="#ctx0" brushRef="#br0" timeOffset="54039">9418 9019 24179,'-20'-2'-253,"3"0"75,6 23-840,6 4-478,2 14 174,3 1 300,0-4 8,0 2-1122,0 4-589,0 22 890,0-14 584,5-6 1,2 0 1131,-5 6 1,5-17 0,-2 0 0,-5 11 0</inkml:trace>
+  <inkml:trace contextRef="#ctx0" brushRef="#br0" timeOffset="54201">9023 9599 22650,'-6'-32'-7629,"1"-13"5473,5 10 1395,20-20 1459,7 23 716,14-4-699,-11 20 0,1 3 138,12-7-764,-3 6 0,2 2 0,10 1 0,-17 5 0,0-1 0</inkml:trace>
+  <inkml:trace contextRef="#ctx0" brushRef="#br0" timeOffset="54419">9902 8974 23549,'-20'15'1884,"5"6"-3321,15 13-1575,0 3 1241,0-2 530,0 5 265,-8 5 477,5 5-1737,-10 5-215,8 2 417,-1 6 2066,-2 3 0,6-32 0,0 1 0,-2 0 1,0-1-1</inkml:trace>
+  <inkml:trace contextRef="#ctx0" brushRef="#br0" timeOffset="54881">10832 9400 23639,'-54'-6'-412,"4"2"271,8 4 401,1 0-21,-8 0-109,16 8 0,0 3 555,-18 12-377,10-2 1,3 3 92,0 12-213,-5 1 56,24 0-921,10-8-496,5 15-506,26-21-601,7 2 292,13-17 1231,0-4 585,3-18 655,-11 11 507,16-28 571,-32 7 335,9-16-881,-25 5-1115,5 37-64,-7 7-1257,0 34-662,0-4 202,0 5-13,16 6-9,-12 3 593,13 1 635,-3-1-901,-11-2 1453,5-16 0,-2 0-163,-6 17 327,-8-11 0,-1-1-63,5 4-68,-34 8 384,33-22-467,-37-6 833,36-5 1,-34-10 0,17-4 0</inkml:trace>
+  <inkml:trace contextRef="#ctx0" brushRef="#br0" timeOffset="55081">11223 9370 22830,'4'36'-7007,"-1"6"4865,-3-6 1304,0 5 335,0 8-102,0-10-1254,0 27 1814,0-29 0,0 7 0,0-16 1</inkml:trace>
+  <inkml:trace contextRef="#ctx0" brushRef="#br0" timeOffset="55231">11340 9102 22650,'0'-17'-6476,"0"3"6633,0 7 0,21 21 1,6 7-1</inkml:trace>
+  <inkml:trace contextRef="#ctx0" brushRef="#br0" timeOffset="55615">12000 9334 23369,'-41'0'630,"-6"0"-630,9 0 0,-14 18 1087,22-13-804,5 18 1,3 4-743,6-6 134,1 8 0,4 3-587,9 1-574,-6 10 226,8-15-246,22-1-915,4 5 126,1-12 1287,17 2 630,-13-16 985,11-2 727,5-4-101,-22-20 629,5-3 268,-18-12-1212,-3 3-481,-9 6-693,0 0-766,0 1-332,0-7-217,0 11-380,0-2 236,0 12 574,0 21-1050,0 7 1112,21 25-502,-16-7 1519,32 1 0,-22-12 1,14 0-1</inkml:trace>
+  <inkml:trace contextRef="#ctx0" brushRef="#br0" timeOffset="55948">12490 9411 23459,'0'39'-6385,"0"1"4346,0-6 975,14 1-553,-10-10 932,17-9 1097,-15-31 82,4-15-1341,-5-11 1174,-2-3-189,0 10 137,0 0 607,3-8-444,-2 14-423,4-2-142,-1 16 398,2 8 1412,0 2 377,3 4-649,1 23-2544,16 9-719,-6 15 1665,13 5 1,-10-7-1,1 3 1</inkml:trace>
+  <inkml:trace contextRef="#ctx0" brushRef="#br0" timeOffset="56682">14090 8776 26428,'-24'-4'-1230,"4"2"1141,3 1 413,8 1-71,3 16-1270,5 11-457,18 10-255,-13 7-137,26 13 56,-12-9 775,-1-7 0,0 2-1294,2 7 589,-2-7 1,0-2-498,0 5 1042,-2-8 1,0-1 519,0 0-493,-1 10 340,-14-12 1335,3-12 674,-27 4 1510,-7-19 292,-27-17-422,13 5-150,1-33-1284,14 18-102,4-22-1335,3 9 294,11-3-2092,-8 0-449,17-15 1137,-9 12-697,39-19 2858,-20 29-376,19 10 1,7 4 2241,13-4-111,16 9-1286,-19 5 0,-1 1 908,11 3-1349,-9 8 0,0 5 871,5 8-1718,-11 0 0,0 0-559,1-1-931,7 11-157,-13-18 1115,-12 4-777,2-1 474,-16-14 1106,0 9-1412,-25-10 2353,-3 3 176,-20-4-125,20 4-171,-14-2 438,20 4 407,-4-1-1052,8 1 1765,11-1-4288,0 1-371,0-1 311,20 2 857,-15-4-457,35 1 328,-12-3 281,18-1-72,-19-15 2516,7 12-776,-30-23-815,10 10 1,-14-12 0,0 0 0</inkml:trace>
+  <inkml:trace contextRef="#ctx0" brushRef="#br0" timeOffset="57081">15135 9207 22380,'16'13'-5237,"0"2"3116,-6-2 589,-1 0 314,-2 3-29,-2-5 463,-3 1 373,0-2-1669,-2-4 1748,0-16 242,0-6 258,19-20 1057,2 6 678,18-11 225,-19 18-331,11-5 417,-19 14-885,16 4 961,-11 4 129,2 3-1473,-4 3-459,7 15-1602,-5 9-574,10 22-370,-10-5-1160,8 18-1302,-10-23 3777,4 11 0,-7-16 1,-1-2-1</inkml:trace>
+  <inkml:trace contextRef="#ctx0" brushRef="#br0" timeOffset="57381">14838 8804 24359,'-46'-9'-1144,"4"0"698,8 1-3,9-1-187,6-3-266,10 2-403,3-1 131,6 2-513,0 2 377,21-7 2146,5 7 144,1-3 456,20 6-305,-25 1-257,24 1 127,-13 2-537,0 0-192,-2 0 0,0 14 1,0 5-1</inkml:trace>
+  <inkml:trace contextRef="#ctx0" brushRef="#br0" timeOffset="57531">15280 8426 22920,'16'-14'-31,"0"0"482,4 5 340,18 1-1711,-4 5 866,15 0 0,-10 3 0,1 0 0</inkml:trace>
+  <inkml:trace contextRef="#ctx0" brushRef="#br0" timeOffset="57948">16648 8554 24089,'-5'-27'-6843,"0"2"4088,1 6 1686,1 2 668,1 5 786,2 4-402,-1 22 154,1 18-1031,9-1 1,2 3 596,-7 29 315,16-13 1,-1-1-562,-14 17-9,9-10 0,2 0-116,-9-22 0,0-1-448,4 20 0,-1-2-289,3 5 1391,-5-22 0,-2-1 1,-4 5-1,5-3 1</inkml:trace>
+  <inkml:trace contextRef="#ctx0" brushRef="#br0" timeOffset="58080">16708 9025 23459,'0'-38'-6385,"0"2"3806,0 1 975,18 4 2212,-13 2-1351,37 5 1355,-2 1-274,11 10 1,9 3 0,-16 8-1</inkml:trace>
+  <inkml:trace contextRef="#ctx0" brushRef="#br0" timeOffset="58581">17623 8896 25078,'-44'-12'-2124,"-6"9"2507,6-10-1035,0 13 1130,0 19 769,11-14-747,-4 31-497,13-12-55,12 21-440,3-10-823,32 9-544,-18-22-592,51 5 339,-6-13 1673,-18-10 0,3-1 326,13 1 1,-2-3 136,13-16 754,-14 6 1,-2-2 861,2-7-321,-14-5 0,-2 0 1081,-6 6-719,-3-41-2286,-15 35-351,-5-13-612,-17 28 208,13 21-117,-12 9 620,16 21-958,0-7-137,20-15 1190,-15 3-302,34-22 2452,-12 8-1200,8-10 817,2 0-653,-12 0 1244,-1-21 96,-2 16 356,1-37-675,-5 26-471,5-30-879,-9 20-857,3-13 145,-10 25-131,-1-7-152,-3 20 1135,3 13-1782,-1 15-1686,8 24 764,-4-8 2135,7 0 1,-4-14 0,2-2 0</inkml:trace>
+  <inkml:trace contextRef="#ctx0" brushRef="#br0" timeOffset="58749">18362 8365 24988,'-17'-10'85,"-7"3"0,22 16 0,-9 9 1</inkml:trace>
+  <inkml:trace contextRef="#ctx0" brushRef="#br0" timeOffset="58917">18088 9776 25528,'-6'10'-3710,"-1"-3"3951,3-3 1,0-4-1,4 1 1</inkml:trace>
+  <inkml:trace contextRef="#ctx0" brushRef="#br0" timeOffset="59198">19100 8742 26517,'5'0'0,"7"0"0</inkml:trace>
+  <inkml:trace contextRef="#ctx0" brushRef="#br0" timeOffset="59315">19257 9054 23909,'0'7'-1642,"0"-2"1,0 0 0,0-2 0</inkml:trace>
+  <inkml:trace contextRef="#ctx0" brushRef="#br0" timeOffset="60381">21102 8698 24179,'-29'-7'-1259,"-12"2"1207,37 1-2533,-38 1 3380,8 2-283,-13 1-169,15 9 0,1 4 650,-9 17-774,-7 10 296,17 2-632,6-11 1300,7 0-1692,5 0-324,8-3-692,3-2-557,29 4 161,-6-16 1361,12-2 0,4-2 291,12-9 359,-14-5 1,0-1 705,20 1-133,-28-15 0,0-2 924,27-3-616,-29 1 1,-1-2 573,23-17-629,-8-4-799,-18 10 1,-4-2-801,5-21 344,-12 5 0,-4 0-1150,-3-11 922,-2 22 0,-4 0-1314,-20-11-296,17 3 311,-17 9-240,2-3 479,15 20 687,-26 0 989,28 46 111,-8-2 952,28 31-1218,-16-15 0,3 1-602,14-6 0,4 2-399,-9 26 1,-1 2 671,7-23 0,1-2 385,-1 12 1,-2-1 0,11 13 0,2-2 0</inkml:trace>
+  <inkml:trace contextRef="#ctx0" brushRef="#br0" timeOffset="60664">21943 8720 23639,'-39'-12'-2357,"-3"3"1980,19 23 1812,-20-10-934,38 31-2009,-34-18 2599,35 19-2225,-20-8 831,21 0-495,-5 13 15,34-12-1155,10 11 16,14-26 2762,0 6-2243,-10-18 2620,-1 3-1285,0-5 1613,11-23 287,-16-6-96,5-14-229,-21 1-1763,-8 7-246,-4-30-1209,-31 24-120,10 3 0,-4 3 1515,-27 8 1,0-3-1,14 15 1</inkml:trace>
+  <inkml:trace contextRef="#ctx0" brushRef="#br0" timeOffset="61480">22793 8812 23819,'30'-42'-585,"18"7"1748,-42-7-3687,44 6 3693,-31-5-1648,23-4 614,-13-4-481,0 0-131,-3-4 271,-1 0-861,-3-1 1423,-13 16 0,-1 0-1337,7-18 847,-11 23 1,-1-1-986,2-20 175,-5 21-175,0-7 302,-14 30 269,11 19 618,-22 45 364,22 0-562,-3-1 1,1 1 148,5 9-116,0-8 1,0 1 94,0 7-155,11-21 1,2-2-937,-7 11-123,18-27 1,3 0-621,-3 21 233,10-18 1,4-1 1687,13 8 1,-16-14-1,1-2 1,20 1-1</inkml:trace>
+  <inkml:trace contextRef="#ctx0" brushRef="#br0" timeOffset="61783">24195 7925 24089,'-14'-6'-2837,"10"0"-983,-10 18 5981,14 2-3600,0 21 419,0-4 382,0 29 92,0-13-252,0 1 0,0 1-22,0 17 983,0-22 0,0 2-1030,0 2 1,0-2 866,0-12 0,0 2-540,0 19 1,0 0-540,0 2 444,5-23 1,0-2 568,-3 4 0,8-5 0,-10-4 1</inkml:trace>
+  <inkml:trace contextRef="#ctx0" brushRef="#br0" timeOffset="61971">23633 8473 23819,'-14'-14'-5785,"4"-1"2460,6 1 1464,33-3 4800,0-1-1808,16 4 1,6 1-771,-14 2 1,2 0-832,10-1 1,6 0 0,-5 2 502,0 1 0,0 2 0,-6 0 0,2 1 0,-3 1 0,2 2 0,0-1 1</inkml:trace>
+  <inkml:trace contextRef="#ctx0" brushRef="#br0" timeOffset="62281">24753 8411 23279,'-6'16'-3310,"1"10"1220,5 9 270,15 4-452,-11-9 1491,12 0-167,1-2 353,-13-2-876,25-3 981,-11-2 99,5-10 1236,15-2 1314,-14-32-308,12 2 654,-7-24-899,2 3-219,0-9-1191,0-6-126,-16 26 1,0-1-632,-2 0 1,0-1 494,1 1 0,-1-1 1,-2 0-1,0 1 0,0 0 1,0 0-1</inkml:trace>
+  <inkml:trace contextRef="#ctx0" brushRef="#br0" timeOffset="63349">26477 8330 23369,'-18'-9'-2410,"13"-3"-2075,-29 0 5219,15-5-1393,-1 7 822,-12 2 433,17 6 198,-16 2-704,6 0 738,-1 24 1432,-2-18-1193,3 44-222,-6-12-231,13 10-831,-1 14-568,15-28-566,2 6-136,26-19 94,7-4-12,31-9 1900,-12-1-417,-14-13 0,0-7 1498,6-18-1006,-5 2 1,-3-4 27,-13 5 0,-3-1-99,6-2 0,-1-3-85,-5-4 0,-3-1-299,5-23-526,-9 7 1,-2-1-259,-6 22 0,-2 0-252,1-21 1,-1 0-569,-1-8 670,-10 26 1,0 1-951,4-6 423,-14 9 231,6 7 824,10 6-301,-10 27 2761,14 44-2207,17 2-93,-16-10 0,2 0 180,13-12 1,-1-1-282,-12 36 226,10-33 0,1 2-129,-7 12 1,-1 1-127,2-13 0,0 0-2102,3 19 1,0-2 797,2 1 288,5 8 1233,-6-30 0,-2-6 0,-3-5 0</inkml:trace>
+  <inkml:trace contextRef="#ctx0" brushRef="#br0" timeOffset="63498">26228 8238 24089,'-14'-35'-9241,"4"-1"6720,30-13 3841,8 11-496,-2 13 1,4 3-150,0 5 1,1 2-262,4 1 0,1 0-439,4 0 1,3 2 86,1 1 1,1 0 0,3 0 0,-1 1-1,2 1 1,0-1 0</inkml:trace>
+  <inkml:trace contextRef="#ctx0" brushRef="#br0" timeOffset="63765">27378 7562 24089,'-12'-1'-829,"1"0"783,2 1-87,4 0 425,1 18-1836,2-14 1080,2 40-764,-3-19-133,0 28 754,-1-15 0,-1 1-641,-1 27 675,-2-6 0,0 2-151,4-23 0,-1-1 410,-1 12 0,-1-1-455,2-14 0,1-2-93,-4 32 852,1-3 1,2-5 0,1-4 0</inkml:trace>
+  <inkml:trace contextRef="#ctx0" brushRef="#br0" timeOffset="64131">27553 8178 23459,'6'0'90,"-1"18"-5758,1-14 4420,0 35-393,1-19-26,3 19 850,4 10-24,-1-12-1334,8 24-64,-8-27 2057,8 15-674,-11-25 881,6 8 210,-12-22-545,3 1 563,-5-11 1139,4-23-152,-2-8-156,9-34 152,-2 10 47,5-4 188,6 2 200,-5 18-405,13-14-866,-12 31 418,13 5 965,-12 12-171,6 5-310,-5 21-2196,-2-16 50,0 41-4170,6-10 4604,-4 12 1,2 2 0,-7-14 0</inkml:trace>
+  <inkml:trace contextRef="#ctx0" brushRef="#br0" timeOffset="64261">28633 8426 25978,'5'-8'-834,"-3"1"0,0 7 0</inkml:trace>
+  <inkml:trace contextRef="#ctx0" brushRef="#br0" timeOffset="89611">2338 10940 24179,'-22'13'1990,"3"-10"-1051,1 11-356,4 0-933,1-11 889,5 28-2051,5-15 384,0 17-248,3-1-650,0 6 188,0 3-34,0 8 314,20 0-1370,-15 5 2235,30 0 1,-31 1 432,27 0-204,-27 0-400,28-3-797,-19 0-163,13-4 945,-9-2-747,0-3 1545,-3-5 0,-2-4 0,-2-2 0</inkml:trace>
+  <inkml:trace contextRef="#ctx0" brushRef="#br0" timeOffset="89751">2063 11603 23549,'-3'-21'-7833,"2"1"5821,-3-4 192,26 6 3473,-16-3-1068,55 2 0,-35 7 0,34-1 0</inkml:trace>
+  <inkml:trace contextRef="#ctx0" brushRef="#br0" timeOffset="89998">2847 11544 23369,'24'16'-4602,"-18"14"803,41-26 5652,-42 34-3535,38-17 1944,-37 21-1111,25-3 140,-28 27-881,8-9 1313,-31-2 0,-9 2 335,13-21 1,-3 0-66,-13 5 1,-8 4 0,3-4 0,5-4-1,1-2 1,-13 12 0,-1 0 0</inkml:trace>
+  <inkml:trace contextRef="#ctx0" brushRef="#br0" timeOffset="91064">4588 10816 25978,'-12'-10'-4992,"-3"3"4351,5 5 1021,0 1 1103,5 1-660,1 15-1617,0 10 94,2 11-795,0 7 1367,1-10 1,0 2-581,0 22 141,0-3 0,1 2-122,0-21 0,0 1-245,0 25 1,0 1 132,0-24 1,0-2 187,-1 11 0,2 1-473,7-4 1,0-1-90,-5 22 383,6-18 1,-2-1 759,-7 0 0,0 2 1,0-25-1</inkml:trace>
+  <inkml:trace contextRef="#ctx0" brushRef="#br0" timeOffset="91172">4372 11657 23459,'-14'-33'-9230,"-7"-16"6140,19 13 2333,12-22 740,-5 26-335,24 6 0,6 2 771,-4-2 0,3 9 0,2 2 0,9-4 0</inkml:trace>
+  <inkml:trace contextRef="#ctx0" brushRef="#br0" timeOffset="91564">5235 11508 23639,'-21'9'3330,"15"0"-5554,-29-2 2886,31-1-2026,-26 3 2131,27-2-1435,-23 5 1314,23-4-1657,-7 9-251,10-6 196,0 6-910,0-3 989,0 1-1527,17 1 644,3 4-736,1-6 2132,27 2 341,-30-12 1359,33-1 546,-29-18 691,3 12 397,-11-26-944,-6 9-479,-2-15-1583,-6 4-909,0 5-172,-16 14 105,12 20-14,-11 11 716,35 18-1031,-14-4-634,34 2 601,-24-6-1141,35 11 2734,-16-13 1,14 5-1,-11-15 1</inkml:trace>
+  <inkml:trace contextRef="#ctx0" brushRef="#br0" timeOffset="91801">6003 11390 24539,'-21'-11'-3664,"-2"4"3335,-2 18 2720,-4-7-1543,26 27-2653,-19-7 2128,19 10-1456,-7-1 126,10-7 371,0-2-266,24-1-1345,-18-2-155,42-3 3133,-14-4-1354,12-7 1578,-1-3-225,-15-4 776,-3 0-449,-13-14-1513,11-5 757,-22-17 1,11 3 0,-14 0-1</inkml:trace>
+  <inkml:trace contextRef="#ctx0" brushRef="#br0" timeOffset="91981">5627 12368 23729,'14'4'927,"3"-16"0,13-6 0</inkml:trace>
+  <inkml:trace contextRef="#ctx0" brushRef="#br0" timeOffset="92547">7200 11327 25168,'0'-7'-6565,"0"2"4436,-11 1 2757,8 19-974,-8 20 292,30 6-528,-17-7 0,1 1-28,32 4-468,-33-5 1,0-1 984,24 3-120,-23 7-715,8-20 164,-3-6-237,-6-4 1611,5-5-548,-7-26-133,0-12-556,0-16 120,0-7-509,0 19 1,0-1 1134,0-21 0,0 20 0,0-1 0,0-13 0</inkml:trace>
+  <inkml:trace contextRef="#ctx0" brushRef="#br0" timeOffset="92947">8163 11298 24179,'-47'-12'-1579,"0"9"1918,-3-10-977,1 13 1086,9 0-150,6 0-85,12 23-81,5-5-222,2 21-397,9 1-589,2-7 137,4 20-567,20-25-367,-15 7-4,38-18 1262,-38-4-1566,42-7 2904,-27-2 208,21-4 403,-11 0 263,11-14 933,-13-11-580,14-23-1417,-24 5 1382,2-5-2202,-14 15-322,-2 1-759,-4 4-498,0-1-297,0 9 493,0 21-625,0 22-116,18 14-1276,-13 8 3519,37-8 0,-20 4 0,21 1 0</inkml:trace>
+  <inkml:trace contextRef="#ctx0" brushRef="#br0" timeOffset="93497">9763 11193 25078,'-18'-15'-4291,"-2"-2"2453,-3 9 2192,-6-1 169,12 9 502,-13 14 289,7 11-903,9 10-1367,7 4 912,7-6-754,0 4-973,0 0-375,24 1-2249,11 10 3952,15-17 1,3 4 0,-10-19 0</inkml:trace>
+  <inkml:trace contextRef="#ctx0" brushRef="#br0" timeOffset="93781">10187 11265 24179,'-23'-13'-3989,"2"3"3092,-23 10 2118,7 16 625,16 4-1596,-3 21-630,22-10-668,-6 4-98,31-3 223,-17-7 524,24-10 0,5-2-175,-7 2-76,10-9 0,3-4 655,1 4 324,11-21 1700,-9-9-364,-12-9 126,0-19-548,-16 18-1434,-9-12-413,-3 15-683,-4 1-290,-40-11-1156,30 17-1882,-50-4 4500,39 22 1,-3 3 0,8 3-1</inkml:trace>
+  <inkml:trace contextRef="#ctx0" brushRef="#br0" timeOffset="94097">11027 11228 24539,'-23'-11'-3740,"2"3"2951,-24 8 1876,12 0-435,12 18-69,-9-14 133,17 40-1653,-7-27 1065,11 22-404,9-6-579,17-7-936,12 8 79,9-21 982,21-1 30,-21-12 1475,-2-17 1,-1-4-604,-3-2 387,-7-11 0,-5-2 426,-11 3-448,-2-24-554,-30 26-2382,-7-13 210,-14 29 122,-2-5 1883,9 18 1,1-3-1,0 5 1</inkml:trace>
+  <inkml:trace contextRef="#ctx0" brushRef="#br0" timeOffset="94371">11553 10765 23459,'0'-5'-6475,"0"17"4346,0 14 1155,0 10 335,0 9 304,17-7-771,-13 3 781,12 3-1959,-3 20 1811,-1-15-1004,0-9 1,1 0 1318,-2 5 1,10 9 0,-8-19 0</inkml:trace>
+  <inkml:trace contextRef="#ctx0" brushRef="#br0" timeOffset="94598">12028 10912 24089,'-38'-1'134,"-1"-1"-198,4 21 1196,4-14-733,8 34-1429,1-22 1214,3 20-896,8-5-128,-1 0-74,11 3-906,-4-2-2064,27 14-330,-17-13 3982,43 7 1,-26-19 0,22-4-1</inkml:trace>
+  <inkml:trace contextRef="#ctx0" brushRef="#br0" timeOffset="94781">12387 11126 24539,'-17'-4'-1754,"12"17"-273,-12 4 2846,17 20-3591,15-20 178,-11 14 67,23-27 2494,-24 24 1,25-25 0,-10 9 0</inkml:trace>
+  <inkml:trace contextRef="#ctx0" brushRef="#br0" timeOffset="94948">12410 10645 23639,'0'-4'-8274,"0"18"7353,18-10 1,-14 33 0,14-11-1</inkml:trace>
+  <inkml:trace contextRef="#ctx0" brushRef="#br0" timeOffset="95265">12930 11311 23729,'11'0'180,"9"-21"-504,-4 16 1842,17-34-2012,-14 14 227,18-22 18,-18 10-267,10-8 44,-17 19 258,0-26-552,-9 23-1109,-19-18-212,-6 27 1001,1 0-88,-11 11 1206,14 5 185,-1 21 447,4 12-164,15 11-714,0 2 684,0 11-1228,23-14-608,-17 13-717,41-20 277,-27-4-1222,23-5 3011,-8-4 1,2-9 0,1-3 0</inkml:trace>
+  <inkml:trace contextRef="#ctx0" brushRef="#br0" timeOffset="95549">13513 10958 24089,'-14'-7'-3516,"-1"2"2808,-2 23 1558,5 1-916,33 19-2145,5-4 992,27 2 937,-12-8-894,3-5 1022,-15-7-36,-1-2-558,-2-1 385,-5-1 1411,-2 0-187,-5-1-866,-6-3-406,1-1 95,-8-1-608,2 1-209,-3 2 463,-23 0 2340,-3 4-777,-2-3-393,-17 1 24,25-1 1,-20-3 0,12 1-1</inkml:trace>
+  <inkml:trace contextRef="#ctx0" brushRef="#br0" timeOffset="96599">2117 13664 22290,'12'-7'2433,"-9"19"-8753,17-10 6920,-19 34-2590,6-18-27,-1 22 953,-2-5 316,5 7-1264,-2 2-411,-1 2 2768,1 3-2017,0-1 1580,1 2 450,-1-2-796,0-2-441,-1-4 395,1-3 474,-2-6 0,0-5 0,-1-4 0</inkml:trace>
+  <inkml:trace contextRef="#ctx0" brushRef="#br0" timeOffset="96747">2060 14209 22920,'-13'-20'-7726,"10"1"5216,-9 1 1317,5 1-324,5 1 1275,-4 2-310,6 2 684,0 1-1728,24 1 4281,-18 2-2608,60 2 864,-37 3-348,37 2 1,-21 1-1,2 0 1</inkml:trace>
+  <inkml:trace contextRef="#ctx0" brushRef="#br0" timeOffset="96965">2715 14083 21480,'15'27'-8204,"-11"-3"6020,24 1 2136,-24-2-369,23 3 564,-23 3-465,19 3-10,-21 2-1315,8 3 1644,-10 18 304,0-12-546,-7-6 0,-4-1-49,-14 5 584,2 13 1,-22-22-1,14 0 1</inkml:trace>
+  <inkml:trace contextRef="#ctx0" brushRef="#br0" timeOffset="98014">4190 14437 22020,'18'-24'-478,"0"-23"-1334,16 20 3140,-3-29-1485,-11 19 1,0-1-74,-5 8 1,-2-1 21,10-26 0,-3-1 0,-13 23 0,-2-1-203,7-26 0,-4-1-128,-6 26 0,-2 1 294,2-12 1,0 1-1349,-2-12 886,-21 5-838,16 8 286,-34 0 427,34 19 168,-26 4 794,28 35 404,-19 6 1117,19 23-1626,-6 2 1117,9 9-920,0 8-173,0-28 1,0 3 181,-2 16 0,4 2-508,7-13 0,1 0-84,-9 12 0,3-2-738,16-16 1,0-2 600,-15 30-304,24-21 1,4-2 149,-6 18 98,3-23 0,4-2 32,-4-6 0,0-2 520,17 6 215,-15-13 0,1-2 1,8-5-1,2-3 0</inkml:trace>
+  <inkml:trace contextRef="#ctx0" brushRef="#br0" timeOffset="98367">4973 14110 24629,'0'-15'-6566,"-20"7"6735,3 3 218,-17 20 1819,20 7-2180,-4 22-380,16-6-640,-4 2-370,6-10 1364,0-3-794,17 1-622,2 3-1227,2-11 1211,8 2 414,-12-13 1273,12-5 731,-4-20 1054,-11-9-1088,-2-11 184,-11-12-691,3 18-282,-4-15-611,-16 28-320,13-9-829,-13 39 1424,16-1-689,21 7 339,-10 13 1,2-1-187,36-11 246,-22 8 1,0 0-243,17-6 990,17-11 0,-25-1 0,12-10 0</inkml:trace>
+  <inkml:trace contextRef="#ctx0" brushRef="#br0" timeOffset="98748">5477 14122 22560,'0'31'-6386,"0"2"4258,17-17 1467,-12 10-574,33-23 2670,-20 18-2383,19-18 1760,18 5-1122,-20-8 1906,27-16 587,-38-6-266,6-22-30,-20 8-1708,-1-14 707,-8 21-1999,-1-8-354,-20 9-475,15 11-703,-15 18 2738,20 28-1297,0 13 665,0 14 210,18-6 22,-7-10 0,0 1 22,0-9 1,1 1 83,6 20 0,1 1 9,1 6-856,-9-23 1,1-1 216,17 10 552,-26-6 208,18-4 322,-19-6-161,5-4-699,-7-6-986,0 1 2174,0-10 0,-23-1 0,-5-9 0</inkml:trace>
+  <inkml:trace contextRef="#ctx0" brushRef="#br0" timeOffset="98964">5082 13816 23009,'-3'-24'-7295,"1"2"5047,2-9 1373,0 9 405,19-12 1420,-14 17-754,32-2 1632,-22 11-1274,19 3 1537,-12 4-1810,18 29-208,-15-21 0,12 36 0,-15-23 0</inkml:trace>
+  <inkml:trace contextRef="#ctx0" brushRef="#br0" timeOffset="99120">5692 13308 23189,'-19'23'-1875,"4"10"-968,15 17 2216,0 4 0,0-6 0,0 3 0</inkml:trace>
+  <inkml:trace contextRef="#ctx0" brushRef="#br0" timeOffset="99567">7108 13918 23459,'-55'0'-180,"-2"17"1824,13-12-1739,3 31-140,13-31 470,5 51-1286,-5-35 1268,16 42-1531,-1-33 633,32 23-2358,12-30 885,28 4 819,-6-22 940,-16-14 0,0-2 1579,6 6-917,-14-17 0,-3-4 821,8 1-86,-6-29 703,-5 8-1471,-13 9 0,-3-3-464,1-23 82,-2 5 1,-6-1-664,-9 22 1,-3 0-164,1-24 0,-2 0 89,1 27 1,-1 2-350,-7-8 1,4 2-479,12-4 692,-26 10 601,26 10-3,-17 8 1095,19 25 150,-6 20 172,24 13-1051,-12 14 697,28-6-856,-20-8 1,0 1-114,3-12 0,1 2-545,8 24 0,0 0-169,-9-26 1,1-1 929,12 19 0,1-4 0,8 0 0,-12-19 0,0 0 0</inkml:trace>
+  <inkml:trace contextRef="#ctx0" brushRef="#br0" timeOffset="99914">7842 13777 24089,'-43'0'-90,"6"20"1488,6 3-1337,16 22-1770,6-12 312,9 0-89,0-9 124,0 5-504,0-8-270,23 2-419,2-11 1374,22-7 1988,-8-19 1229,-4-11 337,-10-23-1064,-13 11-388,-5 0-751,-7 16-242,0-3-672,0 35-627,0 10-902,16 42-212,4-10 518,1-15 1,2-2 1777,14 6 0,5 10 0,-9-22 0</inkml:trace>
+  <inkml:trace contextRef="#ctx0" brushRef="#br0" timeOffset="100151">8720 13283 23999,'-17'16'-30,"-4"16"-966,19 8-1699,-6 12 1406,8-5 25,0 6 362,0 4 225,0 4-919,0-1 119,22-2-591,-17-1 1240,35-4-431,-36-1 289,32-6 825,-18 9 0,4-18 1,-8 8-1</inkml:trace>
+  <inkml:trace contextRef="#ctx0" brushRef="#br0" timeOffset="100302">8447 13694 22200,'0'-13'-6296,"0"2"3898,48 6 4389,-18 2-1880,16 12 0,2 2 0,4-6 0,-17 5 0,1 0 0</inkml:trace>
+  <inkml:trace contextRef="#ctx0" brushRef="#br0" timeOffset="100647">9340 13664 23369,'-32'0'0,"1"0"90,3 14 1134,-1-11-1063,6 27-694,-1-26 980,13 33-1505,-9-7 622,17 10-936,-8 10 206,11-23-998,23 14-265,4-22 1684,1 1-996,19-14 2351,-29-3-689,22-3 1361,-2 0-116,-11-16 769,12-9 725,-26-9-1807,7-18-11,-18 18-1832,5-9 24,-7 15-810,0 6 269,0 1-427,0 27-136,0 10 763,0 34-1058,20-5 2196,-15 7 1,33-13-1,-15 0 1</inkml:trace>
+  <inkml:trace contextRef="#ctx0" brushRef="#br0" timeOffset="101031">10500 13116 24898,'-2'-22'-7289,"-2"5"5360,-2 6 650,0 5 1509,4 25 103,0 17-377,2 14-159,0 12-1393,0-5 1799,0 6 82,0-29 0,0 2-348,8 14 1,0 1-550,-7-13 1,2 2-925,9 22 1,2-2 645,-6-26 1,-2-2 781,0 7 0,2-1 0,14 7 0,-9-5 0</inkml:trace>
+  <inkml:trace contextRef="#ctx0" brushRef="#br0" timeOffset="101198">10275 13661 24269,'-9'-28'-8874,"1"2"6090,32-12 4221,13 15-594,-2 4 0,3 3 691,26 3-1283,-29 7 0,0 2-57,16 1-834,1 3 1194,-2 0 1,2 0 0,-3 0 0</inkml:trace>
+  <inkml:trace contextRef="#ctx0" brushRef="#br0" timeOffset="101482">10997 13645 22830,'0'15'-6296,"0"-1"4257,0-2 975,0 0 426,0 3 302,0-4 32,0 6 76,0-8-1369,0 2 1058,24-6 1473,7-2 124,14-2 215,-3-1 233,-9 0-89,9-18 785,-11-2 38,11-21-144,-28 10-1589,4-4 204,-16-4-1838,2 9-269,-20-15-941,13 24-308,-26 2 1203,25 37 244,-9 25 973,13 3-771,6-10 0,4-3-530,14 0 1491,-2-6 0,1-2 1,17 0-1,0 6 1</inkml:trace>
+  <inkml:trace contextRef="#ctx0" brushRef="#br0" timeOffset="101748">11080 13132 22920,'0'-26'-6386,"25"1"8331,-19 5-1213,26 6 1,5 3 1168,-10-3-571,36-5-587,-28 14-364,-1 0 62,-3 5 1194,8 0-1690,-13 17-1058,11 3-423,-22 1-760,-1 26-534,-10-28-72,-4 28-35,0-23 133,0 1 2609,-16-5 0,13-2 1,-13-2-1</inkml:trace>
+  <inkml:trace contextRef="#ctx0" brushRef="#br0" timeOffset="101873">11473 12821 22290,'33'-14'2796,"0"2"-1978,5 8-2085,0 1 1121,3 3 0,0 0 1,0 0-1</inkml:trace>
+  <inkml:trace contextRef="#ctx0" brushRef="#br0" timeOffset="102248">12838 13422 24898,'-28'-20'-1985,"0"0"0,-24-15 636,4 1 714,7 8 275,10 3-250,4 6 477,8 7 334,5 5-859,2 24 1217,9 1-613,0 19-108,3-1-409,0 5 233,0 6 48,8-12 1,4 1-1292,15 17 239,1-11 1,4-2-786,20-2 1598,-21-16 1,1-3-148,19-2 592,3-10 452,2-4 0,1-5 0,1 0 0</inkml:trace>
+  <inkml:trace contextRef="#ctx0" brushRef="#br0" timeOffset="102398">13282 13303 23369,'-48'0'-90,"5"0"90,10 19 982,1-14-691,1 42-1089,5-23 758,11 25-1027,-6-10 334,18 0-1705,-9 13 648,42-15-1106,-5 5 2634,33-24 0,-8-7 1,6-6-1</inkml:trace>
+  <inkml:trace contextRef="#ctx0" brushRef="#br0" timeOffset="102514">13685 13332 22380,'-39'-21'-2401,"8"9"1,-2 2 2458,-20-3 0,16 7 1,0 2-1,-16 2 1</inkml:trace>
+  <inkml:trace contextRef="#ctx0" brushRef="#br0" timeOffset="103218">13668 13432 22020,'6'18'-8313,"-1"-1"6127,-4 3 1725,-1-2 494,0 1-40,0 0 117,-23 2 1499,17-1-2578,-40 0 3876,11 9-837,-12-8 328,-3 5-162,13-11-276,0-4-692,3-2-1912,-1-2 961,4-4 0,1 0 0,3-3 0</inkml:trace>
+  <inkml:trace contextRef="#ctx0" brushRef="#br0" timeOffset="103680">14257 13262 23999,'-34'14'2678,"2"-11"-3086,0 27-118,-8-5 811,12 9-839,-7 18-128,24-17-381,0 12-104,10-14-1009,1-1 375,26-4 188,13 3-136,14-11 1583,-14-10 1,1-2 301,13-3 331,-7-12 1,0-3 1103,8 5-532,-21-14 1,-1 0 1058,6 14-230,-7-38-901,-7 24-383,-8-33-1213,-8 20-793,-28-19-1659,13 22 1352,-26 8 0,-7 2-252,9 1 1853,-5 9 0,-1 2 1,-7 3-1,1 4 0</inkml:trace>
+  <inkml:trace contextRef="#ctx0" brushRef="#br0" timeOffset="103997">14810 12728 24808,'0'-14'-6565,"0"2"4616,16 8 5091,2 19-4227,1 4 75,12 19 260,-27 0-115,29 8-225,-25-7 0,-1 2 896,2-7 0,0 0-50,2 11 1,-2 2-980,-4 1 0,0 0 937,2-12 1,1 1-1106,1 21 0,0-2-569,2 6 1911,-4-26 0,1-1 0,4 4 0,0-4 0</inkml:trace>
+  <inkml:trace contextRef="#ctx0" brushRef="#br0" timeOffset="104237">15547 13089 24269,'-48'-3'211,"-5"0"-195,11 23 1325,-2-15-1144,10 32-532,2-20 829,2 16-771,3-3 171,7 0-206,8 3-493,5-3-884,7 2-305,0-3 80,20 0-2127,17 2 2004,11-12 1059,-6-8 1,2-3 1041,14-4 1,-18-2 0,0-2 0,18 0-1</inkml:trace>
+  <inkml:trace contextRef="#ctx0" brushRef="#br0" timeOffset="104398">15860 13303 24359,'0'39'-6386,"0"-7"4258,0-3 1063,0-6 67,0-4-327,16 0-110,-13-3-591,30-8 1877,-29 5 1,32-11-1,-13 5 1</inkml:trace>
+  <inkml:trace contextRef="#ctx0" brushRef="#br0" timeOffset="104564">15963 12774 24898,'0'-15'-6475,"0"3"4256,0 6-1993,0 2 4038,17 24 1,-12-15-1,12 16 1</inkml:trace>
+  <inkml:trace contextRef="#ctx0" brushRef="#br0" timeOffset="104888">16312 13448 23099,'11'3'-1614,"2"-1"1497,0-1 572,4-1 88,11-16 502,-6-4-769,8 0 315,-9-17-850,1 22 1085,-3-19-1036,4-2-71,-9 8-318,1-21-613,-11 19 601,-1-19-1157,-24 19 422,16-5-847,-33 7 1559,17 13-251,-11-1 747,3 30 1728,15 27-1318,4 1 201,10 15-1814,23-5 0,-17-12-116,23-9 1,5-2 1465,-10 1 1,5-13 0,1-2 0,6 2 0</inkml:trace>
+  <inkml:trace contextRef="#ctx0" brushRef="#br0" timeOffset="105152">17072 13064 24629,'0'-12'-5936,"0"2"3807,0 2 1065,-16 1 1685,12 20-403,-11 6 665,15 25-1588,17-6-1425,-12 4 1769,19-13 1,2 1 368,-19 5-346,15-2 1,-1-1-798,-19-9 259,9 13-1106,-11-19 1353,-21 9 1588,-15-13 764,-10 2-1396,8-9 0,0-2 0,-11 1 0,15-3 0,1 1 0</inkml:trace>
+  <inkml:trace contextRef="#ctx0" brushRef="#br0" timeOffset="105714">18142 12942 25888,'0'-6'-6296,"0"1"4438,-14 2 3177,10 24-1914,-10 26 527,14 4-283,0-8 0,0-1-175,0 5-340,6-7 1,1-1 537,-4 4 184,9 6-1355,-12-23 1444,10-6-942,-8-6 667,8-4 211,-10-25-196,0-13-1066,0-32 445,0 6 235,0 14 0,0 0 701,0-8 0,0-14 0,0 22 0</inkml:trace>
+  <inkml:trace contextRef="#ctx0" brushRef="#br0" timeOffset="106131">18990 12994 24539,'-19'-19'-5360,"-16"-9"4081,-8 25 2896,-13-10-1137,12 13-19,9 0 0,1 0 197,-18 0-289,10 7 1,1 2 10,-3-6 738,14 21 1,3 4 102,2-3-1165,6 33-490,15-22-926,4 3-237,0-5-154,43 11-291,-15-15 1063,14-12 1,5-4 242,4 0 329,7-8 1,2-6 1306,1-18 26,-6 6 0,-2-3 1196,-12-11-1146,-13-2 1,-2-1 519,-5 7 667,-1-38-2200,-15 31-594,-2-2-931,-3 7-436,0 9-304,0 17-2349,19 10 1899,6 21 2426,10-16 1,-1 15-1,-9-12 1</inkml:trace>
+  <inkml:trace contextRef="#ctx0" brushRef="#br0" timeOffset="106263">19678 13117 26877,'6'-8'-1233,"-2"7"-194,-1-7 846,-2 4 0,0 3 0,-1-4 1</inkml:trace>
+</inkml:ink>
+</file>
+
+<file path=ppt/ink/ink8.xml><?xml version="1.0" encoding="utf-8"?>
+<inkml:ink xmlns:inkml="http://www.w3.org/2003/InkML">
+  <inkml:definitions>
+    <inkml:context xml:id="ctx0">
+      <inkml:inkSource xml:id="inkSrc0">
+        <inkml:traceFormat>
+          <inkml:channel name="X" type="integer" min="-2.14748E9" max="2.14748E9" units="cm"/>
+          <inkml:channel name="Y" type="integer" min="-2.14748E9" max="2.14748E9" units="cm"/>
+          <inkml:channel name="F" type="integer" max="32767" units="dev"/>
+        </inkml:traceFormat>
+        <inkml:channelProperties>
+          <inkml:channelProperty channel="X" name="resolution" value="1000" units="1/cm"/>
+          <inkml:channelProperty channel="Y" name="resolution" value="1000" units="1/cm"/>
+          <inkml:channelProperty channel="F" name="resolution" value="0" units="1/dev"/>
+        </inkml:channelProperties>
+      </inkml:inkSource>
+      <inkml:timestamp xml:id="ts0" timeString="2021-07-30T05:26:00.266"/>
+    </inkml:context>
+    <inkml:brush xml:id="br0">
+      <inkml:brushProperty name="width" value="0.12095" units="cm"/>
+      <inkml:brushProperty name="height" value="0.12095" units="cm"/>
+      <inkml:brushProperty name="color" value="#FF0000"/>
+    </inkml:brush>
+  </inkml:definitions>
+  <inkml:trace contextRef="#ctx0" brushRef="#br0">2238 1341 23369,'-13'20'-1371,"10"12"-1552,-11-18 4146,14 18-2623,0 13 496,0-6 530,0-2 0,0 1-255,0 10-877,0 16 365,0-18 936,17 0-1945,-12 19 2022,23-16-226,-25 11 264,17-8-733,-17-16 782,13 17-449,-14-29 353,4 9 256,-6-21-1610,0 0 1396,-14-58-488,11 18 665,-10-7 0,1-3-654,10-6 1038,-9-8-802,3-5 493,7 11 0,0-1-256,-6 12 0,0-2 15,6-26 1,1 0 344,-3 28 0,0-1 123,2-21 0,2 0 427,-1-2-657,9 22 1,2 1 877,-6-4-534,27 5 1258,-29 4-1478,26-2 1241,-9 11 384,17-4 118,-7 17 51,-2 1-460,-9 7-131,2 1-1352,-1 19-228,2-14 12,-1 37-2055,2-19 1103,-9 9 1,-1 3-1931,7 12 1273,-7-4 1,-2 2-1018,-3 11 1468,-4-19 1,-1-1 293,-3 17-1258,0-2 2445,-17 0 1,13-1 0,-13 0-1</inkml:trace>
+  <inkml:trace contextRef="#ctx0" brushRef="#br0" timeOffset="184">1995 2048 23189,'0'-20'-5756,"17"8"8474,-13-6-4108,13 9 3132,5-12-2788,8-5 239,14 2 979,3-8 1,-5 7 0,3-1 0</inkml:trace>
+  <inkml:trace contextRef="#ctx0" brushRef="#br0" timeOffset="470">3152 1207 24359,'-22'0'1349,"9"18"-2425,-1 9 92,13 13-948,-9 7 1026,7-2-27,-4 6 362,1 5-826,0 4 609,1-17 1,0 2 162,2-12 1,-1 2-362,-1 9 1,-1 7 0,1-7 425,2-8 0,0-2 508,-3 30 0,0-3 0,4-10 0,0 12 0</inkml:trace>
+  <inkml:trace contextRef="#ctx0" brushRef="#br0" timeOffset="884">3325 1842 24089,'4'21'-7617,"-1"10"5623,2-11 262,-2 8 1282,6 11-199,-3-15 71,7 16 64,-5-19-1893,3 5 1722,-2-8-16,-1-6 407,-2-1-106,0-8 1282,-1-1 622,2-20-354,0 13 1664,-1-33-1814,0 20 383,1-19-497,0 8 353,0-1-1137,-1 3 98,1 2 135,-3 1-1510,4 12 2249,-2 1-740,6 11 1007,-3 19-2461,6-15 1723,-3 36-1632,2-23 376,1 21-1271,6 1-593,-2-8-719,10 14 49,-8-30 3477,7 12 0,-5-25 1,0 8-1</inkml:trace>
+  <inkml:trace contextRef="#ctx0" brushRef="#br0" timeOffset="1290">4023 1312 24449,'0'-6'-4407,"0"16"2548,0 19 795,0 9 744,0 8 1,0 2-16,0 7 116,7 2 0,3 0-345,7-4-563,0-9 0,0-1 391,0 3 343,-3-10 0,0-2-476,2 0-300,10 17 261,-8-33 260,-8 3 238,-6-33 1746,-4-25-509,0-2-131,0-11 172,0 7-58,0 15 547,0-6-1131,0 14 447,16 12 746,1 23-1250,18 13-340,-17-1 0,-1 3-839,11 14-28,-8-13 0,-1 0-138,5 4 275,-3-7 0,2-2 963,6 1 1,10 3-1,-10-14 1</inkml:trace>
+  <inkml:trace contextRef="#ctx0" brushRef="#br0" timeOffset="1634">4752 1858 24808,'-23'-12'-2902,"-11"-1"2442,14 6 520,0 17 1799,-7-7-1047,24 41-2325,-7-25 1034,10 24-1477,0-17 1017,0-3-392,22 0-358,2 3-761,21-7 1306,-7-3 1949,-1-9-362,-8-23 2166,-13-5-410,-7-18-1041,-9 1-1192,0 3 71,0 8-1750,0 31 73,0 10-1485,15 27-701,3-9 3474,1 0 1,11-12 0,-10-1 0</inkml:trace>
+  <inkml:trace contextRef="#ctx0" brushRef="#br0" timeOffset="2051">5138 1995 24718,'0'38'-5486,"17"-6"1900,-13 0 2391,12-6 235,0 3 162,-13 0 522,24 3 237,-24-3-1741,20 2 1545,-20-2 582,18 0-347,-19-4 313,13 3-601,-10-11-1027,2 3 499,-4-32 1316,-17-11-728,10-16 148,-25-8-156,27 14 1,0-2 336,-23-23 14,23 6 1,1-1 556,-10-9-187,10 12 1,2 2-855,-1 0 1193,0-6-276,20 26 1655,2 15 10,20 2 385,-21 30-2436,14 8 348,-15 12-1281,1 2 159,8-7 232,-26-2-1383,17 1-1192,-17-3 77,5-3 1446,-8-1-397,0 3 1191,0-9 1157,-26 1 1,19-12-1,-19-2 1</inkml:trace>
+  <inkml:trace contextRef="#ctx0" brushRef="#br0" timeOffset="2251">4388 1587 23549,'-1'-16'-5475,"1"-4"3480,0 8 1232,20-4 2970,3 10-1161,26-2-767,-1 6-718,-7 1-941,-2 23 1439,-13-16 0,0 42 0,-2-16 0</inkml:trace>
+  <inkml:trace contextRef="#ctx0" brushRef="#br0" timeOffset="2384">4902 2806 25258,'3'29'-9263,"0"-5"5076,-1-3 3869,-1-11 0,0 0 0,0-6 0</inkml:trace>
+  <inkml:trace contextRef="#ctx0" brushRef="#br0" timeOffset="3136">6215 1650 24718,'16'-3'2005,"-4"1"-1681,-12 0 0,0 1 1,0 1-1</inkml:trace>
+  <inkml:trace contextRef="#ctx0" brushRef="#br0" timeOffset="3292">6527 2029 25708,'3'6'-2310,"0"1"0,-3-5 1,0 0-1</inkml:trace>
+  <inkml:trace contextRef="#ctx0" brushRef="#br0" timeOffset="4217">8388 1229 25798,'0'30'-5306,"0"-5"3267,0-1 1065,0-3 425,0 3 124,0 4 120,0 2 77,0 2-1368,0 2 1596,0 17-90,0-12-90,0 26-90,0-27-89,0 8-271,0-15-90,0-2-179,0-1-810,0 11 719,0-11 990,0 8 0,0-16 0,0-1 0</inkml:trace>
+  <inkml:trace contextRef="#ctx0" brushRef="#br0" timeOffset="5100">8495 1210 24179,'20'-3'1745,"7"0"-1672,12 15-1602,2-8 1343,-9 8-706,5-12 992,1 0-48,4 0-412,23 0-31,-14 0 123,15 0 783,-20 0-458,-1 0 667,-2 0-904,9 0 90,-14 0 0,13 0 180,-28 0-180,4 0 180,-17 0-180,-1 0 180,-6 0-90,-2 10-1778,0 1-38,-1 16 310,0-8-90,0 5-1,0 0 1,0-4 0,0 20 89,14-15 1180,-10 25 311,26-21 86,-26 13-244,10-13-461,-1 1-77,-10 0 510,17 15-547,-11-10 781,3 22-405,-2-24-176,-5 8 486,-1-15 321,-2-2 303,0-2-508,-2-2 533,0-4-108,0-1-50,0-1 231,0-5-422,0 1 49,0-6-225,-14-1 2138,-2-3-455,-12 0-148,5 0 1,-6-11-751,8 8 559,-18-9-470,12 12 752,-22 0-2050,14 0 287,-10 0 76,-13 0 90,12 0 330,-1 0 0,-1 0-228,-12 0 190,3 6 0,-2 1-250,23-6 0,1 1-39,-12 4 1,-2 1 22,1-2 1,2-2-64,12-2 0,-1 0-175,-18 3 1,1 0-184,1-4-550,15 0 1,3 0 828,6 0 0,1 0 1,17 0-1</inkml:trace>
+  <inkml:trace contextRef="#ctx0" brushRef="#br0" timeOffset="6306">10337 1516 24808,'0'-4'-5666,"0"19"3538,0 10 1154,0 12 425,0 4 33,13-8-540,-10 3 842,11 13-1808,-5-12 1607,-6 6 306,6-17-489,-9-5 778,0-1 180,0-2 557,0-6-1005,0 0 603,0-41-550,0-1-396,0-24-230,19-7 423,4 21 370,0-12 130,3 26 0,0 3 1,-6-12-1,28-10 1</inkml:trace>
+  <inkml:trace contextRef="#ctx0" brushRef="#br0" timeOffset="6684">11008 1853 22920,'8'1'-348,"5"-16"124,-4 12 1950,10-25-2530,-6 10 301,1 2 423,-3-14-766,-5 18 274,0-12 29,-3 1-455,0 7-957,-3-9 1010,0 13-81,-18-5 289,13 12 488,-28 0 793,17 21 469,-2 5 220,-2 23-611,19-10-585,-6 2 323,7-10-625,0 0 208,16 0-3328,5 8 666,0-9-1367,29 10 4052,-29-19 0,30 1 1,-19-8-1</inkml:trace>
+  <inkml:trace contextRef="#ctx0" brushRef="#br0" timeOffset="7467">11552 1616 23549,'15'12'-3753,"3"2"1889,-17 6 192,8-7 428,-5 2 182,1-9 843,0 9-607,-1-6-1419,1 6 1318,-2-4 109,0 11 666,-1-6 224,0 5 199,-2 5-218,0-8 583,0 13 13,0-17-200,1 6 4,-1-13-949,2 0 112,-1-22 575,2-4 218,0-22-338,4-2 210,-2 5 92,3-3 53,-2 11 39,0 0 347,1 1-500,-1 3 85,1 2 166,0 4 384,3 2-157,1 10 652,5 0 491,-4 23-2376,10 8 14,-9 9-678,5 4 73,0 7-283,-5-8-374,7 18-707,-9-24-570,4 10 2387,-9-22-50,2-3 37,-5-4 585,-2-23 875,1 14 75,-1-33-195,4 4 336,-2-8-171,5-3 92,-2 11 5,2 2 36,0 3-520,0 2 259,2 3 345,-1 9 347,7-3 199,-4 11-250,13-4 229,-10 21-2558,16 6 184,-12-2-735,6 20-1629,4-10 447,-9 10 2117,12-1 1,-11-14-1,2 0 1</inkml:trace>
+  <inkml:trace contextRef="#ctx0" brushRef="#br0" timeOffset="7835">12498 1786 24269,'0'-10'-6386,"0"1"4258,0 6 974,0-2 605,0 3-57,0-6 32,21 2 2381,-16-3-2694,37 0 2715,-37 1-892,36-3 1072,-35 2-1105,31-2 1219,-32 2-1319,24-7-723,-27 5-463,10-9-323,-12 8-230,0-4-802,-16 6 1581,12 1-2467,-28 3 3751,10 1-1673,-12 3 1485,3 1-324,15 21 829,0 2-213,14 13-1794,-5-4 1656,7-6-2213,0 1-989,19 11-729,-15-8-649,31 18 918,-11-22 2340,-2 5 1,18-14 0,-14-1 0</inkml:trace>
+  <inkml:trace contextRef="#ctx0" brushRef="#br0" timeOffset="8436">12883 1675 23639,'0'34'-6026,"20"-13"3994,-15 16 422,33-22 2529,-23 28-2376,5-22 1200,0 12-404,-10-16-1352,1 2 1630,-3-9 245,-4-3-509,-2-3-884,2-17 2736,-4-6-1424,0-22 648,0 7-13,0-4 57,0 10-370,0-1 265,0-10 211,0 12-778,17-11 1106,-13 21 43,28 1 1309,-16 12-170,13 17-1247,-7 8-749,-1 21-630,-6-7-178,3 14-803,-7-21 297,2 8-1585,-2-8 83,-4-9 1252,2 2 682,-5-11 384,0-5 682,-3-16 713,0-9-196,-1-19-157,0 7-2,0-13 173,0 19-22,0-15 426,0 22-774,0-6-547,14 18 2278,0 1 81,17 46-2776,-11-18-35,1 33-945,-7-25-105,-2 0-384,1 1 1841,1-1 1,0-1 0,1-1 0</inkml:trace>
+  <inkml:trace contextRef="#ctx0" brushRef="#br0" timeOffset="9267">13680 1308 24359,'0'46'-5756,"0"-8"3807,0 2 975,0-5 425,14 1-746,-10 1 827,10 1-331,-4-2-1348,-7-1 2095,7-2-635,-2-2 181,-6-3 273,10 4 169,-11-10-195,3 0 185,-4-12-635,0-4 581,0-20 635,0-9 89,0-23-453,0 8 640,0-14-519,0 23 331,0-6-235,0 17 0,20 4 1609,0 7 384,20 24-1479,-13-12 342,-2 40-1605,-8-27 365,-2 21-602,-2-9-16,0 0-1858,-4-1-370,-1 0 1590,-3-2-519,-3 3 1879,0-6-601,-2 3 337,-17-15 2552,-6-2 678,-14-26-1628,14-3-608,8-21-755,15 6 524,0 2-393,19 14 1459,1 7-1243,20 11-1140,-10 0 1432,0 13-20,4-10 1441,-7 10-1404,9-1 298,-10-10-1177,1 10-1231,-1-12 1309,0 0 90,-1 0 700,-1-16-130,5-1 621,-9-2-602,2-11-523,-15 8-190,-1-6-937,-6-3-86,0 12-89,0-1-293,-19-5-417,15 10 46,-32-5 1298,32 13-30,-25 1 1519,26 21-413,-9 7 424,12 22-898,0-8 133,15 4-878,-11 0-735,28-8 1059,-27 5-2940,26-6 1908,-12-11 1348,8 1 0,-2-14 1,-6-3-1</inkml:trace>
+  <inkml:trace contextRef="#ctx0" brushRef="#br0" timeOffset="9590">14468 1653 24808,'17'23'-6899,"-12"11"4433,25-13 2543,-27 9-942,20 8-52,-20-14 611,15 11-312,-10-18-1685,2 6 1893,-5-13-45,-5-2 47,0-27 716,-16-19-576,12-6 259,-5 8 1,1 1 12,8-4 703,0-13-57,0 17-217,0 1-703,19 3 246,1-7 867,2 12-1468,24-8 1294,-27 22 1,26 0-1,-17 9 1</inkml:trace>
+  <inkml:trace contextRef="#ctx0" brushRef="#br0" timeOffset="10485">15228 1516 24269,'0'33'-5576,"17"-3"2297,-12 2 2100,12-3 315,-17 5 837,14 14-724,-10-10 582,21 10-1963,-22-18 1965,7-2-63,-3-4 43,-5 2 407,4-10-2597,-6 2 2331,0-32 56,0-4 526,0-16-369,0-12 527,0 13-69,0-22-412,0 22 1085,0-20-758,18 32 1077,1-5-287,17 23 554,-18 16-1470,12-9 1048,-20 29-1959,11-17 871,-6 18-1056,-2-6-1281,4 9 85,-5-9-564,4 13 1494,-8-21-1224,0-2 1394,-6-6 11,-1-25 1472,-1 1-89,0-26 22,0 6 10,0-15 66,0 17-5,0-8 207,0 12-163,0 3-597,17 4 1996,1 2-582,20 9 432,-9 0 101,0 8-507,-8 23-1600,1-18 1102,-1 40-1908,-1-27-1595,9 34-284,-8-20-1530,14 21 636,-13-25 3182,5 6 0,-7-17 1,1-1-1</inkml:trace>
+  <inkml:trace contextRef="#ctx0" brushRef="#br0" timeOffset="10834">16097 1766 23909,'0'-6'-5846,"17"3"9143,-13 0-1617,26 3-1299,-27-3 286,26 1-529,-15-2 473,15 0-236,-7-2 1711,0-1-1897,9-4 60,-10 1 296,10-10-524,-17 7-175,-1-5-835,-9-5-291,-3 5-366,-19-14-573,13 13 12,-33-10 437,33 15-797,-28-2 2135,20 9 1,-9 4 1433,10 23-5,4 7 3,8 14-722,0-3-880,0-9 1013,18 0-2246,-13 0-1384,46 9 615,-27-11 2494,31 4 0,-14-15 0,2-3 0</inkml:trace>
+  <inkml:trace contextRef="#ctx0" brushRef="#br0" timeOffset="17085">8723 1577 23189,'20'-8'4801,"2"6"-5089,-14-6-360,3 26-2902,0-14 2779,-3 28-1177,6-11 564,-2 8-833,2 1-768,-1 0 616,-3-9 130,2 12 1921,-6-18-1260,4 5 1563,-6-12-68,2 0 639,-4-5 56,0-1 304,0-2 655,1 0 753,-1 0-6,7-14-677,-3 10 1000,7-26-1610,0 26 1334,2-34-1859,1 19-14,11-34-1165,-6 19 423,-2 5 0,-1-1 322,5-5-758,-5 5 1,0 0 337,5-6-1481,6-11 1362,-8 13-913,1 1 522,0-1 897,2 2 1,-1 2-1,0 3 1</inkml:trace>
+  <inkml:trace contextRef="#ctx0" brushRef="#br0" timeOffset="18350">13247 3486 22650,'0'29'-6116,"0"0"4257,-17 7 2475,13-5-1088,-24 9 1686,25 9-1724,-20-13 1045,20 13-1931,-8-15 1921,11 0-525,0 16-841,0-12 494,0 28-1013,0-30 521,17 26-1306,-13-27 994,12 9 934,-16-15 1,0-2-1,0-1 1</inkml:trace>
+  <inkml:trace contextRef="#ctx0" brushRef="#br0" timeOffset="18950">13422 3344 22020,'13'0'360,"1"0"-270,4 0 0,2 0 0,2 0-90,2 0 90,4 0 0,4 0-90,5 0 90,28 0-180,-11 0 135,-3 0 0,0 0-45,14 0 42,-6-5 0,0-1 31,-23 5 1,-1 0-38,12-5 0,2 0 55,3 3 0,-2-1-13,-9 1 1,1-2-43,6 0 0,6 0 0,-5 0 77,0-2 1,-1 1-106,8 1 0,6-1 0,-5 1-1,-3-1 1,-2 1 6,-6 0 1,3 1 0,-1-1-127,0 1 0,0-1 0,-2 1 106,7-1 0,2 1 1,2 0 0,5 0 1,-6 0-38,-8 2 1,0 0-10,1 0 1,5 0-1,-6 0-29,-7 2 0,-3 0-4,13-1 1,-2 0-87,15 1-16,-3 0 16,-1 0 144,-18 0 0,1 0 1,20 0-58,-9 0 0,-1 0 130,9 0-103,-21 0 0,-1 0 124,14 0-158,1 0 90,0 0-90,-2 0 90,0 0-90,-5-8-101,15 5-281,-20-5 502,9 8 0,-28 0 0,-3 0 1</inkml:trace>
+  <inkml:trace contextRef="#ctx0" brushRef="#br0" timeOffset="19866">13438 4800 22290,'32'0'630,"2"0"-451,-8-15 911,2 11-863,-3-11 328,18 4-164,-8 8-192,-2-7 1,1 0 445,10 8-646,17-6 159,-24 4 0,0 1-519,25-6 414,-3 1 0,1-1-110,-21 2 1,1 0-25,8 0 0,6 0 1,-4 0 31,-1 0 0,0 0-74,-4 1 1,2-1-1,-2 1 210,8-1 0,-2 0-110,2-1 0,1 1-28,1 0 0,2-1-72,-4 1 0,4-1 0,-3 1 5,9-1 1,2 0 59,-15 2 0,6-1 1,-1 0-1,-5 1-6,11-1 0,-1 0-21,3 1 1,5-1-1,-6 1 3,-7 1 0,-3 0 12,-7 2 1,2-1 0,-4 2 3,2-1 0,-3 0-22,-1 2 0,0 0-59,-2 0 0,1 0 0,14 0 1,-1 1 36,-13 0 1,1 0 10,24-1 1,-2 1 7,-26 0 0,0 0 14,22 0 1,0 0 11,-24 0 1,-2 0-14,11-1 0,0 2-99,15 9-364,-2-8 264,-1 8-199,-19-9 1,0-2 475,15 1 1,10 0-1,-25 0 1</inkml:trace>
+  <inkml:trace contextRef="#ctx0" brushRef="#br0" timeOffset="20268">17382 3371 23189,'4'-8'-1679,"-1"0"433,-1 2 875,-1 2-542,-1 1 940,0 2-753,0 15 204,0 14-984,0 9 622,0 12 212,0-4-104,14 7-26,-10 5 674,11 5-335,-2 0-128,-9 2-401,8-18 0,0 1 283,-10-13 1,-1 1 677,8 21 0,0 0 1,-8 6-1,3-23 1,-1 0-1</inkml:trace>
+  <inkml:trace contextRef="#ctx0" brushRef="#br0" timeOffset="21017">14045 4133 23099,'0'18'-2967,"16"-7"1914,-13-19 1474,29-12 1575,-15-19-2199,2 4 142,7-3 306,-16 8-1218,11-3 2134,-10 2-942,2-20-702,-7 14-1080,2-29 994,-6 29-252,-1-8-306,-1 18 503,0 5-447,0 4 538,-16 3 142,13 27 767,-23 13 960,23 17-1273,-7 5 292,10 15-355,0-14-180,8-5 0,4-1-828,10 6-47,-1-9 1,3-2-1008,8 4-682,2 8 275,7-12 2488,-9-14 1,15 2-1,-12-13 1</inkml:trace>
+  <inkml:trace contextRef="#ctx0" brushRef="#br0" timeOffset="21284">14778 4133 23999,'-43'0'1439,"-1"0"-1349,22 16 580,-27 0 146,42 17-2615,-23-2 1727,30-6-1386,0-2-678,23-3 454,1-6 58,24-3 320,-4-6-6,-2-23 2975,-11 0-1500,-12-20 269,-11 3-977,-27 0 331,15 3 0,-15 15 0,19 6 0</inkml:trace>
+  <inkml:trace contextRef="#ctx0" brushRef="#br0" timeOffset="21767">15317 3950 23549,'-41'13'2546,"8"-10"-2943,14 21-530,8-13 462,11 10-1790,18-11 1210,-13 6-950,32-14 1719,-32 10-2896,39-11 2841,-17 3 264,13-4 249,-2 0 1325,-24-16-458,8 11 1797,-20-27-3503,6 18 2533,-28-15-3420,1 16 712,-14 3 253,16 32 400,8 6-577,9 12-1206,21 16 1131,-15-20 7,12-4 0,2-1 758,2 5-805,-1 9-676,9-7 128,-18-11 207,3 9 424,-5-20 991,-10-1-639,0-9-851,-22-4 2678,1-1-1059,-5-20 1,-2 14 0,13-15 0</inkml:trace>
+  <inkml:trace contextRef="#ctx0" brushRef="#br0" timeOffset="21950">15743 4004 23459,'0'39'-6385,"0"-2"4256,0-9 705,0-4 516,0-6-148,0-2 33,0 0-285,0-3 909,0-1 0,0-4 0,0-1 0</inkml:trace>
+  <inkml:trace contextRef="#ctx0" brushRef="#br0" timeOffset="22120">15787 3765 23009,'-10'-3'567,"3"1"1,23 1 0,5 0 0</inkml:trace>
+  <inkml:trace contextRef="#ctx0" brushRef="#br0" timeOffset="22467">16052 3995 22830,'4'17'-7892,"2"1"4758,-2 1 2096,6 6-160,-2-4 535,7 9 183,-6-13 255,4 3-1654,-1-5 2097,-2-4 488,4 0-42,-6-8 858,3-1 427,-4-2 212,1-21-959,-1-3-257,0-13 232,4-10-437,-4 18 340,5-17-1025,-5 23-158,1 2-404,-2 9 899,0 10 1223,2-4-161,6 6-289,-3 15-2134,11 6-16,-8-2-2875,9 32 341,-11-31 3114,5 31 0,-7-23 0,0 3 0</inkml:trace>
+  <inkml:trace contextRef="#ctx0" brushRef="#br0" timeOffset="63281">3673 7096 23639,'-21'11'2659,"-17"-9"-2800,24 18-912,-29-6 1883,21 3-770,-17 11 54,20-10-303,-12 18 93,19-13-1097,-4 8 346,13-6-172,0-1-882,3 2 209,0 8-176,15-9-111,5 12 53,-1-21 1216,14 5 294,-10-14 1250,9 0 87,0-6 632,-10-1 133,-1 0 298,6-20 394,-8 15-391,8-44-1390,-16 29-276,2-37-908,-10 27-379,0-8-298,-3 6-242,0 12-537,0-7-76,0 16 1223,0 16-1253,18 14 579,5 15-109,11-2 1703,11 5 0,-16-13 0,12 5 1</inkml:trace>
+  <inkml:trace contextRef="#ctx0" brushRef="#br0" timeOffset="63545">4465 7364 24269,'-9'11'-2695,"15"-8"1,12 8 0</inkml:trace>
+  <inkml:trace contextRef="#ctx0" brushRef="#br0" timeOffset="63741">4755 7122 22560,'0'0'0</inkml:trace>
+  <inkml:trace contextRef="#ctx0" brushRef="#br0" timeOffset="64529">4772 7026 23819,'-10'0'270,"4"16"-2667,3 12 341,3 9 518,0 8 543,18 13-354,-13-9 875,11-8 1,3 0-1750,-2 8 1020,0-11 0,-1 0-139,-1 3 505,8 8 186,-14-10 280,3-13 690,-2 7-334,-10-20 625,3 1-412,-24-28 879,1-7-294,-5-15-417,-6-19-373,13 16 60,1 5 1,1-2-211,-1-4-430,-4-10 314,14 13-589,-3 12 164,4-4 455,5 15 567,0 1-115,1 7-398,0 0 72,0 3-977,17 1 1607,-1 1 1,4 1 0,-8 0-1</inkml:trace>
+  <inkml:trace contextRef="#ctx0" brushRef="#br0" timeOffset="67545">573 7133 23099,'16'-4'4973,"2"1"-4718,1 18-3223,22-1 2077,-21 3 230,8 1 0,3-2 17,4 0 258,13 20-964,0 3-362,-11-9 264,-7-3 0,-1 1 232,4 6-844,11 9-775,-5-6 2726,-8-10 0,7 3 1,-14-11-1</inkml:trace>
+  <inkml:trace contextRef="#ctx0" brushRef="#br0" timeOffset="67778">1350 6993 24089,'-18'-10'-3771,"14"3"-318,-27 3 5694,18 3-599,-3 20-387,-3 2-74,9 23-1172,-5-11-135,3 3 782,4-10 651,-1 7-1985,1-7 48,-1 3-613,1-8 799,1-8 452,-4 0 973,3-9 1,-4-2-1,2-2 1</inkml:trace>
+  <inkml:trace contextRef="#ctx0" brushRef="#br0" timeOffset="67962">1045 6928 22380,'0'-26'-6296,"15"5"7519,-11 4-1803,23 5 3393,-14 6-1161,17 2-846,16 45-2004,-12-18 530,-4 12 1,-1 1 416,2-3-321,-5-3 1,0 0 88,6 6-1844,8 11-861,1-3 350,-11-11 2817,-5-7 0,0-1 1,2 0-1,7 6 1</inkml:trace>
+  <inkml:trace contextRef="#ctx0" brushRef="#br0" timeOffset="68132">1757 6968 23279,'-20'17'-26,"-4"2"-420,22 22-208,-16 3 0,16-7 1,-7 1-1</inkml:trace>
+  <inkml:trace contextRef="#ctx0" brushRef="#br0" timeOffset="68479">1957 7140 21840,'4'0'1349,"4"0"-1169,-2 0 0,11 0-90,-4 0-90,13 0 0,-9-12 363,9 9-127,-9-23-579,2 23 587,-3-26-756,1 9 364,-7-9-294,-2-8-535,-7 15-376,-21-9-802,16 16 292,-16-1 182,1 10 1673,2 3-83,-6 21 1224,2-13 379,19 46-1404,-7-29 1067,9 40-654,0-29-1311,16 9-1913,-12-15 65,28-2-80,-28-2 2210,31-4 1,-30-5 0,15-2 0</inkml:trace>
+  <inkml:trace contextRef="#ctx0" brushRef="#br0" timeOffset="68928">2362 6507 22740,'0'46'-6026,"0"-8"3987,0 4 975,0-6 426,17 21-572,3-12 748,-2-7 1,1-1-163,-1 5-1625,12 8 1822,-15-9-182,2-14 853,3 10-497,-18-21 436,5 1-585,-7-11 883,-19-21 323,15-8-777,-15-24-65,19 14 334,0-9 226,0 21-206,23-6 1728,2 18 194,25 2-594,-24 27-874,16 3 673,-21 2-1098,14 23-408,-16-32 384,-4 31-2212,-13-27-547,2 5 213,-22-6 2772,-8-3-1380,-26 4 1364,7-11 1,-3 0 0,12-7 0</inkml:trace>
+  <inkml:trace contextRef="#ctx0" brushRef="#br0" timeOffset="69780">3073 7662 22650,'-3'1'2738,"-2"1"-1534,4-2-784,14 0-1167,7 1 196,10-1 319,3 0-10,19 0 332,-5 0-421,0 0 0,3 0 36,-15-1 1,-1 2-40,13 5 0,3 0 324,8-5 0,0 1-82,-12 9 1,2 1 17,7-7 1,6-3-1,-5 1 0,-1 2 0,0 2 4,7-1 1,6 1 0,-6-1-6,-2-3 0,-2 1 10,-9 1 0,3 1 0,-1 0 88,0-2 1,0 0 0,-2 0-40,6 1 0,1 0 46,3-1 1,5 1 0,-6-1 6,-7 0 1,-2 0-39,1 0 1,5 0 0,-6-1 34,-7 0 0,-2 0-39,9 2 0,-1-1 13,8 0-53,-6 0 33,-9-2-365,4 2-301,-18-2 692,6 0 0,-23-2 0,-1 0 1</inkml:trace>
+  <inkml:trace contextRef="#ctx0" brushRef="#br0" timeOffset="70161">5728 6651 24449,'0'-18'-6476,"0"1"4258,0 5 1243,0 3 427,0 21 122,0 18 175,8 2 1,1 4-1,-7-3 1,1 2-739,12 19 1,0 2 807,-13-20 1,-1 2 53,11 26 1,0-1-3,-10-24 1,-1-2 56,4 11 1,0-1-136,-5 15 458,0-4 148,0-3-254,0-19 1,0 0 214,0 16-1016,-7-13 1,0-1 121,3-1 643,-10 5 0,14-22 1,0-3-1</inkml:trace>
+  <inkml:trace contextRef="#ctx0" brushRef="#br0" timeOffset="70712">5873 6574 22920,'-30'-13'-3154,"-11"-6"2099,13 2 145,-27-9 752,19 9 143,1 2 0,-2 2 58,-11-2 74,15 5 0,-2 1-284,-7 1 1,0 2 526,7 2 0,-1 0-135,-8 0 1,-5 1 0,4 1 212,-1 0 0,0 2-151,-9-1 1,-6 1 0,5-1 112,0 1 1,1 0-177,6-1 0,-3 1 0,2 1 168,-7 9 1,2 0-82,-3-9 0,0 2-23,0 12 1,-2 2-128,6-10 0,-4-2 0,4 0-13,-9 3 0,0 0-54,0 1 1,-6 0-1,8 0 31,9-3 0,4-1-3,-13 2 1,3 0-93,-6 2 34,9-9-460,9 0 70,9 0 113,6 0-49,8 0-73,1-17-1079,10 13 395,0-13-1084,10 5 172,0 24 694,13 13-994,-8 14 498,8 18-240,-11-12 1658,0 8-497,7 5 850,-5-10 1,1 2 39,2-11 1,1 2-251,-3 5 0,-1 5 1,1-3 429,0-4 1,0 1-369,-1 3 0,1 5 0,-1-5-114,1-4 1,-1-1-416,1 12 1,0-2 602,0-17 0,0-2 1,3 31-1,2-3 1</inkml:trace>
+  <inkml:trace contextRef="#ctx0" brushRef="#br0" timeOffset="71662">8312 6922 23819,'0'-9'-5396,"-20"0"5835,1 5 405,-23 2 250,11 1-374,-11 15 569,14 8-791,-5 9-508,4 21 1002,13-17-1025,6-3 0,3 0-770,4 5-565,3 10-188,20-18-1222,-14-4 575,35-10 0,10-6 774,-10 2 1571,10-3 0,2-6 0,1-17 0,4-5 0</inkml:trace>
+  <inkml:trace contextRef="#ctx0" brushRef="#br0" timeOffset="72412">8628 6273 23819,'-19'-18'-5709,"-12"3"5503,16 8 249,-4 20 1755,8 6-1632,11 18-1149,0 2 110,0 8-723,0 8 1494,20 5-1260,-15 6 752,15-32 1,0-1-631,-18 1 0,0-1 386,18 0 1,2-1 528,-5 31-29,5-22 1,2-1-76,1 20 90,-9-24 0,0-2 388,1 8-277,-8-6 359,6-5-12,-9 1-229,3-12-727,-3 0 695,-6-33 905,-18-21-625,13-5-68,-11 8 1,1 0-147,12 1 509,-8-17-628,11 26 929,18 0 1248,-13 9-1395,31 10 1710,-15-4 426,11 27-1762,4 5-315,-13 13-627,8-2-235,-10-9-1427,1-1 896,-2 0-1236,0-3-355,-1-2 1113,2-4-24,8 0 1780,-6-10-130,14-1 441,-17-7 913,6-19 294,-12 14 916,0-33-1371,-5 33 513,-1-38-1834,-2 27-70,-1-21-768,-3 13-830,-1-3-381,-1 7-473,0 22 1662,16 8-1152,-12 25 1225,29-6 29,-16-4-20,17-11 1115,-10-7 261,5-7 725,-11 0 0,9-15 6,-12-5-77,1 2-208,-8-16-380,0 30 485,-2-29-1901,-1 18-445,-3-9-413,1 11-408,-2 8 862,2 5 1169,2 20-1252,1-15-775,3 32 867,10-12-116,-2 6-1309,21 9 888,-11-26 1521,12 15 0,-9-26 1,2 9-1</inkml:trace>
+  <inkml:trace contextRef="#ctx0" brushRef="#br0" timeOffset="72768">9977 6856 23999,'-19'-7'-2611,"-8"3"3020,12 1-399,-9 3 627,11 19-873,-2-14 1340,14 30-2542,-5-13 354,23 16-413,-12-9-170,30-2 586,-30-13-1537,34-1 2214,-13-3-984,11-5 2453,-3-2-162,-5-3 1314,-15-21-739,10 16 165,-22-31-863,10 32 559,-11-32-1654,2 22-608,-3-22-494,0 12-179,0 24 407,0 16-721,0 35 1611,17-7-3117,1 15 2004,2-27-1694,6 19 2983,-13-28 0,3 6 1,-6-14-1</inkml:trace>
+  <inkml:trace contextRef="#ctx0" brushRef="#br0" timeOffset="72996">9338 6595 23729,'-6'-10'-7831,"2"1"4461,3 1 2316,1 0 969,0 2 28,0 1 17,22 3 1837,-2 1-1825,20 18 856,-8 10-839,-14 10-1218,10 6 1095,-17-7 1,14 3-1,-6 1 1</inkml:trace>
+  <inkml:trace contextRef="#ctx0" brushRef="#br0" timeOffset="73494">11420 6792 23639,'-59'15'2120,"13"-11"-2346,0 27 379,14-26 110,9 18 1,0 5-1003,-8-7 589,12 8 0,3 3-708,4-2-26,24 14-1708,-7-23 147,45-2 916,1-13 1079,-19-5 0,3-2 468,14-4 0,-1-5 327,9-16 285,-19 10 1,-3-2 778,8-24 574,-6 6 7,-6-3-1481,-7-4-948,-5-3-560,-10-6 326,-5 12 0,-3-2-196,0 8 1,-2-1 183,-5-26 1,-5 0-47,0 24 1,-3 0 39,-10-24 1,1 2-197,9 26 1,0 3 189,-11-10 1,4 3-512,16-3 676,-31 8 640,32 9-274,-20 7 1138,22 25 222,-7 5 690,9 26-1688,0-7 0,0 2 275,0 27-330,-1-20 0,2 2-333,8 4 1,2 0 117,-2-12 0,0 0-470,9 23 1,0-1-1334,-1 4 107,-5-14 0,-1-1 412,0 0 264,2 8 1005,-4-26 0,-9-8 0,0-1 1</inkml:trace>
+  <inkml:trace contextRef="#ctx0" brushRef="#br0" timeOffset="73661">11237 6694 24359,'-11'-33'-8232,"3"-1"5643,8 2 2214,0-1 150,29 3 2081,10-12-586,16 14-640,-17 7 0,1 0-757,13-1 574,-5 6 0,2 2 728,11 0-786,-20 5 1,0 2 0,16-1-1,0 0 1</inkml:trace>
+  <inkml:trace contextRef="#ctx0" brushRef="#br0" timeOffset="73880">12148 6141 24269,'-14'23'-1368,"2"7"-290,12 15-553,0 2 740,0-5 1010,0-9 1,0 1-197,0 19 365,0-6 1,0-1-1396,0 9 141,9-11 0,0 0-514,-4 6 1166,12-20 1,1 0 753,-14 7 1,24-6-1,-13-2 1</inkml:trace>
+  <inkml:trace contextRef="#ctx0" brushRef="#br0" timeOffset="74280">12435 6682 23549,'4'15'-6507,"-1"3"4117,15 17 796,-13-1 965,25-6 978,-27 4-581,19-14 631,-19 2-1969,7-8 1961,-4-3-370,0-22 1376,8-21-311,-4-7-962,-2 8 0,0 1 641,3-3-320,8-19 569,-8 27-76,4-3 410,-3 15-780,-4 8 436,7 2 757,-5 5-572,8 14-1458,-4 6-740,15 18 29,-13 3-705,12 3-49,-15-11-1543,7 4-965,-5-18 3949,12 6 0,-7-17 0,7 1 0</inkml:trace>
+  <inkml:trace contextRef="#ctx0" brushRef="#br0" timeOffset="75578">8847 9388 24718,'-23'-15'-3381,"-13"3"3325,32 0-3221,-35 2 4105,21 2-633,-18 1 265,8 3 120,1 2-628,-2 2 1186,1 0-571,-10 17 2404,13 5-2421,-8 23-129,23-6-1220,0 2-14,10-9-645,0-2-138,22 6-620,9-13-71,12-1 1537,-10-18 0,1-3 676,10-1 659,-1-14 1,0-5 946,9-6-521,-18-2 0,-2-2 534,12-11 412,-6-4-907,-4-3-789,-7-1-777,-6-4-571,-8 1 244,-8 11 1,-1-1-727,-1-21 972,-12 9 1,-1 1-931,5-8 718,-14 24 0,1 2-748,14-7 256,-26 9 488,26 7 243,-21 8 890,22 24 296,-8 23 636,11 13-771,0 16 39,0-6-495,7-10 1,3 2-264,-1-11 0,1 2 86,9 23 1,-1 0-434,-8-25 1,-1-1-948,7 19 1,0-2-1033,1 3 778,2 8 1620,3-28 0,-20-5 0,7-3 0</inkml:trace>
+  <inkml:trace contextRef="#ctx0" brushRef="#br0" timeOffset="75750">8543 9112 23999,'-2'-27'-7012,"-1"0"4722,3 4 1468,28-11 2491,12 11-654,-1 4 1,3 2-262,-8 7 0,0 2-628,4-1 1,0 0-958,20 2 1306,2 3 0,4 3 0,1 0 1</inkml:trace>
+  <inkml:trace contextRef="#ctx0" brushRef="#br0" timeOffset="76029">9827 8587 25168,'-24'19'684,"4"-14"369,6 35-3141,-4 0 1035,3 11 497,2-5 0,1 1-370,-3 17 617,6-19 1,0-1-359,3-10 1,1-1-761,-3 33-561,2-1 607,3 0-537,1 0 72,2-4 1643,0-1 0,17-4 0,3-1 0</inkml:trace>
+  <inkml:trace contextRef="#ctx0" brushRef="#br0" timeOffset="76444">10070 9173 23009,'6'40'-7268,"0"8"5081,-1-10 870,1 18 631,0-21 74,0 8 258,0-15-36,-3-4-1397,1-4 1677,0-2-80,0-8-490,3-2 688,-1-7 1367,3-20-338,2 14 1590,-1-40-1901,3 23 820,1-26-592,-1 10 646,1-4-479,6-13-1497,-7 16 507,7-16-1573,-8 32 2162,2 3-502,-3 14 1539,1 6-735,0 0-61,2 0-24,0 23-1948,3-17 678,-3 24 0,0 4-1386,8-9 984,-1 11 0,0 2-1942,5-2 125,9 9-299,-8-19-84,1-6 3237,2-9 0,2 1 1,-1-5-1</inkml:trace>
+  <inkml:trace contextRef="#ctx0" brushRef="#br0" timeOffset="76828">10838 8618 24269,'0'49'-5127,"0"-7"2999,0 9 1064,0-6 515,14 4 114,-13-12 1,2 1 117,29 19-168,-22-9 0,0-1-1490,11 5 1599,-2-12 1,-1-2-93,-8 0-52,17 3 194,-16-21-104,-1-7 149,-2-5 494,-2-4 591,-1-19 369,1-14-135,-1-9-292,-1-27-185,-1 23 50,0-17-259,0 22-246,-1 4-291,1 6-241,1 4 366,0 6 336,7 8 1180,-2 18-1512,17 33-404,-8 0 25,1-3 1,2 1-506,4 4-387,0-7 0,1 0-510,8 2 1792,-9-15 1,1-1 0,12 0 0,4-1 0</inkml:trace>
+  <inkml:trace contextRef="#ctx0" brushRef="#br0" timeOffset="77194">11690 9008 23999,'-24'-4'-1180,"-5"1"1134,-11 3 488,5 0-232,22 21-604,-9-16 1090,18 35-2052,-16-11 953,19 8-699,-6 10-10,29-21-1192,6 9 271,26-18 1350,0-3-342,-10-8 2124,2-23 68,-19-3 669,-6-19-517,-10-1-206,-11 7-317,0 3-1870,-18 7-110,13 7-591,-23 3 207,25 26 255,-8 10 1224,11 23-496,21-9-491,-15 2-184,31-12-732,-14 9 2125,-3-11 1,18 5 0,-15-12-1</inkml:trace>
+  <inkml:trace contextRef="#ctx0" brushRef="#br0" timeOffset="77628">12052 9091 24808,'0'36'-5755,"0"-5"3626,17 2 258,-13-4 997,27 3 640,-27 3-148,25 1 150,-9 19-1966,8-14 1981,-11-7 0,-2-1-426,3 4 622,-3-7 1,-1 0-386,-2-6-731,5 10 53,-14-45 1369,-1-29 425,-2-7-634,-7 14 1,-2-2 109,7-5 0,0 0 472,-14-24-538,9 5 1,3-1 326,3 23 1,0 1 77,-5-21 0,1 1-929,5-3 394,0 23 1,0 4 380,0-2 170,19 8 1048,-15 10-601,29 6 1266,-12 7-39,18 17-1232,-6 13-691,10 20-332,-20-4-463,7 2-1062,-14-12 355,-2-2-1580,-7-2-837,1 7 1299,-7-11-91,-18 10 1784,13-19 1330,-42 1 1,22-11 0,-24-1 0</inkml:trace>
+  <inkml:trace contextRef="#ctx0" brushRef="#br0" timeOffset="77796">11493 8621 24269,'0'-21'-6206,"0"1"4168,17 5 4219,-13 2-2512,31 7 1846,-9 1-768,24 20-2200,-9-10 1195,-13 21 0,-3 6 0,4-1 0,-12 3 0,1-1 0</inkml:trace>
+  <inkml:trace contextRef="#ctx0" brushRef="#br0" timeOffset="77930">11872 10187 24988,'12'13'-2454,"-10"-4"0,10-5 0,-12-4 0</inkml:trace>
+  <inkml:trace contextRef="#ctx0" brushRef="#br0" timeOffset="79600">9922 11313 24539,'-12'35'-3785,"9"1"1309,-9-3 2199,12 9-952,0 8 410,-7 7 523,5 6 161,-2-30 0,0 1-606,4 1 1,0 1 408,0 0 1,0 0 250,0 1 1,0 0-252,0 0 0,0-1 389,-1 1 0,2-1-210,7 1 0,-1-1-62,-5-2 1,0 2 46,6 11 0,-1 1 16,-7-14 1,0 0-149,0 19 0,0-2-689,0 2-271,0 8-113,0-27 1427,0-7 0,0-7 0,0-2 0</inkml:trace>
+  <inkml:trace contextRef="#ctx0" brushRef="#br0" timeOffset="80180">9993 11511 22830,'0'-5'-6296,"0"-1"4257,0 0 1065,0 0 426,0 0 212,0-1 212,0 0-15,0 0-1367,17-4 3440,7 3 256,30-4 39,-5 4-1244,-5 2 1,2 0 861,20-1-899,-19 2 0,2 1-67,-8 0 1,-1 2 21,4-1 0,2 1-1071,1 0 1,2 0-7,2 0 0,3 0 1,-1 1-29,8-1 0,4 1 138,-11 0 1,6 0 0,1 1-1,-6-1-17,-6 1 0,-3 0 0,2 0 11,14 0 0,4 0 0,-5 0 14,-14 0 1,-3 0-1,0 0 16,1 0 0,1 0 1,-1 0 38,1 0 0,0 0 0,0 0-23,1 0 0,-1 0 0,1 0 11,0 0 1,1-1 0,0 2-41,-1 3 0,1 0 0,3 0 40,1-2 0,4-3 0,0 1 0,-2 3-31,3 4 0,-2 2 0,6-1 33,-5-6 0,5-2 0,3-1 1,-2 1-1,-6 2-27,6 5 1,-6 2 0,6-2-1,-5-3 0,7-2 0,1-1 1,-2 0-1,-5 2-5,5 1 1,-5 1 0,3-1 40,-4-1 0,2-1 0,1-1 1,0 1 135,2-1 1,1 0-1,-1 0 1,-2 0-96,4 0 1,-2-1-1,5 0 39,-15 1 0,6 0 1,2 0-1,0-1 1,-3 1-1,-4 0-44,1-1 1,-4 0 0,-1 0-1,5 0-2,1 0 1,5 0 0,2 1-1,1-1 1,-3 0 0,-6-1 21,1-2 1,-5-1 0,-1-1 0,6 1-19,-1 1 1,5 1 0,2 0-1,0-1 1,-2 1 0,-6-2 44,16-1 0,-7-1 0,3-1-19,-4 0 0,3 0 0,0 0 1,0 1-24,-3 2 1,0 0 0,-1 0 0,-3 0 28,3-2 0,-3 0 0,4 0-35,-7 1 0,4 1 0,2-1 0,-2 1 0,-6 1 5,1 0 0,-6 1 0,4 0-69,3-1 0,5 1 0,-2-1 1,-6 1 30,7-1 0,-5 1-95,12 0 0,-2 4-262,-16 5 0,-4 0-644,19-4 139,-22 8 1,-3 3-630,-2 2 1078,1 14 0,-22-6 0,-4 2 1</inkml:trace>
+  <inkml:trace contextRef="#ctx0" brushRef="#br0" timeOffset="80980">10693 12790 21930,'29'3'-969,"20"1"928,-26-2 191,25-1 76,-5 0-99,3 0 147,8-1-115,3 1-130,-8 0 0,2 0 77,-12-1 0,3 1-40,7 0 0,7 0 0,-5 0 52,1 0 1,-1 0-142,-4 0 1,2-1 0,-2 1 20,11 0 0,-2 0 42,4 0 1,1 0-39,3 0 1,5-1 1,-19 0 1,5 1 0,1-1 0,-2 0 34,4 0 0,-2 0 1,6 0-35,-2 0 1,6 0 0,4 0 0,-3 0 0,-5 0 2,-8 0 0,-4 1 0,-1-1 0,3-1 14,1-1 1,3 0-1,1-1 1,-1 0-1,-3 1 2,15 1 0,-4 0 0,0 0 22,2-3 0,1-1 0,-1 1-11,-17 4 1,0 0 0,1 0 0,3 0-23,3-1 1,4-1 0,2-1 0,-1 1 0,-3 0-6,1 1 0,-3 1 0,0 0 0,6-1-2,-9 0 1,5-1 0,2 0-1,1 1 1,0-1 0,-3 1-1,-5 0-2,11 0 0,-6 1 0,0 1 0,3-1-20,1 0 0,2 0 0,1 0 0,-1 0 0,-4 0 6,-3 0 0,-4 0 0,0 0 1,-1 0 5,1 0 1,0 0 0,0 0 0,0 0 17,-2 0 1,-1 0 0,2 0 0,2 0-27,1 0 1,4 0 0,0 0 0,1 0 0,-4 0-19,-1 0 0,-2 0 1,0 0-1,6 0 38,-2 0 0,5-1 0,3 1 0,0 0 0,-3 0 0,-6 1-33,0 1 1,-5 1 0,0 1 0,4-2 20,0-1 0,5-1 1,3 0-1,0 0 1,-4 1-1,-4 0-42,-2 1 1,-4 1-1,-1 0 1,2 0 51,13-1 1,3 0 0,-1-1 0,-5 0-44,-3 0 0,-3-1 0,-2 1 16,0 1 1,0 0 0,-1 0 29,-3-1 1,0 0 0,2 1-239,12-1 1,4 1 0,-4 0 112,-16 0 1,-2 0 0,3 0 107,3 0 1,4 1 0,0 0-1,-7-1 1,7 0 0,-3-1-1,12 3 1,1-1 0</inkml:trace>
+  <inkml:trace contextRef="#ctx0" brushRef="#br0" timeOffset="81311">19093 11657 23819,'-32'-4'-748,"2"1"1229,-20 3 170,24 19 35,-23 15-67,32 12-1157,3-6 1,0 2-344,1 18 233,3-3 0,1 2 101,4-22 1,2 0-332,-1 11 1,0 3-902,2 0 1,1-2 238,0-11 0,1 0 1163,0 12 1,-1-2-1,1 15 1,0 0-1</inkml:trace>
+  <inkml:trace contextRef="#ctx0" brushRef="#br0" timeOffset="82596">4940 12321 23099,'19'21'-5250,"3"-8"4817,25-6 1743,-9-7-129,4 0-304,-11 0-315,3 0-141,-1 0-421,0-17 2376,9 1-627,-11-4-1032,13-16-578,-23 20 123,2-19-820,-14 12-340,-3 0-92,-4-3-922,-1-12-337,-1 8 396,-24-19-282,-1 22 286,-27-12 959,27 23 759,-18-2 464,16 15 846,-8 0 115,-3 18 1128,20 12-748,-2 23-847,13-3-874,3 4-288,4 6-605,25-12-57,-10-9 1,2-1-1754,31 6 805,-16-9 1,0-2-29,10 2 1335,-13-13 0,-1-1 764,13 2 1,0-5 0,-1-2-1</inkml:trace>
+  <inkml:trace contextRef="#ctx0" brushRef="#br0" timeOffset="83244">5760 12144 23549,'-19'-9'-3496,"3"0"2033,16 4-423,0 1 701,0 22 395,16 4-103,-13 15 303,32-3-962,-31-6 502,44 13 622,-31-11 307,7-4 0,1-2 193,-4 2-116,7 9 190,-14-19-29,0-1-315,-7-11 810,-4-17-314,0-23 65,-22-1-919,15-14 514,-15 17-310,5-2-294,10 1 424,-20-11-674,21 13 226,-7-11 100,10 25 1054,0-4-219,21 16 2401,4 1 151,21 27-1841,-9-16 868,-3 35-1794,2-12 707,-10 9-1041,6 1 201,-13-15-2160,-2 0-53,-2-5 1427,0-1-491,-3-2 788,-2-5 291,-6-18 1541,-1-10-948,-3-25-63,0-5-32,0 4 141,0-8-408,0 24 277,14-10 446,4 23 178,14 2 1224,0 26-1285,-7 10-680,-1 10-351,-6 4-360,2-7 263,1 2-620,1 1-1150,0-2-486,1 0 1497,12 7 611,-6-12-480,23 9 914,-20-22 441,10-1 1,-11-10 0,-2-2-1</inkml:trace>
+  <inkml:trace contextRef="#ctx0" brushRef="#br0" timeOffset="83632">6998 12050 24179,'-15'-6'-2882,"-6"1"2746,-12 20 2289,3 4-1279,15 19-1965,4-8 183,11 3-406,0-9-283,0 1 654,17 7-716,-12-8-1184,29 9 662,-10-17 1523,-2-1 188,28-10 1680,-33-4 243,31-21 835,-29 15 435,4-34-1334,-12 14-61,-5-19-1222,-2 3-421,-4 6-1074,0 12-65,0 31-743,0 10-8,18 18 665,3 10 108,1-16 825,23 15 85,-27-20-328,26 1 845,-18-16 287,0-5 449,0-5 821,-1 0-837,0 0 1,-2-20 0,0-5 0</inkml:trace>
+  <inkml:trace contextRef="#ctx0" brushRef="#br0" timeOffset="83796">7547 12067 23909,'0'-17'-6116,"0"2"3898,-15 8 2645,11-2-2523,-11 24 3666,15 2-2151,14 40-327,-10-18-495,10-8 1,1 0-200,-11-2 1556,33 14 0,-23-23 1,19 2-1</inkml:trace>
+  <inkml:trace contextRef="#ctx0" brushRef="#br0" timeOffset="83965">7467 11596 23639,'-8'0'-1383,"4"16"1,1 1 0,3 16 0</inkml:trace>
+  <inkml:trace contextRef="#ctx0" brushRef="#br0" timeOffset="84327">8127 12380 23099,'8'-20'-2921,"0"15"5016,-1-39-4138,0 22 1376,2-24 127,5-16-66,-3 12 573,-3-8 1,-1-1-1059,-1-5 954,-2 1 0,-2 1-1174,-2 2 1161,-8 22 0,0 0-549,4-12 431,-12 3-799,-4-3-1,2 17 342,-4 2 512,-1 21 891,13 27 468,-2 3 245,5 24-819,7 22-6,0-9-229,7-18 0,3 2-841,2 3 1,4-2-466,2-9 0,3 0-1613,12 19 1,2-2 2450,-11-21 1,2-2-1,10 6 1,1-1-1,-9-11 1,1 0-1</inkml:trace>
+  <inkml:trace contextRef="#ctx0" brushRef="#br0" timeOffset="85444">4747 14645 23549,'-6'-6'-6942,"2"2"6000,2 16 374,17-9 1824,-11 31-2335,26-17 1184,-26 20-620,26-3-1131,-26 4 1580,27 7-517,-27 3 284,9-12 0,1 2-1546,-3 20 1783,-4-19 1,0-2-885,1 14 852,-4-3-40,-3-5 289,4 4 117,-5-15 22,0 5 327,0-24-351,-17-3 2063,13-24-2708,-30 10 1942,30-33-1838,-30 16 325,23-9 0,2-5-662,-17-15 245,12 3 0,4-2-49,-1-14-696,7 9 0,2 1 1585,-2-8-1130,12 23 0,1 2 1345,-5-9-443,31 5 1695,-30 5-1078,21 15 0,4 2 1436,-9-6-660,39-2 734,-32 18-341,4 3-599,-13 5 164,-3 16-2863,-1 3 148,-8 18-1264,0 1 549,-7-7-367,-19 7 707,1-17 562,-4 4-689,-7-11 2124,15-2 1,-4-5-1,8-2 1</inkml:trace>
+  <inkml:trace contextRef="#ctx0" brushRef="#br0" timeOffset="85730">5665 14757 22740,'-40'0'449,"-1"0"-449,7 0 0,3 0 0,11 0-90,3 0 90,1 0 0,-3 0 0,7 0 0,-4 13-417,9-10 144,2 25-1509,3-12 1401,2 7 0,0-9 0,0-8 0</inkml:trace>
+  <inkml:trace contextRef="#ctx0" brushRef="#br0" timeOffset="86165">5700 14730 23909,'0'-10'-5486,"0"3"3357,0 1 1065,-16 4 2515,13-1-1652,-13 17 1478,16 2-1992,0 21-791,0-9 1416,0 5 90,16-8-352,-12 1-1265,24-1 1307,-12 10-1894,-2-10 1663,20 10 752,-22-20-463,16 1 624,-8-12 1108,-8-1-253,7-24 80,-11 15 1170,2-36-1530,-6 13-765,-1-8 172,-3-1-906,0 13-576,0 2 122,0-5-420,0 10-611,-12-5 1131,9 33 1373,-10 3 707,13 20-1264,17 11-1625,-13-14 454,32 13-109,-32-13 1316,33 0 1,-22-2 0,15-2 0</inkml:trace>
+  <inkml:trace contextRef="#ctx0" brushRef="#br0" timeOffset="86551">6387 14707 23999,'-21'-6'-1790,"16"1"-1509,-27 2 4277,15 1-650,-12 1 319,4 1-140,3 0-235,9 17-609,2-13 1580,3 13-623,4-1-1781,1 1 86,3 15-602,23-7 49,-18-4-577,52 1 1807,-35-7-1488,30 6 1831,-19-9 445,0 3-35,-4-4 631,11 7-334,-15-4 655,11 10-1637,-23-9 19,1 2-608,-11-6-577,-2-3 486,-1 2 115,0-3 55,0 1 321,-21-3 1772,0 2 474,-4-2-1557,-10-1 401,12-2 0,-1-2 1,7 0-1</inkml:trace>
+  <inkml:trace contextRef="#ctx0" brushRef="#br0" timeOffset="86895">6758 14680 24359,'-35'0'-90,"1"0"90,18 12 268,23 7-3950,16 12 1823,1-4 649,16-3 1050,-34-6-2021,38 0 1422,-29-2-905,26 11 511,-28-10 1542,14 6 201,-25-9-884,8-3-298,-10 0 1176,0-1-1421,0 1 905,0-2-1546,-21 2 2775,-2-3-827,-23 3 1,23-6 0,3-1-1</inkml:trace>
+  <inkml:trace contextRef="#ctx0" brushRef="#br0" timeOffset="87127">6988 14681 22650,'7'0'268,"-1"0"-88,2 15-4405,6 1 2357,-2 2 342,14 21 420,-10-21 569,8 22-1478,1 0 47,-3-9 510,-5-3 0,1 0 339,3 3 1107,8 9 1,-9-19-1,0-1 1</inkml:trace>
+  <inkml:trace contextRef="#ctx0" brushRef="#br0" timeOffset="87361">7535 14632 23099,'-18'15'835,"4"1"-1615,5 2-397,6 20-900,-14-22 2644,9 31-1573,-1-24 530,-4 13-828,10-16-765,-5 1-259,4-10 2466,-1-6 1,0-2 0,-1-3-1</inkml:trace>
+  <inkml:trace contextRef="#ctx0" brushRef="#br0" timeOffset="87530">7342 14631 22470,'42'-7'1722,"-3"1"-1398,-17 27-3638,10-16 3248,-19 35-2582,15-24 2138,-8 18-979,0-8-299,10 13-1051,-8-10 2355,19 20 1,-17-24 0,9 7-1</inkml:trace>
+  <inkml:trace contextRef="#ctx0" brushRef="#br0" timeOffset="87731">8022 14564 23549,'-20'19'14,"-7"-15"890,24 34-3993,-23-23 4240,22 19-2828,-22-6 1947,23 4-1451,-17 1 378,18 3-1571,-6-2 1914,8 16 1,0-15-1,0 10 1</inkml:trace>
+  <inkml:trace contextRef="#ctx0" brushRef="#br0" timeOffset="88065">8373 14690 24179,'-40'-1'298,"2"0"-331,-5 1 349,12 16 953,4-12-938,17 25-1563,-5-26 1772,12 35-2031,-5-23 829,8 21-813,20-6-456,-15-8-739,35 13 989,-9-18 1624,21 4-1093,-9-14 1697,15-1-397,-34-6 1177,9-15 897,-26-5-1483,-3-18-1013,-28 6-730,18-1-570,-41 8 663,41 1-1516,-43 2 2185,18-4 1,-10 9 0,3-3 0</inkml:trace>
+  <inkml:trace contextRef="#ctx0" brushRef="#br0" timeOffset="88399">8610 14687 22290,'6'0'360,"0"0"-180,0 13-4477,0-10 3618,1 26-1223,0-24 1720,2 30-871,2-11-1161,-3 9 409,5 4-81,-7-18 2793,3 3-2615,-6-34 2196,0-10-1858,-3-34 1103,0 8-234,0 14 0,0 0 724,0-6 0,15-10 0,3 18 0</inkml:trace>
+  <inkml:trace contextRef="#ctx0" brushRef="#br0" timeOffset="88844">9270 14667 24269,'-46'0'180,"0"0"-180,3 0 0,18 14 865,-7-11-722,28 25-1812,-10-14 1709,14 13-1637,20-6 1,6-3 425,23-9 803,-11-4-368,0-5 532,-13 0 1460,7-19-753,-6-2 1226,-5-13-639,-11 4-880,-10-13-1438,0 9 472,-9 1 0,-1 1-1136,6-9 1268,-19 0 1,-1 1-1952,17 0 1356,-13 8 1,1 3-227,16 11 420,-16 1 1301,17 36 183,-6 12 605,22 16-1109,-10 4 252,11-8-1381,-8-9 0,-1 0-730,10 18 1832,-9-17 1,2 0 0,17 11 0,-9 1 0</inkml:trace>
+  <inkml:trace contextRef="#ctx0" brushRef="#br0" timeOffset="89515">10095 14351 23999,'3'-3'242,"0"1"730,-3 1-3719,1 19 913,-1 8 476,0 15 479,0 5 515,0-12 0,0 0-1142,0 23 767,0-3 1,0 1-258,0-21 1,0 0 897,0 12 1,0 0 176,0 18-799,0-1-629,0-2 0,0-4 1255,17-4 1,-13-7-1,13-4 1</inkml:trace>
+  <inkml:trace contextRef="#ctx0" brushRef="#br0" timeOffset="90078">10878 14329 21840,'40'0'0,"0"0"0,0 0 0,0 0 45,0 0 0,1 0 105,-1-1 1,2 2-132,20 6 1,1 0 24,-14-5 0,0 0-27,-6 2 1,2 1 0,0 0 30,2 0 0,1-1 1,-2-1-50,10-1 0,3-1 22,-12 1 0,6 2 1,1-1-1,-6 0-77,15 0 0,1 0 67,-10-2 1,6-1-1,0 0 1,-5 1 72,-5 1 1,-5 0-1,3 0 52,15-2 0,3 0 1,-3 0-83,-15 0 0,-3 0 0,1 0 39,2 0 0,0 0 0,1 0-63,-1 0 1,1 0-1,3 0-7,2 0 1,4 0 0,0 0 0,-2 0 10,3 0 1,-2 1-1,5-2 5,-3-1 0,6-1 1,2 0-1,-1-1 0,-6 0 29,6 0 0,-4-1 0,6-1-37,-14 2 0,5-1 0,3-1 1,0 1-1,-2 0 0,-4 1 0,2 0 0,-5 1 1,0-1-1,3 1-18,2-2 1,2 0 0,1 0-1,-1 0 1,-3 0 34,-2 2 1,-2 1 0,0 0 0,-1-1-6,3-2 0,0 0 0,0-1 0,0 1-2,0 0 1,0 1-1,0 0 1,0 0-5,0 0 0,1 0 0,-1 1 1,1-1-58,0-1 1,-1 1 0,1 0 0,-1-1 36,0 1 1,0 0 0,1 0 0,2 0-35,4 0 1,3-1-1,2 0 1,-2 1-1,-2 0 32,0-1 1,-4 2-1,1-1 1,6 0-27,-12 0 0,5 1 0,3-1 0,1 0 0,-2 0 0,-2 1 0,-5 0 17,8 0 0,-6-1 1,1 2-1,4-2-31,-1 1 0,5 0 0,2 0 1,0-1-1,-3 1 0,-6 0-11,-1 1 1,-6 0-1,-1 0 1,3 0 41,11-1 0,2 0 1,1 0-1,-3 0-116,-4 1 0,-2 1 0,-1-1 0,-2 0-123,1 0 0,-4 0 1,5 1-398,3-1 1,6 1-1,-2 0 1,-7 0 616,7 0 0,-5 0 1,-11 1-1,1 0 1,-5 0-1,-5 0 1,1 0-1</inkml:trace>
+  <inkml:trace contextRef="#ctx0" brushRef="#br0" timeOffset="91011">10432 15610 21840,'63'-8'629,"-30"3"0,1 2-524,3 0 0,0 1-121,2 0 0,1-1 38,1 1 0,3 1-85,-2 0 1,5-1-1,-3 2 12,9-1 1,2 1 48,7 0 0,7-1 0,-6 1 9,-1-1 1,-3 2-165,-5 4 1,1 1 0,-2-1 103,7-4 1,-3 2 5,3 4 0,0 1-105,1 2 0,1-3 95,1-5 1,0 1 2,-20 6 0,1 3 1,0-3 85,-1-6 0,1-4 0,4 3-17,1 2 0,3 3 0,2 1 1,-3-3-29,3 0 0,-2-2 1,6 1 8,-3 0 0,5 0 1,2 1-1,-1-1 0,-6-1 44,8 1 0,-5 0 0,2-1 15,-1-1 1,3-1-1,0 1 1,-4-1-11,2-1 0,-3 0 0,0 0 60,2 0 0,0 0 0,0 0-23,0 0 1,1 1-1,4-2-26,-12-1 1,5-2 0,1 1 0,-1-1 0,-2 2-28,1 1 1,-3 0 0,2 1 0,4-2 8,-7-1 1,5-1 0,3 0-1,1-1 1,-1 0 0,-2 0-1,-5 0 61,11-1 1,-5 0 0,0 0 0,6-1-63,-8 2 0,4-1 1,4 0-1,1-1 1,-2 1-1,-2-1 1,-5 0 34,12-2 0,-7-1 0,0 0 0,4 1-34,-13 2 0,3 1 0,1 0 1,0 0-1,1-1 0,-2 1 2,0-1 1,1 0-1,-1 0 1,0 1-1,-1-1 1,-3 0 18,13 0 1,-5-1 0,2 1 0,5-2-43,-12 2 1,5-1 0,3 0 0,0 0-1,0-1 1,-4 2 0,-5-1 11,9 0 0,-5 1 1,-2 0-1,4-1-14,-2 0 0,4-1 0,1 1 1,-3 0-1,-4 0 9,12-1 0,-6 0 0,0 0-25,-1 1 1,0-1 0,-1 0 15,-4 1 0,0 0 1,-1 0 30,-2 1 1,-1-1-1,-1 1-65,-2 0 1,-1 0 0,-1 1 68,18-3 1,1 0-86,-11 3 1,1-1 0,-2 1 6,2 0 1,0 1-71,-2 1 1,4 0 0,-8 1-258,-12 1 0,-2 1 15,7 1 0,-3-1-373,-1 1-100,-11 0-261,-6 0 664,-10 16 1,-6-12 0,-4 12 0</inkml:trace>
+  <inkml:trace contextRef="#ctx0" brushRef="#br0" timeOffset="91380">19602 14386 21930,'-14'-7'-3626,"3"2"2941,5 1 479,4 2-904,-4 16 1312,6 23-982,0 3 285,0 15-1101,0 3 839,0-11 100,0-5 0,0 0-837,0 9 1573,-8-9 1,-1 0 0,4 5-1,-13 14 1</inkml:trace>
+  <inkml:trace contextRef="#ctx0" brushRef="#br0" timeOffset="92715">9833 16927 22470,'0'11'-5486,"0"-2"3447,0-2 975,0 6 515,0 0 124,0 21 121,0-6 75,0 35-1277,0-20 1424,7-2 1,1 1-280,-4 9 252,3-8 0,1 0-702,1 6-469,-6 10 1206,13-12 0,-14-15 0,4 7 0</inkml:trace>
+  <inkml:trace contextRef="#ctx0" brushRef="#br0" timeOffset="93729">4855 17184 23189,'14'11'-4508,"-3"7"1125,-11 13 2298,0 2 578,0-3 109,0 5 114,13 2-594,-9 4-878,9 0 894,-13 1 1300,11 13-914,-8-14-468,17 17-512,-18-31 1284,13 7 0,-11-22 0,6 0 1</inkml:trace>
+  <inkml:trace contextRef="#ctx0" brushRef="#br0" timeOffset="94411">4980 17075 23279,'-11'-6'-3467,"8"2"-276,-8-1 4105,11 0-1457,0 1 366,0-3 207,0 3 221,19-5 839,-15 3-12,42-6 2023,-21 4-1170,30-3 509,-4 1-911,-7 3 0,3-1-25,-11 2 1,3 1-339,5-1 0,5 1 0,-4 0-774,-3 0 1,1 1 308,2 0 0,3 1 1,-4 1-346,-5 0 0,-1 0-74,9 1 0,0 0 88,-8 1 0,-2 0-270,16 0 312,-15-1 0,-4 2-182,-2 12-632,5-10 642,-24 22-1947,0-21 1693,-11 29-1198,0-19-36,-2 27 175,0-16 104,0 19 660,0-15-664,0 23 1990,0-21-1648,0 13 1064,18 4-397,-13-11 184,11-5 0,0 1-243,-12 4 299,18 25-391,-20-28 549,6 10-244,-8-18 362,0-1 724,0-1-60,0 6-89,0-9-388,-20 9 1583,0-16 276,-23 5 575,14-10-447,-1-1 26,-5-3-304,8-2-34,-24 1-92,17-2-1180,-29 2-513,19-1-247,4 1 1,0 0-210,-13 1 269,19-1 1,-3 0 244,-4 0 0,0 0-43,-25 3-89,8-2 1,-1-1 21,23-1 0,0-1-47,-26 1 1,-1-1-24,27-2 1,0 1-139,-11-1 1,1 0-657,-13 0-361,7 0-146,9 0 1300,7 0 1,10 0 0,4 0 0</inkml:trace>
+  <inkml:trace contextRef="#ctx0" brushRef="#br0" timeOffset="95783">7178 17104 24089,'-6'-16'-8405,"-1"3"5787,4 2 1357,-1-1 177,2 6 687,0-2 166,1 26 667,32 18-2121,-24 6 1721,14-10 1,2-1 234,-9 8-366,-1-7 0,-1 2 133,1 8-11,-5 0 0,-2 0 142,-5 2-219,3-6 0,-2 0-8,-2-7 872,0 11-548,0-23 528,0 1-205,-12-13 1942,-3-16-1780,-7-10-403,8-11-852,3-18 62,5 11 329,3 0 1,1-1-21,-3-12 24,4 15 1,1 0-1869,-1-17 1483,0-2 111,1 0 708,0 17 1,0-1 26,0-18-147,10 12 0,0 1 395,-5-4-287,11 14 0,3 3 818,2 1 38,27-1 840,-16 21 219,14 18-1110,-28-5 27,8 47-2144,-15-29 436,-3 12 0,-3 1-833,-1 2 44,-1 12-721,-3-15-155,0-3 1110,0-3-32,-17 8 2519,13-12-501,-24 12 702,25-19-1029,-19 10 838,19-14-914,-7 6 438,10-6-903,0 1-837,0 0 505,0 2-949,0 2 936,19 1-871,6 12 617,12-8-805,13 19 743,-15-19 751,4 2 1,0 0 0,6-1 0,-11-5-1,0-1 1</inkml:trace>
+  <inkml:trace contextRef="#ctx0" brushRef="#br0" timeOffset="96193">8008 17497 22650,'38'-3'648,"4"0"-556,-8 3-277,3 0 74,-10 0 127,13 0-69,-10 0 13,16-11 525,-22 8-311,2-22-392,-14 11-7,-6-8-750,-3-4-169,-3 10-92,-23-13-412,-1 13 104,-3-2 444,-28 7 798,35 6 84,-42 2 1253,36 3 379,-13 17 832,26 6-1089,-5 11-640,16 17-857,-2-15-320,10-3 1,5 0-1676,18 8 712,-3-7 0,4-2-1065,23 3 2366,-22-14 0,0-1 0,18 0 1,3 0-1</inkml:trace>
+  <inkml:trace contextRef="#ctx0" brushRef="#br0" timeOffset="96711">8845 17452 22290,'0'18'-6206,"0"13"3988,15-7 461,-11 20 1009,10-19-123,-3 15 151,0-18 146,3 2-1541,0-10 2238,-13-4-395,11-1 1055,-7-2-1084,3-4 1099,-1 0 317,-5-3 417,2-21-592,-2 16-943,2-37 118,-1 24 0,0-20 0,0 7 0</inkml:trace>
+  <inkml:trace contextRef="#ctx0" brushRef="#br0" timeOffset="97065">9010 17433 21750,'16'-47'-3195,"6"-1"2424,-8 27 993,6 1 635,2 14 651,-4 4-496,12 17-1532,-10 8-1105,9 24 592,-12-7-400,7 16-400,-12-23-331,2 7-461,-8-7 455,-2-12 1438,-2 4 224,-2-14 609,0-22 491,0-10 97,0-14-99,0-2 51,0-12-253,0 9-162,-2 4 0,4 0 234,20-5 115,-12 8 0,0 2 229,16 1 853,3-5-269,-25 21-683,29 4 1475,-18 6 141,25 1-707,-15 3-808,18 16-515,-18 7-1478,14 24-326,-19-6 408,4 6-1708,-5 8-1106,-5-11 3459,-3-6 1,0 0-1,3 6 1,4 12 0</inkml:trace>
+  <inkml:trace contextRef="#ctx0" brushRef="#br0" timeOffset="98165">10025 17156 23549,'-11'-10'-5649,"8"2"1546,-8 1 4573,3 3-240,6 21-461,-6 10 321,8 12-447,17 4-1952,-12-7 1884,26 2 889,-28 2-1296,24-1 36,-24-1 400,22-3-472,-22-2 705,17 7 317,-12-13-451,3 8-119,1-22 523,-11 2-335,4-11 271,-5-17 63,-16-20-524,12-3 756,-12-12-350,16 15 579,0-4-601,0 0 209,0-1-316,0 2 231,0 2 490,0 4-360,0 4 420,14 6 710,4 6 378,17 7 334,3 27-1413,-5-15 611,0 43-1285,-9-27 301,-2 22-722,6 4-1255,-9-11-359,6 18-373,-15-27 1799,0 7-1461,-7-18 1971,-2-25 196,-15-12 131,10-18 61,-10 1-535,14-10 1092,17 9-139,-8 5 0,1 1 348,10-5 333,11-15-745,-7 28 1185,21 1 503,-10 16 398,2 5-852,-1 20-1738,-9 8-353,-3-1 1,-2 3-714,3 18-700,7 4-52,-11-13-950,2-1 372,-1-3 144,2-1 1173,1-3 920,2-4 306,15 3 730,-5-9-407,-5-8 0,1-2 894,8-2 115,11-3-96,-17-3 110,0 0-134,-5-14 402,1 10-541,-5-25-869,-2 25 299,2-42-1082,-9 27 259,-1-40-919,-10 29 96,-23-33-1578,12 31 899,-30-24-137,13 33-129,-16-5 1248,15 15-213,-7 3 1242,16 8 531,-9 21 1314,11 8-1183,6 25-566,6-7-676,11-13 0,1-1-1006,-7 7 211,37 10-680,-38-17-924,39-4 426,-24-2 2046,35 1 0,-19-9 0,10 0 1</inkml:trace>
+  <inkml:trace contextRef="#ctx0" brushRef="#br0" timeOffset="98761">11608 17286 22920,'20'18'-5851,"-16"11"2692,34-7 3458,-33 8-1572,27 0 896,-28-6-298,23-1 773,-23 0-1974,27 8 1824,-27-11-46,24 9-421,-23-18 148,7-1-493,-9-7 935,-2-21-372,0-20 708,-1-1-398,0-27 498,0 31-383,15-21 1253,-11 26-1098,12-2 550,-4 16 741,1 9 430,15 2 35,-16 19-1904,17 8 300,-19 8-1575,18 15 514,-15-16-918,12 29-355,-13-32-630,9 15 231,-14-26 1764,3-3 143,-6-5 463,0-4 831,-1-3 1363,1-17-1288,-2 13 782,3-32-874,-1 19 185,4-18-605,3-13 456,-2 13-766,9-29-1034,-7 29 1257,10-17-616,-10 28 893,6-3-8,-7 16 483,2 6 648,-2 2-207,6 3-506,-5 23-2112,9 7-57,-9 14 411,-1-4 0,0 0-918,2 6-162,-1-1 0,2-1-2070,1-2 3170,8 10 1,-6-21 0,2-2 0</inkml:trace>
+  <inkml:trace contextRef="#ctx0" brushRef="#br0" timeOffset="99560">12962 16763 25528,'0'-8'-6475,"13"-1"9653,-10 4-3514,24 1 1462,-16 2-186,12 18-2069,-13 12-774,7 29-257,-13-3 2038,4-11 1,-1-1-2132,-1 13 1634,0 1 0,0 1-1433,-2-1 1012,0-7 0,-1-2 497,-2-9 1130,1 12-82,-2-28-262,0 1 110,0-14-1222,0-4 615,-14-19 277,10-8-118,-10-22-450,14 8 603,0-3-58,0 12 0,0 0 0,0 4 0,22-4 1306,4 14 1277,25-3 230,-13 15-1259,2-3 314,-13 24-1544,-1-15 909,-2 38-1637,6-11-867,-9 13-1357,5 13-138,-17-23 621,-1 18 90,-8-24 1591,0 5-1309,-22-6 2888,-5-10-903,-26 4 449,13-15 0,-2-1 0,15-6 0</inkml:trace>
+  <inkml:trace contextRef="#ctx0" brushRef="#br0" timeOffset="99911">13323 17300 22200,'35'17'-3356,"19"1"2877,-12 3 203,-5-8 0,0-2 455,6 2-2,-6-7 0,-1 1 52,6 9-427,13-14 233,-21 4 522,0-6 76,-3 0 337,5-17 323,-11 13-334,4-26-614,-20 9-57,-1-16-1226,-8 6-220,-20 0-251,-2 1-213,-2 7-187,-10-10-134,15 16 684,-15-1 1080,16 10 674,-3 3 703,13 4 358,-1 20-353,3 7-813,6 12-551,0 16 19,0-18-925,19 25-993,1-26-223,3 7-216,13-15 950,-21-5-364,18-2 2058,-10-5 1,-1-2 0,2-3 0</inkml:trace>
+  <inkml:trace contextRef="#ctx0" brushRef="#br0" timeOffset="100227">14053 17325 23549,'0'-14'-6385,"14"5"9226,-11 25-5915,21 6 2167,-21 21-132,19-12 104,-20 2 279,15-11-1026,-15-2 1617,8 0-2322,-9-3 2664,7 1-1204,-6-9 504,2 3 66,-2-26 727,-2-6-194,0-11-21,0-6 367,0 5-415,0-23 528,0 10-380,-2 5 0,4 1 204,15-6-877,-7 10 0,0 2 37,12 1 720,11-3 1,-29 21-1,13 4 1</inkml:trace>
+  <inkml:trace contextRef="#ctx0" brushRef="#br0" timeOffset="101078">15062 17366 24539,'9'-12'-968,"-6"0"-1897,6 4 4158,-9 2-3250,0 25 593,0 9 390,0 14 153,0 2-775,14-7-411,-10 16 1498,21-15-1684,-22 20 2100,19-31 36,-19 5-25,8-18-392,-4-3 118,-1-6 406,7-23 1372,-6 13 500,2-51-1507,-3 32 155,0-30-68,1 18 5,0 1 136,2 0-206,6-14-1164,-3 14-300,11-16 1528,-9 28 290,13-2 548,-9 18 561,2 3-273,-2 4-427,-4 21-2013,1-16 1213,3 54-1800,-6-37 651,-2 11 0,-2 1-1272,-2-4-428,2 17 303,-6-26 200,-1 6 2087,-1-36-1097,0-8 1533,0-17 245,0-16-468,0 17 71,20-29 581,6 25-170,-3 6 0,3 2 775,15-2 460,0-5-226,-10 18 474,0 4-142,1 8-95,0 2-850,-1 4-868,-1 0-271,8 16-1082,-10 9-565,12 23-1088,-21-5-1347,4 3 76,-11-11-545,-1-2 3903,0 0 0,-2-3 1,1-1-1</inkml:trace>
+  <inkml:trace contextRef="#ctx0" brushRef="#br0" timeOffset="101413">16263 17364 24898,'16'-7'2633,"2"-2"-2050,2 6-759,3-4 396,16-1-230,-7 1 111,27-5-206,-20 4 511,21-4-676,-25 3 207,7 0 240,-18 2-191,-4-1 319,-5 0-103,-7-6-1199,-3 2-291,-27-10-572,17 6-784,-42-3 1978,27 5-968,-24 2 584,14 2-218,-13-1 1561,25 5-74,-20 1 1169,28 4 743,-6 19-1564,9 8-491,32 25-1924,-19-8 96,29-12 1,6-2-315,-4 8 2010,15-8 1,4-3 0,-24-11 0,-1-1 0,11 4 0,0-1 0</inkml:trace>
+  <inkml:trace contextRef="#ctx0" brushRef="#br0" timeOffset="102777">17430 17870 23279,'0'-9'-4766,"0"0"3357,0 0 794,0 0 157,0-1 122,0 2 32,0-1 76,0 5-1458,0 21 1776,0 14-90,14 14-232,-5 6 0,0 1-107,9 12 220,-12-22 1,-1 6-1,-1-5-76,5 22-381,-8-10 1,0 0-906,8 3 483,-8-22 1,-2 0 999,1 5 0,0-9 0,0-3 1</inkml:trace>
+  <inkml:trace contextRef="#ctx0" brushRef="#br0" timeOffset="103777">17672 17810 21570,'28'-9'2913,"4"-1"-2038,3 1-564,7-2-95,3 2-87,3-1-151,6 0-41,-13 5 1,2-1 130,-9 3 0,2 0-258,27-2 0,1 2-68,-25 2 0,1 0 109,5 0 1,4 1 0,-3 0-100,-4 0 1,0 0 47,14 0 0,0 0 3,-14-1 1,-3 2-68,1 7 0,1 1 69,-1-8 1,2 2-84,17 11 1,2 0 130,-15-12 1,2-1 73,5 6 0,5 1 0,-3-2-5,-5-4 0,2-1 61,2 1 0,9 1 0,1-1 0,-7 0-29,-11-1 1,-4-2-1,5 1 109,3 0 0,7 0 0,3 0 0,-3 0 1,-6 0 16,-2 0 1,-5 1 0,5-2 26,11-2 1,6-2 0,1 0 0,-6 1 11,-8 3 1,-4 1 0,3-3-6,-2-4 1,3-2-1,0-1 1,-3 4-29,1 4 0,-3 2 0,0-2 36,2-7 0,0-3 0,1 4-39,-1 6 0,0 2 1,1-2 90,0-6 0,1-2 1,-1 2-48,-1 3 1,1 3 0,-1-2-30,0-2 1,-1-1 0,4-1-21,-3 3 1,3 1 0,1-1 0,-3 1-113,2 0 1,-3-1 0,4 1 38,7 0 1,6 0 0,0 0-1,-7 0-67,-10 1 0,-5 1 0,4 0 44,6 0 0,6 0 0,-1 1 0,-6 0-45,12-1 0,-3 2 3,-9-1 1,2 1 0,-4 0-54,2 0 0,-3 0 14,-1 0 1,0 0 23,-3-1 1,1 2-66,12 6 0,1 1-4,-18-6 1,0 0-83,20 12 0,-3 2-323,-3-2 310,-20 0 1,-3-1-604,-6 0-2,-2 7-332,-18-13-367,-5 9-174,-2-5 194,-1 3 437,-17-5 2121,12 5-1303,-26-8 1489,27 1-543,-11-4 1139,2-1 549,9 0 47,-19-1-740,15 1-1577,-8-2 923,6 0-1396,4 0 1039,1 0-878,4 18-1662,14 3-558,-10 10 556,21-1-163,-22 4 299,20-8-3,-13 24-129,4-21-386,-2 24 1665,-7-23 854,3 33-347,-4-32 108,1 27 5,-3-34 24,3 16 134,-3-18 384,1 6-261,-2-9-40,0-3-148,0 14 93,-17-13 1324,13 15-1180,-12-19 1453,3 15-823,9-14-1143,-9 11 658,13-15-1757,0 4 180,0-7 704,0 0 0,0-2 1,0-3-1</inkml:trace>
+  <inkml:trace contextRef="#ctx0" brushRef="#br0" timeOffset="104677">18653 18558 23819,'0'-12'-4856,"0"-4"2817,0 4 1155,0-7 425,0 12 123,0-6 32,-11 11 1280,-1-2-1547,-10 4 2168,1 19 69,3 4-382,3 12-486,4 11-361,7-17-147,2 9-1291,2-16-24,0-1-571,23-10 696,0 12-358,22-17 1765,-8 10-131,1-13 769,-18-20 457,7 13 201,-16-30-1317,2 8-306,0-35 283,-12 15-1113,2 10 0,-1 1-25,-2-3-669,-17-21-847,12 24-42,-13-9 940,18 20 347,-15 1 157,11 7 227,-12 2 600,16 7-38,0 19 565,0 6-316,0 16 468,0-1-717,17 21-300,-12-9 303,11-4 1,0 0-917,-12 5 705,9-15 1,1 0-1614,-1 21 525,1-13-615,12 18 741,-23-30 1176,22 6 0,-21-20 1,6 0-1</inkml:trace>
+  <inkml:trace contextRef="#ctx0" brushRef="#br0" timeOffset="104851">18525 18529 23009,'-2'-13'-7308,"1"1"4913,1 1 1583,23-8 3183,14 2-1217,-1 4 1,3-1-673,-5 6 1,0 0-371,5-3 1,-1 1-881,24-2 1192,4 2 1,0 4-1,-32 3 1,-1 1-1</inkml:trace>
+  <inkml:trace contextRef="#ctx0" brushRef="#br0" timeOffset="105110">19508 18186 22380,'-7'15'-1925,"1"6"-144,6 10 32,0 7 905,0-6 317,0 26 233,0-13 146,0 17-1251,0 0 752,12-16-195,-11-10 0,1 0 17,17 1 943,-17 6 1,13-19 0,-6-3 0</inkml:trace>
+  <inkml:trace contextRef="#ctx0" brushRef="#br0" timeOffset="105495">19730 18541 23099,'4'-9'-3381,"0"1"2982,0 2 637,1 2 702,3 1 392,-3 3-863,7 0-245,-2 18-2410,5 0 1377,-4 3-760,1 9-317,-1-14-146,-2 3-865,2 4 578,-7-14 294,2 2 1904,-4-4-479,1-7 2764,2 0 143,-1-16-1437,9-5 860,-2 2-132,6-19-163,7 22 1140,-5-26-884,15 20-1258,-14-7-861,10 19 2083,-12 2-535,3 8-527,-2 0 177,-4 23-3071,9 4 1425,-9 16-1711,3-5 795,-5-5-1145,-1-2 46,1 0-431,7 6 440,-4-12 3015,15 4 0,-12-16 0,6-1 0</inkml:trace>
+  <inkml:trace contextRef="#ctx0" brushRef="#br0" timeOffset="105881">20410 18238 23279,'0'-9'-6295,"0"23"4256,0 13 975,14 29-340,-10-7 1008,22 3-429,-23 6 568,20-16-847,-17-9 0,-2 0 777,8-1-287,0 6 31,-6-15 524,2-7-537,0-2 759,-4-11-91,2 0 1580,0-17-734,0 10 1896,1-27-1809,5 5 357,-3-6-148,9-13 15,-6 22-408,1 0-523,2 3 238,-6 13-920,8-6 1766,-7 8-98,11 24-1709,-9 6-927,13 24-80,-11-9-687,15 13-221,-8-22 2059,5-4 0,2-3 0,5-7 1,20 6-1</inkml:trace>
+  <inkml:trace contextRef="#ctx0" brushRef="#br0" timeOffset="106227">21100 18529 23549,'-15'-14'-5373,"-4"-3"3636,0 7 1748,-19 0 664,26 7-132,-12 21 616,18 2-1825,25 21-1907,4-22 2454,21 12 226,-20-16-276,14 1-88,-17 2-546,13-17 591,-8 5 905,-9-24 1563,-6 14 500,-6-28-2212,-3 15-780,-1-9-605,-1 3 601,0 32-1626,0 7 90,15 29-1047,-11-11-853,24-1 1834,-25-11 1728,23-3 1,-22-9 0,9-2 0</inkml:trace>
+  <inkml:trace contextRef="#ctx0" brushRef="#br0" timeOffset="106627">21497 18582 23459,'0'9'-6115,"17"4"4706,-12 25-222,27-7 1113,-18 12-857,2-16 810,5 15-120,-9-21-1437,0 5 1639,7-11 301,-15-5-164,9-2 754,-11-27 491,1-7-349,-3-26 25,0 10-50,0-3 48,0 12-695,0-1 786,0 2-897,0-12 34,18 15 1215,-13-15-812,32 25 2039,-18-4-907,17 16 603,-4 18-1107,-8-6 504,-1 26-1555,-10-8-1434,-2-4 948,-5 17-2287,-4-21 719,-2 14-1424,0 1 3657,-16-9 0,12 3 0,-12-10 0</inkml:trace>
+  <inkml:trace contextRef="#ctx0" brushRef="#br0" timeOffset="106813">20977 18350 23549,'32'-23'1141,"21"1"424,-29 0-2246,24 4 1317,7-3-135,-12 10-667,-9 5 0,-1 2-713,4 2 608,14 22 0,-25 5 0,4 21 1</inkml:trace>
+  <inkml:trace contextRef="#ctx0" brushRef="#br0" timeOffset="106989">22040 18890 25798,'19'0'0,"3"0"-630,-5-15-498,-1 12 999,-8-12 1,-5 7 0,-1-2 0</inkml:trace>
+  <inkml:trace contextRef="#ctx0" brushRef="#br0" timeOffset="112677">5253 17025 23549,'0'28'-6295,"0"6"4166,23-6 719,-18 6 332,37-6 1387,-37 2-974,36 0 944,-25 0-2427,17-1 2363,-11-2-377,0-2 331,-4-2 33,-1-5-417,1 3 706,-7-8 45,2 1 1126,-8-10-1771,-1-15 815,-2-10-412,1-12-68,9-27 188,2 13-864,4-2 0,1-2 198,-4 16 1,3 0 384,2-6 0,4-5 0,-1 4 0,1 1 0,1 1 0,7-13 0,1 0 0</inkml:trace>
+  <inkml:trace contextRef="#ctx0" brushRef="#br0" timeOffset="121313">21705 880 21031,'0'29'-5846,"0"-6"3717,0 2 1065,0-4 515,0 3 214,0 6 121,0 5-15,0 5-1367,0 9 1650,-1-9 1,2 3-189,5-10 1,1 5 134,-5 7 1,-2 10 0,-1 1-1,3-8-33,4 4 0,0-2-23,-4 11 0,-3 6 0,0-9 62,1-17 0,0-2 38,0 20 0,0 0-50,1-14 1,-2 2 35,-2 5 1,-2 6-1,1-5 155,2-2 1,1 0-124,-3 9 0,0 6 0,-1-4 94,0-5 0,0 3-87,1 0 0,1 10 0,0 0 0,-2-8-7,0-14 1,-2-5 0,1 4-19,0 15 1,1 9 0,-1-2 0,1-8 50,-1 0 0,0-2-47,0 5 1,1 5 0,0-6-23,0-8 1,1 0-33,1 4 0,2 6 1,-1-6-52,1-6 0,0-2 22,1-7 1,0 1-1,0 1-5,0-1 0,0 1 0,0-3-46,-1 7 0,2 2-49,3 4 0,3 5 0,-2-6 29,-4-4 0,1-1-1,3 6 1,2 4 0,-3-5 14,-3-4 0,-2-2 72,1 17 0,0-1 57,0-20 1,0-1-50,1 0 0,-2 0 108,-7-1 0,-1 2 70,7 16 0,0 0-6,-7-15 0,1 1-40,6 4 0,3 4 0,0-4-85,-1-4 1,0 0-71,0 5 1,0 6-1,0-5 79,0-3 0,0-1 12,0 16 0,0-1-116,0-17 0,0-3-43,0 1 1,0 0 48,0-2 0,0 3-6,0 15 0,0 1 64,0-16 0,0 1 59,-3 3 1,-2 5 0,2-6-14,1-4 0,1-1-13,-2 3 1,-1 5 0,0-5 7,-1-4 1,2-1 0,2 12 1,-1-2 54,-2-15 1,0-2-41,4 0 0,0 0-110,0-1 0,0 1 41,0 12 1,0 1-38,0-12 1,0 1-99,8 24 0,1 0-53,-7-24 1,0-1 30,5 11 0,2 1-42,-3 2 1,-1-1 73,-3-11 1,-1 1 79,4 26 1,1 1-10,-1-27 1,0 1-41,-5 25 1,2 0 95,6-26 0,0-1 9,-6 24 0,-1 1 102,4-28 0,-1 2-79,-2 8 0,0 7 1,0-6 41,0-10 0,0 1-93,0 7 1,0 5 0,0-6 227,3 20-222,-3-23 1,1 1 71,2 13-28,-1 2-57,0-17 0,1 2-63,1 20 37,-2-21 1,1 2 1,-1 1 1,1-2-64,1 23 91,-1-7 1,1-1-13,-3-22 1,1-2 29,0 13 1,0-1 2,3 18 14,-1 1 12,0-2-19,0 2 119,1-1-237,-2-1 184,-2-18 0,0 1-15,2 21-70,-2-9 0,0 0 207,1 9-142,-2-9 0,-1 0 36,-1-22 0,1-1 5,-1 10 1,0 1 16,0 2 1,0-2-35,0-9 0,0 1 75,-7 24 0,-1 2 7,6-25 0,0 1 55,-12 26 1,1 1-19,11-27 1,1 2-103,-6 12 1,-3 6 0,2-6 62,2-10 1,0 0-62,-1 9 1,-1 5 0,1-7 59,2-13 1,-1-1-61,-4 23 0,0 0 138,5 6-261,-3-21 1,0-2 25,2 17-37,0 0-34,1 1 72,1-16 0,0 1-57,2-10 0,-1 0-15,-3 25 1,0 0-29,3-24 1,-1-1 284,-4 26 0,-1-1-186,5-22 0,-1-2 57,-2 11 1,0 1 31,-3 17-26,5-31 0,0 1 74,-4 31-46,3-17 0,1 2-74,1-14 0,0 2-27,-3 25 0,0 0-5,2-26 0,0-1 9,-1 12 0,0-1-26,-4 17 58,-1 0 32,0-1 13,-2 0 118,0-1 30,0 0-114,3-19 0,-1 1 6,3-10 0,0 0-14,-5 22 1,0 0-16,5-23 0,0-1-32,0 10 1,-1 0 22,-3 15-48,1-2-54,0 2 2,1-1-13,2 1-201,1 0 135,2-15 1,1 0-46,-1 22 37,2-10 0,0 0-187,1 9 143,1-22 0,0 0-246,0 15 184,0-1-3,1 0-288,0-16 0,0 0-382,0 22 875,0-10 1,0 0 0,0 7 0,0-20 0,0 0 0</inkml:trace>
+  <inkml:trace contextRef="#ctx0" brushRef="#br0" timeOffset="122644">23540 1608 23189,'0'-19'-5666,"0"0"4078,0 1 1243,-16-8-720,12 10 377,-13-12 56,3 16 819,11-1-2378,-24 6 3255,11 3 150,-8 1 33,-2 18 1285,-11 12-233,5 9-1409,-6 5 1,1 2 378,-1 5-399,5 0 1,4 0-970,12-6-426,-1 21-456,15-34-1067,0 10-164,28-24 1259,8-2 300,15-10 979,1-3 216,12-23 1000,-16-10-953,-6 2 0,-1-4 3,-18 8 1,-1-1-94,5-3 0,-1 1 252,0-18-706,-4-1-799,-7-2 175,-8 15 0,-1 0-1587,-1-19 1306,0 13 1,-4 1-706,-17-2-349,15-4 393,-15 23 454,3 8 327,12 5-301,-21 6 2191,23 17-888,-7 16 537,9 27-124,0-3-575,0 8 165,0-14-334,0 2 132,0-1-1668,8-15 1,3 1-653,10 15 1983,2 10 1,10-23 0,-13-2-1</inkml:trace>
+  <inkml:trace contextRef="#ctx0" brushRef="#br0" timeOffset="122859">23232 1327 22290,'-7'-18'-9328,"2"0"6942,22-5 4587,-13 7-1067,30 3 0,7 2 631,1-1-1082,3 5 0,3 1-463,-14 0 1,0 1-498,3 1 0,0 0 643,3-1 0,1-1 1,0 2-1,1-1 1,0 0-1,1 0 1</inkml:trace>
+  <inkml:trace contextRef="#ctx0" brushRef="#br0" timeOffset="123077">24322 786 22110,'-24'0'90,"10"18"-888,-3-13 2008,15 35-3688,-15-18 2426,11 24-1185,-8-3 739,5 7-835,1 5-230,-1 3 452,5-15 1,0 1 709,0 22 1,2-23 0,0-1 0,1 14 0</inkml:trace>
+  <inkml:trace contextRef="#ctx0" brushRef="#br0" timeOffset="123460">24472 1366 21480,'9'15'-7623,"-1"-11"8257,4 42-2717,-4-23 1417,-4 9 0,0 3 83,1 2 145,0 14 141,-3-5-1257,-1-14 1909,-1 12-1023,0-26 1133,0 1-16,0-29-229,0-10 19,0-13-32,0-4-159,14-10 610,-10 10-403,10 7 1,3 0 765,0-3 471,18-8-59,-7 27 765,-6 2-144,-2 12-458,-6 18-2375,7 10 68,-2 10-1694,12 18-91,-8-22 2099,7 13 1,-6-18 0,1 0-1</inkml:trace>
+  <inkml:trace contextRef="#ctx0" brushRef="#br0" timeOffset="123877">25353 961 23549,'-19'19'71,"3"-2"-530,16 23-2525,0-2 2062,0-5 1,0 2-309,0 22 715,8-5 0,0-1-340,-4 11-137,14-14 1,0-1-1302,-13 3 1293,14-19 0,-1-3 616,-15 6 158,26-6 319,-25-6-168,19-3 530,-13-9-31,8-2 1085,-4-7 553,3-23-347,-2-7-557,4-13-452,-4-1 282,2 8-365,-2-1 41,8-11-498,-8 14-834,9-10 345,-11 30 897,9-1 614,-8 14-282,3 21-1948,-2-16 1192,-2 43-1445,4-26 601,-4 9 1,1 1-1574,9 10 576,-2-8 1,2-1-1413,6 3 2747,12 8 0,-7-21 0,0-2 0</inkml:trace>
+  <inkml:trace contextRef="#ctx0" brushRef="#br0" timeOffset="124227">26288 1446 23279,'-28'-14'-3352,"-9"6"3380,33 0-3711,-25 7 5018,11-2-825,-11 24 567,5 3-561,12 23-1588,5-4 636,28-1-1290,2-10 2117,21-14-1113,-2-8 630,-2-10-194,-2-21 983,-18-3 113,2-21-206,-16 11 363,3 4-198,-6 5-1214,-3 8-721,0 19-431,0 14-510,0 28 233,15 5-320,4-6-695,15 7 2742,-15-23 0,18 4 0,-11-13 0</inkml:trace>
+  <inkml:trace contextRef="#ctx0" brushRef="#br0" timeOffset="124593">26725 1447 22290,'0'10'-5306,"0"7"3267,15 14-205,-11 3 1412,10-4 391,2 0 1,-3 1-375,-6 10 518,13-6 0,0-1-1791,-6-5 1623,7 8-45,-8-22 1032,2 0-218,-12-11-73,7-2 1674,-7-2 349,1-22-1515,0 16 1119,4-54-1163,-3 34-461,1-12 0,-1-2 36,0-3-34,-1 9 1,1 1-1189,0-1-381,0-4 1290,0 20-558,-2 9 983,1 4 774,-1 5 169,1 0 46,-1 16-1994,2 8-78,-1 9 280,2 19-492,-4-20-588,0 11-875,-2-17-390,0-1 2601,0-4 0,-19-3 1,-4-2-1</inkml:trace>
+  <inkml:trace contextRef="#ctx0" brushRef="#br0" timeOffset="124793">25670 1109 23189,'-4'-44'-6957,"1"2"4955,3 5 1139,28 0 2354,-21 6-1608,51 3 1976,-33 6-954,28 6-349,-14 6 1722,0 5-2554,13 22 374,-12-13 0,-15 18 0,-1 6 0,8 11 0</inkml:trace>
+  <inkml:trace contextRef="#ctx0" brushRef="#br0" timeOffset="124943">26390 2074 24359,'0'9'-6746,"0"-1"6214,0-4 0,0-2 0,0-2 0</inkml:trace>
+  <inkml:trace contextRef="#ctx0" brushRef="#br0" timeOffset="125448">27857 773 25258,'0'40'-6295,"0"-5"4076,0-3 1245,0 17 335,0-6 324,6 0 1,2 1-334,-5 14 457,11-10 0,0 1-2032,-11 7 2071,8-21 1,1 0-413,-1 20 169,1-16-189,7 9 21,-15-28-25,8 0-120,-9-15 381,-1-23 799,-1-29 124,-1-1-376,6 6 1,4 1 922,10-3-336,-1 10 0,0 0 605,1 2 148,17-4 509,-14 25-122,9 5 172,6 24-1510,-15-13-539,-5 21 0,-1 5-1389,0-5 42,4 33-455,-12-23-310,-4 0-362,-2-3 160,-2 8 1464,-1-12 80,-23 10 1349,17-20-809,-36-1 1656,37-11-896,-35-4 1,34-1 0,-15-2 0</inkml:trace>
+  <inkml:trace contextRef="#ctx0" brushRef="#br0" timeOffset="125763">29190 704 24629,'-42'-1'-54,"18"17"789,-14-12-383,34 36-2732,-28-18 3016,29 24-2186,-11-6 963,14 5-211,0-11 0,0 2-762,0 19 632,-1-18 0,2 0-966,19 16 864,-15-3-1147,33 0 1318,-26-17 0,-1 0-1000,11 14 1067,-4-11 0,-1-1-327,-2-3 937,5 11 0,-9-28 0,-11 2 0</inkml:trace>
+  <inkml:trace contextRef="#ctx0" brushRef="#br0" timeOffset="125894">29063 1432 23009,'-26'-33'-6674,"-7"-17"3930,30 11 2094,-5-1 1,3 1-94,24 1 1242,-6 3 1,4 3 213,22 6 415,5-5-1560,-10 14 2251,2 2 163,-1 2-1350,0 1 1,-4 2 0,0 0 0</inkml:trace>
+  <inkml:trace contextRef="#ctx0" brushRef="#br0" timeOffset="126581">29458 780 23009,'0'-3'-5935,"0"23"3806,0-2 1245,0 25 785,0 19-327,0-10 205,7-2 1,0 2-254,-4 11-425,9-22 0,0 0 242,-9 11 553,18-3-495,-19-5 401,18-6-162,-13-4 75,10-6 213,-4-1-240,-3-10 456,4-2-100,-6-11 1417,8-22 6,-5-10-60,10-24-267,-8 9-132,5-11 128,-6 24 104,1-3-429,-6 14-838,1 10-64,2 1 1097,-2 8-54,12 16-1348,-6 7-510,15 20-151,-7-5-144,4 0 250,-6-12-684,0-2-299,0-2 449,9-4 1711,-5-3 618,13-6 748,-15-4-228,4-5 528,-10-20-413,0 15 973,-4-36-1972,1 35 1439,-5-35-1840,0 25-70,-3-26-963,-2 15-442,-1-1 354,-2 33-1171,0 13 1623,18 29-2443,-13-10 2427,27 11-697,-10-32 1495,27 16 69,-15-29 1006,14 9-53,-29-30 359,12-8 913,-15-9-1314,1-3 125,-6 9-674,-3-1-499,-3 3-1274,1-5 394,-4 17-626,1-11-78,-2 44 354,-1-1-428,17 23-1991,4 14 1326,0-21 2130,4-4 0,0-2 1,-2 1-1,28 6 0</inkml:trace>
+  <inkml:trace contextRef="#ctx0" brushRef="#br0" timeOffset="126876">30960 1240 24089,'-24'-13'-3590,"-12"0"3122,17 7 628,-13 16 1780,14 10-1685,1 19-822,16-8-574,-5 2-107,6-4 661,19-7-290,-14 3-565,32-8-5,-21-9 664,5-16 2207,-9-14-732,-12-20-1580,0-4 348,0 9-218,0 4 412,0 14-1034,-13 8 1156,10-5 1,-10 14-1,13-7 1</inkml:trace>
+  <inkml:trace contextRef="#ctx0" brushRef="#br0" timeOffset="127261">31182 1348 23189,'4'3'-3955,"0"1"1481,-1 3-290,-2 1 1764,2 6 167,-1-1 322,0 4 237,0 1-1586,1 11 1197,0-8 505,0 12 649,-2-18-105,0 3-144,-1-12-50,2-1-562,0-5 1234,0-13-401,5-10 313,-1-7-208,11-22 174,-5 16-296,0 3 0,-1-1 263,3-5 627,4-9-1245,-8 22 375,0 5-110,-4 5 94,5 8 754,-6 4-103,10 25-2014,-7-16 784,11 53-1180,-6-35 99,5 33-340,4-9-165,-5-12-2958,17 20 1115,-11-28 3695,8 4 0,-6-17 0,1-3 1</inkml:trace>
+  <inkml:trace contextRef="#ctx0" brushRef="#br0" timeOffset="127610">31763 1288 24449,'-34'0'90,"4"0"-90,16 17-528,4 0-255,10 19-1127,0-6 546,0 0 340,21-14-228,-15 3-786,32-17 2032,-25 6-840,6-29 1386,-9-3 1023,-10-11-1383,-17-4-966,13 10 74,-12 1 863,3 12-1804,10 31 1422,-9 19-519,12 14 388,-2-13 0,4-1 292,12 11 176,-12-9 0,0-1-475,13 6-932,-15 5-1694,0-12 2897,0-12 0,0 2 1,0-11-1</inkml:trace>
+  <inkml:trace contextRef="#ctx0" brushRef="#br0" timeOffset="127811">30822 711 22020,'20'47'-9632,"7"-11"7200,-25 5 2229,9-10 0,-11 2 0,0 1 0</inkml:trace>
+  <inkml:trace contextRef="#ctx0" brushRef="#br0" timeOffset="128033">30465 796 22110,'19'22'-6491,"6"2"4562,-23 23 766,7 0-20,-9-11-111,0 8 1446,0-20 1,-19 3-1,-5-10 1</inkml:trace>
+  <inkml:trace contextRef="#ctx0" brushRef="#br0" timeOffset="128210">30780 471 23279,'49'0'-399,"-14"9"1,1 0-1294,17-4 1526,-7 10 1,-1 3 0,5 6-1,-18-5 1,0 1 0</inkml:trace>
+  <inkml:trace contextRef="#ctx0" brushRef="#br0" timeOffset="136514">23130 3389 21570,'0'-12'-5846,"0"0"3808,0-2 1333,0-1 247,0-2 482,0-1-328,-14-1-151,10-1-1129,-10 0 1748,14-1-74,0-1 180,0 1 0,0 1-90,0 2-180,0 2 136,0 1 212,0 4-153,0 1-15,0 6-90,0 18-90,0 14 0,0 12 0,0 8 0,0-6 0,14 5-186,-12-11 1,0 1-439,12 22 158,-13-21 0,-2 0-20,1 15-234,0-4-89,0-3-1,0-4 810,0-4 0,0-3 0,0-3 0</inkml:trace>
+  <inkml:trace contextRef="#ctx0" brushRef="#br0" timeOffset="136693">22877 3574 21750,'-4'-27'-7236,"2"2"4867,1 1 1481,19-9 2000,-14 10-1151,51-8 1931,-30 19-452,33 2-2277,-2 7 1234,-9 3 0,17 15 0,-14 3 0</inkml:trace>
+  <inkml:trace contextRef="#ctx0" brushRef="#br0" timeOffset="137078">23668 3486 22290,'-48'0'270,"9"0"-270,-1 0-90,10 0 180,-9 14 738,12-10-577,-6 25-323,16-6-312,7 8-603,3 1-206,7-9-403,19-3 50,7 6-689,12-8 1029,18 2 492,-16-14 788,-5-3 1,0-2 842,9-1 276,11-18 1019,-8-8-77,-15-11-777,10-15-681,-25 17-42,-2-25-1222,-10 27-616,-4-23-342,-1 34-666,-15-6-475,11 38 1966,-10 7 811,37 2-658,-17 14-189,36-17 1431,-38 14-1099,35-8-246,-9 6 488,11-14 270,15 12 0,-21-24 0,10 8 0</inkml:trace>
+  <inkml:trace contextRef="#ctx0" brushRef="#br0" timeOffset="137277">24342 3235 22470,'-19'-17'-5865,"4"5"4695,5 1-205,7 26 1104,9 24-686,-3 4 372,13 13-208,2-21-1365,-14 3 722,27 16 6,-13-13 1315,7 9 0,-2-20 0,-7-3 1</inkml:trace>
+  <inkml:trace contextRef="#ctx0" brushRef="#br0" timeOffset="137443">24077 3291 21750,'60'-1'-404,"-10"0"0,0 1 0</inkml:trace>
+  <inkml:trace contextRef="#ctx0" brushRef="#br0" timeOffset="137677">23747 2725 22920,'-27'0'-90,"1"0"90,6 15 552,-3 4-442,8-1-1166,0 35-1078,10-29 1795,2 32 0,3-23 1,0 1-1</inkml:trace>
+  <inkml:trace contextRef="#ctx0" brushRef="#br0" timeOffset="137844">24118 2616 21300,'-17'24'-1332,"3"11"1,14 16-1,0 1 1</inkml:trace>
+  <inkml:trace contextRef="#ctx0" brushRef="#br0" timeOffset="138460">25082 3389 23459,'-21'14'1279,"5"5"-2168,16 19-2469,0-7 1487,0 2 564,0-10 374,0-1 233,0-2-897,0-3-319,14-2 551,-10-5 745,10 0 967,-14-4-437,9-3 902,0-1 388,10-22 246,-5-9-559,-1-12-397,-2-2 694,0 7-1015,0-1 363,6-13-778,-6 16-356,7-12-199,-10 32 1145,5 1 563,-6 13 216,3 16-2137,3 12-135,-2 8-178,11 21 113,-10-20-176,11 25-242,-12-29-612,6 7-23,-8-20 2191,2-4 357,-3-8 373,3 3 22,-4-10 1250,8 4-270,-4-25-8,13-9 422,-6-10-594,6-3-193,-5 10-222,0-1-209,0 3-1080,-3 2 240,2 5 499,-5 4-799,7 3 1255,-7 8 136,10 1-119,-10 7-299,4 18-1913,-5-13 1106,1 32-1877,0-20 693,10 30-1520,-5-16-1166,18 21 689,-9-24 2971,7 7 0,-4-18 0,-1 0 0</inkml:trace>
+  <inkml:trace contextRef="#ctx0" brushRef="#br0" timeOffset="139188">26265 3424 23369,'0'-14'-5036,"-19"-5"3030,15 7-624,-33-4 3552,18 12 89,-18-1 12,12 23 267,1-14-850,8 28 470,0-11 276,8 8-1,1 1-1561,7-2-638,0-8-442,21 8-640,-2-18 814,6 4 927,2-13 642,-11 3 236,12-20 1073,-4-6 121,-5-20-877,-10 1-282,-3 2-967,-6 8-146,0 31-964,0 15 444,14 18-1601,-10 3 849,26-8 1009,-6 11-380,6-12 223,17 5 953,-19-14 210,24-8 965,-22-2 587,9-8 57,-13-19 27,-3 15 555,-3-34-1422,2 12 434,-9 1 270,2-25-2517,-11 30 126,0-19-680,-4 43-347,0 13-224,0 28 934,18-12-710,-13-1 522,27-8 1071,-16-12 182,1 8-285,8-19 1743,-15 5-1090,13-6 1300,-10-15 138,1 11 847,-3-28-2006,-4 8-176,2-14-56,-6 15-1615,0-4 972,-3 40-1594,0 5 548,0 19-861,0 10 1500,0-8 19,14 1-414,-10 2 555,10-2-472,-1-3 400,-10-3 442,17 3-1019,-17-11 1036,5 3 1,-8-20 0,0-1 0</inkml:trace>
+  <inkml:trace contextRef="#ctx0" brushRef="#br0" timeOffset="139366">26955 2492 23819,'-15'-4'-1915,"-2"23"2013,-1 1 147,-12 25-901,26-4-1516,-11-1 1,-2 3 2049,8-9 1,1 1-1,-2 15 1,1 0 0,3-13-1,-1 0 1</inkml:trace>
+  <inkml:trace contextRef="#ctx0" brushRef="#br0" timeOffset="139530">28418 3702 22830,'0'0'0</inkml:trace>
+  <inkml:trace contextRef="#ctx0" brushRef="#br0" timeOffset="157598">23215 5365 21660,'0'-6'-5486,"0"1"3628,-7 0 1599,5 0-1459,-6-1 1915,3 1-335,4 0-654,-4 2-438,5 0 1320,-3 2 729,1 0-650,-1 1 2125,1 14-2285,1 3 111,0 17 489,1-6-1065,0 1 456,0-5-820,0-2 294,16-1-1325,-13-1 947,30 5 754,-29-9-1030,37 8 1372,-27-16-121,30 2 1099,-22-9 304,7 0 335,-10-16 448,-1 11-671,-4-27-265,-2 27 437,-3-31-1729,-4 30 801,-2-41-1902,-2 31-113,-1-22-688,0 18-119,-17 9 1794,13-4-2566,-12 35 3582,16 4-2458,0 20 1456,9-13 1,4 0-633,11 12 368,2 17 147,-8-28 0,0-2-713,3 20 933,-5-11 1,1 0-1894,2 5 1612,-7-11 1,-2-1 17,-2-1 570,7 13-250,-8-31 0,-3 2 0,-4-15 0</inkml:trace>
+  <inkml:trace contextRef="#ctx0" brushRef="#br0" timeOffset="157916">23825 5106 22920,'0'-7'-5666,"0"1"3537,0 2 1065,0 1 425,0 1 124,-16 1 1835,13 18-1306,-13-2-73,32 18-546,2-8 353,15-10 1030,-15 1-714,10-15 1525,-13 5-2136,8-26 1711,-6-1-1395,-9-22 765,-4 5-1176,-25 3-1194,16 7 1876,-31 15 1,32 7 0,-12 6-1</inkml:trace>
+  <inkml:trace contextRef="#ctx0" brushRef="#br0" timeOffset="158177">24787 5235 22830,'-48'-9'-1290,"-2"2"944,10 7 845,3 0-254,14 18 215,3-14 89,0 43-1352,10-27-517,1 35-252,28-25-1030,-15 6 2273,42-13 1,-22-2 0,25-3-1</inkml:trace>
+  <inkml:trace contextRef="#ctx0" brushRef="#br0" timeOffset="158846">25197 5242 22740,'-21'-10'-2999,"0"1"1978,-19 3 1628,4 3-70,0 23 704,2 2-571,8 21-984,11-11-477,9-1 477,6-9-469,0-2-558,22-2 229,-17-1-1598,38-4 1825,-14 0 656,11-8 748,-1 0 409,0-19 1351,-12 10-420,7-24-433,-12 6 838,-3-13-2360,-5-2-131,-7 7-552,-6 29 828,15 10-1787,3 27-660,20-2 797,-8-13 461,3 5 363,-7-23 1261,1 8-348,14-11 63,-12 0 857,18 0 1079,-24-18-450,10-2-151,-20-2-727,1-7-1251,-12 14-13,0-8-897,-3 27-242,18 8 290,2 8-336,19 5 91,-8-22 1946,8 6-197,-14-9 994,14-16 877,-18 12-7,10-27-743,-18 11-116,2 2-383,-8-12-1836,-3 26 1488,-2-20-1785,0 21 53,-1-7-298,1 10 1545,1 0 438,5 19-2421,1 6 848,4 9-1982,6 14 1485,-4-19 1280,11 16 1,-11-22 0,5 5 0</inkml:trace>
+  <inkml:trace contextRef="#ctx0" brushRef="#br0" timeOffset="159044">25013 4891 22650,'-2'-10'-7826,"1"-3"5575,27 5 5930,10 0-2341,16 5-1186,1 3-24,-9 0 1,1 0 0,1 0 0</inkml:trace>
+  <inkml:trace contextRef="#ctx0" brushRef="#br0" timeOffset="159216">25910 4692 21210,'44'-1'-81,"-8"-1"-296,4 2 0,-6 19 0,2 4 0</inkml:trace>
+  <inkml:trace contextRef="#ctx0" brushRef="#br0" timeOffset="159727">27402 5070 23279,'0'-29'-6115,"-19"12"4490,15-1-504,-36 16 4032,35-12-3574,-30 13 3022,17-5-838,-9 27-409,10 3 1088,8 22-849,9-11 149,0-2-1988,22-4 1880,-17-9-2320,38 5 1479,-14-17-267,10 0 754,0-8 1192,-15 0 374,1-18 252,-5 14 388,-1-37-905,-3 18-1198,-8-8 1,-2-4-878,5-14 285,-7 2 0,-2-1-973,1-16 814,-1 21 1,-4-2 40,-6-1 1,-1 1-1626,5-21 1689,-4 17 1,-1 2-792,-2 4 672,8-4 123,-8 52 2753,11 4-2246,0 30-37,10-8 0,1 2-228,-5 21 118,11-1 0,4 0 40,-10-20 0,-1-1 106,0 11 1,1 0-495,26 12-2162,-24-3 2165,15-3-397,-9-4-57,-2-4 114,-1-7-358,1 3-210,-7-14 1358,-1 0 1,-7-16-1,-2-3 1</inkml:trace>
+  <inkml:trace contextRef="#ctx0" brushRef="#br0" timeOffset="159860">27323 4780 22470,'0'-36'-6296,"19"3"6818,-15 0-1705,51 4 3345,-23 2-1827,13 13 0,5 3-244,-17 2 0,0 2-16,12 0 1,1 3 0,-12 1 0,-1 2-1,33 1 1</inkml:trace>
+  <inkml:trace contextRef="#ctx0" brushRef="#br0" timeOffset="160093">28392 4435 23459,'-26'-5'-1213,"12"14"2558,-4 17-2109,16 10-1410,-9 8 1319,7 20-322,-2-13 796,4-3 1,0 0-1792,0 7 840,2-8 0,0-1-1379,0 4 2313,0 11 1,17-26-1,4-3 1</inkml:trace>
+  <inkml:trace contextRef="#ctx0" brushRef="#br0" timeOffset="160446">28482 4951 22650,'2'-8'-3775,"2"2"3812,0 6 943,1 0-393,2 0-195,-1 14-2720,3-10 2131,0 28-1946,1-16 1113,1 17-683,2 7-501,-2-10-68,4 17 80,-8-24 2598,5 8-1992,-8-21 1446,6 1 393,-4-11 1972,7-19-370,0-7-271,11-29 207,-5 9-388,6-6 315,-7 17-2,-1 3-593,-1 4-1698,3 4 680,-4 5 310,9 9 1102,-11 3-62,11 29-2203,-10 6-702,6 14-60,-4 0-169,1-9-158,1 0-952,10 9-831,-4-11 3217,20 2 0,-15-18 0,11-3 0</inkml:trace>
+  <inkml:trace contextRef="#ctx0" brushRef="#br0" timeOffset="160816">29323 4415 23009,'-17'-11'-4485,"3"28"5323,14 36-3007,0 6 1391,7-8 1,0-1-492,-3 6 802,10-9 1,1-1-544,-1 5-1104,3 10 1141,3-15-835,-10-17 1744,5 8-583,-7-26 714,-4-21 898,-4-15-242,0-27-26,0 15-356,0-1 398,0 13-135,12 6 1240,3 24-548,19 26-1815,-9 9 13,-5-7 1,1-1-642,6 3 219,-2-7 0,1 0 1005,7 0 0,12 6 0,-12-17 0</inkml:trace>
+  <inkml:trace contextRef="#ctx0" brushRef="#br0" timeOffset="161160">30005 4826 23639,'-21'-14'-4651,"4"1"2974,3 2 601,-1 6 1455,-1 18 955,-6-8-77,19 32-2152,-7-8-21,10 20 505,0-8 70,0-6 96,23-12-572,-17-5-1412,33-2 992,-24-2 1144,16-7 567,-6 0 643,-2-26 598,-12-5-782,0 0-287,-10-19 106,4 27-1129,-5-18 155,0 8-843,0 7-52,0 20-598,0 14 152,15 28-2406,4 3 3864,0-8 1,13-2-1,-11-13 1</inkml:trace>
+  <inkml:trace contextRef="#ctx0" brushRef="#br0" timeOffset="161542">30480 4857 23369,'5'-8'-2044,"0"2"2185,1 6 357,2 0-199,0 16-2895,2-12 2323,1 34-1379,0-19-424,7 38 406,-4-17 632,-4-6 1,0 0-1041,2 5-85,3 20 2328,-9-32-1442,1 4 1653,-5-18-3,1-3-427,-3-23 707,-15-9-143,11-33-82,-11 6 146,13-2 1,4-2 160,-2-7-456,0 3 0,0 1 7,0 7 38,8 14 1,1 3 168,-5 3 126,32 0 1273,-32 21-573,27 4 376,-15 3-24,13 23-1298,0 2-1134,-8 1-1945,-1 25 513,-13-31 1687,0 24 1,-7-21 0,0-1 0</inkml:trace>
+  <inkml:trace contextRef="#ctx0" brushRef="#br0" timeOffset="161726">29812 4253 24089,'0'-25'-6476,"19"3"8092,4 2-468,0 9 214,17 2-1392,-22 8-1015,7 17 598,4-12 0,-25 44 1,13-8-1</inkml:trace>
+  <inkml:trace contextRef="#ctx0" brushRef="#br0" timeOffset="161860">29778 5646 25708,'0'11'-2226,"0"-2"0,0-5 0,0-3 0</inkml:trace>
+  <inkml:trace contextRef="#ctx0" brushRef="#br0" timeOffset="166760">26205 7417 21570,'-5'0'810,"0"0"-810,14 0 0,-2 0 0,9 0 90,-8 0-180,1 0 90,-4 0 0,1 0 90,-3 0-1799,0 0 1709,-13 0 0,9 0 0,-9 0 0</inkml:trace>
+  <inkml:trace contextRef="#ctx0" brushRef="#br0" timeOffset="168050">26052 7062 21300,'-12'16'-746,"2"1"-293,10 17-1550,0-9 1036,0 1 517,0-4 296,0-3 186,0 3-1043,0-3 345,0 2 217,0-2 1035,0 0 0,0-1 0,12 4-433,-9-6 82,22 7 520,-8-13 362,6-1 323,2-5 484,-6-4 181,4 1 23,1-1 577,0-16 156,2 12-552,10-29-639,-9 9-179,12-16-657,-21 6-456,6-5-173,-16 17-405,0-2-364,-6 10-421,-2 1 67,0 60-164,0-22 919,0 24 1,0 4-202,0-1 392,7-1 1,4 0-569,10 11 555,-2-6 0,2 1 51,-5-24 0,-1-1 140,0 12 1,-1-1-319,6 16 39,-3-4 184,-1-2 23,0 8 371,-6-19 165,1 11-57,-8-34 91,0 1 1,-3-17 0,0-1 0</inkml:trace>
+  <inkml:trace contextRef="#ctx0" brushRef="#br0" timeOffset="168743">26650 7059 21660,'0'7'-6385,"1"-1"3570,-1-1 1768,3-3 1010,0 2-426,2-2 1010,0 0 9,3 1-1114,-2-3 2150,7 1 70,-5-1 12,6 0-191,-5-14-70,3 10 95,-5-24-1802,-1 25 1547,-3-19-2636,-3 13 139,0-7-352,-14 8 620,10 24 310,-24 7 225,25 24 89,-9-5-1101,12-5 1243,0 2 50,17-17-16,-13 5-663,32-13 1233,-31 0-2770,37-3 3336,-9 0-437,11-6 1013,15 0-86,-26-5 592,18-19 455,-25 14-1287,3-30 706,-16 31-731,-3-34-1584,-4 23-155,-3-18-757,-3 10-131,0 0-836,-17-5-63,-5 8 1111,-19-6-630,3 17 1441,3 1-480,16 28 997,6 4 0,13 12 1,0-4-1</inkml:trace>
+  <inkml:trace contextRef="#ctx0" brushRef="#br0" timeOffset="169150">27417 7126 22200,'-20'-3'-1572,"-6"2"1974,14-3-1409,-1 19 1090,4 4-636,9 20-983,0-1 541,33 10-890,-25-15 170,46-4 795,-41-19 288,17-25 1330,-15-7-327,-5-1 484,-5-14-244,-3 13-110,-2-8-102,0 0-917,0 15 158,0 25-1815,0 12 1120,18 17-374,3 9 540,2-18-845,20 17 1756,-29-21 0,23 2 1,-18-11-1</inkml:trace>
+  <inkml:trace contextRef="#ctx0" brushRef="#br0" timeOffset="169392">26643 6869 22290,'0'-27'-6476,"28"0"8496,-21 0-3212,47 0 3342,-32 2-1834,26 3 757,6-2-167,-11 9-913,-8 8 1,1 2 878,5 3-981,10 22 0,-15-15 0,-1 16 0</inkml:trace>
+  <inkml:trace contextRef="#ctx0" brushRef="#br0" timeOffset="170280">28333 7054 23189,'-16'-7'-3170,"-1"16"5598,-3 15-2722,7 8-829,13 4-645,0-5 594,0 13 137,23-10-832,-17 7 699,45-15-348,-27-5-27,23-3 1374,-10-5 853,0-6 359,3-2 250,14-5 668,-13-19 560,16-6-850,-28 1 316,1-31-1488,-20 34-116,-3-37-1174,-7 30-408,0-2-305,-19 14-544,15 0-778,-32 10 2445,17-1 305,-2 27 742,7 5 224,14 13-888,0-2 0,0-11-194,0 13 761,17-13-2118,3 6 177,0-10-385,15-12 1708,-11 1 860,17-10 787,-11-19 395,-1-3-119,-13-21-772,-3 1-223,-6 3-621,-6 8-1247,-1 32 182,0 10-787,19 9-441,-15 14-13,29-30 2690,-29 29-1375,29-29 1705,-12 22-1080,10-24 1360,6 9-197,-15-11 590,12-16 857,-18 12-1795,6-29 637,-12 29-331,0-33-402,-4 23-1180,-1-17-134,-2 19-608,0-10-618,-3 10 17,0 13 702,19 8-373,-15 24 815,28-5 305,-13-11 285,10-1 379,0-14 1083,-6 4-247,-6-6 652,-4-15-1034,-6 11 1641,0-21-1943,-3 22 1343,0-7-1517,2 10-72,-1 0 419,2 17-2765,2-13 1448,2 26-2527,2-26 3112,0 24-3206,1-24 3205,3 24 0,-5-16 1,3 12-1</inkml:trace>
+  <inkml:trace contextRef="#ctx0" brushRef="#br0" timeOffset="170468">28432 6777 23189,'0'-14'-6475,"0"2"4346,24 2 5518,13 0-2144,13 6-1789,-12 2 0,0 1 540,12 1 1,-16 6 0,-1 3 0,14 11 0</inkml:trace>
+  <inkml:trace contextRef="#ctx0" brushRef="#br0" timeOffset="171143">30325 7098 22830,'-24'-8'-2616,"-2"1"2209,-24 27 2736,6 4-1468,19 11-1295,-5-2 237,28-11-985,-10 10 276,12-11-14,0 7-95,19-14-1074,5-6 1083,22-2 1129,1-6 26,-20-22 1335,12 16-301,-34-39-990,25 26 1774,-27-22-2146,16 8 191,-18-4-1179,5 0 239,-6-4-93,0-18-672,-18 14 697,13-21-1107,-13 33 1489,4-4-992,10 51 1995,7 37-901,15 12 256,1-9 0,0-1-501,-1 4 480,-1-11 0,0 0-1112,5 2 115,-1-9 1,1-3 1378,7-6 1,-7 6-1,-16-26 1</inkml:trace>
+  <inkml:trace contextRef="#ctx0" brushRef="#br0" timeOffset="171300">30125 6826 23279,'0'-33'-6295,"0"1"4166,26 4 3989,-3 3-731,27 3 651,-7 3-1134,-7 10 1,1 1-37,21 0-1357,-7 4 1,0 2 1003,6 2 1,-19 6 0,-2 5 0,11 11 0</inkml:trace>
+  <inkml:trace contextRef="#ctx0" brushRef="#br0" timeOffset="171528">31108 6465 22740,'0'43'-6296,"0"-5"4168,0 28 1063,0-19 746,0-2 0,0 1-107,0 9 139,0-7 0,0-2-751,0 6 668,6-11 0,1-1 1,-4-2-1,10 10 1</inkml:trace>
+  <inkml:trace contextRef="#ctx0" brushRef="#br0" timeOffset="171826">31250 6991 23549,'4'-7'-1757,"0"2"1330,0 5 995,1 0-226,6 0-115,-2 14-2196,5-11 1923,4 21-1738,-3-9 670,10 9 201,-10-10-576,9 3 243,-12-15 1036,4 6 1162,-5-8-338,2 0 1800,-2-16-357,9-5-562,-6 1-400,10-12-179,-11 17-882,3-4 521,-10 9-1026,1 10 471,-4 0 418,1 0-1418,-3 16-1618,2 17-42,-3 9 2305,0 13 0,0-6 0,0 3 1</inkml:trace>
+  <inkml:trace contextRef="#ctx0" brushRef="#br0" timeOffset="172528">27753 7883 23819,'-16'-10'-4430,"12"1"174,-12 5 5622,-1 2-235,12 18-1527,-29 3 1907,30 19-2232,-27 3 498,20 5 165,-12 8 1435,5 5-2008,1 1-331,6-16 0,0 0 400,4-12 0,-1 1 279,-3 20 1,1-1 0,0 6 0,3-22 0,0 0 0</inkml:trace>
+  <inkml:trace contextRef="#ctx0" brushRef="#br0" timeOffset="172892">27115 8380 23459,'-4'-3'-4905,"0"1"3914,0 2 1896,2 18-2019,-1 12 270,2 13 487,1-6 1,0 1-242,0 18-271,7-5 0,2 2 184,-5 12 386,5-22 0,4 5 1,-2-5-606,-4-10 1,0 0 616,7 27 1,1-2-464,-3-10 492,-3-13 0,-1-2-141,-1-3 908,7 9-747,-6-26 233,-1-1 65,12-10 1715,-1-28-304,33-14-636,-31 14 0,1-4-941,21-13 1,2 0 417,-16 13 0,0 1-3,11-11 0,0 1 1,-12 11-1,0 1 0,0 0 1,0 1-1</inkml:trace>
+  <inkml:trace contextRef="#ctx0" brushRef="#br0" timeOffset="173976">24462 10683 23189,'0'-7'-5126,"0"-13"2908,22-17 3368,-17-9-1929,38 3 2130,-38-5-2052,35-4 1343,-25-2-1718,17-2 2083,-21-2-619,8-2-843,-16 0 310,14-2-445,-15 19 0,-2 1 385,6-20-385,-6 23 1,0 2 46,0-4-464,-19 8 161,15 10-139,-29 11 1828,17 43-146,-1 3-261,2-1 0,2 5 73,9 27-377,-9-29 1,-2 1 159,10 3 0,1 2 69,-4 0 0,1 0-90,3 1 1,2-1-666,2-1 0,0 1-114,-1 12 0,2 0-36,8-16 1,3 1-613,2 18 1,4-3 325,2-27 0,4-2 22,11 10 0,1-5 46,13-6 942,-16-12 1,1-2 0,19-6-1,0-3 1</inkml:trace>
+  <inkml:trace contextRef="#ctx0" brushRef="#br0" timeOffset="174226">25245 10505 23189,'2'-23'-5135,"-1"-3"3090,-18 13 1769,-9-4 180,-24 16 1456,8 20 372,-1-13-805,12 41-1311,4-27 2008,1 21-640,13-12-536,-7 12 1,17-12-1744,-7 13-460,10-22-98,16-2 709,-12-6-1285,27-11 2843,-10 5-340,13-26 1069,-2-6 350,-14-11-2071,-7-12 536,-11 18-387,0-11 450,0 16-2517,-17 1 2082,12 6 1,-12 2-1,17 2 1</inkml:trace>
+  <inkml:trace contextRef="#ctx0" brushRef="#br0" timeOffset="174676">25732 10361 22920,'-20'-4'-1501,"-5"1"1427,-22 3 490,23 18 229,-16 5 86,22-1-1080,-11 29-190,13-33 413,8 35-796,8-32-425,24 4-343,-18-12-805,39-6 1729,-40 2-844,54-8 2145,-38 3-670,38-22 1992,-35 14 92,5-30-579,-19 10 261,-2-8-2088,-8 1 1121,0 9-2230,0 4 321,-20-2-778,15 35 593,-15-6 2283,20 36-1564,0-10 135,0 6 576,16 3-662,4 19 123,0-15 178,-2-10 0,-1 0-955,3 3-24,-5-5 0,1-1 677,1-3-90,-8 14-334,-9-33-949,-17 1 2703,-4-12 0,0 0 0,4-2 1</inkml:trace>
+  <inkml:trace contextRef="#ctx0" brushRef="#br0" timeOffset="174866">26292 10343 22110,'9'18'-8213,"-1"11"5335,-2-26 3541,-2 29-1496,0-18-129,0 17 777,-1-7-85,0 3-1570,3 10 1894,-1-11-1563,3 13 1243,-2-22 0,0 3 0,-2-11 0</inkml:trace>
+  <inkml:trace contextRef="#ctx0" brushRef="#br0" timeOffset="175026">26252 9980 22830,'0'-16'-1132,"22"29"0,-17-14 1,18 23-1</inkml:trace>
+  <inkml:trace contextRef="#ctx0" brushRef="#br0" timeOffset="175376">26760 10322 22290,'2'8'-7971,"0"-1"5766,3 6 643,-2-3 691,2 5 278,0 4 115,-1-3 381,3 14-1962,-2-13 2074,2 10-18,-3-14 78,4 5-247,-5-13 304,4 0 349,1-5 1393,3-19-521,11-10 418,-5-13-1060,0 9 0,0 1 1120,6-13-83,8-13-67,-4 9-858,-5 17-1151,10-1 842,-12 23 444,12 3 89,-13 25-1927,7-13 1232,-7 39-1979,-1-20 399,2 24-1996,-3-5-537,1 3 3064,-1 2 0,-1 3 1,0 0-1</inkml:trace>
+  <inkml:trace contextRef="#ctx0" brushRef="#br0" timeOffset="175926">27928 10287 25078,'-5'0'360,"0"0"-360,1 0-328,1 10 0,0-7 0,2 7 0</inkml:trace>
+  <inkml:trace contextRef="#ctx0" brushRef="#br0" timeOffset="176392">28392 10034 23999,'-20'20'-419,"5"15"-1446,15 10 554,0-5 0,0 1-172,0 16 958,0-4 1,0 2 203,-1-21 1,2 1-103,7 21 1,1-1-1487,-5 6 941,13-23 1,1-1-461,-14 7 1323,24-6-125,-25-4 1068,14-3-1450,-15-11 634,4-3-617,-24-36 1094,13-13-351,-36-17-80,36-7-32,-31 3-316,27 9 0,3-4 373,-3 9 1,1-2-115,3-8 1,1-4 0,2 2 356,2 3 1,0-2-362,0-5 1,0-5 0,0 5 163,0 5 0,0 3-46,-2-13 1,4-1 102,7 13 1,4 3 972,10-16-613,-2 21 1,1 4 651,-1 8 276,9 1 188,-15 21 597,9 18-1618,-5 11-916,-10 22-666,-3-5-152,-6 12-525,0-21-1800,-23 16 1526,4-25 1799,-7 4 1,-4-18-1,11-3 1</inkml:trace>
+  <inkml:trace contextRef="#ctx0" brushRef="#br0" timeOffset="176776">28823 9423 22650,'14'0'900,"-1"0"-451,-1 18-4103,-2-14 3248,4 46-1639,-4-27 509,1 30 460,-5-15-811,-2 3 151,-1 3 18,0 22 1966,-3-16-705,0-9 0,0 0 1007,0 2 163,0 19-301,0-34-31,0 3-152,0-16-107,0-6-50,0-22-55,18-11 1391,4-36-733,0 20 305,5-8 214,-16 25-439,8 11 1268,-2 2 63,-3 10-490,0 20-3111,-2-15 1692,7 54-1864,-2-32-121,-3 12 1,0 3-844,5 2 1981,4 15 0,-5-22 1,1-2-1</inkml:trace>
+  <inkml:trace contextRef="#ctx0" brushRef="#br0" timeOffset="177178">29548 9999 23909,'0'11'-6386,"18"8"4190,-13 20 706,12 1-81,0-11 780,-12 1 428,22-2 401,-24-2-1829,15-3 1642,-16-5 228,13 1-36,-9-10 448,2-22 922,-4-6-690,-4-22-759,0-17 231,0 9-166,0 0 1,0-1 277,0-16 6,0 6 1,0 0-116,-1 23 1,2 0-363,9-8 1,5-5-1,-3 6 312,-3-22 184,23 14 0,3 6 1024,-18 20-260,33 3 1239,-30 19-465,5 4-156,-13 24-2612,-1-18 917,-3 45-879,-4-8-603,-2 15 247,-14-15 1,-2-1-1771,8 15 2862,-28-8 1,-4 0-1,22-19 1,0-1-1,-19 8 1,-1 0 0</inkml:trace>
 </inkml:ink>
 </file>
 
@@ -1632,7 +2318,7 @@
           <a:p>
             <a:fld id="{E1FDF49B-466B-5545-87A6-07BB843D9F65}" type="datetimeFigureOut">
               <a:rPr lang="en-VN" smtClean="0"/>
-              <a:t>28/07/2021</a:t>
+              <a:t>30/07/2021</a:t>
             </a:fld>
             <a:endParaRPr lang="en-VN"/>
           </a:p>
@@ -1832,7 +2518,7 @@
           <a:p>
             <a:fld id="{E1FDF49B-466B-5545-87A6-07BB843D9F65}" type="datetimeFigureOut">
               <a:rPr lang="en-VN" smtClean="0"/>
-              <a:t>28/07/2021</a:t>
+              <a:t>30/07/2021</a:t>
             </a:fld>
             <a:endParaRPr lang="en-VN"/>
           </a:p>
@@ -2042,7 +2728,7 @@
           <a:p>
             <a:fld id="{E1FDF49B-466B-5545-87A6-07BB843D9F65}" type="datetimeFigureOut">
               <a:rPr lang="en-VN" smtClean="0"/>
-              <a:t>28/07/2021</a:t>
+              <a:t>30/07/2021</a:t>
             </a:fld>
             <a:endParaRPr lang="en-VN"/>
           </a:p>
@@ -2242,7 +2928,7 @@
           <a:p>
             <a:fld id="{E1FDF49B-466B-5545-87A6-07BB843D9F65}" type="datetimeFigureOut">
               <a:rPr lang="en-VN" smtClean="0"/>
-              <a:t>28/07/2021</a:t>
+              <a:t>30/07/2021</a:t>
             </a:fld>
             <a:endParaRPr lang="en-VN"/>
           </a:p>
@@ -2518,7 +3204,7 @@
           <a:p>
             <a:fld id="{E1FDF49B-466B-5545-87A6-07BB843D9F65}" type="datetimeFigureOut">
               <a:rPr lang="en-VN" smtClean="0"/>
-              <a:t>28/07/2021</a:t>
+              <a:t>30/07/2021</a:t>
             </a:fld>
             <a:endParaRPr lang="en-VN"/>
           </a:p>
@@ -2786,7 +3472,7 @@
           <a:p>
             <a:fld id="{E1FDF49B-466B-5545-87A6-07BB843D9F65}" type="datetimeFigureOut">
               <a:rPr lang="en-VN" smtClean="0"/>
-              <a:t>28/07/2021</a:t>
+              <a:t>30/07/2021</a:t>
             </a:fld>
             <a:endParaRPr lang="en-VN"/>
           </a:p>
@@ -3201,7 +3887,7 @@
           <a:p>
             <a:fld id="{E1FDF49B-466B-5545-87A6-07BB843D9F65}" type="datetimeFigureOut">
               <a:rPr lang="en-VN" smtClean="0"/>
-              <a:t>28/07/2021</a:t>
+              <a:t>30/07/2021</a:t>
             </a:fld>
             <a:endParaRPr lang="en-VN"/>
           </a:p>
@@ -3343,7 +4029,7 @@
           <a:p>
             <a:fld id="{E1FDF49B-466B-5545-87A6-07BB843D9F65}" type="datetimeFigureOut">
               <a:rPr lang="en-VN" smtClean="0"/>
-              <a:t>28/07/2021</a:t>
+              <a:t>30/07/2021</a:t>
             </a:fld>
             <a:endParaRPr lang="en-VN"/>
           </a:p>
@@ -3456,7 +4142,7 @@
           <a:p>
             <a:fld id="{E1FDF49B-466B-5545-87A6-07BB843D9F65}" type="datetimeFigureOut">
               <a:rPr lang="en-VN" smtClean="0"/>
-              <a:t>28/07/2021</a:t>
+              <a:t>30/07/2021</a:t>
             </a:fld>
             <a:endParaRPr lang="en-VN"/>
           </a:p>
@@ -3769,7 +4455,7 @@
           <a:p>
             <a:fld id="{E1FDF49B-466B-5545-87A6-07BB843D9F65}" type="datetimeFigureOut">
               <a:rPr lang="en-VN" smtClean="0"/>
-              <a:t>28/07/2021</a:t>
+              <a:t>30/07/2021</a:t>
             </a:fld>
             <a:endParaRPr lang="en-VN"/>
           </a:p>
@@ -4058,7 +4744,7 @@
           <a:p>
             <a:fld id="{E1FDF49B-466B-5545-87A6-07BB843D9F65}" type="datetimeFigureOut">
               <a:rPr lang="en-VN" smtClean="0"/>
-              <a:t>28/07/2021</a:t>
+              <a:t>30/07/2021</a:t>
             </a:fld>
             <a:endParaRPr lang="en-VN"/>
           </a:p>
@@ -4301,7 +4987,7 @@
           <a:p>
             <a:fld id="{E1FDF49B-466B-5545-87A6-07BB843D9F65}" type="datetimeFigureOut">
               <a:rPr lang="en-VN" smtClean="0"/>
-              <a:t>28/07/2021</a:t>
+              <a:t>30/07/2021</a:t>
             </a:fld>
             <a:endParaRPr lang="en-VN"/>
           </a:p>
@@ -4718,8 +5404,8 @@
           <a:chExt cx="0" cy="0"/>
         </a:xfrm>
       </p:grpSpPr>
-      <mc:AlternateContent xmlns:mc="http://schemas.openxmlformats.org/markup-compatibility/2006">
-        <mc:Choice xmlns:p14="http://schemas.microsoft.com/office/powerpoint/2010/main" Requires="p14">
+      <mc:AlternateContent xmlns:mc="http://schemas.openxmlformats.org/markup-compatibility/2006" xmlns:p14="http://schemas.microsoft.com/office/powerpoint/2010/main">
+        <mc:Choice Requires="p14">
           <p:contentPart p14:bwMode="auto" r:id="rId2">
             <p14:nvContentPartPr>
               <p14:cNvPr id="4" name="Ink 3">
@@ -4738,7 +5424,7 @@
             </p14:xfrm>
           </p:contentPart>
         </mc:Choice>
-        <mc:Fallback>
+        <mc:Fallback xmlns="">
           <p:pic>
             <p:nvPicPr>
               <p:cNvPr id="4" name="Ink 3">
@@ -4782,6 +5468,126 @@
 </p:sld>
 </file>
 
+<file path=ppt/slides/slide10.xml><?xml version="1.0" encoding="utf-8"?>
+<p:sld xmlns:a="http://schemas.openxmlformats.org/drawingml/2006/main" xmlns:r="http://schemas.openxmlformats.org/officeDocument/2006/relationships" xmlns:p="http://schemas.openxmlformats.org/presentationml/2006/main">
+  <p:cSld>
+    <p:spTree>
+      <p:nvGrpSpPr>
+        <p:cNvPr id="1" name=""/>
+        <p:cNvGrpSpPr/>
+        <p:nvPr/>
+      </p:nvGrpSpPr>
+      <p:grpSpPr>
+        <a:xfrm>
+          <a:off x="0" y="0"/>
+          <a:ext cx="0" cy="0"/>
+          <a:chOff x="0" y="0"/>
+          <a:chExt cx="0" cy="0"/>
+        </a:xfrm>
+      </p:grpSpPr>
+    </p:spTree>
+    <p:extLst>
+      <p:ext uri="{BB962C8B-B14F-4D97-AF65-F5344CB8AC3E}">
+        <p14:creationId xmlns:p14="http://schemas.microsoft.com/office/powerpoint/2010/main" val="1313005327"/>
+      </p:ext>
+    </p:extLst>
+  </p:cSld>
+  <p:clrMapOvr>
+    <a:masterClrMapping/>
+  </p:clrMapOvr>
+</p:sld>
+</file>
+
+<file path=ppt/slides/slide11.xml><?xml version="1.0" encoding="utf-8"?>
+<p:sld xmlns:a="http://schemas.openxmlformats.org/drawingml/2006/main" xmlns:r="http://schemas.openxmlformats.org/officeDocument/2006/relationships" xmlns:p="http://schemas.openxmlformats.org/presentationml/2006/main">
+  <p:cSld>
+    <p:spTree>
+      <p:nvGrpSpPr>
+        <p:cNvPr id="1" name=""/>
+        <p:cNvGrpSpPr/>
+        <p:nvPr/>
+      </p:nvGrpSpPr>
+      <p:grpSpPr>
+        <a:xfrm>
+          <a:off x="0" y="0"/>
+          <a:ext cx="0" cy="0"/>
+          <a:chOff x="0" y="0"/>
+          <a:chExt cx="0" cy="0"/>
+        </a:xfrm>
+      </p:grpSpPr>
+    </p:spTree>
+    <p:extLst>
+      <p:ext uri="{BB962C8B-B14F-4D97-AF65-F5344CB8AC3E}">
+        <p14:creationId xmlns:p14="http://schemas.microsoft.com/office/powerpoint/2010/main" val="480669894"/>
+      </p:ext>
+    </p:extLst>
+  </p:cSld>
+  <p:clrMapOvr>
+    <a:masterClrMapping/>
+  </p:clrMapOvr>
+</p:sld>
+</file>
+
+<file path=ppt/slides/slide12.xml><?xml version="1.0" encoding="utf-8"?>
+<p:sld xmlns:a="http://schemas.openxmlformats.org/drawingml/2006/main" xmlns:r="http://schemas.openxmlformats.org/officeDocument/2006/relationships" xmlns:p="http://schemas.openxmlformats.org/presentationml/2006/main">
+  <p:cSld>
+    <p:spTree>
+      <p:nvGrpSpPr>
+        <p:cNvPr id="1" name=""/>
+        <p:cNvGrpSpPr/>
+        <p:nvPr/>
+      </p:nvGrpSpPr>
+      <p:grpSpPr>
+        <a:xfrm>
+          <a:off x="0" y="0"/>
+          <a:ext cx="0" cy="0"/>
+          <a:chOff x="0" y="0"/>
+          <a:chExt cx="0" cy="0"/>
+        </a:xfrm>
+      </p:grpSpPr>
+    </p:spTree>
+    <p:extLst>
+      <p:ext uri="{BB962C8B-B14F-4D97-AF65-F5344CB8AC3E}">
+        <p14:creationId xmlns:p14="http://schemas.microsoft.com/office/powerpoint/2010/main" val="898183389"/>
+      </p:ext>
+    </p:extLst>
+  </p:cSld>
+  <p:clrMapOvr>
+    <a:masterClrMapping/>
+  </p:clrMapOvr>
+</p:sld>
+</file>
+
+<file path=ppt/slides/slide13.xml><?xml version="1.0" encoding="utf-8"?>
+<p:sld xmlns:a="http://schemas.openxmlformats.org/drawingml/2006/main" xmlns:r="http://schemas.openxmlformats.org/officeDocument/2006/relationships" xmlns:p="http://schemas.openxmlformats.org/presentationml/2006/main">
+  <p:cSld>
+    <p:spTree>
+      <p:nvGrpSpPr>
+        <p:cNvPr id="1" name=""/>
+        <p:cNvGrpSpPr/>
+        <p:nvPr/>
+      </p:nvGrpSpPr>
+      <p:grpSpPr>
+        <a:xfrm>
+          <a:off x="0" y="0"/>
+          <a:ext cx="0" cy="0"/>
+          <a:chOff x="0" y="0"/>
+          <a:chExt cx="0" cy="0"/>
+        </a:xfrm>
+      </p:grpSpPr>
+    </p:spTree>
+    <p:extLst>
+      <p:ext uri="{BB962C8B-B14F-4D97-AF65-F5344CB8AC3E}">
+        <p14:creationId xmlns:p14="http://schemas.microsoft.com/office/powerpoint/2010/main" val="2826222334"/>
+      </p:ext>
+    </p:extLst>
+  </p:cSld>
+  <p:clrMapOvr>
+    <a:masterClrMapping/>
+  </p:clrMapOvr>
+</p:sld>
+</file>
+
 <file path=ppt/slides/slide2.xml><?xml version="1.0" encoding="utf-8"?>
 <p:sld xmlns:a="http://schemas.openxmlformats.org/drawingml/2006/main" xmlns:r="http://schemas.openxmlformats.org/officeDocument/2006/relationships" xmlns:p="http://schemas.openxmlformats.org/presentationml/2006/main">
   <p:cSld>
@@ -4799,8 +5605,8 @@
           <a:chExt cx="0" cy="0"/>
         </a:xfrm>
       </p:grpSpPr>
-      <mc:AlternateContent xmlns:mc="http://schemas.openxmlformats.org/markup-compatibility/2006">
-        <mc:Choice xmlns:p14="http://schemas.microsoft.com/office/powerpoint/2010/main" Requires="p14">
+      <mc:AlternateContent xmlns:mc="http://schemas.openxmlformats.org/markup-compatibility/2006" xmlns:p14="http://schemas.microsoft.com/office/powerpoint/2010/main">
+        <mc:Choice Requires="p14">
           <p:contentPart p14:bwMode="auto" r:id="rId2">
             <p14:nvContentPartPr>
               <p14:cNvPr id="2" name="Ink 1">
@@ -4819,7 +5625,7 @@
             </p14:xfrm>
           </p:contentPart>
         </mc:Choice>
-        <mc:Fallback>
+        <mc:Fallback xmlns="">
           <p:pic>
             <p:nvPicPr>
               <p:cNvPr id="2" name="Ink 1">
@@ -4880,8 +5686,8 @@
           <a:chExt cx="0" cy="0"/>
         </a:xfrm>
       </p:grpSpPr>
-      <mc:AlternateContent xmlns:mc="http://schemas.openxmlformats.org/markup-compatibility/2006">
-        <mc:Choice xmlns:p14="http://schemas.microsoft.com/office/powerpoint/2010/main" Requires="p14">
+      <mc:AlternateContent xmlns:mc="http://schemas.openxmlformats.org/markup-compatibility/2006" xmlns:p14="http://schemas.microsoft.com/office/powerpoint/2010/main">
+        <mc:Choice Requires="p14">
           <p:contentPart p14:bwMode="auto" r:id="rId2">
             <p14:nvContentPartPr>
               <p14:cNvPr id="2" name="Ink 1">
@@ -4900,7 +5706,7 @@
             </p14:xfrm>
           </p:contentPart>
         </mc:Choice>
-        <mc:Fallback>
+        <mc:Fallback xmlns="">
           <p:pic>
             <p:nvPicPr>
               <p:cNvPr id="2" name="Ink 1">
@@ -4961,8 +5767,8 @@
           <a:chExt cx="0" cy="0"/>
         </a:xfrm>
       </p:grpSpPr>
-      <mc:AlternateContent xmlns:mc="http://schemas.openxmlformats.org/markup-compatibility/2006">
-        <mc:Choice xmlns:p14="http://schemas.microsoft.com/office/powerpoint/2010/main" Requires="p14">
+      <mc:AlternateContent xmlns:mc="http://schemas.openxmlformats.org/markup-compatibility/2006" xmlns:p14="http://schemas.microsoft.com/office/powerpoint/2010/main">
+        <mc:Choice Requires="p14">
           <p:contentPart p14:bwMode="auto" r:id="rId2">
             <p14:nvContentPartPr>
               <p14:cNvPr id="2" name="Ink 1">
@@ -4981,7 +5787,7 @@
             </p14:xfrm>
           </p:contentPart>
         </mc:Choice>
-        <mc:Fallback>
+        <mc:Fallback xmlns="">
           <p:pic>
             <p:nvPicPr>
               <p:cNvPr id="2" name="Ink 1">
@@ -5072,8 +5878,8 @@
           </a:prstGeom>
         </p:spPr>
       </p:pic>
-      <mc:AlternateContent xmlns:mc="http://schemas.openxmlformats.org/markup-compatibility/2006">
-        <mc:Choice xmlns:p14="http://schemas.microsoft.com/office/powerpoint/2010/main" Requires="p14">
+      <mc:AlternateContent xmlns:mc="http://schemas.openxmlformats.org/markup-compatibility/2006" xmlns:p14="http://schemas.microsoft.com/office/powerpoint/2010/main">
+        <mc:Choice Requires="p14">
           <p:contentPart p14:bwMode="auto" r:id="rId3">
             <p14:nvContentPartPr>
               <p14:cNvPr id="3" name="Ink 2">
@@ -5092,7 +5898,7 @@
             </p14:xfrm>
           </p:contentPart>
         </mc:Choice>
-        <mc:Fallback>
+        <mc:Fallback xmlns="">
           <p:pic>
             <p:nvPicPr>
               <p:cNvPr id="3" name="Ink 2">
@@ -5153,6 +5959,57 @@
           <a:chExt cx="0" cy="0"/>
         </a:xfrm>
       </p:grpSpPr>
+      <mc:AlternateContent xmlns:mc="http://schemas.openxmlformats.org/markup-compatibility/2006">
+        <mc:Choice xmlns:p14="http://schemas.microsoft.com/office/powerpoint/2010/main" Requires="p14">
+          <p:contentPart p14:bwMode="auto" r:id="rId2">
+            <p14:nvContentPartPr>
+              <p14:cNvPr id="2" name="Ink 1">
+                <a:extLst>
+                  <a:ext uri="{FF2B5EF4-FFF2-40B4-BE49-F238E27FC236}">
+                    <a16:creationId xmlns:a16="http://schemas.microsoft.com/office/drawing/2014/main" id="{7B954B36-F316-EA43-8147-F84D31B4133C}"/>
+                  </a:ext>
+                </a:extLst>
+              </p14:cNvPr>
+              <p14:cNvContentPartPr/>
+              <p14:nvPr/>
+            </p14:nvContentPartPr>
+            <p14:xfrm>
+              <a:off x="512280" y="209520"/>
+              <a:ext cx="11367000" cy="4268880"/>
+            </p14:xfrm>
+          </p:contentPart>
+        </mc:Choice>
+        <mc:Fallback>
+          <p:pic>
+            <p:nvPicPr>
+              <p:cNvPr id="2" name="Ink 1">
+                <a:extLst>
+                  <a:ext uri="{FF2B5EF4-FFF2-40B4-BE49-F238E27FC236}">
+                    <a16:creationId xmlns:a16="http://schemas.microsoft.com/office/drawing/2014/main" id="{7B954B36-F316-EA43-8147-F84D31B4133C}"/>
+                  </a:ext>
+                </a:extLst>
+              </p:cNvPr>
+              <p:cNvPicPr/>
+              <p:nvPr/>
+            </p:nvPicPr>
+            <p:blipFill>
+              <a:blip r:embed="rId3"/>
+              <a:stretch>
+                <a:fillRect/>
+              </a:stretch>
+            </p:blipFill>
+            <p:spPr>
+              <a:xfrm>
+                <a:off x="490680" y="187920"/>
+                <a:ext cx="11410200" cy="4312080"/>
+              </a:xfrm>
+              <a:prstGeom prst="rect">
+                <a:avLst/>
+              </a:prstGeom>
+            </p:spPr>
+          </p:pic>
+        </mc:Fallback>
+      </mc:AlternateContent>
     </p:spTree>
     <p:extLst>
       <p:ext uri="{BB962C8B-B14F-4D97-AF65-F5344CB8AC3E}">
@@ -5183,10 +6040,172 @@
           <a:chExt cx="0" cy="0"/>
         </a:xfrm>
       </p:grpSpPr>
+      <mc:AlternateContent xmlns:mc="http://schemas.openxmlformats.org/markup-compatibility/2006">
+        <mc:Choice xmlns:p14="http://schemas.microsoft.com/office/powerpoint/2010/main" Requires="p14">
+          <p:contentPart p14:bwMode="auto" r:id="rId2">
+            <p14:nvContentPartPr>
+              <p14:cNvPr id="2" name="Ink 1">
+                <a:extLst>
+                  <a:ext uri="{FF2B5EF4-FFF2-40B4-BE49-F238E27FC236}">
+                    <a16:creationId xmlns:a16="http://schemas.microsoft.com/office/drawing/2014/main" id="{9322F8C4-EB2B-104D-9C71-6F14860CC033}"/>
+                  </a:ext>
+                </a:extLst>
+              </p14:cNvPr>
+              <p14:cNvContentPartPr/>
+              <p14:nvPr/>
+            </p14:nvContentPartPr>
+            <p14:xfrm>
+              <a:off x="726120" y="142200"/>
+              <a:ext cx="10356120" cy="5182200"/>
+            </p14:xfrm>
+          </p:contentPart>
+        </mc:Choice>
+        <mc:Fallback>
+          <p:pic>
+            <p:nvPicPr>
+              <p:cNvPr id="2" name="Ink 1">
+                <a:extLst>
+                  <a:ext uri="{FF2B5EF4-FFF2-40B4-BE49-F238E27FC236}">
+                    <a16:creationId xmlns:a16="http://schemas.microsoft.com/office/drawing/2014/main" id="{9322F8C4-EB2B-104D-9C71-6F14860CC033}"/>
+                  </a:ext>
+                </a:extLst>
+              </p:cNvPr>
+              <p:cNvPicPr/>
+              <p:nvPr/>
+            </p:nvPicPr>
+            <p:blipFill>
+              <a:blip r:embed="rId3"/>
+              <a:stretch>
+                <a:fillRect/>
+              </a:stretch>
+            </p:blipFill>
+            <p:spPr>
+              <a:xfrm>
+                <a:off x="704520" y="120600"/>
+                <a:ext cx="10399320" cy="5225400"/>
+              </a:xfrm>
+              <a:prstGeom prst="rect">
+                <a:avLst/>
+              </a:prstGeom>
+            </p:spPr>
+          </p:pic>
+        </mc:Fallback>
+      </mc:AlternateContent>
     </p:spTree>
     <p:extLst>
       <p:ext uri="{BB962C8B-B14F-4D97-AF65-F5344CB8AC3E}">
         <p14:creationId xmlns:p14="http://schemas.microsoft.com/office/powerpoint/2010/main" val="563853014"/>
+      </p:ext>
+    </p:extLst>
+  </p:cSld>
+  <p:clrMapOvr>
+    <a:masterClrMapping/>
+  </p:clrMapOvr>
+</p:sld>
+</file>
+
+<file path=ppt/slides/slide8.xml><?xml version="1.0" encoding="utf-8"?>
+<p:sld xmlns:a="http://schemas.openxmlformats.org/drawingml/2006/main" xmlns:r="http://schemas.openxmlformats.org/officeDocument/2006/relationships" xmlns:p="http://schemas.openxmlformats.org/presentationml/2006/main">
+  <p:cSld>
+    <p:spTree>
+      <p:nvGrpSpPr>
+        <p:cNvPr id="1" name=""/>
+        <p:cNvGrpSpPr/>
+        <p:nvPr/>
+      </p:nvGrpSpPr>
+      <p:grpSpPr>
+        <a:xfrm>
+          <a:off x="0" y="0"/>
+          <a:ext cx="0" cy="0"/>
+          <a:chOff x="0" y="0"/>
+          <a:chExt cx="0" cy="0"/>
+        </a:xfrm>
+      </p:grpSpPr>
+      <mc:AlternateContent xmlns:mc="http://schemas.openxmlformats.org/markup-compatibility/2006">
+        <mc:Choice xmlns:p14="http://schemas.microsoft.com/office/powerpoint/2010/main" Requires="p14">
+          <p:contentPart p14:bwMode="auto" r:id="rId2">
+            <p14:nvContentPartPr>
+              <p14:cNvPr id="3" name="Ink 2">
+                <a:extLst>
+                  <a:ext uri="{FF2B5EF4-FFF2-40B4-BE49-F238E27FC236}">
+                    <a16:creationId xmlns:a16="http://schemas.microsoft.com/office/drawing/2014/main" id="{2FD206CF-772B-D548-BDF7-E5C845B43593}"/>
+                  </a:ext>
+                </a:extLst>
+              </p14:cNvPr>
+              <p14:cNvContentPartPr/>
+              <p14:nvPr/>
+            </p14:nvContentPartPr>
+            <p14:xfrm>
+              <a:off x="206280" y="169560"/>
+              <a:ext cx="11235600" cy="6631200"/>
+            </p14:xfrm>
+          </p:contentPart>
+        </mc:Choice>
+        <mc:Fallback>
+          <p:pic>
+            <p:nvPicPr>
+              <p:cNvPr id="3" name="Ink 2">
+                <a:extLst>
+                  <a:ext uri="{FF2B5EF4-FFF2-40B4-BE49-F238E27FC236}">
+                    <a16:creationId xmlns:a16="http://schemas.microsoft.com/office/drawing/2014/main" id="{2FD206CF-772B-D548-BDF7-E5C845B43593}"/>
+                  </a:ext>
+                </a:extLst>
+              </p:cNvPr>
+              <p:cNvPicPr/>
+              <p:nvPr/>
+            </p:nvPicPr>
+            <p:blipFill>
+              <a:blip r:embed="rId3"/>
+              <a:stretch>
+                <a:fillRect/>
+              </a:stretch>
+            </p:blipFill>
+            <p:spPr>
+              <a:xfrm>
+                <a:off x="184680" y="147960"/>
+                <a:ext cx="11278800" cy="6674400"/>
+              </a:xfrm>
+              <a:prstGeom prst="rect">
+                <a:avLst/>
+              </a:prstGeom>
+            </p:spPr>
+          </p:pic>
+        </mc:Fallback>
+      </mc:AlternateContent>
+    </p:spTree>
+    <p:extLst>
+      <p:ext uri="{BB962C8B-B14F-4D97-AF65-F5344CB8AC3E}">
+        <p14:creationId xmlns:p14="http://schemas.microsoft.com/office/powerpoint/2010/main" val="4150458199"/>
+      </p:ext>
+    </p:extLst>
+  </p:cSld>
+  <p:clrMapOvr>
+    <a:masterClrMapping/>
+  </p:clrMapOvr>
+</p:sld>
+</file>
+
+<file path=ppt/slides/slide9.xml><?xml version="1.0" encoding="utf-8"?>
+<p:sld xmlns:a="http://schemas.openxmlformats.org/drawingml/2006/main" xmlns:r="http://schemas.openxmlformats.org/officeDocument/2006/relationships" xmlns:p="http://schemas.openxmlformats.org/presentationml/2006/main">
+  <p:cSld>
+    <p:spTree>
+      <p:nvGrpSpPr>
+        <p:cNvPr id="1" name=""/>
+        <p:cNvGrpSpPr/>
+        <p:nvPr/>
+      </p:nvGrpSpPr>
+      <p:grpSpPr>
+        <a:xfrm>
+          <a:off x="0" y="0"/>
+          <a:ext cx="0" cy="0"/>
+          <a:chOff x="0" y="0"/>
+          <a:chExt cx="0" cy="0"/>
+        </a:xfrm>
+      </p:grpSpPr>
+    </p:spTree>
+    <p:extLst>
+      <p:ext uri="{BB962C8B-B14F-4D97-AF65-F5344CB8AC3E}">
+        <p14:creationId xmlns:p14="http://schemas.microsoft.com/office/powerpoint/2010/main" val="750307193"/>
       </p:ext>
     </p:extLst>
   </p:cSld>

</xml_diff>